<commit_message>
changed some things in the slides
</commit_message>
<xml_diff>
--- a/Project Presentation.pptx
+++ b/Project Presentation.pptx
@@ -6,24 +6,27 @@
     <p:sldMasterId id="2147483660" r:id="rId2"/>
   </p:sldMasterIdLst>
   <p:notesMasterIdLst>
-    <p:notesMasterId r:id="rId18"/>
+    <p:notesMasterId r:id="rId21"/>
   </p:notesMasterIdLst>
   <p:sldIdLst>
     <p:sldId id="256" r:id="rId3"/>
     <p:sldId id="288" r:id="rId4"/>
     <p:sldId id="270" r:id="rId5"/>
     <p:sldId id="298" r:id="rId6"/>
-    <p:sldId id="271" r:id="rId7"/>
-    <p:sldId id="258" r:id="rId8"/>
-    <p:sldId id="273" r:id="rId9"/>
-    <p:sldId id="299" r:id="rId10"/>
-    <p:sldId id="272" r:id="rId11"/>
-    <p:sldId id="300" r:id="rId12"/>
-    <p:sldId id="274" r:id="rId13"/>
-    <p:sldId id="303" r:id="rId14"/>
-    <p:sldId id="302" r:id="rId15"/>
-    <p:sldId id="304" r:id="rId16"/>
-    <p:sldId id="305" r:id="rId17"/>
+    <p:sldId id="308" r:id="rId7"/>
+    <p:sldId id="271" r:id="rId8"/>
+    <p:sldId id="258" r:id="rId9"/>
+    <p:sldId id="273" r:id="rId10"/>
+    <p:sldId id="299" r:id="rId11"/>
+    <p:sldId id="306" r:id="rId12"/>
+    <p:sldId id="307" r:id="rId13"/>
+    <p:sldId id="272" r:id="rId14"/>
+    <p:sldId id="309" r:id="rId15"/>
+    <p:sldId id="300" r:id="rId16"/>
+    <p:sldId id="303" r:id="rId17"/>
+    <p:sldId id="302" r:id="rId18"/>
+    <p:sldId id="304" r:id="rId19"/>
+    <p:sldId id="305" r:id="rId20"/>
   </p:sldIdLst>
   <p:sldSz cx="12192000" cy="6858000"/>
   <p:notesSz cx="6858000" cy="9144000"/>
@@ -212,7 +215,7 @@
           <a:p>
             <a:fld id="{1F1BAD5C-F1F8-43FF-B1E4-442C6F91B49A}" type="datetimeFigureOut">
               <a:rPr lang="de-DE" smtClean="0"/>
-              <a:t>11.05.2022</a:t>
+              <a:t>12.05.2022</a:t>
             </a:fld>
             <a:endParaRPr lang="de-DE"/>
           </a:p>
@@ -370,7 +373,7 @@
           <a:p>
             <a:fld id="{5976870D-EDE0-4065-9108-FF08285B4E25}" type="slidenum">
               <a:rPr lang="de-DE" smtClean="0"/>
-              <a:t>‹#›</a:t>
+              <a:t>‹Nr.›</a:t>
             </a:fld>
             <a:endParaRPr lang="de-DE"/>
           </a:p>
@@ -628,7 +631,7 @@
           <a:p>
             <a:fld id="{5976870D-EDE0-4065-9108-FF08285B4E25}" type="slidenum">
               <a:rPr lang="de-DE" smtClean="0"/>
-              <a:t>14</a:t>
+              <a:t>17</a:t>
             </a:fld>
             <a:endParaRPr lang="de-DE"/>
           </a:p>
@@ -712,7 +715,7 @@
           <a:p>
             <a:fld id="{5976870D-EDE0-4065-9108-FF08285B4E25}" type="slidenum">
               <a:rPr lang="de-DE" smtClean="0"/>
-              <a:t>15</a:t>
+              <a:t>18</a:t>
             </a:fld>
             <a:endParaRPr lang="de-DE"/>
           </a:p>
@@ -883,7 +886,7 @@
           <a:p>
             <a:fld id="{C8735BCC-3E06-4614-A9C9-2FA5849F9F0F}" type="datetimeFigureOut">
               <a:rPr lang="de-DE" smtClean="0"/>
-              <a:t>11.05.2022</a:t>
+              <a:t>12.05.2022</a:t>
             </a:fld>
             <a:endParaRPr lang="de-DE"/>
           </a:p>
@@ -940,7 +943,7 @@
           <a:p>
             <a:fld id="{B82E1514-0941-4E58-8ADF-3E33D2A7C7AA}" type="slidenum">
               <a:rPr lang="de-DE" smtClean="0"/>
-              <a:t>‹#›</a:t>
+              <a:t>‹Nr.›</a:t>
             </a:fld>
             <a:endParaRPr lang="de-DE"/>
           </a:p>
@@ -1084,7 +1087,7 @@
           <a:p>
             <a:fld id="{C8735BCC-3E06-4614-A9C9-2FA5849F9F0F}" type="datetimeFigureOut">
               <a:rPr lang="de-DE" smtClean="0"/>
-              <a:t>11.05.2022</a:t>
+              <a:t>12.05.2022</a:t>
             </a:fld>
             <a:endParaRPr lang="de-DE"/>
           </a:p>
@@ -1138,7 +1141,7 @@
           <a:p>
             <a:fld id="{B82E1514-0941-4E58-8ADF-3E33D2A7C7AA}" type="slidenum">
               <a:rPr lang="de-DE" smtClean="0"/>
-              <a:t>‹#›</a:t>
+              <a:t>‹Nr.›</a:t>
             </a:fld>
             <a:endParaRPr lang="de-DE"/>
           </a:p>
@@ -1292,7 +1295,7 @@
           <a:p>
             <a:fld id="{C8735BCC-3E06-4614-A9C9-2FA5849F9F0F}" type="datetimeFigureOut">
               <a:rPr lang="de-DE" smtClean="0"/>
-              <a:t>11.05.2022</a:t>
+              <a:t>12.05.2022</a:t>
             </a:fld>
             <a:endParaRPr lang="de-DE"/>
           </a:p>
@@ -1346,7 +1349,7 @@
           <a:p>
             <a:fld id="{B82E1514-0941-4E58-8ADF-3E33D2A7C7AA}" type="slidenum">
               <a:rPr lang="de-DE" smtClean="0"/>
-              <a:t>‹#›</a:t>
+              <a:t>‹Nr.›</a:t>
             </a:fld>
             <a:endParaRPr lang="de-DE"/>
           </a:p>
@@ -1496,7 +1499,7 @@
           <a:p>
             <a:fld id="{C8735BCC-3E06-4614-A9C9-2FA5849F9F0F}" type="datetimeFigureOut">
               <a:rPr lang="de-DE" smtClean="0"/>
-              <a:t>11.05.2022</a:t>
+              <a:t>12.05.2022</a:t>
             </a:fld>
             <a:endParaRPr lang="de-DE"/>
           </a:p>
@@ -1538,7 +1541,7 @@
           <a:p>
             <a:fld id="{B82E1514-0941-4E58-8ADF-3E33D2A7C7AA}" type="slidenum">
               <a:rPr lang="de-DE" smtClean="0"/>
-              <a:t>‹#›</a:t>
+              <a:t>‹Nr.›</a:t>
             </a:fld>
             <a:endParaRPr lang="de-DE"/>
           </a:p>
@@ -1666,7 +1669,7 @@
           <a:p>
             <a:fld id="{C8735BCC-3E06-4614-A9C9-2FA5849F9F0F}" type="datetimeFigureOut">
               <a:rPr lang="de-DE" smtClean="0"/>
-              <a:t>11.05.2022</a:t>
+              <a:t>12.05.2022</a:t>
             </a:fld>
             <a:endParaRPr lang="de-DE"/>
           </a:p>
@@ -1708,7 +1711,7 @@
           <a:p>
             <a:fld id="{B82E1514-0941-4E58-8ADF-3E33D2A7C7AA}" type="slidenum">
               <a:rPr lang="de-DE" smtClean="0"/>
-              <a:t>‹#›</a:t>
+              <a:t>‹Nr.›</a:t>
             </a:fld>
             <a:endParaRPr lang="de-DE"/>
           </a:p>
@@ -1912,7 +1915,7 @@
           <a:p>
             <a:fld id="{C8735BCC-3E06-4614-A9C9-2FA5849F9F0F}" type="datetimeFigureOut">
               <a:rPr lang="de-DE" smtClean="0"/>
-              <a:t>11.05.2022</a:t>
+              <a:t>12.05.2022</a:t>
             </a:fld>
             <a:endParaRPr lang="de-DE"/>
           </a:p>
@@ -1954,7 +1957,7 @@
           <a:p>
             <a:fld id="{B82E1514-0941-4E58-8ADF-3E33D2A7C7AA}" type="slidenum">
               <a:rPr lang="de-DE" smtClean="0"/>
-              <a:t>‹#›</a:t>
+              <a:t>‹Nr.›</a:t>
             </a:fld>
             <a:endParaRPr lang="de-DE"/>
           </a:p>
@@ -2144,7 +2147,7 @@
           <a:p>
             <a:fld id="{C8735BCC-3E06-4614-A9C9-2FA5849F9F0F}" type="datetimeFigureOut">
               <a:rPr lang="de-DE" smtClean="0"/>
-              <a:t>11.05.2022</a:t>
+              <a:t>12.05.2022</a:t>
             </a:fld>
             <a:endParaRPr lang="de-DE"/>
           </a:p>
@@ -2186,7 +2189,7 @@
           <a:p>
             <a:fld id="{B82E1514-0941-4E58-8ADF-3E33D2A7C7AA}" type="slidenum">
               <a:rPr lang="de-DE" smtClean="0"/>
-              <a:t>‹#›</a:t>
+              <a:t>‹Nr.›</a:t>
             </a:fld>
             <a:endParaRPr lang="de-DE"/>
           </a:p>
@@ -2511,7 +2514,7 @@
           <a:p>
             <a:fld id="{C8735BCC-3E06-4614-A9C9-2FA5849F9F0F}" type="datetimeFigureOut">
               <a:rPr lang="de-DE" smtClean="0"/>
-              <a:t>11.05.2022</a:t>
+              <a:t>12.05.2022</a:t>
             </a:fld>
             <a:endParaRPr lang="de-DE"/>
           </a:p>
@@ -2553,7 +2556,7 @@
           <a:p>
             <a:fld id="{B82E1514-0941-4E58-8ADF-3E33D2A7C7AA}" type="slidenum">
               <a:rPr lang="de-DE" smtClean="0"/>
-              <a:t>‹#›</a:t>
+              <a:t>‹Nr.›</a:t>
             </a:fld>
             <a:endParaRPr lang="de-DE"/>
           </a:p>
@@ -2629,7 +2632,7 @@
           <a:p>
             <a:fld id="{C8735BCC-3E06-4614-A9C9-2FA5849F9F0F}" type="datetimeFigureOut">
               <a:rPr lang="de-DE" smtClean="0"/>
-              <a:t>11.05.2022</a:t>
+              <a:t>12.05.2022</a:t>
             </a:fld>
             <a:endParaRPr lang="de-DE"/>
           </a:p>
@@ -2671,7 +2674,7 @@
           <a:p>
             <a:fld id="{B82E1514-0941-4E58-8ADF-3E33D2A7C7AA}" type="slidenum">
               <a:rPr lang="de-DE" smtClean="0"/>
-              <a:t>‹#›</a:t>
+              <a:t>‹Nr.›</a:t>
             </a:fld>
             <a:endParaRPr lang="de-DE"/>
           </a:p>
@@ -2724,7 +2727,7 @@
           <a:p>
             <a:fld id="{C8735BCC-3E06-4614-A9C9-2FA5849F9F0F}" type="datetimeFigureOut">
               <a:rPr lang="de-DE" smtClean="0"/>
-              <a:t>11.05.2022</a:t>
+              <a:t>12.05.2022</a:t>
             </a:fld>
             <a:endParaRPr lang="de-DE"/>
           </a:p>
@@ -2766,7 +2769,7 @@
           <a:p>
             <a:fld id="{B82E1514-0941-4E58-8ADF-3E33D2A7C7AA}" type="slidenum">
               <a:rPr lang="de-DE" smtClean="0"/>
-              <a:t>‹#›</a:t>
+              <a:t>‹Nr.›</a:t>
             </a:fld>
             <a:endParaRPr lang="de-DE"/>
           </a:p>
@@ -3001,7 +3004,7 @@
           <a:p>
             <a:fld id="{C8735BCC-3E06-4614-A9C9-2FA5849F9F0F}" type="datetimeFigureOut">
               <a:rPr lang="de-DE" smtClean="0"/>
-              <a:t>11.05.2022</a:t>
+              <a:t>12.05.2022</a:t>
             </a:fld>
             <a:endParaRPr lang="de-DE"/>
           </a:p>
@@ -3043,7 +3046,7 @@
           <a:p>
             <a:fld id="{B82E1514-0941-4E58-8ADF-3E33D2A7C7AA}" type="slidenum">
               <a:rPr lang="de-DE" smtClean="0"/>
-              <a:t>‹#›</a:t>
+              <a:t>‹Nr.›</a:t>
             </a:fld>
             <a:endParaRPr lang="de-DE"/>
           </a:p>
@@ -3247,7 +3250,7 @@
             <a:fld id="{C8735BCC-3E06-4614-A9C9-2FA5849F9F0F}" type="datetimeFigureOut">
               <a:rPr lang="de-DE" smtClean="0"/>
               <a:pPr/>
-              <a:t>11.05.2022</a:t>
+              <a:t>12.05.2022</a:t>
             </a:fld>
             <a:endParaRPr lang="de-DE"/>
           </a:p>
@@ -3322,7 +3325,7 @@
             <a:fld id="{B82E1514-0941-4E58-8ADF-3E33D2A7C7AA}" type="slidenum">
               <a:rPr lang="de-DE" smtClean="0"/>
               <a:pPr/>
-              <a:t>‹#›</a:t>
+              <a:t>‹Nr.›</a:t>
             </a:fld>
             <a:endParaRPr lang="de-DE"/>
           </a:p>
@@ -3537,7 +3540,7 @@
           <a:p>
             <a:fld id="{C8735BCC-3E06-4614-A9C9-2FA5849F9F0F}" type="datetimeFigureOut">
               <a:rPr lang="de-DE" smtClean="0"/>
-              <a:t>11.05.2022</a:t>
+              <a:t>12.05.2022</a:t>
             </a:fld>
             <a:endParaRPr lang="de-DE"/>
           </a:p>
@@ -3579,7 +3582,7 @@
           <a:p>
             <a:fld id="{B82E1514-0941-4E58-8ADF-3E33D2A7C7AA}" type="slidenum">
               <a:rPr lang="de-DE" smtClean="0"/>
-              <a:t>‹#›</a:t>
+              <a:t>‹Nr.›</a:t>
             </a:fld>
             <a:endParaRPr lang="de-DE"/>
           </a:p>
@@ -3707,7 +3710,7 @@
           <a:p>
             <a:fld id="{C8735BCC-3E06-4614-A9C9-2FA5849F9F0F}" type="datetimeFigureOut">
               <a:rPr lang="de-DE" smtClean="0"/>
-              <a:t>11.05.2022</a:t>
+              <a:t>12.05.2022</a:t>
             </a:fld>
             <a:endParaRPr lang="de-DE"/>
           </a:p>
@@ -3749,7 +3752,7 @@
           <a:p>
             <a:fld id="{B82E1514-0941-4E58-8ADF-3E33D2A7C7AA}" type="slidenum">
               <a:rPr lang="de-DE" smtClean="0"/>
-              <a:t>‹#›</a:t>
+              <a:t>‹Nr.›</a:t>
             </a:fld>
             <a:endParaRPr lang="de-DE"/>
           </a:p>
@@ -3887,7 +3890,7 @@
           <a:p>
             <a:fld id="{C8735BCC-3E06-4614-A9C9-2FA5849F9F0F}" type="datetimeFigureOut">
               <a:rPr lang="de-DE" smtClean="0"/>
-              <a:t>11.05.2022</a:t>
+              <a:t>12.05.2022</a:t>
             </a:fld>
             <a:endParaRPr lang="de-DE"/>
           </a:p>
@@ -3929,7 +3932,7 @@
           <a:p>
             <a:fld id="{B82E1514-0941-4E58-8ADF-3E33D2A7C7AA}" type="slidenum">
               <a:rPr lang="de-DE" smtClean="0"/>
-              <a:t>‹#›</a:t>
+              <a:t>‹Nr.›</a:t>
             </a:fld>
             <a:endParaRPr lang="de-DE"/>
           </a:p>
@@ -4150,7 +4153,7 @@
           <a:p>
             <a:fld id="{C8735BCC-3E06-4614-A9C9-2FA5849F9F0F}" type="datetimeFigureOut">
               <a:rPr lang="de-DE" smtClean="0"/>
-              <a:t>11.05.2022</a:t>
+              <a:t>12.05.2022</a:t>
             </a:fld>
             <a:endParaRPr lang="de-DE"/>
           </a:p>
@@ -4207,7 +4210,7 @@
           <a:p>
             <a:fld id="{B82E1514-0941-4E58-8ADF-3E33D2A7C7AA}" type="slidenum">
               <a:rPr lang="de-DE" smtClean="0"/>
-              <a:t>‹#›</a:t>
+              <a:t>‹Nr.›</a:t>
             </a:fld>
             <a:endParaRPr lang="de-DE"/>
           </a:p>
@@ -4418,7 +4421,7 @@
           <a:p>
             <a:fld id="{C8735BCC-3E06-4614-A9C9-2FA5849F9F0F}" type="datetimeFigureOut">
               <a:rPr lang="de-DE" smtClean="0"/>
-              <a:t>11.05.2022</a:t>
+              <a:t>12.05.2022</a:t>
             </a:fld>
             <a:endParaRPr lang="de-DE"/>
           </a:p>
@@ -4475,7 +4478,7 @@
           <a:p>
             <a:fld id="{B82E1514-0941-4E58-8ADF-3E33D2A7C7AA}" type="slidenum">
               <a:rPr lang="de-DE" smtClean="0"/>
-              <a:t>‹#›</a:t>
+              <a:t>‹Nr.›</a:t>
             </a:fld>
             <a:endParaRPr lang="de-DE"/>
           </a:p>
@@ -4833,7 +4836,7 @@
           <a:p>
             <a:fld id="{C8735BCC-3E06-4614-A9C9-2FA5849F9F0F}" type="datetimeFigureOut">
               <a:rPr lang="de-DE" smtClean="0"/>
-              <a:t>11.05.2022</a:t>
+              <a:t>12.05.2022</a:t>
             </a:fld>
             <a:endParaRPr lang="de-DE"/>
           </a:p>
@@ -4887,7 +4890,7 @@
           <a:p>
             <a:fld id="{B82E1514-0941-4E58-8ADF-3E33D2A7C7AA}" type="slidenum">
               <a:rPr lang="de-DE" smtClean="0"/>
-              <a:t>‹#›</a:t>
+              <a:t>‹Nr.›</a:t>
             </a:fld>
             <a:endParaRPr lang="de-DE"/>
           </a:p>
@@ -4974,7 +4977,7 @@
           <a:p>
             <a:fld id="{C8735BCC-3E06-4614-A9C9-2FA5849F9F0F}" type="datetimeFigureOut">
               <a:rPr lang="de-DE" smtClean="0"/>
-              <a:t>11.05.2022</a:t>
+              <a:t>12.05.2022</a:t>
             </a:fld>
             <a:endParaRPr lang="de-DE"/>
           </a:p>
@@ -5028,7 +5031,7 @@
           <a:p>
             <a:fld id="{B82E1514-0941-4E58-8ADF-3E33D2A7C7AA}" type="slidenum">
               <a:rPr lang="de-DE" smtClean="0"/>
-              <a:t>‹#›</a:t>
+              <a:t>‹Nr.›</a:t>
             </a:fld>
             <a:endParaRPr lang="de-DE"/>
           </a:p>
@@ -5087,7 +5090,7 @@
           <a:p>
             <a:fld id="{C8735BCC-3E06-4614-A9C9-2FA5849F9F0F}" type="datetimeFigureOut">
               <a:rPr lang="de-DE" smtClean="0"/>
-              <a:t>11.05.2022</a:t>
+              <a:t>12.05.2022</a:t>
             </a:fld>
             <a:endParaRPr lang="de-DE"/>
           </a:p>
@@ -5141,7 +5144,7 @@
           <a:p>
             <a:fld id="{B82E1514-0941-4E58-8ADF-3E33D2A7C7AA}" type="slidenum">
               <a:rPr lang="de-DE" smtClean="0"/>
-              <a:t>‹#›</a:t>
+              <a:t>‹Nr.›</a:t>
             </a:fld>
             <a:endParaRPr lang="de-DE"/>
           </a:p>
@@ -5398,7 +5401,7 @@
           <a:p>
             <a:fld id="{C8735BCC-3E06-4614-A9C9-2FA5849F9F0F}" type="datetimeFigureOut">
               <a:rPr lang="de-DE" smtClean="0"/>
-              <a:t>11.05.2022</a:t>
+              <a:t>12.05.2022</a:t>
             </a:fld>
             <a:endParaRPr lang="de-DE"/>
           </a:p>
@@ -5452,7 +5455,7 @@
           <a:p>
             <a:fld id="{B82E1514-0941-4E58-8ADF-3E33D2A7C7AA}" type="slidenum">
               <a:rPr lang="de-DE" smtClean="0"/>
-              <a:t>‹#›</a:t>
+              <a:t>‹Nr.›</a:t>
             </a:fld>
             <a:endParaRPr lang="de-DE"/>
           </a:p>
@@ -5686,7 +5689,7 @@
           <a:p>
             <a:fld id="{C8735BCC-3E06-4614-A9C9-2FA5849F9F0F}" type="datetimeFigureOut">
               <a:rPr lang="de-DE" smtClean="0"/>
-              <a:t>11.05.2022</a:t>
+              <a:t>12.05.2022</a:t>
             </a:fld>
             <a:endParaRPr lang="de-DE"/>
           </a:p>
@@ -5740,7 +5743,7 @@
           <a:p>
             <a:fld id="{B82E1514-0941-4E58-8ADF-3E33D2A7C7AA}" type="slidenum">
               <a:rPr lang="de-DE" smtClean="0"/>
-              <a:t>‹#›</a:t>
+              <a:t>‹Nr.›</a:t>
             </a:fld>
             <a:endParaRPr lang="de-DE"/>
           </a:p>
@@ -5927,7 +5930,7 @@
           <a:p>
             <a:fld id="{C8735BCC-3E06-4614-A9C9-2FA5849F9F0F}" type="datetimeFigureOut">
               <a:rPr lang="de-DE" smtClean="0"/>
-              <a:t>11.05.2022</a:t>
+              <a:t>12.05.2022</a:t>
             </a:fld>
             <a:endParaRPr lang="de-DE"/>
           </a:p>
@@ -6017,7 +6020,7 @@
           <a:p>
             <a:fld id="{B82E1514-0941-4E58-8ADF-3E33D2A7C7AA}" type="slidenum">
               <a:rPr lang="de-DE" smtClean="0"/>
-              <a:t>‹#›</a:t>
+              <a:t>‹Nr.›</a:t>
             </a:fld>
             <a:endParaRPr lang="de-DE"/>
           </a:p>
@@ -6479,7 +6482,7 @@
           <a:p>
             <a:fld id="{C8735BCC-3E06-4614-A9C9-2FA5849F9F0F}" type="datetimeFigureOut">
               <a:rPr lang="de-DE" smtClean="0"/>
-              <a:t>11.05.2022</a:t>
+              <a:t>12.05.2022</a:t>
             </a:fld>
             <a:endParaRPr lang="de-DE"/>
           </a:p>
@@ -6557,7 +6560,7 @@
           <a:p>
             <a:fld id="{B82E1514-0941-4E58-8ADF-3E33D2A7C7AA}" type="slidenum">
               <a:rPr lang="de-DE" smtClean="0"/>
-              <a:t>‹#›</a:t>
+              <a:t>‹Nr.›</a:t>
             </a:fld>
             <a:endParaRPr lang="de-DE"/>
           </a:p>
@@ -6900,14 +6903,19 @@
             <p:ph type="ctrTitle"/>
           </p:nvPr>
         </p:nvSpPr>
-        <p:spPr/>
-        <p:txBody>
-          <a:bodyPr/>
-          <a:lstStyle/>
-          <a:p>
-            <a:r>
-              <a:rPr lang="en-US"/>
-              <a:t>Deployment of a Docker-based application in the cloud</a:t>
+        <p:spPr>
+          <a:xfrm>
+            <a:off x="897832" y="868362"/>
+            <a:ext cx="10396331" cy="2387600"/>
+          </a:xfrm>
+        </p:spPr>
+        <p:txBody>
+          <a:bodyPr/>
+          <a:lstStyle/>
+          <a:p>
+            <a:r>
+              <a:rPr lang="en-US" dirty="0"/>
+              <a:t>Docker Compose App in the Cloud</a:t>
             </a:r>
             <a:endParaRPr lang="de-DE" dirty="0"/>
           </a:p>
@@ -6929,33 +6937,99 @@
             <p:ph type="subTitle" idx="1"/>
           </p:nvPr>
         </p:nvSpPr>
-        <p:spPr/>
+        <p:spPr>
+          <a:xfrm>
+            <a:off x="1523997" y="3121709"/>
+            <a:ext cx="9144000" cy="1655762"/>
+          </a:xfrm>
+        </p:spPr>
         <p:txBody>
           <a:bodyPr>
-            <a:normAutofit lnSpcReduction="10000"/>
+            <a:normAutofit/>
           </a:bodyPr>
           <a:lstStyle/>
           <a:p>
-            <a:endParaRPr lang="de-DE"/>
-          </a:p>
-          <a:p>
-            <a:r>
-              <a:rPr lang="de-DE"/>
-              <a:t>Cloud Computing project 2022</a:t>
-            </a:r>
-          </a:p>
-          <a:p>
-            <a:endParaRPr lang="de-DE"/>
-          </a:p>
-          <a:p>
-            <a:r>
-              <a:rPr lang="sv-SE"/>
+            <a:endParaRPr lang="sv-SE" dirty="0"/>
+          </a:p>
+          <a:p>
+            <a:r>
+              <a:rPr lang="sv-SE" dirty="0"/>
               <a:t>Greta Piliponytė, Jana Karas, Jördis Krieger</a:t>
             </a:r>
             <a:endParaRPr lang="de-DE" dirty="0"/>
           </a:p>
         </p:txBody>
       </p:sp>
+      <p:pic>
+        <p:nvPicPr>
+          <p:cNvPr id="1028" name="Picture 4" descr="data:image/png;base64,iVBORw0KGgoAAAANSUhEUgAAAPMAAADQCAMAAADlEKeVAAAAbFBMVEX///8kl+0AjuwAkOz8//8XlO2/3PkAkuwble0Ajey72fjb6/uZyPV5ufKUxvXn8fy01ffv9/7n8vymz/aHv/P1+v52t/LK4vrV6PvX6fsvm+5irvGQw/RSp/BCoe+jzfZfrPA6n+5Lpe9ssvFIIBcuAAAOgUlEQVR4nO1da4OqLBBOiMAum+attSyt//8fXy+AyCXtvCrubs/5co6H1McZhmEYhtXKHq7E6YI8Lb7NPHAdGe7J9jtNDaBwhkfb7zQ1NJz/opz/Iue/qNt/kfNHt38hPpz/rG7/Rc5/Ubf/Iudfr9vqvOr3y9nBMty17XeaGr4n49eL+YMfjLWEl5flqz+yN++QbJVgUl4+Q/ky2pWXD/JlmNkm8A/YY3n0QXF5+YDky/i60sYAf6AR2yvk0GGl44y+Vr/FD/vfnH+gHzYf58ifjsV7mE+3n+59OhpvYTY5b6ED0/OETIZjLs5RPT6A65RchmIu3Y6bG8JsAV7MTJx3bGRHRTQpnyGYSbdzvohLUuuk55HzTvghSW2r9zycO7dDtn30WXQ7gt3fhBOT6sEsnD1pIgOSiVm9hoazfl5Vc/7HGGAmpaEQZ2JWr+G5UAKoyO2Vy65XXnbkqxgMsMKRoh7Yrm+SbCVs6ssb+XKtjr58dTtEtTfKHN0Bi5lwTIRQzrAqe4plMzY5HipnB9sepCeGYg8rzt4cT764oAs3L6/uIJBR9dxEbgzgd3k5Vi4/qlvflFsfhAf7UMOZzOGYqMazNiTDY4D6sarKA9ypt8bCk791nJ0hBv9/c1afDP1xfM+demskPDlRzXb1VTY/l/Opl7NmqKpazDBE25OznjPJ/cTbh/Hz8ozDvXeeQtXn5Sz2Z71uOwRijAgihCCEMIRFOLoXbk+39TZMBYI4HNc9s6fb2rHKQBuEY/oq9jhrfRITcDriYpBFzvJU8jXc8bq1vf68+npH0A5cPucBcj4P79DjxhMscl6RN5R7TF/Fom6vrm8oNxxxuLIp55P6OxNGjRppOAM95xcxwH/kzFar+jFydFCJ38HKQdyqwb59efmujwGmagxwXU1TsXy96D57sFsychTY38ioe85Zvto8NdFejvT3OCmX5RlDOEzQ+PeEyZJsGGWU237TcRBtDgQOG6vQY5xHKol7syHyvzf3OIXlhHEQYwePEiILlODcnChNGRrKtwSMx6D8eMfnswwERwn+5m+59lZBYD6K+5UMd34sA8HHSMOyZpVogSAIgudoaWOXJXMmdegPY+DE2xGjQfmCOZNLnl/ia5CMvCS7YM7o0P/6/4QF63a93jcFnssdqor+t/83qFPgpWAc90OH5Y5V0+UYvBdhnRETrkgG+qUx+5gwZ2i7UM5owrJMhiVQ6wC76ThropFLwKTJM5rg7hIw4nKUBou022SkmJcBN9v8dJhWzIt0PicWs2ZZxj4mFvNqszwjRvJpKa9Oy+M85djcYHGc0Sgh7Jd4L3dlBoy5nm7AO8v7cwDvJ6e8OI87nZ7y0rzPeXZVLcoTm8GAVVhShyZonl0nbyWjTQwwQ15+jeXIeSbNXr2RozQ95qK8Spai3GCqlQsNFiJnOGdpkoF5WRMDXWakPHgvxLSYwwETsAS3ZO46TJ59Qc+/k9/6PAPMsgO2A9tRMTjDBFKG5cmVnbocVicaeKrMkddYW+zReDYvW0JgTbuhHSlXSG1Rtph1f7aT+Wm3/p+NKSWBcwUJDLBAGc04e9Ridu3GN+vV4Fb3eW03sGewBVxm7NLWuzLDbTbSMFtK0ah1Os+KHYGBbaotojlIk+UIuUZUTK7e2NnaZikjm3a6geqyekvDYcJxGsHDotSaY4sn0m/kxoutMu/nAzepvgNSynjRNea3zsi9mmC0t+9p9uCOR2SNQLY4W61FkI6i4aVOp/vFdmMFycXF/492Sdi52p4wvonIyyB8Y092lzCGj/3kSX1TINoeHPju6EUQBkWoVKb4STh6hwIOKjpASrYYoss++cl8Gdbf3vVS11vBqC5B0Fa/d1i5PgjTLBx9I6t1nM6b4Ct85o+0dCSB65ZfIC0e+TP8CjbnRfscH3zwwQcffPDBBx988MEHH3zwwTAEt/Qy5Zmdpzi9LeUkVIoYEkLc6RIcjhA5Dpx1w0EfmvNnCJnsAc0mY8unynVBKw1NtyWgOepnjtNbBoNxnmpVZd2sYpMlFVH+cB4fH87LwIfz+PhwXgY+nMfHh/My8OE8Pj6cLcHf7XantuTJa87+sWw8NCOkanyUG/dwXn8bJnT+8XgyFmZZ77qvW3PSv+Z6cyhAcwhP+vSabA8z5yR80MO8yTPom2qerw9Y3xrg/C7e6zXnqwvdh/yyp+CZ1scGAXS563Ks9tWvfJkTQN0nVzgecJvqRBCGdTl+A+foitp8MEIwyF5EUtZ7R0geIwjc2gzHV5zPafVw1K2wvckAT0wiBMFC2b4QVLdEqcLJKV/zIn7AdQzk3C4E8pOB815JgCPwZgqaBVjOEiQ4ZXGRF5xZgri48+ZcKImWkEib3+kbe6tIwwm3yUoJ0mWzEeB5SOW8S7V5ra5WP/2btjGIezgnDnsj1Gbsa/PkpX0bftMG3Te6hMy2qvEXMKSxYboPVuS8UU9upo01G94SUwIsKvwXnEu147/DTHsj/ecr7yVuLqRnepHUsPWNfb7enXEC58BEuXy2I6e5bU0fkx2dpue8EdWO1dg+mY8cJEKlKXaOmaFxqlKuchI1yYstZ0+kLDcmTlfSHZWozu0QDyeq5afjHF0E5UCE2glfpEykewmBU/XsNpETPb2s3f9IMMzCwAuuOZZ+yDknLQsEb+HdC/ZP1L4i6ZSJEUpYlwb2UDWOHd4YhXrOnpgpCw50FBb2sRGM8us9+Ho6sG3Jy33KnDHMryWnrxyVvGFa367d54qdgIlpvS06fYdxjrhdQPjKB+Uka4kIVQfWAuOQK8qZ7eKobZPC2c+Fd8YOHwzaTZow5zL9Fro966hdzrDwuOuyiXO6YNJ+qW6MuVO6gHHmZzrBZ0eLE8L+Q4jO8+3h8NLp59Qku0cN50C0eaCV/pa9DUo7Y+Ix4/8RazjrNx/uqTwJlsfXk2AGKGdeQwzI91o/GEGu3VyBgLwctc4BxvWBixLnk3g0GE4FJ4v1XahU0L/yd/qWORNH6zJHTIWh6sX5ipwLdnvNVhFGGjMXgZV+Vb5PieRO3dUO570gZALEojNMMrqCHcwe0aLFopz12dJ3ejNtYecj/3nDmYkZavf1sbZU0Dsq5tfnPAqcd4Uo5EdHRNRm6wvoHygHcOxyNlUxpj6Hoawg79MNZ9ZBb9rGTJfpqTusxNrrA2lazlfBHBGpGBwrhY31gqPqVw8ELWdTeVsmSWiYELJyJA1n1tjgWdNi7HS9jVqDnsrgjPNF9LGUTcD0vB1kYEH1r/FyWp/E8EiveZLxECiPqX7FmZb4NNZ0Z8Nx/f/sa/acO0Q5d7wmrFTMYt/PNGOm1dzq1VPGGZsW8qkCmiTHK0nVnOkcCxs3n1Mdg9XfqToan0yxVmYNpFCY0WmDc9t6Wmyf9JtsBM7GYtX0MC5sfCdqfGvOofB3LUJhEkZrjWmGgx7OGjHzGrLYAKolte77fQpWkJfa2uXJvqaxMe0JuOrCtAuCnsq6Gs5q0sEWqo10qLso5Wwu9krVyXxUzl0QXSNzYq68SIt01yrGbPxrylrOinJ4hjmkwjkWOBszF4S2eohxkl7OVAdh5bE0RvxFY5VzO7dA3b449CipOiDAOBvr6DVj0Qs5s25ZWUR6+qA5n4bKGQtyRsbGMufS1eTHlZK00yUGy/kqcDbWQ7g1NMwDCu2W9fgd93XRQOjP1J6Bnkgw51zPcDz2L9RxewaezkFqU93LmZkl45ux2FD1d1oN0Hy6YSx0/rvAfwDnounCez5LEjPGuN1WjpEXAZo5SS9netAcNkVqT6IbwhwY492QYNipnqOeBQp5LsljNmItPOYl3I67F6DT+V7OVGuM56hQ0TZvfhJdPN3NGprNRICF4no6tBIz4LEBsZhnQS8NyVLr5cy+oKGmddSddTEX0FBNlb4ZtZjUHzR7bTXU2BAv4CQUbaXGYVCB9V7OzM8i+qkSG2SpsKjUCdZ2/6AzpeOzVH1jBpVzG/hyuS1gHRoMSLbt58xnabp+x4oSs055pAYH6aaxbIbB5rgR6P5bD00M0Ocxt9Y3oSrkONoxo7Na18+5nS2qkwE+XHJ3nR3dpQlXHHn0hkmHHbiqORAxuj/Ds4mzEC4l7MFshNbp4xVAcQllAGc+9ikVNAM+WPL/ObFIL5aTj/nZMK1YeXVfnEnSOVdhV3dv4rzS+CZM0KiQ7Ng6r54sWPkBnNtQJr6JhuwkxFzbqzzghhxxeIsOPMghrnjwxki0euuwaayNezZofRM2++EBRSmEwpa1XO6tDuEctcsBMNs2P42SZxupcUXDceMLsPDGVp3PYespd4KrGbtMcBrQb7G7ssbGdYyV6Jvk9MqV+5/YYbVbou0Dyj1qEOfVuV2aIBCm+fNSiEU3umFLXwhoYOhkz8sNC6sJ3Y4u1tDDkGSX5wO1jetwgmldUvVNuD7WFVyyOK4qRfD7A65egzivNuJ8rjoRXvinA6U52RG/aCx38+4ak9TY/X7BWfBNmC7fOvfqrFaJtm0Y59XGNa74AWVKdjSXH1ED7r6DTI1x3di85s4XCVwmwodxekVQa9lkzkn4pfUQvon+1QjUBO/9Qv9sAjTT9Ehcmeg0bliaOfOO0YbUnob5FS4EVhJn7+u8y7Wko4vmdgTf9KGvULeqjB39FEq7no8QM/t0P4bGJfLZ+N6qmgc1siHdBIfI7fwqP14vR0P8YCOXxCKYGF3lXSY/HOvXNiocczmtA4GQj9iN86ut1krDxeK44cdA6loIZlIkqaivs6BafjrEJ2PMJLnUpYLqPwiC7OW5DN9xaa4RaRpjUNxfedW7A2oa13WGYCqWgttV6Tgw1/7uXNkZ2PX5TiHho0p1s1hxwctfkda0BHv/nL+o8hMl+zgr0iJ7fm36iwGdg0N+S4vH87rtzxJsGqe3Z+hJjY/P4mEKgu+eaaYq23dwyEphpo94n+j87115x/ZXm/DaeeJ/sWToJRlk4p8AAAAASUVORK5CYII=">
+            <a:extLst>
+              <a:ext uri="{FF2B5EF4-FFF2-40B4-BE49-F238E27FC236}">
+                <a16:creationId xmlns:a16="http://schemas.microsoft.com/office/drawing/2014/main" id="{9223A398-C879-076B-AE61-94FB2F235974}"/>
+              </a:ext>
+            </a:extLst>
+          </p:cNvPr>
+          <p:cNvPicPr>
+            <a:picLocks noChangeAspect="1" noChangeArrowheads="1"/>
+          </p:cNvPicPr>
+          <p:nvPr/>
+        </p:nvPicPr>
+        <p:blipFill rotWithShape="1">
+          <a:blip r:embed="rId2">
+            <a:extLst>
+              <a:ext uri="{BEBA8EAE-BF5A-486C-A8C5-ECC9F3942E4B}">
+                <a14:imgProps xmlns:a14="http://schemas.microsoft.com/office/drawing/2010/main">
+                  <a14:imgLayer r:embed="rId3">
+                    <a14:imgEffect>
+                      <a14:backgroundRemoval t="2885" b="62019" l="9877" r="90535">
+                        <a14:foregroundMark x1="26337" y1="21635" x2="26337" y2="21635"/>
+                        <a14:foregroundMark x1="37449" y1="24038" x2="37449" y2="24038"/>
+                        <a14:foregroundMark x1="37037" y1="14423" x2="37037" y2="14423"/>
+                        <a14:foregroundMark x1="45267" y1="25962" x2="45267" y2="25962"/>
+                        <a14:foregroundMark x1="46502" y1="14423" x2="46502" y2="14423"/>
+                        <a14:foregroundMark x1="52263" y1="25000" x2="52263" y2="25000"/>
+                        <a14:foregroundMark x1="61317" y1="25962" x2="61317" y2="25962"/>
+                        <a14:foregroundMark x1="54321" y1="13462" x2="54321" y2="13462"/>
+                        <a14:foregroundMark x1="53909" y1="6731" x2="53909" y2="6731"/>
+                        <a14:foregroundMark x1="53909" y1="2885" x2="53909" y2="2885"/>
+                        <a14:foregroundMark x1="90535" y1="25962" x2="90535" y2="25962"/>
+                        <a14:foregroundMark x1="42387" y1="62019" x2="42387" y2="62019"/>
+                      </a14:backgroundRemoval>
+                    </a14:imgEffect>
+                    <a14:imgEffect>
+                      <a14:sharpenSoften amount="50000"/>
+                    </a14:imgEffect>
+                  </a14:imgLayer>
+                </a14:imgProps>
+              </a:ext>
+              <a:ext uri="{28A0092B-C50C-407E-A947-70E740481C1C}">
+                <a14:useLocalDpi xmlns:a14="http://schemas.microsoft.com/office/drawing/2010/main" val="0"/>
+              </a:ext>
+            </a:extLst>
+          </a:blip>
+          <a:srcRect b="32040"/>
+          <a:stretch/>
+        </p:blipFill>
+        <p:spPr bwMode="auto">
+          <a:xfrm>
+            <a:off x="4938711" y="4643217"/>
+            <a:ext cx="2314575" cy="1346421"/>
+          </a:xfrm>
+          <a:prstGeom prst="rect">
+            <a:avLst/>
+          </a:prstGeom>
+          <a:noFill/>
+          <a:extLst>
+            <a:ext uri="{909E8E84-426E-40DD-AFC4-6F175D3DCCD1}">
+              <a14:hiddenFill xmlns:a14="http://schemas.microsoft.com/office/drawing/2010/main">
+                <a:solidFill>
+                  <a:srgbClr val="FFFFFF"/>
+                </a:solidFill>
+              </a14:hiddenFill>
+            </a:ext>
+          </a:extLst>
+        </p:spPr>
+      </p:pic>
     </p:spTree>
     <p:extLst>
       <p:ext uri="{BB962C8B-B14F-4D97-AF65-F5344CB8AC3E}">
@@ -6991,15 +7065,15 @@
           <p:cNvPr id="2" name="Titel 1">
             <a:extLst>
               <a:ext uri="{FF2B5EF4-FFF2-40B4-BE49-F238E27FC236}">
-                <a16:creationId xmlns:a16="http://schemas.microsoft.com/office/drawing/2014/main" id="{B65D7EC3-CD42-4551-8940-B2E7B1FA136C}"/>
-              </a:ext>
-            </a:extLst>
-          </p:cNvPr>
-          <p:cNvSpPr>
-            <a:spLocks noGrp="1"/>
-          </p:cNvSpPr>
-          <p:nvPr>
-            <p:ph type="title"/>
+                <a16:creationId xmlns:a16="http://schemas.microsoft.com/office/drawing/2014/main" id="{423EE35B-33E3-42A0-BBDA-368E8D825D7E}"/>
+              </a:ext>
+            </a:extLst>
+          </p:cNvPr>
+          <p:cNvSpPr>
+            <a:spLocks noGrp="1"/>
+          </p:cNvSpPr>
+          <p:nvPr>
+            <p:ph type="ctrTitle"/>
           </p:nvPr>
         </p:nvSpPr>
         <p:spPr/>
@@ -7008,27 +7082,26 @@
           <a:lstStyle/>
           <a:p>
             <a:r>
-              <a:rPr lang="de-DE"/>
-              <a:t>Solution 1</a:t>
-            </a:r>
-            <a:endParaRPr lang="de-DE" dirty="0"/>
-          </a:p>
-        </p:txBody>
-      </p:sp>
-      <p:sp>
-        <p:nvSpPr>
-          <p:cNvPr id="4" name="Content Placeholder 3">
-            <a:extLst>
-              <a:ext uri="{FF2B5EF4-FFF2-40B4-BE49-F238E27FC236}">
-                <a16:creationId xmlns:a16="http://schemas.microsoft.com/office/drawing/2014/main" id="{2BF5D699-940E-4DE9-8183-FAB1BE315652}"/>
-              </a:ext>
-            </a:extLst>
-          </p:cNvPr>
-          <p:cNvSpPr>
-            <a:spLocks noGrp="1"/>
-          </p:cNvSpPr>
-          <p:nvPr>
-            <p:ph idx="1"/>
+              <a:rPr lang="de-DE" dirty="0"/>
+              <a:t>AWS</a:t>
+            </a:r>
+          </a:p>
+        </p:txBody>
+      </p:sp>
+      <p:sp>
+        <p:nvSpPr>
+          <p:cNvPr id="5" name="Untertitel 4">
+            <a:extLst>
+              <a:ext uri="{FF2B5EF4-FFF2-40B4-BE49-F238E27FC236}">
+                <a16:creationId xmlns:a16="http://schemas.microsoft.com/office/drawing/2014/main" id="{B11A7254-9FA9-40F3-BD35-E1C8D97446A8}"/>
+              </a:ext>
+            </a:extLst>
+          </p:cNvPr>
+          <p:cNvSpPr>
+            <a:spLocks noGrp="1"/>
+          </p:cNvSpPr>
+          <p:nvPr>
+            <p:ph type="subTitle" idx="1"/>
           </p:nvPr>
         </p:nvSpPr>
         <p:spPr/>
@@ -7036,54 +7109,14 @@
           <a:bodyPr/>
           <a:lstStyle/>
           <a:p>
-            <a:pPr marL="0" indent="0">
-              <a:buNone/>
-            </a:pPr>
-            <a:r>
-              <a:rPr lang="de-DE"/>
-              <a:t>Deployment via .zip link:</a:t>
-            </a:r>
-          </a:p>
-          <a:p>
-            <a:pPr marL="0" indent="0">
-              <a:buNone/>
-            </a:pPr>
             <a:endParaRPr lang="de-DE"/>
-          </a:p>
-          <a:p>
-            <a:pPr lvl="1"/>
-            <a:r>
-              <a:rPr lang="de-DE"/>
-              <a:t>SSH to access EC2 instance</a:t>
-            </a:r>
-          </a:p>
-          <a:p>
-            <a:pPr lvl="1"/>
-            <a:r>
-              <a:rPr lang="de-DE"/>
-              <a:t>Installation of Docker and Docker Compose on EC2</a:t>
-            </a:r>
-          </a:p>
-          <a:p>
-            <a:pPr lvl="1"/>
-            <a:r>
-              <a:rPr lang="de-DE"/>
-              <a:t>Upload of application via .zip link from GitHub Repo to EC2</a:t>
-            </a:r>
-          </a:p>
-          <a:p>
-            <a:pPr lvl="1"/>
-            <a:r>
-              <a:rPr lang="de-DE"/>
-              <a:t>Docker-compose up on EC2</a:t>
-            </a:r>
           </a:p>
         </p:txBody>
       </p:sp>
     </p:spTree>
     <p:extLst>
       <p:ext uri="{BB962C8B-B14F-4D97-AF65-F5344CB8AC3E}">
-        <p14:creationId xmlns:p14="http://schemas.microsoft.com/office/powerpoint/2010/main" val="3653631288"/>
+        <p14:creationId xmlns:p14="http://schemas.microsoft.com/office/powerpoint/2010/main" val="163883768"/>
       </p:ext>
     </p:extLst>
   </p:cSld>
@@ -7115,15 +7148,15 @@
           <p:cNvPr id="2" name="Titel 1">
             <a:extLst>
               <a:ext uri="{FF2B5EF4-FFF2-40B4-BE49-F238E27FC236}">
-                <a16:creationId xmlns:a16="http://schemas.microsoft.com/office/drawing/2014/main" id="{423EE35B-33E3-42A0-BBDA-368E8D825D7E}"/>
-              </a:ext>
-            </a:extLst>
-          </p:cNvPr>
-          <p:cNvSpPr>
-            <a:spLocks noGrp="1"/>
-          </p:cNvSpPr>
-          <p:nvPr>
-            <p:ph type="ctrTitle"/>
+                <a16:creationId xmlns:a16="http://schemas.microsoft.com/office/drawing/2014/main" id="{B65D7EC3-CD42-4551-8940-B2E7B1FA136C}"/>
+              </a:ext>
+            </a:extLst>
+          </p:cNvPr>
+          <p:cNvSpPr>
+            <a:spLocks noGrp="1"/>
+          </p:cNvSpPr>
+          <p:nvPr>
+            <p:ph type="title"/>
           </p:nvPr>
         </p:nvSpPr>
         <p:spPr/>
@@ -7132,27 +7165,26 @@
           <a:lstStyle/>
           <a:p>
             <a:r>
-              <a:rPr lang="de-DE"/>
-              <a:t>Solution 2</a:t>
-            </a:r>
-            <a:endParaRPr lang="de-DE" dirty="0"/>
-          </a:p>
-        </p:txBody>
-      </p:sp>
-      <p:sp>
-        <p:nvSpPr>
-          <p:cNvPr id="5" name="Untertitel 4">
-            <a:extLst>
-              <a:ext uri="{FF2B5EF4-FFF2-40B4-BE49-F238E27FC236}">
-                <a16:creationId xmlns:a16="http://schemas.microsoft.com/office/drawing/2014/main" id="{B11A7254-9FA9-40F3-BD35-E1C8D97446A8}"/>
-              </a:ext>
-            </a:extLst>
-          </p:cNvPr>
-          <p:cNvSpPr>
-            <a:spLocks noGrp="1"/>
-          </p:cNvSpPr>
-          <p:nvPr>
-            <p:ph type="subTitle" idx="1"/>
+              <a:rPr lang="de-DE" dirty="0"/>
+              <a:t>AWS</a:t>
+            </a:r>
+          </a:p>
+        </p:txBody>
+      </p:sp>
+      <p:sp>
+        <p:nvSpPr>
+          <p:cNvPr id="4" name="Content Placeholder 3">
+            <a:extLst>
+              <a:ext uri="{FF2B5EF4-FFF2-40B4-BE49-F238E27FC236}">
+                <a16:creationId xmlns:a16="http://schemas.microsoft.com/office/drawing/2014/main" id="{2BF5D699-940E-4DE9-8183-FAB1BE315652}"/>
+              </a:ext>
+            </a:extLst>
+          </p:cNvPr>
+          <p:cNvSpPr>
+            <a:spLocks noGrp="1"/>
+          </p:cNvSpPr>
+          <p:nvPr>
+            <p:ph idx="1"/>
           </p:nvPr>
         </p:nvSpPr>
         <p:spPr/>
@@ -7160,14 +7192,61 @@
           <a:bodyPr/>
           <a:lstStyle/>
           <a:p>
-            <a:endParaRPr lang="de-DE"/>
-          </a:p>
-        </p:txBody>
-      </p:sp>
+            <a:r>
+              <a:rPr lang="en-US" dirty="0"/>
+              <a:t>Amazon Elastic Compute Cloud (EC2) to deploy our application</a:t>
+            </a:r>
+          </a:p>
+          <a:p>
+            <a:pPr lvl="1"/>
+            <a:r>
+              <a:rPr lang="en-US" dirty="0"/>
+              <a:t>Security groups</a:t>
+            </a:r>
+          </a:p>
+          <a:p>
+            <a:pPr lvl="1"/>
+            <a:r>
+              <a:rPr lang="en-US" dirty="0"/>
+              <a:t>Elastic IP</a:t>
+            </a:r>
+          </a:p>
+        </p:txBody>
+      </p:sp>
+      <p:pic>
+        <p:nvPicPr>
+          <p:cNvPr id="7" name="Picture 6">
+            <a:extLst>
+              <a:ext uri="{FF2B5EF4-FFF2-40B4-BE49-F238E27FC236}">
+                <a16:creationId xmlns:a16="http://schemas.microsoft.com/office/drawing/2014/main" id="{E1C1E508-A52A-4971-A179-36A48ADFB13B}"/>
+              </a:ext>
+            </a:extLst>
+          </p:cNvPr>
+          <p:cNvPicPr>
+            <a:picLocks noChangeAspect="1"/>
+          </p:cNvPicPr>
+          <p:nvPr/>
+        </p:nvPicPr>
+        <p:blipFill>
+          <a:blip r:embed="rId2"/>
+          <a:stretch>
+            <a:fillRect/>
+          </a:stretch>
+        </p:blipFill>
+        <p:spPr>
+          <a:xfrm>
+            <a:off x="9491753" y="457654"/>
+            <a:ext cx="1862047" cy="1140504"/>
+          </a:xfrm>
+          <a:prstGeom prst="rect">
+            <a:avLst/>
+          </a:prstGeom>
+        </p:spPr>
+      </p:pic>
     </p:spTree>
     <p:extLst>
       <p:ext uri="{BB962C8B-B14F-4D97-AF65-F5344CB8AC3E}">
-        <p14:creationId xmlns:p14="http://schemas.microsoft.com/office/powerpoint/2010/main" val="2988536169"/>
+        <p14:creationId xmlns:p14="http://schemas.microsoft.com/office/powerpoint/2010/main" val="3037856559"/>
       </p:ext>
     </p:extLst>
   </p:cSld>
@@ -7178,6 +7257,1069 @@
 </file>
 
 <file path=ppt/slides/slide12.xml><?xml version="1.0" encoding="utf-8"?>
+<p:sld xmlns:a="http://schemas.openxmlformats.org/drawingml/2006/main" xmlns:r="http://schemas.openxmlformats.org/officeDocument/2006/relationships" xmlns:p="http://schemas.openxmlformats.org/presentationml/2006/main">
+  <p:cSld>
+    <p:spTree>
+      <p:nvGrpSpPr>
+        <p:cNvPr id="1" name=""/>
+        <p:cNvGrpSpPr/>
+        <p:nvPr/>
+      </p:nvGrpSpPr>
+      <p:grpSpPr>
+        <a:xfrm>
+          <a:off x="0" y="0"/>
+          <a:ext cx="0" cy="0"/>
+          <a:chOff x="0" y="0"/>
+          <a:chExt cx="0" cy="0"/>
+        </a:xfrm>
+      </p:grpSpPr>
+      <p:sp>
+        <p:nvSpPr>
+          <p:cNvPr id="2" name="Titel 1">
+            <a:extLst>
+              <a:ext uri="{FF2B5EF4-FFF2-40B4-BE49-F238E27FC236}">
+                <a16:creationId xmlns:a16="http://schemas.microsoft.com/office/drawing/2014/main" id="{423EE35B-33E3-42A0-BBDA-368E8D825D7E}"/>
+              </a:ext>
+            </a:extLst>
+          </p:cNvPr>
+          <p:cNvSpPr>
+            <a:spLocks noGrp="1"/>
+          </p:cNvSpPr>
+          <p:nvPr>
+            <p:ph type="ctrTitle"/>
+          </p:nvPr>
+        </p:nvSpPr>
+        <p:spPr/>
+        <p:txBody>
+          <a:bodyPr/>
+          <a:lstStyle/>
+          <a:p>
+            <a:r>
+              <a:rPr lang="de-DE" dirty="0"/>
+              <a:t>Solution</a:t>
+            </a:r>
+          </a:p>
+        </p:txBody>
+      </p:sp>
+      <p:sp>
+        <p:nvSpPr>
+          <p:cNvPr id="5" name="Untertitel 4">
+            <a:extLst>
+              <a:ext uri="{FF2B5EF4-FFF2-40B4-BE49-F238E27FC236}">
+                <a16:creationId xmlns:a16="http://schemas.microsoft.com/office/drawing/2014/main" id="{B11A7254-9FA9-40F3-BD35-E1C8D97446A8}"/>
+              </a:ext>
+            </a:extLst>
+          </p:cNvPr>
+          <p:cNvSpPr>
+            <a:spLocks noGrp="1"/>
+          </p:cNvSpPr>
+          <p:nvPr>
+            <p:ph type="subTitle" idx="1"/>
+          </p:nvPr>
+        </p:nvSpPr>
+        <p:spPr/>
+        <p:txBody>
+          <a:bodyPr/>
+          <a:lstStyle/>
+          <a:p>
+            <a:endParaRPr lang="de-DE"/>
+          </a:p>
+        </p:txBody>
+      </p:sp>
+    </p:spTree>
+    <p:extLst>
+      <p:ext uri="{BB962C8B-B14F-4D97-AF65-F5344CB8AC3E}">
+        <p14:creationId xmlns:p14="http://schemas.microsoft.com/office/powerpoint/2010/main" val="2403675243"/>
+      </p:ext>
+    </p:extLst>
+  </p:cSld>
+  <p:clrMapOvr>
+    <a:masterClrMapping/>
+  </p:clrMapOvr>
+</p:sld>
+</file>
+
+<file path=ppt/slides/slide13.xml><?xml version="1.0" encoding="utf-8"?>
+<p:sld xmlns:a="http://schemas.openxmlformats.org/drawingml/2006/main" xmlns:r="http://schemas.openxmlformats.org/officeDocument/2006/relationships" xmlns:p="http://schemas.openxmlformats.org/presentationml/2006/main">
+  <p:cSld>
+    <p:spTree>
+      <p:nvGrpSpPr>
+        <p:cNvPr id="1" name=""/>
+        <p:cNvGrpSpPr/>
+        <p:nvPr/>
+      </p:nvGrpSpPr>
+      <p:grpSpPr>
+        <a:xfrm>
+          <a:off x="0" y="0"/>
+          <a:ext cx="0" cy="0"/>
+          <a:chOff x="0" y="0"/>
+          <a:chExt cx="0" cy="0"/>
+        </a:xfrm>
+      </p:grpSpPr>
+      <p:sp>
+        <p:nvSpPr>
+          <p:cNvPr id="2" name="Titel 1">
+            <a:extLst>
+              <a:ext uri="{FF2B5EF4-FFF2-40B4-BE49-F238E27FC236}">
+                <a16:creationId xmlns:a16="http://schemas.microsoft.com/office/drawing/2014/main" id="{FE7310EA-0D36-8797-94D6-7E3C9FD760A2}"/>
+              </a:ext>
+            </a:extLst>
+          </p:cNvPr>
+          <p:cNvSpPr>
+            <a:spLocks noGrp="1"/>
+          </p:cNvSpPr>
+          <p:nvPr>
+            <p:ph type="title"/>
+          </p:nvPr>
+        </p:nvSpPr>
+        <p:spPr/>
+        <p:txBody>
+          <a:bodyPr/>
+          <a:lstStyle/>
+          <a:p>
+            <a:r>
+              <a:rPr lang="de-DE" dirty="0"/>
+              <a:t>„Critical“ Points</a:t>
+            </a:r>
+          </a:p>
+        </p:txBody>
+      </p:sp>
+      <p:sp>
+        <p:nvSpPr>
+          <p:cNvPr id="4" name="Rectangle: Rounded Corners 5">
+            <a:extLst>
+              <a:ext uri="{FF2B5EF4-FFF2-40B4-BE49-F238E27FC236}">
+                <a16:creationId xmlns:a16="http://schemas.microsoft.com/office/drawing/2014/main" id="{78CCAEE7-61F5-65AA-DCCD-9964C5338FAE}"/>
+              </a:ext>
+            </a:extLst>
+          </p:cNvPr>
+          <p:cNvSpPr/>
+          <p:nvPr/>
+        </p:nvSpPr>
+        <p:spPr>
+          <a:xfrm>
+            <a:off x="1037373" y="4362643"/>
+            <a:ext cx="1704110" cy="768927"/>
+          </a:xfrm>
+          <a:prstGeom prst="roundRect">
+            <a:avLst/>
+          </a:prstGeom>
+          <a:solidFill>
+            <a:srgbClr val="2088FE"/>
+          </a:solidFill>
+          <a:ln>
+            <a:noFill/>
+          </a:ln>
+        </p:spPr>
+        <p:style>
+          <a:lnRef idx="2">
+            <a:schemeClr val="accent1">
+              <a:shade val="50000"/>
+            </a:schemeClr>
+          </a:lnRef>
+          <a:fillRef idx="1">
+            <a:schemeClr val="accent1"/>
+          </a:fillRef>
+          <a:effectRef idx="0">
+            <a:schemeClr val="accent1"/>
+          </a:effectRef>
+          <a:fontRef idx="minor">
+            <a:schemeClr val="lt1"/>
+          </a:fontRef>
+        </p:style>
+        <p:txBody>
+          <a:bodyPr rtlCol="0" anchor="ctr"/>
+          <a:lstStyle/>
+          <a:p>
+            <a:pPr algn="ctr"/>
+            <a:r>
+              <a:rPr lang="de-DE" dirty="0"/>
+              <a:t>Push</a:t>
+            </a:r>
+          </a:p>
+        </p:txBody>
+      </p:sp>
+      <p:sp>
+        <p:nvSpPr>
+          <p:cNvPr id="5" name="Rectangle: Rounded Corners 6">
+            <a:extLst>
+              <a:ext uri="{FF2B5EF4-FFF2-40B4-BE49-F238E27FC236}">
+                <a16:creationId xmlns:a16="http://schemas.microsoft.com/office/drawing/2014/main" id="{264CA49D-6F4B-C4CF-E420-1104249827C0}"/>
+              </a:ext>
+            </a:extLst>
+          </p:cNvPr>
+          <p:cNvSpPr/>
+          <p:nvPr/>
+        </p:nvSpPr>
+        <p:spPr>
+          <a:xfrm>
+            <a:off x="3492545" y="4362645"/>
+            <a:ext cx="2558017" cy="768927"/>
+          </a:xfrm>
+          <a:prstGeom prst="roundRect">
+            <a:avLst/>
+          </a:prstGeom>
+          <a:solidFill>
+            <a:srgbClr val="2088FE"/>
+          </a:solidFill>
+          <a:ln>
+            <a:noFill/>
+          </a:ln>
+        </p:spPr>
+        <p:style>
+          <a:lnRef idx="2">
+            <a:schemeClr val="accent1">
+              <a:shade val="50000"/>
+            </a:schemeClr>
+          </a:lnRef>
+          <a:fillRef idx="1">
+            <a:schemeClr val="accent1"/>
+          </a:fillRef>
+          <a:effectRef idx="0">
+            <a:schemeClr val="accent1"/>
+          </a:effectRef>
+          <a:fontRef idx="minor">
+            <a:schemeClr val="lt1"/>
+          </a:fontRef>
+        </p:style>
+        <p:txBody>
+          <a:bodyPr rtlCol="0" anchor="ctr"/>
+          <a:lstStyle/>
+          <a:p>
+            <a:pPr algn="ctr"/>
+            <a:r>
+              <a:rPr lang="de-DE" dirty="0"/>
+              <a:t>Create Infrastructure </a:t>
+            </a:r>
+            <a:r>
+              <a:rPr lang="de-DE" dirty="0" err="1"/>
+              <a:t>with</a:t>
+            </a:r>
+            <a:r>
+              <a:rPr lang="de-DE" dirty="0"/>
+              <a:t> Terraform</a:t>
+            </a:r>
+          </a:p>
+        </p:txBody>
+      </p:sp>
+      <p:sp>
+        <p:nvSpPr>
+          <p:cNvPr id="6" name="Rectangle: Rounded Corners 7">
+            <a:extLst>
+              <a:ext uri="{FF2B5EF4-FFF2-40B4-BE49-F238E27FC236}">
+                <a16:creationId xmlns:a16="http://schemas.microsoft.com/office/drawing/2014/main" id="{7245DBC1-1583-905A-477C-077D529C85D9}"/>
+              </a:ext>
+            </a:extLst>
+          </p:cNvPr>
+          <p:cNvSpPr/>
+          <p:nvPr/>
+        </p:nvSpPr>
+        <p:spPr>
+          <a:xfrm>
+            <a:off x="7512510" y="4362642"/>
+            <a:ext cx="2558015" cy="768927"/>
+          </a:xfrm>
+          <a:prstGeom prst="roundRect">
+            <a:avLst/>
+          </a:prstGeom>
+          <a:solidFill>
+            <a:srgbClr val="2088FE"/>
+          </a:solidFill>
+          <a:ln>
+            <a:noFill/>
+          </a:ln>
+        </p:spPr>
+        <p:style>
+          <a:lnRef idx="2">
+            <a:schemeClr val="accent1">
+              <a:shade val="50000"/>
+            </a:schemeClr>
+          </a:lnRef>
+          <a:fillRef idx="1">
+            <a:schemeClr val="accent1"/>
+          </a:fillRef>
+          <a:effectRef idx="0">
+            <a:schemeClr val="accent1"/>
+          </a:effectRef>
+          <a:fontRef idx="minor">
+            <a:schemeClr val="lt1"/>
+          </a:fontRef>
+        </p:style>
+        <p:txBody>
+          <a:bodyPr rtlCol="0" anchor="ctr"/>
+          <a:lstStyle/>
+          <a:p>
+            <a:pPr algn="ctr"/>
+            <a:r>
+              <a:rPr lang="de-DE" dirty="0"/>
+              <a:t>Deploy </a:t>
+            </a:r>
+            <a:r>
+              <a:rPr lang="de-DE" dirty="0" err="1"/>
+              <a:t>app</a:t>
+            </a:r>
+            <a:r>
+              <a:rPr lang="de-DE" dirty="0"/>
+              <a:t> </a:t>
+            </a:r>
+            <a:r>
+              <a:rPr lang="de-DE" dirty="0" err="1"/>
+              <a:t>with</a:t>
+            </a:r>
+            <a:r>
+              <a:rPr lang="de-DE" dirty="0"/>
+              <a:t> </a:t>
+            </a:r>
+            <a:r>
+              <a:rPr lang="de-DE" dirty="0" err="1"/>
+              <a:t>docker</a:t>
+            </a:r>
+            <a:r>
+              <a:rPr lang="de-DE" dirty="0"/>
+              <a:t> </a:t>
+            </a:r>
+            <a:r>
+              <a:rPr lang="de-DE" dirty="0" err="1"/>
+              <a:t>compose</a:t>
+            </a:r>
+            <a:endParaRPr lang="de-DE" dirty="0"/>
+          </a:p>
+        </p:txBody>
+      </p:sp>
+      <p:cxnSp>
+        <p:nvCxnSpPr>
+          <p:cNvPr id="7" name="Straight Arrow Connector 11">
+            <a:extLst>
+              <a:ext uri="{FF2B5EF4-FFF2-40B4-BE49-F238E27FC236}">
+                <a16:creationId xmlns:a16="http://schemas.microsoft.com/office/drawing/2014/main" id="{F501AB0B-B3CB-38AA-624C-ED414CEFB3A8}"/>
+              </a:ext>
+            </a:extLst>
+          </p:cNvPr>
+          <p:cNvCxnSpPr>
+            <a:cxnSpLocks/>
+            <a:stCxn id="4" idx="3"/>
+            <a:endCxn id="5" idx="1"/>
+          </p:cNvCxnSpPr>
+          <p:nvPr/>
+        </p:nvCxnSpPr>
+        <p:spPr>
+          <a:xfrm>
+            <a:off x="2741483" y="4747107"/>
+            <a:ext cx="751062" cy="2"/>
+          </a:xfrm>
+          <a:prstGeom prst="straightConnector1">
+            <a:avLst/>
+          </a:prstGeom>
+          <a:ln>
+            <a:solidFill>
+              <a:srgbClr val="2088FE"/>
+            </a:solidFill>
+            <a:tailEnd type="triangle"/>
+          </a:ln>
+        </p:spPr>
+        <p:style>
+          <a:lnRef idx="1">
+            <a:schemeClr val="accent1"/>
+          </a:lnRef>
+          <a:fillRef idx="0">
+            <a:schemeClr val="accent1"/>
+          </a:fillRef>
+          <a:effectRef idx="0">
+            <a:schemeClr val="accent1"/>
+          </a:effectRef>
+          <a:fontRef idx="minor">
+            <a:schemeClr val="tx1"/>
+          </a:fontRef>
+        </p:style>
+      </p:cxnSp>
+      <p:cxnSp>
+        <p:nvCxnSpPr>
+          <p:cNvPr id="8" name="Straight Arrow Connector 13">
+            <a:extLst>
+              <a:ext uri="{FF2B5EF4-FFF2-40B4-BE49-F238E27FC236}">
+                <a16:creationId xmlns:a16="http://schemas.microsoft.com/office/drawing/2014/main" id="{15D2F7F9-D527-3673-F73F-11C0FEC9E142}"/>
+              </a:ext>
+            </a:extLst>
+          </p:cNvPr>
+          <p:cNvCxnSpPr>
+            <a:cxnSpLocks/>
+            <a:stCxn id="5" idx="3"/>
+            <a:endCxn id="6" idx="1"/>
+          </p:cNvCxnSpPr>
+          <p:nvPr/>
+        </p:nvCxnSpPr>
+        <p:spPr>
+          <a:xfrm flipV="1">
+            <a:off x="6050562" y="4747106"/>
+            <a:ext cx="1461948" cy="3"/>
+          </a:xfrm>
+          <a:prstGeom prst="straightConnector1">
+            <a:avLst/>
+          </a:prstGeom>
+          <a:ln>
+            <a:solidFill>
+              <a:srgbClr val="2088FE"/>
+            </a:solidFill>
+            <a:tailEnd type="triangle"/>
+          </a:ln>
+        </p:spPr>
+        <p:style>
+          <a:lnRef idx="1">
+            <a:schemeClr val="accent1"/>
+          </a:lnRef>
+          <a:fillRef idx="0">
+            <a:schemeClr val="accent1"/>
+          </a:fillRef>
+          <a:effectRef idx="0">
+            <a:schemeClr val="accent1"/>
+          </a:effectRef>
+          <a:fontRef idx="minor">
+            <a:schemeClr val="tx1"/>
+          </a:fontRef>
+        </p:style>
+      </p:cxnSp>
+      <p:sp>
+        <p:nvSpPr>
+          <p:cNvPr id="9" name="Rectangle: Rounded Corners 17">
+            <a:extLst>
+              <a:ext uri="{FF2B5EF4-FFF2-40B4-BE49-F238E27FC236}">
+                <a16:creationId xmlns:a16="http://schemas.microsoft.com/office/drawing/2014/main" id="{433EC4C8-5652-8E37-1388-42FECF4CA3D7}"/>
+              </a:ext>
+            </a:extLst>
+          </p:cNvPr>
+          <p:cNvSpPr/>
+          <p:nvPr/>
+        </p:nvSpPr>
+        <p:spPr>
+          <a:xfrm flipH="1" flipV="1">
+            <a:off x="2907532" y="3874273"/>
+            <a:ext cx="7433721" cy="1594946"/>
+          </a:xfrm>
+          <a:prstGeom prst="roundRect">
+            <a:avLst/>
+          </a:prstGeom>
+          <a:noFill/>
+          <a:ln>
+            <a:solidFill>
+              <a:srgbClr val="2088FE"/>
+            </a:solidFill>
+          </a:ln>
+        </p:spPr>
+        <p:style>
+          <a:lnRef idx="2">
+            <a:schemeClr val="accent1">
+              <a:shade val="50000"/>
+            </a:schemeClr>
+          </a:lnRef>
+          <a:fillRef idx="1">
+            <a:schemeClr val="accent1"/>
+          </a:fillRef>
+          <a:effectRef idx="0">
+            <a:schemeClr val="accent1"/>
+          </a:effectRef>
+          <a:fontRef idx="minor">
+            <a:schemeClr val="lt1"/>
+          </a:fontRef>
+        </p:style>
+        <p:txBody>
+          <a:bodyPr rtlCol="0" anchor="ctr"/>
+          <a:lstStyle/>
+          <a:p>
+            <a:pPr algn="ctr"/>
+            <a:endParaRPr lang="de-DE"/>
+          </a:p>
+        </p:txBody>
+      </p:sp>
+      <p:pic>
+        <p:nvPicPr>
+          <p:cNvPr id="10" name="Picture 19">
+            <a:extLst>
+              <a:ext uri="{FF2B5EF4-FFF2-40B4-BE49-F238E27FC236}">
+                <a16:creationId xmlns:a16="http://schemas.microsoft.com/office/drawing/2014/main" id="{B187C7EC-CE9C-D136-07DC-CC38CA9DE47D}"/>
+              </a:ext>
+            </a:extLst>
+          </p:cNvPr>
+          <p:cNvPicPr>
+            <a:picLocks noChangeAspect="1"/>
+          </p:cNvPicPr>
+          <p:nvPr/>
+        </p:nvPicPr>
+        <p:blipFill>
+          <a:blip r:embed="rId2"/>
+          <a:stretch>
+            <a:fillRect/>
+          </a:stretch>
+        </p:blipFill>
+        <p:spPr>
+          <a:xfrm>
+            <a:off x="2986679" y="4019847"/>
+            <a:ext cx="426720" cy="426720"/>
+          </a:xfrm>
+          <a:prstGeom prst="rect">
+            <a:avLst/>
+          </a:prstGeom>
+        </p:spPr>
+      </p:pic>
+      <p:cxnSp>
+        <p:nvCxnSpPr>
+          <p:cNvPr id="19" name="Straight Arrow Connector 11">
+            <a:extLst>
+              <a:ext uri="{FF2B5EF4-FFF2-40B4-BE49-F238E27FC236}">
+                <a16:creationId xmlns:a16="http://schemas.microsoft.com/office/drawing/2014/main" id="{2BE4D3C3-2C05-2D6B-EB00-0B569B104FB4}"/>
+              </a:ext>
+            </a:extLst>
+          </p:cNvPr>
+          <p:cNvCxnSpPr>
+            <a:cxnSpLocks/>
+            <a:stCxn id="5" idx="0"/>
+            <a:endCxn id="20" idx="2"/>
+          </p:cNvCxnSpPr>
+          <p:nvPr/>
+        </p:nvCxnSpPr>
+        <p:spPr>
+          <a:xfrm flipH="1" flipV="1">
+            <a:off x="4771553" y="3197349"/>
+            <a:ext cx="1" cy="1165296"/>
+          </a:xfrm>
+          <a:prstGeom prst="straightConnector1">
+            <a:avLst/>
+          </a:prstGeom>
+          <a:ln>
+            <a:solidFill>
+              <a:srgbClr val="5C4EE5"/>
+            </a:solidFill>
+            <a:tailEnd type="triangle"/>
+          </a:ln>
+        </p:spPr>
+        <p:style>
+          <a:lnRef idx="1">
+            <a:schemeClr val="accent1"/>
+          </a:lnRef>
+          <a:fillRef idx="0">
+            <a:schemeClr val="accent1"/>
+          </a:fillRef>
+          <a:effectRef idx="0">
+            <a:schemeClr val="accent1"/>
+          </a:effectRef>
+          <a:fontRef idx="minor">
+            <a:schemeClr val="tx1"/>
+          </a:fontRef>
+        </p:style>
+      </p:cxnSp>
+      <p:sp>
+        <p:nvSpPr>
+          <p:cNvPr id="20" name="Rectangle: Rounded Corners 6">
+            <a:extLst>
+              <a:ext uri="{FF2B5EF4-FFF2-40B4-BE49-F238E27FC236}">
+                <a16:creationId xmlns:a16="http://schemas.microsoft.com/office/drawing/2014/main" id="{B811BC74-BB0A-7701-99C2-0D2003A48E60}"/>
+              </a:ext>
+            </a:extLst>
+          </p:cNvPr>
+          <p:cNvSpPr/>
+          <p:nvPr/>
+        </p:nvSpPr>
+        <p:spPr>
+          <a:xfrm>
+            <a:off x="3492544" y="2428422"/>
+            <a:ext cx="2558017" cy="768927"/>
+          </a:xfrm>
+          <a:prstGeom prst="roundRect">
+            <a:avLst/>
+          </a:prstGeom>
+          <a:solidFill>
+            <a:srgbClr val="5C4EE5"/>
+          </a:solidFill>
+          <a:ln>
+            <a:noFill/>
+          </a:ln>
+        </p:spPr>
+        <p:style>
+          <a:lnRef idx="2">
+            <a:schemeClr val="accent1">
+              <a:shade val="50000"/>
+            </a:schemeClr>
+          </a:lnRef>
+          <a:fillRef idx="1">
+            <a:schemeClr val="accent1"/>
+          </a:fillRef>
+          <a:effectRef idx="0">
+            <a:schemeClr val="accent1"/>
+          </a:effectRef>
+          <a:fontRef idx="minor">
+            <a:schemeClr val="lt1"/>
+          </a:fontRef>
+        </p:style>
+        <p:txBody>
+          <a:bodyPr rtlCol="0" anchor="ctr"/>
+          <a:lstStyle/>
+          <a:p>
+            <a:pPr algn="ctr"/>
+            <a:r>
+              <a:rPr lang="de-DE" dirty="0"/>
+              <a:t>Create EC2 </a:t>
+            </a:r>
+            <a:r>
+              <a:rPr lang="de-DE" dirty="0" err="1"/>
+              <a:t>machine</a:t>
+            </a:r>
+            <a:endParaRPr lang="de-DE" dirty="0"/>
+          </a:p>
+        </p:txBody>
+      </p:sp>
+      <p:sp>
+        <p:nvSpPr>
+          <p:cNvPr id="21" name="Rectangle: Rounded Corners 17">
+            <a:extLst>
+              <a:ext uri="{FF2B5EF4-FFF2-40B4-BE49-F238E27FC236}">
+                <a16:creationId xmlns:a16="http://schemas.microsoft.com/office/drawing/2014/main" id="{865E96C3-898B-ABE0-91DC-5A88AEAE32A1}"/>
+              </a:ext>
+            </a:extLst>
+          </p:cNvPr>
+          <p:cNvSpPr/>
+          <p:nvPr/>
+        </p:nvSpPr>
+        <p:spPr>
+          <a:xfrm flipH="1" flipV="1">
+            <a:off x="2907533" y="1842909"/>
+            <a:ext cx="3424355" cy="1594946"/>
+          </a:xfrm>
+          <a:prstGeom prst="roundRect">
+            <a:avLst/>
+          </a:prstGeom>
+          <a:noFill/>
+          <a:ln>
+            <a:solidFill>
+              <a:srgbClr val="5C4EE5"/>
+            </a:solidFill>
+          </a:ln>
+        </p:spPr>
+        <p:style>
+          <a:lnRef idx="2">
+            <a:schemeClr val="accent1">
+              <a:shade val="50000"/>
+            </a:schemeClr>
+          </a:lnRef>
+          <a:fillRef idx="1">
+            <a:schemeClr val="accent1"/>
+          </a:fillRef>
+          <a:effectRef idx="0">
+            <a:schemeClr val="accent1"/>
+          </a:effectRef>
+          <a:fontRef idx="minor">
+            <a:schemeClr val="lt1"/>
+          </a:fontRef>
+        </p:style>
+        <p:txBody>
+          <a:bodyPr rtlCol="0" anchor="ctr"/>
+          <a:lstStyle/>
+          <a:p>
+            <a:pPr algn="ctr"/>
+            <a:endParaRPr lang="de-DE"/>
+          </a:p>
+        </p:txBody>
+      </p:sp>
+      <p:pic>
+        <p:nvPicPr>
+          <p:cNvPr id="24" name="Picture 4">
+            <a:extLst>
+              <a:ext uri="{FF2B5EF4-FFF2-40B4-BE49-F238E27FC236}">
+                <a16:creationId xmlns:a16="http://schemas.microsoft.com/office/drawing/2014/main" id="{F668A630-DDE5-F7FD-292A-06605BED7FC7}"/>
+              </a:ext>
+            </a:extLst>
+          </p:cNvPr>
+          <p:cNvPicPr>
+            <a:picLocks noChangeAspect="1"/>
+          </p:cNvPicPr>
+          <p:nvPr/>
+        </p:nvPicPr>
+        <p:blipFill>
+          <a:blip r:embed="rId3"/>
+          <a:stretch>
+            <a:fillRect/>
+          </a:stretch>
+        </p:blipFill>
+        <p:spPr>
+          <a:xfrm>
+            <a:off x="3107283" y="1946043"/>
+            <a:ext cx="426720" cy="482379"/>
+          </a:xfrm>
+          <a:prstGeom prst="rect">
+            <a:avLst/>
+          </a:prstGeom>
+        </p:spPr>
+      </p:pic>
+      <p:pic>
+        <p:nvPicPr>
+          <p:cNvPr id="28" name="Picture 6">
+            <a:extLst>
+              <a:ext uri="{FF2B5EF4-FFF2-40B4-BE49-F238E27FC236}">
+                <a16:creationId xmlns:a16="http://schemas.microsoft.com/office/drawing/2014/main" id="{97D45E23-90AD-A028-05E6-6586A5843E21}"/>
+              </a:ext>
+            </a:extLst>
+          </p:cNvPr>
+          <p:cNvPicPr>
+            <a:picLocks noChangeAspect="1"/>
+          </p:cNvPicPr>
+          <p:nvPr/>
+        </p:nvPicPr>
+        <p:blipFill>
+          <a:blip r:embed="rId4"/>
+          <a:stretch>
+            <a:fillRect/>
+          </a:stretch>
+        </p:blipFill>
+        <p:spPr>
+          <a:xfrm>
+            <a:off x="7122529" y="1990811"/>
+            <a:ext cx="549008" cy="336268"/>
+          </a:xfrm>
+          <a:prstGeom prst="rect">
+            <a:avLst/>
+          </a:prstGeom>
+        </p:spPr>
+      </p:pic>
+      <p:sp>
+        <p:nvSpPr>
+          <p:cNvPr id="29" name="Rectangle: Rounded Corners 6">
+            <a:extLst>
+              <a:ext uri="{FF2B5EF4-FFF2-40B4-BE49-F238E27FC236}">
+                <a16:creationId xmlns:a16="http://schemas.microsoft.com/office/drawing/2014/main" id="{8A69E514-DFCE-BDFC-FE4E-7567049EB630}"/>
+              </a:ext>
+            </a:extLst>
+          </p:cNvPr>
+          <p:cNvSpPr/>
+          <p:nvPr/>
+        </p:nvSpPr>
+        <p:spPr>
+          <a:xfrm>
+            <a:off x="7512511" y="2428422"/>
+            <a:ext cx="2558017" cy="768927"/>
+          </a:xfrm>
+          <a:prstGeom prst="roundRect">
+            <a:avLst/>
+          </a:prstGeom>
+          <a:solidFill>
+            <a:srgbClr val="FF9900"/>
+          </a:solidFill>
+          <a:ln>
+            <a:noFill/>
+          </a:ln>
+        </p:spPr>
+        <p:style>
+          <a:lnRef idx="2">
+            <a:schemeClr val="accent1">
+              <a:shade val="50000"/>
+            </a:schemeClr>
+          </a:lnRef>
+          <a:fillRef idx="1">
+            <a:schemeClr val="accent1"/>
+          </a:fillRef>
+          <a:effectRef idx="0">
+            <a:schemeClr val="accent1"/>
+          </a:effectRef>
+          <a:fontRef idx="minor">
+            <a:schemeClr val="lt1"/>
+          </a:fontRef>
+        </p:style>
+        <p:txBody>
+          <a:bodyPr rtlCol="0" anchor="ctr"/>
+          <a:lstStyle/>
+          <a:p>
+            <a:pPr algn="ctr"/>
+            <a:r>
+              <a:rPr lang="de-DE" dirty="0"/>
+              <a:t>EC2 </a:t>
+            </a:r>
+            <a:r>
+              <a:rPr lang="de-DE" dirty="0" err="1"/>
+              <a:t>machine</a:t>
+            </a:r>
+            <a:endParaRPr lang="de-DE" dirty="0"/>
+          </a:p>
+        </p:txBody>
+      </p:sp>
+      <p:sp>
+        <p:nvSpPr>
+          <p:cNvPr id="30" name="Rectangle: Rounded Corners 17">
+            <a:extLst>
+              <a:ext uri="{FF2B5EF4-FFF2-40B4-BE49-F238E27FC236}">
+                <a16:creationId xmlns:a16="http://schemas.microsoft.com/office/drawing/2014/main" id="{C3D25223-D404-A957-180D-7C74A93E192A}"/>
+              </a:ext>
+            </a:extLst>
+          </p:cNvPr>
+          <p:cNvSpPr/>
+          <p:nvPr/>
+        </p:nvSpPr>
+        <p:spPr>
+          <a:xfrm flipH="1" flipV="1">
+            <a:off x="6916899" y="1842909"/>
+            <a:ext cx="3424355" cy="1594946"/>
+          </a:xfrm>
+          <a:prstGeom prst="roundRect">
+            <a:avLst/>
+          </a:prstGeom>
+          <a:noFill/>
+          <a:ln>
+            <a:solidFill>
+              <a:srgbClr val="FF9900"/>
+            </a:solidFill>
+          </a:ln>
+        </p:spPr>
+        <p:style>
+          <a:lnRef idx="2">
+            <a:schemeClr val="accent1">
+              <a:shade val="50000"/>
+            </a:schemeClr>
+          </a:lnRef>
+          <a:fillRef idx="1">
+            <a:schemeClr val="accent1"/>
+          </a:fillRef>
+          <a:effectRef idx="0">
+            <a:schemeClr val="accent1"/>
+          </a:effectRef>
+          <a:fontRef idx="minor">
+            <a:schemeClr val="lt1"/>
+          </a:fontRef>
+        </p:style>
+        <p:txBody>
+          <a:bodyPr rtlCol="0" anchor="ctr"/>
+          <a:lstStyle/>
+          <a:p>
+            <a:pPr algn="ctr"/>
+            <a:endParaRPr lang="de-DE"/>
+          </a:p>
+        </p:txBody>
+      </p:sp>
+      <p:cxnSp>
+        <p:nvCxnSpPr>
+          <p:cNvPr id="31" name="Straight Arrow Connector 11">
+            <a:extLst>
+              <a:ext uri="{FF2B5EF4-FFF2-40B4-BE49-F238E27FC236}">
+                <a16:creationId xmlns:a16="http://schemas.microsoft.com/office/drawing/2014/main" id="{227B2E06-2BE5-7007-A654-EBE79D0F9520}"/>
+              </a:ext>
+            </a:extLst>
+          </p:cNvPr>
+          <p:cNvCxnSpPr>
+            <a:cxnSpLocks/>
+            <a:stCxn id="20" idx="3"/>
+            <a:endCxn id="29" idx="1"/>
+          </p:cNvCxnSpPr>
+          <p:nvPr/>
+        </p:nvCxnSpPr>
+        <p:spPr>
+          <a:xfrm>
+            <a:off x="6050561" y="2812886"/>
+            <a:ext cx="1461950" cy="0"/>
+          </a:xfrm>
+          <a:prstGeom prst="straightConnector1">
+            <a:avLst/>
+          </a:prstGeom>
+          <a:ln>
+            <a:solidFill>
+              <a:srgbClr val="FF9900"/>
+            </a:solidFill>
+            <a:tailEnd type="triangle"/>
+          </a:ln>
+        </p:spPr>
+        <p:style>
+          <a:lnRef idx="1">
+            <a:schemeClr val="accent1"/>
+          </a:lnRef>
+          <a:fillRef idx="0">
+            <a:schemeClr val="accent1"/>
+          </a:fillRef>
+          <a:effectRef idx="0">
+            <a:schemeClr val="accent1"/>
+          </a:effectRef>
+          <a:fontRef idx="minor">
+            <a:schemeClr val="tx1"/>
+          </a:fontRef>
+        </p:style>
+      </p:cxnSp>
+      <p:cxnSp>
+        <p:nvCxnSpPr>
+          <p:cNvPr id="36" name="Straight Arrow Connector 11">
+            <a:extLst>
+              <a:ext uri="{FF2B5EF4-FFF2-40B4-BE49-F238E27FC236}">
+                <a16:creationId xmlns:a16="http://schemas.microsoft.com/office/drawing/2014/main" id="{0939BA32-55A3-5025-F860-5D4857282D4C}"/>
+              </a:ext>
+            </a:extLst>
+          </p:cNvPr>
+          <p:cNvCxnSpPr>
+            <a:cxnSpLocks/>
+            <a:stCxn id="6" idx="0"/>
+            <a:endCxn id="29" idx="2"/>
+          </p:cNvCxnSpPr>
+          <p:nvPr/>
+        </p:nvCxnSpPr>
+        <p:spPr>
+          <a:xfrm flipV="1">
+            <a:off x="8791518" y="3197349"/>
+            <a:ext cx="2" cy="1165293"/>
+          </a:xfrm>
+          <a:prstGeom prst="straightConnector1">
+            <a:avLst/>
+          </a:prstGeom>
+          <a:ln>
+            <a:solidFill>
+              <a:srgbClr val="FF9900"/>
+            </a:solidFill>
+            <a:tailEnd type="triangle"/>
+          </a:ln>
+        </p:spPr>
+        <p:style>
+          <a:lnRef idx="1">
+            <a:schemeClr val="accent1"/>
+          </a:lnRef>
+          <a:fillRef idx="0">
+            <a:schemeClr val="accent1"/>
+          </a:fillRef>
+          <a:effectRef idx="0">
+            <a:schemeClr val="accent1"/>
+          </a:effectRef>
+          <a:fontRef idx="minor">
+            <a:schemeClr val="tx1"/>
+          </a:fontRef>
+        </p:style>
+      </p:cxnSp>
+    </p:spTree>
+    <p:extLst>
+      <p:ext uri="{BB962C8B-B14F-4D97-AF65-F5344CB8AC3E}">
+        <p14:creationId xmlns:p14="http://schemas.microsoft.com/office/powerpoint/2010/main" val="3050697166"/>
+      </p:ext>
+    </p:extLst>
+  </p:cSld>
+  <p:clrMapOvr>
+    <a:masterClrMapping/>
+  </p:clrMapOvr>
+</p:sld>
+</file>
+
+<file path=ppt/slides/slide14.xml><?xml version="1.0" encoding="utf-8"?>
+<p:sld xmlns:a="http://schemas.openxmlformats.org/drawingml/2006/main" xmlns:r="http://schemas.openxmlformats.org/officeDocument/2006/relationships" xmlns:p="http://schemas.openxmlformats.org/presentationml/2006/main">
+  <p:cSld>
+    <p:spTree>
+      <p:nvGrpSpPr>
+        <p:cNvPr id="1" name=""/>
+        <p:cNvGrpSpPr/>
+        <p:nvPr/>
+      </p:nvGrpSpPr>
+      <p:grpSpPr>
+        <a:xfrm>
+          <a:off x="0" y="0"/>
+          <a:ext cx="0" cy="0"/>
+          <a:chOff x="0" y="0"/>
+          <a:chExt cx="0" cy="0"/>
+        </a:xfrm>
+      </p:grpSpPr>
+      <p:sp>
+        <p:nvSpPr>
+          <p:cNvPr id="2" name="Titel 1">
+            <a:extLst>
+              <a:ext uri="{FF2B5EF4-FFF2-40B4-BE49-F238E27FC236}">
+                <a16:creationId xmlns:a16="http://schemas.microsoft.com/office/drawing/2014/main" id="{B65D7EC3-CD42-4551-8940-B2E7B1FA136C}"/>
+              </a:ext>
+            </a:extLst>
+          </p:cNvPr>
+          <p:cNvSpPr>
+            <a:spLocks noGrp="1"/>
+          </p:cNvSpPr>
+          <p:nvPr>
+            <p:ph type="title"/>
+          </p:nvPr>
+        </p:nvSpPr>
+        <p:spPr/>
+        <p:txBody>
+          <a:bodyPr/>
+          <a:lstStyle/>
+          <a:p>
+            <a:r>
+              <a:rPr lang="de-DE"/>
+              <a:t>Solution 1</a:t>
+            </a:r>
+            <a:endParaRPr lang="de-DE" dirty="0"/>
+          </a:p>
+        </p:txBody>
+      </p:sp>
+      <p:sp>
+        <p:nvSpPr>
+          <p:cNvPr id="4" name="Content Placeholder 3">
+            <a:extLst>
+              <a:ext uri="{FF2B5EF4-FFF2-40B4-BE49-F238E27FC236}">
+                <a16:creationId xmlns:a16="http://schemas.microsoft.com/office/drawing/2014/main" id="{2BF5D699-940E-4DE9-8183-FAB1BE315652}"/>
+              </a:ext>
+            </a:extLst>
+          </p:cNvPr>
+          <p:cNvSpPr>
+            <a:spLocks noGrp="1"/>
+          </p:cNvSpPr>
+          <p:nvPr>
+            <p:ph idx="1"/>
+          </p:nvPr>
+        </p:nvSpPr>
+        <p:spPr/>
+        <p:txBody>
+          <a:bodyPr/>
+          <a:lstStyle/>
+          <a:p>
+            <a:pPr marL="0" indent="0">
+              <a:buNone/>
+            </a:pPr>
+            <a:r>
+              <a:rPr lang="de-DE"/>
+              <a:t>Deployment via .zip link:</a:t>
+            </a:r>
+          </a:p>
+          <a:p>
+            <a:pPr marL="0" indent="0">
+              <a:buNone/>
+            </a:pPr>
+            <a:endParaRPr lang="de-DE"/>
+          </a:p>
+          <a:p>
+            <a:pPr lvl="1"/>
+            <a:r>
+              <a:rPr lang="de-DE"/>
+              <a:t>SSH to access EC2 instance</a:t>
+            </a:r>
+          </a:p>
+          <a:p>
+            <a:pPr lvl="1"/>
+            <a:r>
+              <a:rPr lang="de-DE"/>
+              <a:t>Installation of Docker and Docker Compose on EC2</a:t>
+            </a:r>
+          </a:p>
+          <a:p>
+            <a:pPr lvl="1"/>
+            <a:r>
+              <a:rPr lang="de-DE"/>
+              <a:t>Upload of application via .zip link from GitHub Repo to EC2</a:t>
+            </a:r>
+          </a:p>
+          <a:p>
+            <a:pPr lvl="1"/>
+            <a:r>
+              <a:rPr lang="de-DE"/>
+              <a:t>Docker-compose up on EC2</a:t>
+            </a:r>
+          </a:p>
+        </p:txBody>
+      </p:sp>
+    </p:spTree>
+    <p:extLst>
+      <p:ext uri="{BB962C8B-B14F-4D97-AF65-F5344CB8AC3E}">
+        <p14:creationId xmlns:p14="http://schemas.microsoft.com/office/powerpoint/2010/main" val="3653631288"/>
+      </p:ext>
+    </p:extLst>
+  </p:cSld>
+  <p:clrMapOvr>
+    <a:masterClrMapping/>
+  </p:clrMapOvr>
+</p:sld>
+</file>
+
+<file path=ppt/slides/slide15.xml><?xml version="1.0" encoding="utf-8"?>
 <p:sld xmlns:a="http://schemas.openxmlformats.org/drawingml/2006/main" xmlns:r="http://schemas.openxmlformats.org/officeDocument/2006/relationships" xmlns:p="http://schemas.openxmlformats.org/presentationml/2006/main">
   <p:cSld>
     <p:spTree>
@@ -7352,7 +8494,7 @@
 </p:sld>
 </file>
 
-<file path=ppt/slides/slide13.xml><?xml version="1.0" encoding="utf-8"?>
+<file path=ppt/slides/slide16.xml><?xml version="1.0" encoding="utf-8"?>
 <p:sld xmlns:a="http://schemas.openxmlformats.org/drawingml/2006/main" xmlns:r="http://schemas.openxmlformats.org/officeDocument/2006/relationships" xmlns:p="http://schemas.openxmlformats.org/presentationml/2006/main">
   <p:cSld>
     <p:spTree>
@@ -7436,7 +8578,7 @@
 </p:sld>
 </file>
 
-<file path=ppt/slides/slide14.xml><?xml version="1.0" encoding="utf-8"?>
+<file path=ppt/slides/slide17.xml><?xml version="1.0" encoding="utf-8"?>
 <p:sld xmlns:a="http://schemas.openxmlformats.org/drawingml/2006/main" xmlns:r="http://schemas.openxmlformats.org/officeDocument/2006/relationships" xmlns:p="http://schemas.openxmlformats.org/presentationml/2006/main">
   <p:cSld>
     <p:bg>
@@ -7509,7 +8651,7 @@
 </p:sld>
 </file>
 
-<file path=ppt/slides/slide15.xml><?xml version="1.0" encoding="utf-8"?>
+<file path=ppt/slides/slide18.xml><?xml version="1.0" encoding="utf-8"?>
 <p:sld xmlns:a="http://schemas.openxmlformats.org/drawingml/2006/main" xmlns:r="http://schemas.openxmlformats.org/officeDocument/2006/relationships" xmlns:p="http://schemas.openxmlformats.org/presentationml/2006/main">
   <p:cSld>
     <p:spTree>
@@ -7900,8 +9042,12 @@
           <a:lstStyle/>
           <a:p>
             <a:r>
-              <a:rPr lang="de-DE"/>
-              <a:t>Starting Point</a:t>
+              <a:rPr lang="de-DE" dirty="0"/>
+              <a:t>Basic </a:t>
+            </a:r>
+            <a:r>
+              <a:rPr lang="de-DE" dirty="0" err="1"/>
+              <a:t>Idea</a:t>
             </a:r>
             <a:endParaRPr lang="de-DE" dirty="0"/>
           </a:p>
@@ -8007,31 +9153,36 @@
             <p:ph idx="1"/>
           </p:nvPr>
         </p:nvSpPr>
-        <p:spPr/>
-        <p:txBody>
-          <a:bodyPr/>
-          <a:lstStyle/>
-          <a:p>
-            <a:r>
-              <a:rPr lang="en-US"/>
+        <p:spPr>
+          <a:xfrm>
+            <a:off x="838200" y="1706512"/>
+            <a:ext cx="10515600" cy="1408907"/>
+          </a:xfrm>
+        </p:spPr>
+        <p:txBody>
+          <a:bodyPr/>
+          <a:lstStyle/>
+          <a:p>
+            <a:r>
+              <a:rPr lang="en-US" dirty="0"/>
               <a:t>Docker-based web application for managing apartments</a:t>
             </a:r>
           </a:p>
           <a:p>
             <a:r>
-              <a:rPr lang="en-US"/>
+              <a:rPr lang="en-US" dirty="0"/>
               <a:t>Consists of several containers</a:t>
             </a:r>
-            <a:endParaRPr lang="de-DE"/>
-          </a:p>
-        </p:txBody>
-      </p:sp>
-      <p:sp>
-        <p:nvSpPr>
-          <p:cNvPr id="5" name="Oval 4">
-            <a:extLst>
-              <a:ext uri="{FF2B5EF4-FFF2-40B4-BE49-F238E27FC236}">
-                <a16:creationId xmlns:a16="http://schemas.microsoft.com/office/drawing/2014/main" id="{4B2D5940-0639-4D21-92EB-B4DA0F6B3C01}"/>
+            <a:endParaRPr lang="de-DE" dirty="0"/>
+          </a:p>
+        </p:txBody>
+      </p:sp>
+      <p:sp>
+        <p:nvSpPr>
+          <p:cNvPr id="8" name="Rechteck: abgerundete Ecken 7">
+            <a:extLst>
+              <a:ext uri="{FF2B5EF4-FFF2-40B4-BE49-F238E27FC236}">
+                <a16:creationId xmlns:a16="http://schemas.microsoft.com/office/drawing/2014/main" id="{F190E0C8-ED1A-8E6C-64F0-1D921312E6FB}"/>
               </a:ext>
             </a:extLst>
           </p:cNvPr>
@@ -8040,10 +9191,10 @@
         </p:nvSpPr>
         <p:spPr>
           <a:xfrm>
-            <a:off x="4509655" y="3128532"/>
-            <a:ext cx="1787236" cy="1049482"/>
+            <a:off x="2657724" y="2955492"/>
+            <a:ext cx="2234433" cy="947015"/>
           </a:xfrm>
-          <a:prstGeom prst="ellipse">
+          <a:prstGeom prst="roundRect">
             <a:avLst/>
           </a:prstGeom>
           <a:solidFill>
@@ -8073,20 +9224,58 @@
           <a:bodyPr rtlCol="0" anchor="ctr"/>
           <a:lstStyle/>
           <a:p>
-            <a:pPr algn="ctr"/>
-            <a:r>
-              <a:rPr lang="de-DE"/>
-              <a:t>Apartments</a:t>
-            </a:r>
-          </a:p>
-        </p:txBody>
-      </p:sp>
-      <p:sp>
-        <p:nvSpPr>
-          <p:cNvPr id="6" name="Oval 5">
-            <a:extLst>
-              <a:ext uri="{FF2B5EF4-FFF2-40B4-BE49-F238E27FC236}">
-                <a16:creationId xmlns:a16="http://schemas.microsoft.com/office/drawing/2014/main" id="{4A26CAAF-DA8E-446C-9333-4080CD852D91}"/>
+            <a:r>
+              <a:rPr lang="de-DE" dirty="0"/>
+              <a:t>      Apartments    </a:t>
+            </a:r>
+          </a:p>
+        </p:txBody>
+      </p:sp>
+      <p:pic>
+        <p:nvPicPr>
+          <p:cNvPr id="12" name="Grafik 11" descr="Datenbank">
+            <a:extLst>
+              <a:ext uri="{FF2B5EF4-FFF2-40B4-BE49-F238E27FC236}">
+                <a16:creationId xmlns:a16="http://schemas.microsoft.com/office/drawing/2014/main" id="{2354B38B-1F58-2DB2-BD6A-B8E64D0DF3C6}"/>
+              </a:ext>
+            </a:extLst>
+          </p:cNvPr>
+          <p:cNvPicPr>
+            <a:picLocks noChangeAspect="1"/>
+          </p:cNvPicPr>
+          <p:nvPr/>
+        </p:nvPicPr>
+        <p:blipFill>
+          <a:blip r:embed="rId2">
+            <a:extLst>
+              <a:ext uri="{28A0092B-C50C-407E-A947-70E740481C1C}">
+                <a14:useLocalDpi xmlns:a14="http://schemas.microsoft.com/office/drawing/2010/main" val="0"/>
+              </a:ext>
+              <a:ext uri="{96DAC541-7B7A-43D3-8B79-37D633B846F1}">
+                <asvg:svgBlip xmlns:asvg="http://schemas.microsoft.com/office/drawing/2016/SVG/main" r:embed="rId3"/>
+              </a:ext>
+            </a:extLst>
+          </a:blip>
+          <a:stretch>
+            <a:fillRect/>
+          </a:stretch>
+        </p:blipFill>
+        <p:spPr>
+          <a:xfrm>
+            <a:off x="4217883" y="3186890"/>
+            <a:ext cx="499568" cy="499568"/>
+          </a:xfrm>
+          <a:prstGeom prst="rect">
+            <a:avLst/>
+          </a:prstGeom>
+        </p:spPr>
+      </p:pic>
+      <p:sp>
+        <p:nvSpPr>
+          <p:cNvPr id="13" name="Rechteck: abgerundete Ecken 12">
+            <a:extLst>
+              <a:ext uri="{FF2B5EF4-FFF2-40B4-BE49-F238E27FC236}">
+                <a16:creationId xmlns:a16="http://schemas.microsoft.com/office/drawing/2014/main" id="{521961B4-16F3-C528-70EE-818E4631F9FC}"/>
               </a:ext>
             </a:extLst>
           </p:cNvPr>
@@ -8095,10 +9284,10 @@
         </p:nvSpPr>
         <p:spPr>
           <a:xfrm>
-            <a:off x="3491346" y="4770223"/>
-            <a:ext cx="1787236" cy="1049482"/>
+            <a:off x="838200" y="5000003"/>
+            <a:ext cx="2234433" cy="947015"/>
           </a:xfrm>
-          <a:prstGeom prst="ellipse">
+          <a:prstGeom prst="roundRect">
             <a:avLst/>
           </a:prstGeom>
           <a:solidFill>
@@ -8128,20 +9317,58 @@
           <a:bodyPr rtlCol="0" anchor="ctr"/>
           <a:lstStyle/>
           <a:p>
-            <a:pPr algn="ctr"/>
-            <a:r>
-              <a:rPr lang="de-DE"/>
-              <a:t>Reserve</a:t>
-            </a:r>
-          </a:p>
-        </p:txBody>
-      </p:sp>
-      <p:sp>
-        <p:nvSpPr>
-          <p:cNvPr id="7" name="Oval 6">
-            <a:extLst>
-              <a:ext uri="{FF2B5EF4-FFF2-40B4-BE49-F238E27FC236}">
-                <a16:creationId xmlns:a16="http://schemas.microsoft.com/office/drawing/2014/main" id="{83F50B71-4640-424A-A160-7C5E5E913CF1}"/>
+            <a:r>
+              <a:rPr lang="de-DE" dirty="0"/>
+              <a:t>      Reserve    </a:t>
+            </a:r>
+          </a:p>
+        </p:txBody>
+      </p:sp>
+      <p:pic>
+        <p:nvPicPr>
+          <p:cNvPr id="14" name="Grafik 13" descr="Datenbank">
+            <a:extLst>
+              <a:ext uri="{FF2B5EF4-FFF2-40B4-BE49-F238E27FC236}">
+                <a16:creationId xmlns:a16="http://schemas.microsoft.com/office/drawing/2014/main" id="{418EEC16-AAE2-A1BF-645F-C277A803B819}"/>
+              </a:ext>
+            </a:extLst>
+          </p:cNvPr>
+          <p:cNvPicPr>
+            <a:picLocks noChangeAspect="1"/>
+          </p:cNvPicPr>
+          <p:nvPr/>
+        </p:nvPicPr>
+        <p:blipFill>
+          <a:blip r:embed="rId2">
+            <a:extLst>
+              <a:ext uri="{28A0092B-C50C-407E-A947-70E740481C1C}">
+                <a14:useLocalDpi xmlns:a14="http://schemas.microsoft.com/office/drawing/2010/main" val="0"/>
+              </a:ext>
+              <a:ext uri="{96DAC541-7B7A-43D3-8B79-37D633B846F1}">
+                <asvg:svgBlip xmlns:asvg="http://schemas.microsoft.com/office/drawing/2016/SVG/main" r:embed="rId3"/>
+              </a:ext>
+            </a:extLst>
+          </a:blip>
+          <a:stretch>
+            <a:fillRect/>
+          </a:stretch>
+        </p:blipFill>
+        <p:spPr>
+          <a:xfrm>
+            <a:off x="2279089" y="5223726"/>
+            <a:ext cx="499568" cy="499568"/>
+          </a:xfrm>
+          <a:prstGeom prst="rect">
+            <a:avLst/>
+          </a:prstGeom>
+        </p:spPr>
+      </p:pic>
+      <p:sp>
+        <p:nvSpPr>
+          <p:cNvPr id="16" name="Rechteck: abgerundete Ecken 15">
+            <a:extLst>
+              <a:ext uri="{FF2B5EF4-FFF2-40B4-BE49-F238E27FC236}">
+                <a16:creationId xmlns:a16="http://schemas.microsoft.com/office/drawing/2014/main" id="{5B7D9DB4-02AC-919A-78CE-10618A0D520D}"/>
               </a:ext>
             </a:extLst>
           </p:cNvPr>
@@ -8150,10 +9377,10 @@
         </p:nvSpPr>
         <p:spPr>
           <a:xfrm>
-            <a:off x="6660573" y="4245482"/>
-            <a:ext cx="1787236" cy="1049482"/>
+            <a:off x="4492003" y="5000003"/>
+            <a:ext cx="2234433" cy="947015"/>
           </a:xfrm>
-          <a:prstGeom prst="ellipse">
+          <a:prstGeom prst="roundRect">
             <a:avLst/>
           </a:prstGeom>
           <a:solidFill>
@@ -8183,106 +9410,619 @@
           <a:bodyPr rtlCol="0" anchor="ctr"/>
           <a:lstStyle/>
           <a:p>
-            <a:pPr algn="ctr"/>
-            <a:r>
-              <a:rPr lang="de-DE"/>
-              <a:t>Search</a:t>
-            </a:r>
-          </a:p>
-        </p:txBody>
-      </p:sp>
-      <p:cxnSp>
-        <p:nvCxnSpPr>
-          <p:cNvPr id="9" name="Straight Arrow Connector 8">
-            <a:extLst>
-              <a:ext uri="{FF2B5EF4-FFF2-40B4-BE49-F238E27FC236}">
-                <a16:creationId xmlns:a16="http://schemas.microsoft.com/office/drawing/2014/main" id="{2BA811C3-A3B7-448F-80EB-587E1BF4A712}"/>
-              </a:ext>
-            </a:extLst>
-          </p:cNvPr>
-          <p:cNvCxnSpPr>
-            <a:cxnSpLocks/>
-            <a:stCxn id="6" idx="0"/>
-            <a:endCxn id="5" idx="3"/>
-          </p:cNvCxnSpPr>
+            <a:r>
+              <a:rPr lang="de-DE" dirty="0"/>
+              <a:t>      Search    </a:t>
+            </a:r>
+          </a:p>
+        </p:txBody>
+      </p:sp>
+      <p:pic>
+        <p:nvPicPr>
+          <p:cNvPr id="17" name="Grafik 16" descr="Datenbank">
+            <a:extLst>
+              <a:ext uri="{FF2B5EF4-FFF2-40B4-BE49-F238E27FC236}">
+                <a16:creationId xmlns:a16="http://schemas.microsoft.com/office/drawing/2014/main" id="{DC4E3FAF-9367-6CAB-6440-7BF4287AFFD9}"/>
+              </a:ext>
+            </a:extLst>
+          </p:cNvPr>
+          <p:cNvPicPr>
+            <a:picLocks noChangeAspect="1"/>
+          </p:cNvPicPr>
           <p:nvPr/>
-        </p:nvCxnSpPr>
+        </p:nvPicPr>
+        <p:blipFill>
+          <a:blip r:embed="rId2">
+            <a:extLst>
+              <a:ext uri="{28A0092B-C50C-407E-A947-70E740481C1C}">
+                <a14:useLocalDpi xmlns:a14="http://schemas.microsoft.com/office/drawing/2010/main" val="0"/>
+              </a:ext>
+              <a:ext uri="{96DAC541-7B7A-43D3-8B79-37D633B846F1}">
+                <asvg:svgBlip xmlns:asvg="http://schemas.microsoft.com/office/drawing/2016/SVG/main" r:embed="rId3"/>
+              </a:ext>
+            </a:extLst>
+          </a:blip>
+          <a:stretch>
+            <a:fillRect/>
+          </a:stretch>
+        </p:blipFill>
         <p:spPr>
-          <a:xfrm flipV="1">
-            <a:off x="4384964" y="4024321"/>
-            <a:ext cx="386426" cy="745902"/>
+          <a:xfrm>
+            <a:off x="5932892" y="5223726"/>
+            <a:ext cx="499568" cy="499568"/>
           </a:xfrm>
-          <a:prstGeom prst="straightConnector1">
+          <a:prstGeom prst="rect">
             <a:avLst/>
           </a:prstGeom>
+        </p:spPr>
+      </p:pic>
+      <p:pic>
+        <p:nvPicPr>
+          <p:cNvPr id="19" name="Grafik 18" descr="Übertragen">
+            <a:extLst>
+              <a:ext uri="{FF2B5EF4-FFF2-40B4-BE49-F238E27FC236}">
+                <a16:creationId xmlns:a16="http://schemas.microsoft.com/office/drawing/2014/main" id="{1B159B4A-78EF-F865-5F39-9DDA1784C837}"/>
+              </a:ext>
+            </a:extLst>
+          </p:cNvPr>
+          <p:cNvPicPr>
+            <a:picLocks noChangeAspect="1"/>
+          </p:cNvPicPr>
+          <p:nvPr/>
+        </p:nvPicPr>
+        <p:blipFill>
+          <a:blip r:embed="rId4">
+            <a:extLst>
+              <a:ext uri="{28A0092B-C50C-407E-A947-70E740481C1C}">
+                <a14:useLocalDpi xmlns:a14="http://schemas.microsoft.com/office/drawing/2010/main" val="0"/>
+              </a:ext>
+              <a:ext uri="{96DAC541-7B7A-43D3-8B79-37D633B846F1}">
+                <asvg:svgBlip xmlns:asvg="http://schemas.microsoft.com/office/drawing/2016/SVG/main" r:embed="rId5"/>
+              </a:ext>
+            </a:extLst>
+          </a:blip>
+          <a:stretch>
+            <a:fillRect/>
+          </a:stretch>
+        </p:blipFill>
+        <p:spPr>
+          <a:xfrm rot="18131053">
+            <a:off x="1984961" y="3952064"/>
+            <a:ext cx="914400" cy="914400"/>
+          </a:xfrm>
+          <a:prstGeom prst="rect">
+            <a:avLst/>
+          </a:prstGeom>
+        </p:spPr>
+      </p:pic>
+      <p:pic>
+        <p:nvPicPr>
+          <p:cNvPr id="20" name="Grafik 19" descr="Übertragen">
+            <a:extLst>
+              <a:ext uri="{FF2B5EF4-FFF2-40B4-BE49-F238E27FC236}">
+                <a16:creationId xmlns:a16="http://schemas.microsoft.com/office/drawing/2014/main" id="{8304CDDF-616A-399F-E78F-81C82F028A09}"/>
+              </a:ext>
+            </a:extLst>
+          </p:cNvPr>
+          <p:cNvPicPr>
+            <a:picLocks noChangeAspect="1"/>
+          </p:cNvPicPr>
+          <p:nvPr/>
+        </p:nvPicPr>
+        <p:blipFill>
+          <a:blip r:embed="rId4">
+            <a:extLst>
+              <a:ext uri="{28A0092B-C50C-407E-A947-70E740481C1C}">
+                <a14:useLocalDpi xmlns:a14="http://schemas.microsoft.com/office/drawing/2010/main" val="0"/>
+              </a:ext>
+              <a:ext uri="{96DAC541-7B7A-43D3-8B79-37D633B846F1}">
+                <asvg:svgBlip xmlns:asvg="http://schemas.microsoft.com/office/drawing/2016/SVG/main" r:embed="rId5"/>
+              </a:ext>
+            </a:extLst>
+          </a:blip>
+          <a:stretch>
+            <a:fillRect/>
+          </a:stretch>
+        </p:blipFill>
+        <p:spPr>
+          <a:xfrm>
+            <a:off x="3325118" y="5039736"/>
+            <a:ext cx="914400" cy="914400"/>
+          </a:xfrm>
+          <a:prstGeom prst="rect">
+            <a:avLst/>
+          </a:prstGeom>
+        </p:spPr>
+      </p:pic>
+      <p:pic>
+        <p:nvPicPr>
+          <p:cNvPr id="21" name="Grafik 20" descr="Übertragen">
+            <a:extLst>
+              <a:ext uri="{FF2B5EF4-FFF2-40B4-BE49-F238E27FC236}">
+                <a16:creationId xmlns:a16="http://schemas.microsoft.com/office/drawing/2014/main" id="{E960B71E-E069-6C21-AB32-7255E5CF4A0C}"/>
+              </a:ext>
+            </a:extLst>
+          </p:cNvPr>
+          <p:cNvPicPr>
+            <a:picLocks noChangeAspect="1"/>
+          </p:cNvPicPr>
+          <p:nvPr/>
+        </p:nvPicPr>
+        <p:blipFill>
+          <a:blip r:embed="rId4">
+            <a:extLst>
+              <a:ext uri="{28A0092B-C50C-407E-A947-70E740481C1C}">
+                <a14:useLocalDpi xmlns:a14="http://schemas.microsoft.com/office/drawing/2010/main" val="0"/>
+              </a:ext>
+              <a:ext uri="{96DAC541-7B7A-43D3-8B79-37D633B846F1}">
+                <asvg:svgBlip xmlns:asvg="http://schemas.microsoft.com/office/drawing/2016/SVG/main" r:embed="rId5"/>
+              </a:ext>
+            </a:extLst>
+          </a:blip>
+          <a:stretch>
+            <a:fillRect/>
+          </a:stretch>
+        </p:blipFill>
+        <p:spPr>
+          <a:xfrm rot="3104335">
+            <a:off x="4763392" y="3952470"/>
+            <a:ext cx="914400" cy="914400"/>
+          </a:xfrm>
+          <a:prstGeom prst="rect">
+            <a:avLst/>
+          </a:prstGeom>
+        </p:spPr>
+      </p:pic>
+      <p:pic>
+        <p:nvPicPr>
+          <p:cNvPr id="23" name="Grafik 22">
+            <a:extLst>
+              <a:ext uri="{FF2B5EF4-FFF2-40B4-BE49-F238E27FC236}">
+                <a16:creationId xmlns:a16="http://schemas.microsoft.com/office/drawing/2014/main" id="{C35F219E-EF28-6EDE-E179-950A551CEF1C}"/>
+              </a:ext>
+            </a:extLst>
+          </p:cNvPr>
+          <p:cNvPicPr>
+            <a:picLocks noChangeAspect="1"/>
+          </p:cNvPicPr>
+          <p:nvPr/>
+        </p:nvPicPr>
+        <p:blipFill>
+          <a:blip r:embed="rId6">
+            <a:extLst>
+              <a:ext uri="{28A0092B-C50C-407E-A947-70E740481C1C}">
+                <a14:useLocalDpi xmlns:a14="http://schemas.microsoft.com/office/drawing/2010/main" val="0"/>
+              </a:ext>
+            </a:extLst>
+          </a:blip>
+          <a:stretch>
+            <a:fillRect/>
+          </a:stretch>
+        </p:blipFill>
+        <p:spPr>
+          <a:xfrm>
+            <a:off x="5862704" y="4104767"/>
+            <a:ext cx="2235071" cy="350976"/>
+          </a:xfrm>
+          <a:prstGeom prst="rect">
+            <a:avLst/>
+          </a:prstGeom>
+        </p:spPr>
+      </p:pic>
+      <p:sp>
+        <p:nvSpPr>
+          <p:cNvPr id="26" name="Rechteck: abgerundete Ecken 25">
+            <a:extLst>
+              <a:ext uri="{FF2B5EF4-FFF2-40B4-BE49-F238E27FC236}">
+                <a16:creationId xmlns:a16="http://schemas.microsoft.com/office/drawing/2014/main" id="{D814E692-3425-F3A9-DE46-FA9C85EAF53E}"/>
+              </a:ext>
+            </a:extLst>
+          </p:cNvPr>
+          <p:cNvSpPr/>
+          <p:nvPr/>
+        </p:nvSpPr>
+        <p:spPr>
+          <a:xfrm>
+            <a:off x="8770984" y="3110776"/>
+            <a:ext cx="2174966" cy="2689934"/>
+          </a:xfrm>
+          <a:prstGeom prst="roundRect">
+            <a:avLst/>
+          </a:prstGeom>
+          <a:solidFill>
+            <a:schemeClr val="bg1"/>
+          </a:solidFill>
           <a:ln>
-            <a:solidFill>
-              <a:srgbClr val="516482"/>
-            </a:solidFill>
-            <a:tailEnd type="triangle"/>
+            <a:noFill/>
           </a:ln>
+          <a:effectLst>
+            <a:innerShdw blurRad="558800">
+              <a:prstClr val="black">
+                <a:alpha val="16000"/>
+              </a:prstClr>
+            </a:innerShdw>
+          </a:effectLst>
         </p:spPr>
         <p:style>
-          <a:lnRef idx="1">
-            <a:schemeClr val="accent1"/>
+          <a:lnRef idx="2">
+            <a:schemeClr val="accent1">
+              <a:shade val="50000"/>
+            </a:schemeClr>
           </a:lnRef>
-          <a:fillRef idx="0">
+          <a:fillRef idx="1">
             <a:schemeClr val="accent1"/>
           </a:fillRef>
           <a:effectRef idx="0">
             <a:schemeClr val="accent1"/>
           </a:effectRef>
           <a:fontRef idx="minor">
-            <a:schemeClr val="tx1"/>
+            <a:schemeClr val="lt1"/>
           </a:fontRef>
         </p:style>
-      </p:cxnSp>
-      <p:cxnSp>
-        <p:nvCxnSpPr>
-          <p:cNvPr id="11" name="Straight Arrow Connector 10">
-            <a:extLst>
-              <a:ext uri="{FF2B5EF4-FFF2-40B4-BE49-F238E27FC236}">
-                <a16:creationId xmlns:a16="http://schemas.microsoft.com/office/drawing/2014/main" id="{54F86FE4-C8A2-4D5F-BC44-9F7B6C98664D}"/>
-              </a:ext>
-            </a:extLst>
-          </p:cNvPr>
-          <p:cNvCxnSpPr>
-            <a:cxnSpLocks/>
-            <a:stCxn id="7" idx="1"/>
-            <a:endCxn id="5" idx="5"/>
-          </p:cNvCxnSpPr>
+        <p:txBody>
+          <a:bodyPr rtlCol="0" anchor="ctr"/>
+          <a:lstStyle/>
+          <a:p>
+            <a:pPr algn="ctr"/>
+            <a:endParaRPr lang="de-DE"/>
+          </a:p>
+        </p:txBody>
+      </p:sp>
+      <p:pic>
+        <p:nvPicPr>
+          <p:cNvPr id="27" name="Picture 4" descr="data:image/png;base64,iVBORw0KGgoAAAANSUhEUgAAAPMAAADQCAMAAADlEKeVAAAAbFBMVEX///8kl+0AjuwAkOz8//8XlO2/3PkAkuwble0Ajey72fjb6/uZyPV5ufKUxvXn8fy01ffv9/7n8vymz/aHv/P1+v52t/LK4vrV6PvX6fsvm+5irvGQw/RSp/BCoe+jzfZfrPA6n+5Lpe9ssvFIIBcuAAAOgUlEQVR4nO1da4OqLBBOiMAum+attSyt//8fXy+AyCXtvCrubs/5co6H1McZhmEYhtXKHq7E6YI8Lb7NPHAdGe7J9jtNDaBwhkfb7zQ1NJz/opz/Iue/qNt/kfNHt38hPpz/rG7/Rc5/Ubf/Iudfr9vqvOr3y9nBMty17XeaGr4n49eL+YMfjLWEl5flqz+yN++QbJVgUl4+Q/ky2pWXD/JlmNkm8A/YY3n0QXF5+YDky/i60sYAf6AR2yvk0GGl44y+Vr/FD/vfnH+gHzYf58ifjsV7mE+3n+59OhpvYTY5b6ED0/OETIZjLs5RPT6A65RchmIu3Y6bG8JsAV7MTJx3bGRHRTQpnyGYSbdzvohLUuuk55HzTvghSW2r9zycO7dDtn30WXQ7gt3fhBOT6sEsnD1pIgOSiVm9hoazfl5Vc/7HGGAmpaEQZ2JWr+G5UAKoyO2Vy65XXnbkqxgMsMKRoh7Yrm+SbCVs6ssb+XKtjr58dTtEtTfKHN0Bi5lwTIRQzrAqe4plMzY5HipnB9sepCeGYg8rzt4cT764oAs3L6/uIJBR9dxEbgzgd3k5Vi4/qlvflFsfhAf7UMOZzOGYqMazNiTDY4D6sarKA9ypt8bCk791nJ0hBv9/c1afDP1xfM+demskPDlRzXb1VTY/l/Opl7NmqKpazDBE25OznjPJ/cTbh/Hz8ozDvXeeQtXn5Sz2Z71uOwRijAgihCCEMIRFOLoXbk+39TZMBYI4HNc9s6fb2rHKQBuEY/oq9jhrfRITcDriYpBFzvJU8jXc8bq1vf68+npH0A5cPucBcj4P79DjxhMscl6RN5R7TF/Fom6vrm8oNxxxuLIp55P6OxNGjRppOAM95xcxwH/kzFar+jFydFCJ38HKQdyqwb59efmujwGmagxwXU1TsXy96D57sFsychTY38ioe85Zvto8NdFejvT3OCmX5RlDOEzQ+PeEyZJsGGWU237TcRBtDgQOG6vQY5xHKol7syHyvzf3OIXlhHEQYwePEiILlODcnChNGRrKtwSMx6D8eMfnswwERwn+5m+59lZBYD6K+5UMd34sA8HHSMOyZpVogSAIgudoaWOXJXMmdegPY+DE2xGjQfmCOZNLnl/ia5CMvCS7YM7o0P/6/4QF63a93jcFnssdqor+t/83qFPgpWAc90OH5Y5V0+UYvBdhnRETrkgG+qUx+5gwZ2i7UM5owrJMhiVQ6wC76ThropFLwKTJM5rg7hIw4nKUBou022SkmJcBN9v8dJhWzIt0PicWs2ZZxj4mFvNqszwjRvJpKa9Oy+M85djcYHGc0Sgh7Jd4L3dlBoy5nm7AO8v7cwDvJ6e8OI87nZ7y0rzPeXZVLcoTm8GAVVhShyZonl0nbyWjTQwwQ15+jeXIeSbNXr2RozQ95qK8Spai3GCqlQsNFiJnOGdpkoF5WRMDXWakPHgvxLSYwwETsAS3ZO46TJ59Qc+/k9/6PAPMsgO2A9tRMTjDBFKG5cmVnbocVicaeKrMkddYW+zReDYvW0JgTbuhHSlXSG1Rtph1f7aT+Wm3/p+NKSWBcwUJDLBAGc04e9Ridu3GN+vV4Fb3eW03sGewBVxm7NLWuzLDbTbSMFtK0ah1Os+KHYGBbaotojlIk+UIuUZUTK7e2NnaZikjm3a6geqyekvDYcJxGsHDotSaY4sn0m/kxoutMu/nAzepvgNSynjRNea3zsi9mmC0t+9p9uCOR2SNQLY4W61FkI6i4aVOp/vFdmMFycXF/492Sdi52p4wvonIyyB8Y092lzCGj/3kSX1TINoeHPju6EUQBkWoVKb4STh6hwIOKjpASrYYoss++cl8Gdbf3vVS11vBqC5B0Fa/d1i5PgjTLBx9I6t1nM6b4Ct85o+0dCSB65ZfIC0e+TP8CjbnRfscH3zwwQcffPDBBx988MEHH3zwwTAEt/Qy5Zmdpzi9LeUkVIoYEkLc6RIcjhA5Dpx1w0EfmvNnCJnsAc0mY8unynVBKw1NtyWgOepnjtNbBoNxnmpVZd2sYpMlFVH+cB4fH87LwIfz+PhwXgY+nMfHh/My8OE8Pj6cLcHf7XantuTJa87+sWw8NCOkanyUG/dwXn8bJnT+8XgyFmZZ77qvW3PSv+Z6cyhAcwhP+vSabA8z5yR80MO8yTPom2qerw9Y3xrg/C7e6zXnqwvdh/yyp+CZ1scGAXS563Ks9tWvfJkTQN0nVzgecJvqRBCGdTl+A+foitp8MEIwyF5EUtZ7R0geIwjc2gzHV5zPafVw1K2wvckAT0wiBMFC2b4QVLdEqcLJKV/zIn7AdQzk3C4E8pOB815JgCPwZgqaBVjOEiQ4ZXGRF5xZgri48+ZcKImWkEib3+kbe6tIwwm3yUoJ0mWzEeB5SOW8S7V5ra5WP/2btjGIezgnDnsj1Gbsa/PkpX0bftMG3Te6hMy2qvEXMKSxYboPVuS8UU9upo01G94SUwIsKvwXnEu147/DTHsj/ecr7yVuLqRnepHUsPWNfb7enXEC58BEuXy2I6e5bU0fkx2dpue8EdWO1dg+mY8cJEKlKXaOmaFxqlKuchI1yYstZ0+kLDcmTlfSHZWozu0QDyeq5afjHF0E5UCE2glfpEykewmBU/XsNpETPb2s3f9IMMzCwAuuOZZ+yDknLQsEb+HdC/ZP1L4i6ZSJEUpYlwb2UDWOHd4YhXrOnpgpCw50FBb2sRGM8us9+Ho6sG3Jy33KnDHMryWnrxyVvGFa367d54qdgIlpvS06fYdxjrhdQPjKB+Uka4kIVQfWAuOQK8qZ7eKobZPC2c+Fd8YOHwzaTZow5zL9Fro966hdzrDwuOuyiXO6YNJ+qW6MuVO6gHHmZzrBZ0eLE8L+Q4jO8+3h8NLp59Qku0cN50C0eaCV/pa9DUo7Y+Ix4/8RazjrNx/uqTwJlsfXk2AGKGdeQwzI91o/GEGu3VyBgLwctc4BxvWBixLnk3g0GE4FJ4v1XahU0L/yd/qWORNH6zJHTIWh6sX5ipwLdnvNVhFGGjMXgZV+Vb5PieRO3dUO570gZALEojNMMrqCHcwe0aLFopz12dJ3ejNtYecj/3nDmYkZavf1sbZU0Dsq5tfnPAqcd4Uo5EdHRNRm6wvoHygHcOxyNlUxpj6Hoawg79MNZ9ZBb9rGTJfpqTusxNrrA2lazlfBHBGpGBwrhY31gqPqVw8ELWdTeVsmSWiYELJyJA1n1tjgWdNi7HS9jVqDnsrgjPNF9LGUTcD0vB1kYEH1r/FyWp/E8EiveZLxECiPqX7FmZb4NNZ0Z8Nx/f/sa/acO0Q5d7wmrFTMYt/PNGOm1dzq1VPGGZsW8qkCmiTHK0nVnOkcCxs3n1Mdg9XfqToan0yxVmYNpFCY0WmDc9t6Wmyf9JtsBM7GYtX0MC5sfCdqfGvOofB3LUJhEkZrjWmGgx7OGjHzGrLYAKolte77fQpWkJfa2uXJvqaxMe0JuOrCtAuCnsq6Gs5q0sEWqo10qLso5Wwu9krVyXxUzl0QXSNzYq68SIt01yrGbPxrylrOinJ4hjmkwjkWOBszF4S2eohxkl7OVAdh5bE0RvxFY5VzO7dA3b449CipOiDAOBvr6DVj0Qs5s25ZWUR6+qA5n4bKGQtyRsbGMufS1eTHlZK00yUGy/kqcDbWQ7g1NMwDCu2W9fgd93XRQOjP1J6Bnkgw51zPcDz2L9RxewaezkFqU93LmZkl45ux2FD1d1oN0Hy6YSx0/rvAfwDnounCez5LEjPGuN1WjpEXAZo5SS9netAcNkVqT6IbwhwY492QYNipnqOeBQp5LsljNmItPOYl3I67F6DT+V7OVGuM56hQ0TZvfhJdPN3NGprNRICF4no6tBIz4LEBsZhnQS8NyVLr5cy+oKGmddSddTEX0FBNlb4ZtZjUHzR7bTXU2BAv4CQUbaXGYVCB9V7OzM8i+qkSG2SpsKjUCdZ2/6AzpeOzVH1jBpVzG/hyuS1gHRoMSLbt58xnabp+x4oSs055pAYH6aaxbIbB5rgR6P5bD00M0Ocxt9Y3oSrkONoxo7Na18+5nS2qkwE+XHJ3nR3dpQlXHHn0hkmHHbiqORAxuj/Ds4mzEC4l7MFshNbp4xVAcQllAGc+9ikVNAM+WPL/ObFIL5aTj/nZMK1YeXVfnEnSOVdhV3dv4rzS+CZM0KiQ7Ng6r54sWPkBnNtQJr6JhuwkxFzbqzzghhxxeIsOPMghrnjwxki0euuwaayNezZofRM2++EBRSmEwpa1XO6tDuEctcsBMNs2P42SZxupcUXDceMLsPDGVp3PYespd4KrGbtMcBrQb7G7ssbGdYyV6Jvk9MqV+5/YYbVbou0Dyj1qEOfVuV2aIBCm+fNSiEU3umFLXwhoYOhkz8sNC6sJ3Y4u1tDDkGSX5wO1jetwgmldUvVNuD7WFVyyOK4qRfD7A65egzivNuJ8rjoRXvinA6U52RG/aCx38+4ak9TY/X7BWfBNmC7fOvfqrFaJtm0Y59XGNa74AWVKdjSXH1ED7r6DTI1x3di85s4XCVwmwodxekVQa9lkzkn4pfUQvon+1QjUBO/9Qv9sAjTT9Ehcmeg0bliaOfOO0YbUnob5FS4EVhJn7+u8y7Wko4vmdgTf9KGvULeqjB39FEq7no8QM/t0P4bGJfLZ+N6qmgc1siHdBIfI7fwqP14vR0P8YCOXxCKYGF3lXSY/HOvXNiocczmtA4GQj9iN86ut1krDxeK44cdA6loIZlIkqaivs6BafjrEJ2PMJLnUpYLqPwiC7OW5DN9xaa4RaRpjUNxfedW7A2oa13WGYCqWgttV6Tgw1/7uXNkZ2PX5TiHho0p1s1hxwctfkda0BHv/nL+o8hMl+zgr0iJ7fm36iwGdg0N+S4vH87rtzxJsGqe3Z+hJjY/P4mEKgu+eaaYq23dwyEphpo94n+j87115x/ZXm/DaeeJ/sWToJRlk4p8AAAAASUVORK5CYII=">
+            <a:extLst>
+              <a:ext uri="{FF2B5EF4-FFF2-40B4-BE49-F238E27FC236}">
+                <a16:creationId xmlns:a16="http://schemas.microsoft.com/office/drawing/2014/main" id="{633D06FE-098F-4211-25E4-E6F392084C54}"/>
+              </a:ext>
+            </a:extLst>
+          </p:cNvPr>
+          <p:cNvPicPr>
+            <a:picLocks noChangeAspect="1" noChangeArrowheads="1"/>
+          </p:cNvPicPr>
           <p:nvPr/>
-        </p:nvCxnSpPr>
-        <p:spPr>
-          <a:xfrm flipH="1" flipV="1">
-            <a:off x="6035156" y="4024321"/>
-            <a:ext cx="887152" cy="374854"/>
+        </p:nvPicPr>
+        <p:blipFill rotWithShape="1">
+          <a:blip r:embed="rId7">
+            <a:extLst>
+              <a:ext uri="{BEBA8EAE-BF5A-486C-A8C5-ECC9F3942E4B}">
+                <a14:imgProps xmlns:a14="http://schemas.microsoft.com/office/drawing/2010/main">
+                  <a14:imgLayer r:embed="rId8">
+                    <a14:imgEffect>
+                      <a14:backgroundRemoval t="2885" b="62019" l="9877" r="90535">
+                        <a14:foregroundMark x1="26337" y1="21635" x2="26337" y2="21635"/>
+                        <a14:foregroundMark x1="37449" y1="24038" x2="37449" y2="24038"/>
+                        <a14:foregroundMark x1="37037" y1="14423" x2="37037" y2="14423"/>
+                        <a14:foregroundMark x1="45267" y1="25962" x2="45267" y2="25962"/>
+                        <a14:foregroundMark x1="46502" y1="14423" x2="46502" y2="14423"/>
+                        <a14:foregroundMark x1="52263" y1="25000" x2="52263" y2="25000"/>
+                        <a14:foregroundMark x1="61317" y1="25962" x2="61317" y2="25962"/>
+                        <a14:foregroundMark x1="54321" y1="13462" x2="54321" y2="13462"/>
+                        <a14:foregroundMark x1="53909" y1="6731" x2="53909" y2="6731"/>
+                        <a14:foregroundMark x1="53909" y1="2885" x2="53909" y2="2885"/>
+                        <a14:foregroundMark x1="90535" y1="25962" x2="90535" y2="25962"/>
+                        <a14:foregroundMark x1="42387" y1="62019" x2="42387" y2="62019"/>
+                      </a14:backgroundRemoval>
+                    </a14:imgEffect>
+                    <a14:imgEffect>
+                      <a14:sharpenSoften amount="50000"/>
+                    </a14:imgEffect>
+                  </a14:imgLayer>
+                </a14:imgProps>
+              </a:ext>
+              <a:ext uri="{28A0092B-C50C-407E-A947-70E740481C1C}">
+                <a14:useLocalDpi xmlns:a14="http://schemas.microsoft.com/office/drawing/2010/main" val="0"/>
+              </a:ext>
+            </a:extLst>
+          </a:blip>
+          <a:srcRect b="32040"/>
+          <a:stretch/>
+        </p:blipFill>
+        <p:spPr bwMode="auto">
+          <a:xfrm>
+            <a:off x="8854013" y="3312357"/>
+            <a:ext cx="858786" cy="499568"/>
           </a:xfrm>
-          <a:prstGeom prst="straightConnector1">
+          <a:prstGeom prst="rect">
             <a:avLst/>
           </a:prstGeom>
-          <a:ln>
-            <a:solidFill>
-              <a:srgbClr val="516482"/>
-            </a:solidFill>
-            <a:tailEnd type="triangle"/>
-          </a:ln>
+          <a:noFill/>
+          <a:extLst>
+            <a:ext uri="{909E8E84-426E-40DD-AFC4-6F175D3DCCD1}">
+              <a14:hiddenFill xmlns:a14="http://schemas.microsoft.com/office/drawing/2010/main">
+                <a:solidFill>
+                  <a:srgbClr val="FFFFFF"/>
+                </a:solidFill>
+              </a14:hiddenFill>
+            </a:ext>
+          </a:extLst>
         </p:spPr>
-        <p:style>
-          <a:lnRef idx="1">
-            <a:schemeClr val="accent1"/>
-          </a:lnRef>
-          <a:fillRef idx="0">
-            <a:schemeClr val="accent1"/>
-          </a:fillRef>
-          <a:effectRef idx="0">
-            <a:schemeClr val="accent1"/>
-          </a:effectRef>
-          <a:fontRef idx="minor">
-            <a:schemeClr val="tx1"/>
-          </a:fontRef>
-        </p:style>
-      </p:cxnSp>
+      </p:pic>
+      <p:sp>
+        <p:nvSpPr>
+          <p:cNvPr id="28" name="Textfeld 27">
+            <a:extLst>
+              <a:ext uri="{FF2B5EF4-FFF2-40B4-BE49-F238E27FC236}">
+                <a16:creationId xmlns:a16="http://schemas.microsoft.com/office/drawing/2014/main" id="{91514754-4208-1CFB-F061-A9DF5EBC9569}"/>
+              </a:ext>
+            </a:extLst>
+          </p:cNvPr>
+          <p:cNvSpPr txBox="1"/>
+          <p:nvPr/>
+        </p:nvSpPr>
+        <p:spPr>
+          <a:xfrm>
+            <a:off x="8804206" y="3971912"/>
+            <a:ext cx="2201849" cy="369332"/>
+          </a:xfrm>
+          <a:prstGeom prst="rect">
+            <a:avLst/>
+          </a:prstGeom>
+          <a:noFill/>
+        </p:spPr>
+        <p:txBody>
+          <a:bodyPr wrap="square" rtlCol="0">
+            <a:spAutoFit/>
+          </a:bodyPr>
+          <a:lstStyle/>
+          <a:p>
+            <a:r>
+              <a:rPr lang="de-DE" dirty="0" err="1"/>
+              <a:t>docker-compose.yml</a:t>
+            </a:r>
+            <a:endParaRPr lang="de-DE" dirty="0"/>
+          </a:p>
+        </p:txBody>
+      </p:sp>
+      <p:pic>
+        <p:nvPicPr>
+          <p:cNvPr id="30" name="Grafik 29" descr="Wiedergeben">
+            <a:extLst>
+              <a:ext uri="{FF2B5EF4-FFF2-40B4-BE49-F238E27FC236}">
+                <a16:creationId xmlns:a16="http://schemas.microsoft.com/office/drawing/2014/main" id="{F1308CAB-6F8C-D107-5D44-D025B652E80F}"/>
+              </a:ext>
+            </a:extLst>
+          </p:cNvPr>
+          <p:cNvPicPr>
+            <a:picLocks noChangeAspect="1"/>
+          </p:cNvPicPr>
+          <p:nvPr/>
+        </p:nvPicPr>
+        <p:blipFill>
+          <a:blip r:embed="rId9">
+            <a:extLst>
+              <a:ext uri="{28A0092B-C50C-407E-A947-70E740481C1C}">
+                <a14:useLocalDpi xmlns:a14="http://schemas.microsoft.com/office/drawing/2010/main" val="0"/>
+              </a:ext>
+              <a:ext uri="{96DAC541-7B7A-43D3-8B79-37D633B846F1}">
+                <asvg:svgBlip xmlns:asvg="http://schemas.microsoft.com/office/drawing/2016/SVG/main" r:embed="rId10"/>
+              </a:ext>
+            </a:extLst>
+          </a:blip>
+          <a:stretch>
+            <a:fillRect/>
+          </a:stretch>
+        </p:blipFill>
+        <p:spPr>
+          <a:xfrm>
+            <a:off x="9545256" y="4581918"/>
+            <a:ext cx="719748" cy="719748"/>
+          </a:xfrm>
+          <a:prstGeom prst="rect">
+            <a:avLst/>
+          </a:prstGeom>
+        </p:spPr>
+      </p:pic>
+      <p:pic>
+        <p:nvPicPr>
+          <p:cNvPr id="31" name="Picture 4" descr="data:image/png;base64,iVBORw0KGgoAAAANSUhEUgAAAPMAAADQCAMAAADlEKeVAAAAbFBMVEX///8kl+0AjuwAkOz8//8XlO2/3PkAkuwble0Ajey72fjb6/uZyPV5ufKUxvXn8fy01ffv9/7n8vymz/aHv/P1+v52t/LK4vrV6PvX6fsvm+5irvGQw/RSp/BCoe+jzfZfrPA6n+5Lpe9ssvFIIBcuAAAOgUlEQVR4nO1da4OqLBBOiMAum+attSyt//8fXy+AyCXtvCrubs/5co6H1McZhmEYhtXKHq7E6YI8Lb7NPHAdGe7J9jtNDaBwhkfb7zQ1NJz/opz/Iue/qNt/kfNHt38hPpz/rG7/Rc5/Ubf/Iudfr9vqvOr3y9nBMty17XeaGr4n49eL+YMfjLWEl5flqz+yN++QbJVgUl4+Q/ky2pWXD/JlmNkm8A/YY3n0QXF5+YDky/i60sYAf6AR2yvk0GGl44y+Vr/FD/vfnH+gHzYf58ifjsV7mE+3n+59OhpvYTY5b6ED0/OETIZjLs5RPT6A65RchmIu3Y6bG8JsAV7MTJx3bGRHRTQpnyGYSbdzvohLUuuk55HzTvghSW2r9zycO7dDtn30WXQ7gt3fhBOT6sEsnD1pIgOSiVm9hoazfl5Vc/7HGGAmpaEQZ2JWr+G5UAKoyO2Vy65XXnbkqxgMsMKRoh7Yrm+SbCVs6ssb+XKtjr58dTtEtTfKHN0Bi5lwTIRQzrAqe4plMzY5HipnB9sepCeGYg8rzt4cT764oAs3L6/uIJBR9dxEbgzgd3k5Vi4/qlvflFsfhAf7UMOZzOGYqMazNiTDY4D6sarKA9ypt8bCk791nJ0hBv9/c1afDP1xfM+demskPDlRzXb1VTY/l/Opl7NmqKpazDBE25OznjPJ/cTbh/Hz8ozDvXeeQtXn5Sz2Z71uOwRijAgihCCEMIRFOLoXbk+39TZMBYI4HNc9s6fb2rHKQBuEY/oq9jhrfRITcDriYpBFzvJU8jXc8bq1vf68+npH0A5cPucBcj4P79DjxhMscl6RN5R7TF/Fom6vrm8oNxxxuLIp55P6OxNGjRppOAM95xcxwH/kzFar+jFydFCJ38HKQdyqwb59efmujwGmagxwXU1TsXy96D57sFsychTY38ioe85Zvto8NdFejvT3OCmX5RlDOEzQ+PeEyZJsGGWU237TcRBtDgQOG6vQY5xHKol7syHyvzf3OIXlhHEQYwePEiILlODcnChNGRrKtwSMx6D8eMfnswwERwn+5m+59lZBYD6K+5UMd34sA8HHSMOyZpVogSAIgudoaWOXJXMmdegPY+DE2xGjQfmCOZNLnl/ia5CMvCS7YM7o0P/6/4QF63a93jcFnssdqor+t/83qFPgpWAc90OH5Y5V0+UYvBdhnRETrkgG+qUx+5gwZ2i7UM5owrJMhiVQ6wC76ThropFLwKTJM5rg7hIw4nKUBou022SkmJcBN9v8dJhWzIt0PicWs2ZZxj4mFvNqszwjRvJpKa9Oy+M85djcYHGc0Sgh7Jd4L3dlBoy5nm7AO8v7cwDvJ6e8OI87nZ7y0rzPeXZVLcoTm8GAVVhShyZonl0nbyWjTQwwQ15+jeXIeSbNXr2RozQ95qK8Spai3GCqlQsNFiJnOGdpkoF5WRMDXWakPHgvxLSYwwETsAS3ZO46TJ59Qc+/k9/6PAPMsgO2A9tRMTjDBFKG5cmVnbocVicaeKrMkddYW+zReDYvW0JgTbuhHSlXSG1Rtph1f7aT+Wm3/p+NKSWBcwUJDLBAGc04e9Ridu3GN+vV4Fb3eW03sGewBVxm7NLWuzLDbTbSMFtK0ah1Os+KHYGBbaotojlIk+UIuUZUTK7e2NnaZikjm3a6geqyekvDYcJxGsHDotSaY4sn0m/kxoutMu/nAzepvgNSynjRNea3zsi9mmC0t+9p9uCOR2SNQLY4W61FkI6i4aVOp/vFdmMFycXF/492Sdi52p4wvonIyyB8Y092lzCGj/3kSX1TINoeHPju6EUQBkWoVKb4STh6hwIOKjpASrYYoss++cl8Gdbf3vVS11vBqC5B0Fa/d1i5PgjTLBx9I6t1nM6b4Ct85o+0dCSB65ZfIC0e+TP8CjbnRfscH3zwwQcffPDBBx988MEHH3zwwTAEt/Qy5Zmdpzi9LeUkVIoYEkLc6RIcjhA5Dpx1w0EfmvNnCJnsAc0mY8unynVBKw1NtyWgOepnjtNbBoNxnmpVZd2sYpMlFVH+cB4fH87LwIfz+PhwXgY+nMfHh/My8OE8Pj6cLcHf7XantuTJa87+sWw8NCOkanyUG/dwXn8bJnT+8XgyFmZZ77qvW3PSv+Z6cyhAcwhP+vSabA8z5yR80MO8yTPom2qerw9Y3xrg/C7e6zXnqwvdh/yyp+CZ1scGAXS563Ks9tWvfJkTQN0nVzgecJvqRBCGdTl+A+foitp8MEIwyF5EUtZ7R0geIwjc2gzHV5zPafVw1K2wvckAT0wiBMFC2b4QVLdEqcLJKV/zIn7AdQzk3C4E8pOB815JgCPwZgqaBVjOEiQ4ZXGRF5xZgri48+ZcKImWkEib3+kbe6tIwwm3yUoJ0mWzEeB5SOW8S7V5ra5WP/2btjGIezgnDnsj1Gbsa/PkpX0bftMG3Te6hMy2qvEXMKSxYboPVuS8UU9upo01G94SUwIsKvwXnEu147/DTHsj/ecr7yVuLqRnepHUsPWNfb7enXEC58BEuXy2I6e5bU0fkx2dpue8EdWO1dg+mY8cJEKlKXaOmaFxqlKuchI1yYstZ0+kLDcmTlfSHZWozu0QDyeq5afjHF0E5UCE2glfpEykewmBU/XsNpETPb2s3f9IMMzCwAuuOZZ+yDknLQsEb+HdC/ZP1L4i6ZSJEUpYlwb2UDWOHd4YhXrOnpgpCw50FBb2sRGM8us9+Ho6sG3Jy33KnDHMryWnrxyVvGFa367d54qdgIlpvS06fYdxjrhdQPjKB+Uka4kIVQfWAuOQK8qZ7eKobZPC2c+Fd8YOHwzaTZow5zL9Fro966hdzrDwuOuyiXO6YNJ+qW6MuVO6gHHmZzrBZ0eLE8L+Q4jO8+3h8NLp59Qku0cN50C0eaCV/pa9DUo7Y+Ix4/8RazjrNx/uqTwJlsfXk2AGKGdeQwzI91o/GEGu3VyBgLwctc4BxvWBixLnk3g0GE4FJ4v1XahU0L/yd/qWORNH6zJHTIWh6sX5ipwLdnvNVhFGGjMXgZV+Vb5PieRO3dUO570gZALEojNMMrqCHcwe0aLFopz12dJ3ejNtYecj/3nDmYkZavf1sbZU0Dsq5tfnPAqcd4Uo5EdHRNRm6wvoHygHcOxyNlUxpj6Hoawg79MNZ9ZBb9rGTJfpqTusxNrrA2lazlfBHBGpGBwrhY31gqPqVw8ELWdTeVsmSWiYELJyJA1n1tjgWdNi7HS9jVqDnsrgjPNF9LGUTcD0vB1kYEH1r/FyWp/E8EiveZLxECiPqX7FmZb4NNZ0Z8Nx/f/sa/acO0Q5d7wmrFTMYt/PNGOm1dzq1VPGGZsW8qkCmiTHK0nVnOkcCxs3n1Mdg9XfqToan0yxVmYNpFCY0WmDc9t6Wmyf9JtsBM7GYtX0MC5sfCdqfGvOofB3LUJhEkZrjWmGgx7OGjHzGrLYAKolte77fQpWkJfa2uXJvqaxMe0JuOrCtAuCnsq6Gs5q0sEWqo10qLso5Wwu9krVyXxUzl0QXSNzYq68SIt01yrGbPxrylrOinJ4hjmkwjkWOBszF4S2eohxkl7OVAdh5bE0RvxFY5VzO7dA3b449CipOiDAOBvr6DVj0Qs5s25ZWUR6+qA5n4bKGQtyRsbGMufS1eTHlZK00yUGy/kqcDbWQ7g1NMwDCu2W9fgd93XRQOjP1J6Bnkgw51zPcDz2L9RxewaezkFqU93LmZkl45ux2FD1d1oN0Hy6YSx0/rvAfwDnounCez5LEjPGuN1WjpEXAZo5SS9netAcNkVqT6IbwhwY492QYNipnqOeBQp5LsljNmItPOYl3I67F6DT+V7OVGuM56hQ0TZvfhJdPN3NGprNRICF4no6tBIz4LEBsZhnQS8NyVLr5cy+oKGmddSddTEX0FBNlb4ZtZjUHzR7bTXU2BAv4CQUbaXGYVCB9V7OzM8i+qkSG2SpsKjUCdZ2/6AzpeOzVH1jBpVzG/hyuS1gHRoMSLbt58xnabp+x4oSs055pAYH6aaxbIbB5rgR6P5bD00M0Ocxt9Y3oSrkONoxo7Na18+5nS2qkwE+XHJ3nR3dpQlXHHn0hkmHHbiqORAxuj/Ds4mzEC4l7MFshNbp4xVAcQllAGc+9ikVNAM+WPL/ObFIL5aTj/nZMK1YeXVfnEnSOVdhV3dv4rzS+CZM0KiQ7Ng6r54sWPkBnNtQJr6JhuwkxFzbqzzghhxxeIsOPMghrnjwxki0euuwaayNezZofRM2++EBRSmEwpa1XO6tDuEctcsBMNs2P42SZxupcUXDceMLsPDGVp3PYespd4KrGbtMcBrQb7G7ssbGdYyV6Jvk9MqV+5/YYbVbou0Dyj1qEOfVuV2aIBCm+fNSiEU3umFLXwhoYOhkz8sNC6sJ3Y4u1tDDkGSX5wO1jetwgmldUvVNuD7WFVyyOK4qRfD7A65egzivNuJ8rjoRXvinA6U52RG/aCx38+4ak9TY/X7BWfBNmC7fOvfqrFaJtm0Y59XGNa74AWVKdjSXH1ED7r6DTI1x3di85s4XCVwmwodxekVQa9lkzkn4pfUQvon+1QjUBO/9Qv9sAjTT9Ehcmeg0bliaOfOO0YbUnob5FS4EVhJn7+u8y7Wko4vmdgTf9KGvULeqjB39FEq7no8QM/t0P4bGJfLZ+N6qmgc1siHdBIfI7fwqP14vR0P8YCOXxCKYGF3lXSY/HOvXNiocczmtA4GQj9iN86ut1krDxeK44cdA6loIZlIkqaivs6BafjrEJ2PMJLnUpYLqPwiC7OW5DN9xaa4RaRpjUNxfedW7A2oa13WGYCqWgttV6Tgw1/7uXNkZ2PX5TiHho0p1s1hxwctfkda0BHv/nL+o8hMl+zgr0iJ7fm36iwGdg0N+S4vH87rtzxJsGqe3Z+hJjY/P4mEKgu+eaaYq23dwyEphpo94n+j87115x/ZXm/DaeeJ/sWToJRlk4p8AAAAASUVORK5CYII=">
+            <a:extLst>
+              <a:ext uri="{FF2B5EF4-FFF2-40B4-BE49-F238E27FC236}">
+                <a16:creationId xmlns:a16="http://schemas.microsoft.com/office/drawing/2014/main" id="{B924EBBE-1A62-4CBB-3C18-A21A111F2417}"/>
+              </a:ext>
+            </a:extLst>
+          </p:cNvPr>
+          <p:cNvPicPr>
+            <a:picLocks noChangeAspect="1" noChangeArrowheads="1"/>
+          </p:cNvPicPr>
+          <p:nvPr/>
+        </p:nvPicPr>
+        <p:blipFill rotWithShape="1">
+          <a:blip r:embed="rId7">
+            <a:extLst>
+              <a:ext uri="{BEBA8EAE-BF5A-486C-A8C5-ECC9F3942E4B}">
+                <a14:imgProps xmlns:a14="http://schemas.microsoft.com/office/drawing/2010/main">
+                  <a14:imgLayer r:embed="rId8">
+                    <a14:imgEffect>
+                      <a14:backgroundRemoval t="2885" b="62019" l="9877" r="90535">
+                        <a14:foregroundMark x1="26337" y1="21635" x2="26337" y2="21635"/>
+                        <a14:foregroundMark x1="37449" y1="24038" x2="37449" y2="24038"/>
+                        <a14:foregroundMark x1="37037" y1="14423" x2="37037" y2="14423"/>
+                        <a14:foregroundMark x1="45267" y1="25962" x2="45267" y2="25962"/>
+                        <a14:foregroundMark x1="46502" y1="14423" x2="46502" y2="14423"/>
+                        <a14:foregroundMark x1="52263" y1="25000" x2="52263" y2="25000"/>
+                        <a14:foregroundMark x1="61317" y1="25962" x2="61317" y2="25962"/>
+                        <a14:foregroundMark x1="54321" y1="13462" x2="54321" y2="13462"/>
+                        <a14:foregroundMark x1="53909" y1="6731" x2="53909" y2="6731"/>
+                        <a14:foregroundMark x1="53909" y1="2885" x2="53909" y2="2885"/>
+                        <a14:foregroundMark x1="90535" y1="25962" x2="90535" y2="25962"/>
+                        <a14:foregroundMark x1="42387" y1="62019" x2="42387" y2="62019"/>
+                      </a14:backgroundRemoval>
+                    </a14:imgEffect>
+                    <a14:imgEffect>
+                      <a14:sharpenSoften amount="50000"/>
+                    </a14:imgEffect>
+                  </a14:imgLayer>
+                </a14:imgProps>
+              </a:ext>
+              <a:ext uri="{28A0092B-C50C-407E-A947-70E740481C1C}">
+                <a14:useLocalDpi xmlns:a14="http://schemas.microsoft.com/office/drawing/2010/main" val="0"/>
+              </a:ext>
+            </a:extLst>
+          </a:blip>
+          <a:srcRect b="32040"/>
+          <a:stretch/>
+        </p:blipFill>
+        <p:spPr bwMode="auto">
+          <a:xfrm>
+            <a:off x="2353470" y="2759689"/>
+            <a:ext cx="743824" cy="432693"/>
+          </a:xfrm>
+          <a:prstGeom prst="rect">
+            <a:avLst/>
+          </a:prstGeom>
+          <a:noFill/>
+          <a:extLst>
+            <a:ext uri="{909E8E84-426E-40DD-AFC4-6F175D3DCCD1}">
+              <a14:hiddenFill xmlns:a14="http://schemas.microsoft.com/office/drawing/2010/main">
+                <a:solidFill>
+                  <a:srgbClr val="FFFFFF"/>
+                </a:solidFill>
+              </a14:hiddenFill>
+            </a:ext>
+          </a:extLst>
+        </p:spPr>
+      </p:pic>
+      <p:pic>
+        <p:nvPicPr>
+          <p:cNvPr id="32" name="Picture 4" descr="data:image/png;base64,iVBORw0KGgoAAAANSUhEUgAAAPMAAADQCAMAAADlEKeVAAAAbFBMVEX///8kl+0AjuwAkOz8//8XlO2/3PkAkuwble0Ajey72fjb6/uZyPV5ufKUxvXn8fy01ffv9/7n8vymz/aHv/P1+v52t/LK4vrV6PvX6fsvm+5irvGQw/RSp/BCoe+jzfZfrPA6n+5Lpe9ssvFIIBcuAAAOgUlEQVR4nO1da4OqLBBOiMAum+attSyt//8fXy+AyCXtvCrubs/5co6H1McZhmEYhtXKHq7E6YI8Lb7NPHAdGe7J9jtNDaBwhkfb7zQ1NJz/opz/Iue/qNt/kfNHt38hPpz/rG7/Rc5/Ubf/Iudfr9vqvOr3y9nBMty17XeaGr4n49eL+YMfjLWEl5flqz+yN++QbJVgUl4+Q/ky2pWXD/JlmNkm8A/YY3n0QXF5+YDky/i60sYAf6AR2yvk0GGl44y+Vr/FD/vfnH+gHzYf58ifjsV7mE+3n+59OhpvYTY5b6ED0/OETIZjLs5RPT6A65RchmIu3Y6bG8JsAV7MTJx3bGRHRTQpnyGYSbdzvohLUuuk55HzTvghSW2r9zycO7dDtn30WXQ7gt3fhBOT6sEsnD1pIgOSiVm9hoazfl5Vc/7HGGAmpaEQZ2JWr+G5UAKoyO2Vy65XXnbkqxgMsMKRoh7Yrm+SbCVs6ssb+XKtjr58dTtEtTfKHN0Bi5lwTIRQzrAqe4plMzY5HipnB9sepCeGYg8rzt4cT764oAs3L6/uIJBR9dxEbgzgd3k5Vi4/qlvflFsfhAf7UMOZzOGYqMazNiTDY4D6sarKA9ypt8bCk791nJ0hBv9/c1afDP1xfM+demskPDlRzXb1VTY/l/Opl7NmqKpazDBE25OznjPJ/cTbh/Hz8ozDvXeeQtXn5Sz2Z71uOwRijAgihCCEMIRFOLoXbk+39TZMBYI4HNc9s6fb2rHKQBuEY/oq9jhrfRITcDriYpBFzvJU8jXc8bq1vf68+npH0A5cPucBcj4P79DjxhMscl6RN5R7TF/Fom6vrm8oNxxxuLIp55P6OxNGjRppOAM95xcxwH/kzFar+jFydFCJ38HKQdyqwb59efmujwGmagxwXU1TsXy96D57sFsychTY38ioe85Zvto8NdFejvT3OCmX5RlDOEzQ+PeEyZJsGGWU237TcRBtDgQOG6vQY5xHKol7syHyvzf3OIXlhHEQYwePEiILlODcnChNGRrKtwSMx6D8eMfnswwERwn+5m+59lZBYD6K+5UMd34sA8HHSMOyZpVogSAIgudoaWOXJXMmdegPY+DE2xGjQfmCOZNLnl/ia5CMvCS7YM7o0P/6/4QF63a93jcFnssdqor+t/83qFPgpWAc90OH5Y5V0+UYvBdhnRETrkgG+qUx+5gwZ2i7UM5owrJMhiVQ6wC76ThropFLwKTJM5rg7hIw4nKUBou022SkmJcBN9v8dJhWzIt0PicWs2ZZxj4mFvNqszwjRvJpKa9Oy+M85djcYHGc0Sgh7Jd4L3dlBoy5nm7AO8v7cwDvJ6e8OI87nZ7y0rzPeXZVLcoTm8GAVVhShyZonl0nbyWjTQwwQ15+jeXIeSbNXr2RozQ95qK8Spai3GCqlQsNFiJnOGdpkoF5WRMDXWakPHgvxLSYwwETsAS3ZO46TJ59Qc+/k9/6PAPMsgO2A9tRMTjDBFKG5cmVnbocVicaeKrMkddYW+zReDYvW0JgTbuhHSlXSG1Rtph1f7aT+Wm3/p+NKSWBcwUJDLBAGc04e9Ridu3GN+vV4Fb3eW03sGewBVxm7NLWuzLDbTbSMFtK0ah1Os+KHYGBbaotojlIk+UIuUZUTK7e2NnaZikjm3a6geqyekvDYcJxGsHDotSaY4sn0m/kxoutMu/nAzepvgNSynjRNea3zsi9mmC0t+9p9uCOR2SNQLY4W61FkI6i4aVOp/vFdmMFycXF/492Sdi52p4wvonIyyB8Y092lzCGj/3kSX1TINoeHPju6EUQBkWoVKb4STh6hwIOKjpASrYYoss++cl8Gdbf3vVS11vBqC5B0Fa/d1i5PgjTLBx9I6t1nM6b4Ct85o+0dCSB65ZfIC0e+TP8CjbnRfscH3zwwQcffPDBBx988MEHH3zwwTAEt/Qy5Zmdpzi9LeUkVIoYEkLc6RIcjhA5Dpx1w0EfmvNnCJnsAc0mY8unynVBKw1NtyWgOepnjtNbBoNxnmpVZd2sYpMlFVH+cB4fH87LwIfz+PhwXgY+nMfHh/My8OE8Pj6cLcHf7XantuTJa87+sWw8NCOkanyUG/dwXn8bJnT+8XgyFmZZ77qvW3PSv+Z6cyhAcwhP+vSabA8z5yR80MO8yTPom2qerw9Y3xrg/C7e6zXnqwvdh/yyp+CZ1scGAXS563Ks9tWvfJkTQN0nVzgecJvqRBCGdTl+A+foitp8MEIwyF5EUtZ7R0geIwjc2gzHV5zPafVw1K2wvckAT0wiBMFC2b4QVLdEqcLJKV/zIn7AdQzk3C4E8pOB815JgCPwZgqaBVjOEiQ4ZXGRF5xZgri48+ZcKImWkEib3+kbe6tIwwm3yUoJ0mWzEeB5SOW8S7V5ra5WP/2btjGIezgnDnsj1Gbsa/PkpX0bftMG3Te6hMy2qvEXMKSxYboPVuS8UU9upo01G94SUwIsKvwXnEu147/DTHsj/ecr7yVuLqRnepHUsPWNfb7enXEC58BEuXy2I6e5bU0fkx2dpue8EdWO1dg+mY8cJEKlKXaOmaFxqlKuchI1yYstZ0+kLDcmTlfSHZWozu0QDyeq5afjHF0E5UCE2glfpEykewmBU/XsNpETPb2s3f9IMMzCwAuuOZZ+yDknLQsEb+HdC/ZP1L4i6ZSJEUpYlwb2UDWOHd4YhXrOnpgpCw50FBb2sRGM8us9+Ho6sG3Jy33KnDHMryWnrxyVvGFa367d54qdgIlpvS06fYdxjrhdQPjKB+Uka4kIVQfWAuOQK8qZ7eKobZPC2c+Fd8YOHwzaTZow5zL9Fro966hdzrDwuOuyiXO6YNJ+qW6MuVO6gHHmZzrBZ0eLE8L+Q4jO8+3h8NLp59Qku0cN50C0eaCV/pa9DUo7Y+Ix4/8RazjrNx/uqTwJlsfXk2AGKGdeQwzI91o/GEGu3VyBgLwctc4BxvWBixLnk3g0GE4FJ4v1XahU0L/yd/qWORNH6zJHTIWh6sX5ipwLdnvNVhFGGjMXgZV+Vb5PieRO3dUO570gZALEojNMMrqCHcwe0aLFopz12dJ3ejNtYecj/3nDmYkZavf1sbZU0Dsq5tfnPAqcd4Uo5EdHRNRm6wvoHygHcOxyNlUxpj6Hoawg79MNZ9ZBb9rGTJfpqTusxNrrA2lazlfBHBGpGBwrhY31gqPqVw8ELWdTeVsmSWiYELJyJA1n1tjgWdNi7HS9jVqDnsrgjPNF9LGUTcD0vB1kYEH1r/FyWp/E8EiveZLxECiPqX7FmZb4NNZ0Z8Nx/f/sa/acO0Q5d7wmrFTMYt/PNGOm1dzq1VPGGZsW8qkCmiTHK0nVnOkcCxs3n1Mdg9XfqToan0yxVmYNpFCY0WmDc9t6Wmyf9JtsBM7GYtX0MC5sfCdqfGvOofB3LUJhEkZrjWmGgx7OGjHzGrLYAKolte77fQpWkJfa2uXJvqaxMe0JuOrCtAuCnsq6Gs5q0sEWqo10qLso5Wwu9krVyXxUzl0QXSNzYq68SIt01yrGbPxrylrOinJ4hjmkwjkWOBszF4S2eohxkl7OVAdh5bE0RvxFY5VzO7dA3b449CipOiDAOBvr6DVj0Qs5s25ZWUR6+qA5n4bKGQtyRsbGMufS1eTHlZK00yUGy/kqcDbWQ7g1NMwDCu2W9fgd93XRQOjP1J6Bnkgw51zPcDz2L9RxewaezkFqU93LmZkl45ux2FD1d1oN0Hy6YSx0/rvAfwDnounCez5LEjPGuN1WjpEXAZo5SS9netAcNkVqT6IbwhwY492QYNipnqOeBQp5LsljNmItPOYl3I67F6DT+V7OVGuM56hQ0TZvfhJdPN3NGprNRICF4no6tBIz4LEBsZhnQS8NyVLr5cy+oKGmddSddTEX0FBNlb4ZtZjUHzR7bTXU2BAv4CQUbaXGYVCB9V7OzM8i+qkSG2SpsKjUCdZ2/6AzpeOzVH1jBpVzG/hyuS1gHRoMSLbt58xnabp+x4oSs055pAYH6aaxbIbB5rgR6P5bD00M0Ocxt9Y3oSrkONoxo7Na18+5nS2qkwE+XHJ3nR3dpQlXHHn0hkmHHbiqORAxuj/Ds4mzEC4l7MFshNbp4xVAcQllAGc+9ikVNAM+WPL/ObFIL5aTj/nZMK1YeXVfnEnSOVdhV3dv4rzS+CZM0KiQ7Ng6r54sWPkBnNtQJr6JhuwkxFzbqzzghhxxeIsOPMghrnjwxki0euuwaayNezZofRM2++EBRSmEwpa1XO6tDuEctcsBMNs2P42SZxupcUXDceMLsPDGVp3PYespd4KrGbtMcBrQb7G7ssbGdYyV6Jvk9MqV+5/YYbVbou0Dyj1qEOfVuV2aIBCm+fNSiEU3umFLXwhoYOhkz8sNC6sJ3Y4u1tDDkGSX5wO1jetwgmldUvVNuD7WFVyyOK4qRfD7A65egzivNuJ8rjoRXvinA6U52RG/aCx38+4ak9TY/X7BWfBNmC7fOvfqrFaJtm0Y59XGNa74AWVKdjSXH1ED7r6DTI1x3di85s4XCVwmwodxekVQa9lkzkn4pfUQvon+1QjUBO/9Qv9sAjTT9Ehcmeg0bliaOfOO0YbUnob5FS4EVhJn7+u8y7Wko4vmdgTf9KGvULeqjB39FEq7no8QM/t0P4bGJfLZ+N6qmgc1siHdBIfI7fwqP14vR0P8YCOXxCKYGF3lXSY/HOvXNiocczmtA4GQj9iN86ut1krDxeK44cdA6loIZlIkqaivs6BafjrEJ2PMJLnUpYLqPwiC7OW5DN9xaa4RaRpjUNxfedW7A2oa13WGYCqWgttV6Tgw1/7uXNkZ2PX5TiHho0p1s1hxwctfkda0BHv/nL+o8hMl+zgr0iJ7fm36iwGdg0N+S4vH87rtzxJsGqe3Z+hJjY/P4mEKgu+eaaYq23dwyEphpo94n+j87115x/ZXm/DaeeJ/sWToJRlk4p8AAAAASUVORK5CYII=">
+            <a:extLst>
+              <a:ext uri="{FF2B5EF4-FFF2-40B4-BE49-F238E27FC236}">
+                <a16:creationId xmlns:a16="http://schemas.microsoft.com/office/drawing/2014/main" id="{C58A9CFD-D360-6E64-002A-DF2C3A1436CD}"/>
+              </a:ext>
+            </a:extLst>
+          </p:cNvPr>
+          <p:cNvPicPr>
+            <a:picLocks noChangeAspect="1" noChangeArrowheads="1"/>
+          </p:cNvPicPr>
+          <p:nvPr/>
+        </p:nvPicPr>
+        <p:blipFill rotWithShape="1">
+          <a:blip r:embed="rId7">
+            <a:extLst>
+              <a:ext uri="{BEBA8EAE-BF5A-486C-A8C5-ECC9F3942E4B}">
+                <a14:imgProps xmlns:a14="http://schemas.microsoft.com/office/drawing/2010/main">
+                  <a14:imgLayer r:embed="rId8">
+                    <a14:imgEffect>
+                      <a14:backgroundRemoval t="2885" b="62019" l="9877" r="90535">
+                        <a14:foregroundMark x1="26337" y1="21635" x2="26337" y2="21635"/>
+                        <a14:foregroundMark x1="37449" y1="24038" x2="37449" y2="24038"/>
+                        <a14:foregroundMark x1="37037" y1="14423" x2="37037" y2="14423"/>
+                        <a14:foregroundMark x1="45267" y1="25962" x2="45267" y2="25962"/>
+                        <a14:foregroundMark x1="46502" y1="14423" x2="46502" y2="14423"/>
+                        <a14:foregroundMark x1="52263" y1="25000" x2="52263" y2="25000"/>
+                        <a14:foregroundMark x1="61317" y1="25962" x2="61317" y2="25962"/>
+                        <a14:foregroundMark x1="54321" y1="13462" x2="54321" y2="13462"/>
+                        <a14:foregroundMark x1="53909" y1="6731" x2="53909" y2="6731"/>
+                        <a14:foregroundMark x1="53909" y1="2885" x2="53909" y2="2885"/>
+                        <a14:foregroundMark x1="90535" y1="25962" x2="90535" y2="25962"/>
+                        <a14:foregroundMark x1="42387" y1="62019" x2="42387" y2="62019"/>
+                      </a14:backgroundRemoval>
+                    </a14:imgEffect>
+                    <a14:imgEffect>
+                      <a14:sharpenSoften amount="50000"/>
+                    </a14:imgEffect>
+                  </a14:imgLayer>
+                </a14:imgProps>
+              </a:ext>
+              <a:ext uri="{28A0092B-C50C-407E-A947-70E740481C1C}">
+                <a14:useLocalDpi xmlns:a14="http://schemas.microsoft.com/office/drawing/2010/main" val="0"/>
+              </a:ext>
+            </a:extLst>
+          </a:blip>
+          <a:srcRect b="32040"/>
+          <a:stretch/>
+        </p:blipFill>
+        <p:spPr bwMode="auto">
+          <a:xfrm>
+            <a:off x="557460" y="4815438"/>
+            <a:ext cx="743824" cy="432693"/>
+          </a:xfrm>
+          <a:prstGeom prst="rect">
+            <a:avLst/>
+          </a:prstGeom>
+          <a:noFill/>
+          <a:extLst>
+            <a:ext uri="{909E8E84-426E-40DD-AFC4-6F175D3DCCD1}">
+              <a14:hiddenFill xmlns:a14="http://schemas.microsoft.com/office/drawing/2010/main">
+                <a:solidFill>
+                  <a:srgbClr val="FFFFFF"/>
+                </a:solidFill>
+              </a14:hiddenFill>
+            </a:ext>
+          </a:extLst>
+        </p:spPr>
+      </p:pic>
+      <p:pic>
+        <p:nvPicPr>
+          <p:cNvPr id="33" name="Picture 4" descr="data:image/png;base64,iVBORw0KGgoAAAANSUhEUgAAAPMAAADQCAMAAADlEKeVAAAAbFBMVEX///8kl+0AjuwAkOz8//8XlO2/3PkAkuwble0Ajey72fjb6/uZyPV5ufKUxvXn8fy01ffv9/7n8vymz/aHv/P1+v52t/LK4vrV6PvX6fsvm+5irvGQw/RSp/BCoe+jzfZfrPA6n+5Lpe9ssvFIIBcuAAAOgUlEQVR4nO1da4OqLBBOiMAum+attSyt//8fXy+AyCXtvCrubs/5co6H1McZhmEYhtXKHq7E6YI8Lb7NPHAdGe7J9jtNDaBwhkfb7zQ1NJz/opz/Iue/qNt/kfNHt38hPpz/rG7/Rc5/Ubf/Iudfr9vqvOr3y9nBMty17XeaGr4n49eL+YMfjLWEl5flqz+yN++QbJVgUl4+Q/ky2pWXD/JlmNkm8A/YY3n0QXF5+YDky/i60sYAf6AR2yvk0GGl44y+Vr/FD/vfnH+gHzYf58ifjsV7mE+3n+59OhpvYTY5b6ED0/OETIZjLs5RPT6A65RchmIu3Y6bG8JsAV7MTJx3bGRHRTQpnyGYSbdzvohLUuuk55HzTvghSW2r9zycO7dDtn30WXQ7gt3fhBOT6sEsnD1pIgOSiVm9hoazfl5Vc/7HGGAmpaEQZ2JWr+G5UAKoyO2Vy65XXnbkqxgMsMKRoh7Yrm+SbCVs6ssb+XKtjr58dTtEtTfKHN0Bi5lwTIRQzrAqe4plMzY5HipnB9sepCeGYg8rzt4cT764oAs3L6/uIJBR9dxEbgzgd3k5Vi4/qlvflFsfhAf7UMOZzOGYqMazNiTDY4D6sarKA9ypt8bCk791nJ0hBv9/c1afDP1xfM+demskPDlRzXb1VTY/l/Opl7NmqKpazDBE25OznjPJ/cTbh/Hz8ozDvXeeQtXn5Sz2Z71uOwRijAgihCCEMIRFOLoXbk+39TZMBYI4HNc9s6fb2rHKQBuEY/oq9jhrfRITcDriYpBFzvJU8jXc8bq1vf68+npH0A5cPucBcj4P79DjxhMscl6RN5R7TF/Fom6vrm8oNxxxuLIp55P6OxNGjRppOAM95xcxwH/kzFar+jFydFCJ38HKQdyqwb59efmujwGmagxwXU1TsXy96D57sFsychTY38ioe85Zvto8NdFejvT3OCmX5RlDOEzQ+PeEyZJsGGWU237TcRBtDgQOG6vQY5xHKol7syHyvzf3OIXlhHEQYwePEiILlODcnChNGRrKtwSMx6D8eMfnswwERwn+5m+59lZBYD6K+5UMd34sA8HHSMOyZpVogSAIgudoaWOXJXMmdegPY+DE2xGjQfmCOZNLnl/ia5CMvCS7YM7o0P/6/4QF63a93jcFnssdqor+t/83qFPgpWAc90OH5Y5V0+UYvBdhnRETrkgG+qUx+5gwZ2i7UM5owrJMhiVQ6wC76ThropFLwKTJM5rg7hIw4nKUBou022SkmJcBN9v8dJhWzIt0PicWs2ZZxj4mFvNqszwjRvJpKa9Oy+M85djcYHGc0Sgh7Jd4L3dlBoy5nm7AO8v7cwDvJ6e8OI87nZ7y0rzPeXZVLcoTm8GAVVhShyZonl0nbyWjTQwwQ15+jeXIeSbNXr2RozQ95qK8Spai3GCqlQsNFiJnOGdpkoF5WRMDXWakPHgvxLSYwwETsAS3ZO46TJ59Qc+/k9/6PAPMsgO2A9tRMTjDBFKG5cmVnbocVicaeKrMkddYW+zReDYvW0JgTbuhHSlXSG1Rtph1f7aT+Wm3/p+NKSWBcwUJDLBAGc04e9Ridu3GN+vV4Fb3eW03sGewBVxm7NLWuzLDbTbSMFtK0ah1Os+KHYGBbaotojlIk+UIuUZUTK7e2NnaZikjm3a6geqyekvDYcJxGsHDotSaY4sn0m/kxoutMu/nAzepvgNSynjRNea3zsi9mmC0t+9p9uCOR2SNQLY4W61FkI6i4aVOp/vFdmMFycXF/492Sdi52p4wvonIyyB8Y092lzCGj/3kSX1TINoeHPju6EUQBkWoVKb4STh6hwIOKjpASrYYoss++cl8Gdbf3vVS11vBqC5B0Fa/d1i5PgjTLBx9I6t1nM6b4Ct85o+0dCSB65ZfIC0e+TP8CjbnRfscH3zwwQcffPDBBx988MEHH3zwwTAEt/Qy5Zmdpzi9LeUkVIoYEkLc6RIcjhA5Dpx1w0EfmvNnCJnsAc0mY8unynVBKw1NtyWgOepnjtNbBoNxnmpVZd2sYpMlFVH+cB4fH87LwIfz+PhwXgY+nMfHh/My8OE8Pj6cLcHf7XantuTJa87+sWw8NCOkanyUG/dwXn8bJnT+8XgyFmZZ77qvW3PSv+Z6cyhAcwhP+vSabA8z5yR80MO8yTPom2qerw9Y3xrg/C7e6zXnqwvdh/yyp+CZ1scGAXS563Ks9tWvfJkTQN0nVzgecJvqRBCGdTl+A+foitp8MEIwyF5EUtZ7R0geIwjc2gzHV5zPafVw1K2wvckAT0wiBMFC2b4QVLdEqcLJKV/zIn7AdQzk3C4E8pOB815JgCPwZgqaBVjOEiQ4ZXGRF5xZgri48+ZcKImWkEib3+kbe6tIwwm3yUoJ0mWzEeB5SOW8S7V5ra5WP/2btjGIezgnDnsj1Gbsa/PkpX0bftMG3Te6hMy2qvEXMKSxYboPVuS8UU9upo01G94SUwIsKvwXnEu147/DTHsj/ecr7yVuLqRnepHUsPWNfb7enXEC58BEuXy2I6e5bU0fkx2dpue8EdWO1dg+mY8cJEKlKXaOmaFxqlKuchI1yYstZ0+kLDcmTlfSHZWozu0QDyeq5afjHF0E5UCE2glfpEykewmBU/XsNpETPb2s3f9IMMzCwAuuOZZ+yDknLQsEb+HdC/ZP1L4i6ZSJEUpYlwb2UDWOHd4YhXrOnpgpCw50FBb2sRGM8us9+Ho6sG3Jy33KnDHMryWnrxyVvGFa367d54qdgIlpvS06fYdxjrhdQPjKB+Uka4kIVQfWAuOQK8qZ7eKobZPC2c+Fd8YOHwzaTZow5zL9Fro966hdzrDwuOuyiXO6YNJ+qW6MuVO6gHHmZzrBZ0eLE8L+Q4jO8+3h8NLp59Qku0cN50C0eaCV/pa9DUo7Y+Ix4/8RazjrNx/uqTwJlsfXk2AGKGdeQwzI91o/GEGu3VyBgLwctc4BxvWBixLnk3g0GE4FJ4v1XahU0L/yd/qWORNH6zJHTIWh6sX5ipwLdnvNVhFGGjMXgZV+Vb5PieRO3dUO570gZALEojNMMrqCHcwe0aLFopz12dJ3ejNtYecj/3nDmYkZavf1sbZU0Dsq5tfnPAqcd4Uo5EdHRNRm6wvoHygHcOxyNlUxpj6Hoawg79MNZ9ZBb9rGTJfpqTusxNrrA2lazlfBHBGpGBwrhY31gqPqVw8ELWdTeVsmSWiYELJyJA1n1tjgWdNi7HS9jVqDnsrgjPNF9LGUTcD0vB1kYEH1r/FyWp/E8EiveZLxECiPqX7FmZb4NNZ0Z8Nx/f/sa/acO0Q5d7wmrFTMYt/PNGOm1dzq1VPGGZsW8qkCmiTHK0nVnOkcCxs3n1Mdg9XfqToan0yxVmYNpFCY0WmDc9t6Wmyf9JtsBM7GYtX0MC5sfCdqfGvOofB3LUJhEkZrjWmGgx7OGjHzGrLYAKolte77fQpWkJfa2uXJvqaxMe0JuOrCtAuCnsq6Gs5q0sEWqo10qLso5Wwu9krVyXxUzl0QXSNzYq68SIt01yrGbPxrylrOinJ4hjmkwjkWOBszF4S2eohxkl7OVAdh5bE0RvxFY5VzO7dA3b449CipOiDAOBvr6DVj0Qs5s25ZWUR6+qA5n4bKGQtyRsbGMufS1eTHlZK00yUGy/kqcDbWQ7g1NMwDCu2W9fgd93XRQOjP1J6Bnkgw51zPcDz2L9RxewaezkFqU93LmZkl45ux2FD1d1oN0Hy6YSx0/rvAfwDnounCez5LEjPGuN1WjpEXAZo5SS9netAcNkVqT6IbwhwY492QYNipnqOeBQp5LsljNmItPOYl3I67F6DT+V7OVGuM56hQ0TZvfhJdPN3NGprNRICF4no6tBIz4LEBsZhnQS8NyVLr5cy+oKGmddSddTEX0FBNlb4ZtZjUHzR7bTXU2BAv4CQUbaXGYVCB9V7OzM8i+qkSG2SpsKjUCdZ2/6AzpeOzVH1jBpVzG/hyuS1gHRoMSLbt58xnabp+x4oSs055pAYH6aaxbIbB5rgR6P5bD00M0Ocxt9Y3oSrkONoxo7Na18+5nS2qkwE+XHJ3nR3dpQlXHHn0hkmHHbiqORAxuj/Ds4mzEC4l7MFshNbp4xVAcQllAGc+9ikVNAM+WPL/ObFIL5aTj/nZMK1YeXVfnEnSOVdhV3dv4rzS+CZM0KiQ7Ng6r54sWPkBnNtQJr6JhuwkxFzbqzzghhxxeIsOPMghrnjwxki0euuwaayNezZofRM2++EBRSmEwpa1XO6tDuEctcsBMNs2P42SZxupcUXDceMLsPDGVp3PYespd4KrGbtMcBrQb7G7ssbGdYyV6Jvk9MqV+5/YYbVbou0Dyj1qEOfVuV2aIBCm+fNSiEU3umFLXwhoYOhkz8sNC6sJ3Y4u1tDDkGSX5wO1jetwgmldUvVNuD7WFVyyOK4qRfD7A65egzivNuJ8rjoRXvinA6U52RG/aCx38+4ak9TY/X7BWfBNmC7fOvfqrFaJtm0Y59XGNa74AWVKdjSXH1ED7r6DTI1x3di85s4XCVwmwodxekVQa9lkzkn4pfUQvon+1QjUBO/9Qv9sAjTT9Ehcmeg0bliaOfOO0YbUnob5FS4EVhJn7+u8y7Wko4vmdgTf9KGvULeqjB39FEq7no8QM/t0P4bGJfLZ+N6qmgc1siHdBIfI7fwqP14vR0P8YCOXxCKYGF3lXSY/HOvXNiocczmtA4GQj9iN86ut1krDxeK44cdA6loIZlIkqaivs6BafjrEJ2PMJLnUpYLqPwiC7OW5DN9xaa4RaRpjUNxfedW7A2oa13WGYCqWgttV6Tgw1/7uXNkZ2PX5TiHho0p1s1hxwctfkda0BHv/nL+o8hMl+zgr0iJ7fm36iwGdg0N+S4vH87rtzxJsGqe3Z+hJjY/P4mEKgu+eaaYq23dwyEphpo94n+j87115x/ZXm/DaeeJ/sWToJRlk4p8AAAAASUVORK5CYII=">
+            <a:extLst>
+              <a:ext uri="{FF2B5EF4-FFF2-40B4-BE49-F238E27FC236}">
+                <a16:creationId xmlns:a16="http://schemas.microsoft.com/office/drawing/2014/main" id="{5221525A-3AB7-E4E2-7D49-391F7641C4D3}"/>
+              </a:ext>
+            </a:extLst>
+          </p:cNvPr>
+          <p:cNvPicPr>
+            <a:picLocks noChangeAspect="1" noChangeArrowheads="1"/>
+          </p:cNvPicPr>
+          <p:nvPr/>
+        </p:nvPicPr>
+        <p:blipFill rotWithShape="1">
+          <a:blip r:embed="rId7">
+            <a:extLst>
+              <a:ext uri="{BEBA8EAE-BF5A-486C-A8C5-ECC9F3942E4B}">
+                <a14:imgProps xmlns:a14="http://schemas.microsoft.com/office/drawing/2010/main">
+                  <a14:imgLayer r:embed="rId8">
+                    <a14:imgEffect>
+                      <a14:backgroundRemoval t="2885" b="62019" l="9877" r="90535">
+                        <a14:foregroundMark x1="26337" y1="21635" x2="26337" y2="21635"/>
+                        <a14:foregroundMark x1="37449" y1="24038" x2="37449" y2="24038"/>
+                        <a14:foregroundMark x1="37037" y1="14423" x2="37037" y2="14423"/>
+                        <a14:foregroundMark x1="45267" y1="25962" x2="45267" y2="25962"/>
+                        <a14:foregroundMark x1="46502" y1="14423" x2="46502" y2="14423"/>
+                        <a14:foregroundMark x1="52263" y1="25000" x2="52263" y2="25000"/>
+                        <a14:foregroundMark x1="61317" y1="25962" x2="61317" y2="25962"/>
+                        <a14:foregroundMark x1="54321" y1="13462" x2="54321" y2="13462"/>
+                        <a14:foregroundMark x1="53909" y1="6731" x2="53909" y2="6731"/>
+                        <a14:foregroundMark x1="53909" y1="2885" x2="53909" y2="2885"/>
+                        <a14:foregroundMark x1="90535" y1="25962" x2="90535" y2="25962"/>
+                        <a14:foregroundMark x1="42387" y1="62019" x2="42387" y2="62019"/>
+                      </a14:backgroundRemoval>
+                    </a14:imgEffect>
+                    <a14:imgEffect>
+                      <a14:sharpenSoften amount="50000"/>
+                    </a14:imgEffect>
+                  </a14:imgLayer>
+                </a14:imgProps>
+              </a:ext>
+              <a:ext uri="{28A0092B-C50C-407E-A947-70E740481C1C}">
+                <a14:useLocalDpi xmlns:a14="http://schemas.microsoft.com/office/drawing/2010/main" val="0"/>
+              </a:ext>
+            </a:extLst>
+          </a:blip>
+          <a:srcRect b="32040"/>
+          <a:stretch/>
+        </p:blipFill>
+        <p:spPr bwMode="auto">
+          <a:xfrm>
+            <a:off x="4154861" y="4816027"/>
+            <a:ext cx="743824" cy="432693"/>
+          </a:xfrm>
+          <a:prstGeom prst="rect">
+            <a:avLst/>
+          </a:prstGeom>
+          <a:noFill/>
+          <a:extLst>
+            <a:ext uri="{909E8E84-426E-40DD-AFC4-6F175D3DCCD1}">
+              <a14:hiddenFill xmlns:a14="http://schemas.microsoft.com/office/drawing/2010/main">
+                <a:solidFill>
+                  <a:srgbClr val="FFFFFF"/>
+                </a:solidFill>
+              </a14:hiddenFill>
+            </a:ext>
+          </a:extLst>
+        </p:spPr>
+      </p:pic>
     </p:spTree>
     <p:extLst>
       <p:ext uri="{BB962C8B-B14F-4D97-AF65-F5344CB8AC3E}">
@@ -8318,6 +10058,867 @@
           <p:cNvPr id="2" name="Titel 1">
             <a:extLst>
               <a:ext uri="{FF2B5EF4-FFF2-40B4-BE49-F238E27FC236}">
+                <a16:creationId xmlns:a16="http://schemas.microsoft.com/office/drawing/2014/main" id="{FE7310EA-0D36-8797-94D6-7E3C9FD760A2}"/>
+              </a:ext>
+            </a:extLst>
+          </p:cNvPr>
+          <p:cNvSpPr>
+            <a:spLocks noGrp="1"/>
+          </p:cNvSpPr>
+          <p:nvPr>
+            <p:ph type="title"/>
+          </p:nvPr>
+        </p:nvSpPr>
+        <p:spPr/>
+        <p:txBody>
+          <a:bodyPr/>
+          <a:lstStyle/>
+          <a:p>
+            <a:r>
+              <a:rPr lang="de-DE" dirty="0"/>
+              <a:t>Basic </a:t>
+            </a:r>
+            <a:r>
+              <a:rPr lang="de-DE" dirty="0" err="1"/>
+              <a:t>Idea</a:t>
+            </a:r>
+            <a:endParaRPr lang="de-DE" dirty="0"/>
+          </a:p>
+        </p:txBody>
+      </p:sp>
+      <p:sp>
+        <p:nvSpPr>
+          <p:cNvPr id="4" name="Rectangle: Rounded Corners 5">
+            <a:extLst>
+              <a:ext uri="{FF2B5EF4-FFF2-40B4-BE49-F238E27FC236}">
+                <a16:creationId xmlns:a16="http://schemas.microsoft.com/office/drawing/2014/main" id="{78CCAEE7-61F5-65AA-DCCD-9964C5338FAE}"/>
+              </a:ext>
+            </a:extLst>
+          </p:cNvPr>
+          <p:cNvSpPr/>
+          <p:nvPr/>
+        </p:nvSpPr>
+        <p:spPr>
+          <a:xfrm>
+            <a:off x="1164594" y="4466010"/>
+            <a:ext cx="1704110" cy="768927"/>
+          </a:xfrm>
+          <a:prstGeom prst="roundRect">
+            <a:avLst/>
+          </a:prstGeom>
+          <a:solidFill>
+            <a:srgbClr val="2088FE"/>
+          </a:solidFill>
+          <a:ln>
+            <a:noFill/>
+          </a:ln>
+        </p:spPr>
+        <p:style>
+          <a:lnRef idx="2">
+            <a:schemeClr val="accent1">
+              <a:shade val="50000"/>
+            </a:schemeClr>
+          </a:lnRef>
+          <a:fillRef idx="1">
+            <a:schemeClr val="accent1"/>
+          </a:fillRef>
+          <a:effectRef idx="0">
+            <a:schemeClr val="accent1"/>
+          </a:effectRef>
+          <a:fontRef idx="minor">
+            <a:schemeClr val="lt1"/>
+          </a:fontRef>
+        </p:style>
+        <p:txBody>
+          <a:bodyPr rtlCol="0" anchor="ctr"/>
+          <a:lstStyle/>
+          <a:p>
+            <a:pPr algn="ctr"/>
+            <a:r>
+              <a:rPr lang="de-DE" dirty="0"/>
+              <a:t>Push</a:t>
+            </a:r>
+          </a:p>
+        </p:txBody>
+      </p:sp>
+      <p:sp>
+        <p:nvSpPr>
+          <p:cNvPr id="5" name="Rectangle: Rounded Corners 6">
+            <a:extLst>
+              <a:ext uri="{FF2B5EF4-FFF2-40B4-BE49-F238E27FC236}">
+                <a16:creationId xmlns:a16="http://schemas.microsoft.com/office/drawing/2014/main" id="{264CA49D-6F4B-C4CF-E420-1104249827C0}"/>
+              </a:ext>
+            </a:extLst>
+          </p:cNvPr>
+          <p:cNvSpPr/>
+          <p:nvPr/>
+        </p:nvSpPr>
+        <p:spPr>
+          <a:xfrm>
+            <a:off x="3619766" y="4466012"/>
+            <a:ext cx="2558017" cy="768927"/>
+          </a:xfrm>
+          <a:prstGeom prst="roundRect">
+            <a:avLst/>
+          </a:prstGeom>
+          <a:solidFill>
+            <a:srgbClr val="2088FE"/>
+          </a:solidFill>
+          <a:ln>
+            <a:noFill/>
+          </a:ln>
+        </p:spPr>
+        <p:style>
+          <a:lnRef idx="2">
+            <a:schemeClr val="accent1">
+              <a:shade val="50000"/>
+            </a:schemeClr>
+          </a:lnRef>
+          <a:fillRef idx="1">
+            <a:schemeClr val="accent1"/>
+          </a:fillRef>
+          <a:effectRef idx="0">
+            <a:schemeClr val="accent1"/>
+          </a:effectRef>
+          <a:fontRef idx="minor">
+            <a:schemeClr val="lt1"/>
+          </a:fontRef>
+        </p:style>
+        <p:txBody>
+          <a:bodyPr rtlCol="0" anchor="ctr"/>
+          <a:lstStyle/>
+          <a:p>
+            <a:pPr algn="ctr"/>
+            <a:r>
+              <a:rPr lang="de-DE" dirty="0"/>
+              <a:t>Create Infrastructure </a:t>
+            </a:r>
+            <a:r>
+              <a:rPr lang="de-DE" dirty="0" err="1"/>
+              <a:t>with</a:t>
+            </a:r>
+            <a:r>
+              <a:rPr lang="de-DE" dirty="0"/>
+              <a:t> Terraform</a:t>
+            </a:r>
+          </a:p>
+        </p:txBody>
+      </p:sp>
+      <p:sp>
+        <p:nvSpPr>
+          <p:cNvPr id="6" name="Rectangle: Rounded Corners 7">
+            <a:extLst>
+              <a:ext uri="{FF2B5EF4-FFF2-40B4-BE49-F238E27FC236}">
+                <a16:creationId xmlns:a16="http://schemas.microsoft.com/office/drawing/2014/main" id="{7245DBC1-1583-905A-477C-077D529C85D9}"/>
+              </a:ext>
+            </a:extLst>
+          </p:cNvPr>
+          <p:cNvSpPr/>
+          <p:nvPr/>
+        </p:nvSpPr>
+        <p:spPr>
+          <a:xfrm>
+            <a:off x="7639731" y="4466009"/>
+            <a:ext cx="2558015" cy="768927"/>
+          </a:xfrm>
+          <a:prstGeom prst="roundRect">
+            <a:avLst/>
+          </a:prstGeom>
+          <a:solidFill>
+            <a:srgbClr val="2088FE"/>
+          </a:solidFill>
+          <a:ln>
+            <a:noFill/>
+          </a:ln>
+        </p:spPr>
+        <p:style>
+          <a:lnRef idx="2">
+            <a:schemeClr val="accent1">
+              <a:shade val="50000"/>
+            </a:schemeClr>
+          </a:lnRef>
+          <a:fillRef idx="1">
+            <a:schemeClr val="accent1"/>
+          </a:fillRef>
+          <a:effectRef idx="0">
+            <a:schemeClr val="accent1"/>
+          </a:effectRef>
+          <a:fontRef idx="minor">
+            <a:schemeClr val="lt1"/>
+          </a:fontRef>
+        </p:style>
+        <p:txBody>
+          <a:bodyPr rtlCol="0" anchor="ctr"/>
+          <a:lstStyle/>
+          <a:p>
+            <a:pPr algn="ctr"/>
+            <a:r>
+              <a:rPr lang="de-DE" dirty="0"/>
+              <a:t>Deploy </a:t>
+            </a:r>
+            <a:r>
+              <a:rPr lang="de-DE" dirty="0" err="1"/>
+              <a:t>app</a:t>
+            </a:r>
+            <a:r>
+              <a:rPr lang="de-DE" dirty="0"/>
+              <a:t> </a:t>
+            </a:r>
+            <a:r>
+              <a:rPr lang="de-DE" dirty="0" err="1"/>
+              <a:t>with</a:t>
+            </a:r>
+            <a:r>
+              <a:rPr lang="de-DE" dirty="0"/>
+              <a:t> </a:t>
+            </a:r>
+            <a:r>
+              <a:rPr lang="de-DE" dirty="0" err="1"/>
+              <a:t>docker</a:t>
+            </a:r>
+            <a:r>
+              <a:rPr lang="de-DE" dirty="0"/>
+              <a:t> </a:t>
+            </a:r>
+            <a:r>
+              <a:rPr lang="de-DE" dirty="0" err="1"/>
+              <a:t>compose</a:t>
+            </a:r>
+            <a:endParaRPr lang="de-DE" dirty="0"/>
+          </a:p>
+        </p:txBody>
+      </p:sp>
+      <p:cxnSp>
+        <p:nvCxnSpPr>
+          <p:cNvPr id="7" name="Straight Arrow Connector 11">
+            <a:extLst>
+              <a:ext uri="{FF2B5EF4-FFF2-40B4-BE49-F238E27FC236}">
+                <a16:creationId xmlns:a16="http://schemas.microsoft.com/office/drawing/2014/main" id="{F501AB0B-B3CB-38AA-624C-ED414CEFB3A8}"/>
+              </a:ext>
+            </a:extLst>
+          </p:cNvPr>
+          <p:cNvCxnSpPr>
+            <a:cxnSpLocks/>
+            <a:stCxn id="4" idx="3"/>
+            <a:endCxn id="5" idx="1"/>
+          </p:cNvCxnSpPr>
+          <p:nvPr/>
+        </p:nvCxnSpPr>
+        <p:spPr>
+          <a:xfrm>
+            <a:off x="2868704" y="4850474"/>
+            <a:ext cx="751062" cy="2"/>
+          </a:xfrm>
+          <a:prstGeom prst="straightConnector1">
+            <a:avLst/>
+          </a:prstGeom>
+          <a:ln>
+            <a:solidFill>
+              <a:srgbClr val="2088FE"/>
+            </a:solidFill>
+            <a:tailEnd type="triangle"/>
+          </a:ln>
+        </p:spPr>
+        <p:style>
+          <a:lnRef idx="1">
+            <a:schemeClr val="accent1"/>
+          </a:lnRef>
+          <a:fillRef idx="0">
+            <a:schemeClr val="accent1"/>
+          </a:fillRef>
+          <a:effectRef idx="0">
+            <a:schemeClr val="accent1"/>
+          </a:effectRef>
+          <a:fontRef idx="minor">
+            <a:schemeClr val="tx1"/>
+          </a:fontRef>
+        </p:style>
+      </p:cxnSp>
+      <p:cxnSp>
+        <p:nvCxnSpPr>
+          <p:cNvPr id="8" name="Straight Arrow Connector 13">
+            <a:extLst>
+              <a:ext uri="{FF2B5EF4-FFF2-40B4-BE49-F238E27FC236}">
+                <a16:creationId xmlns:a16="http://schemas.microsoft.com/office/drawing/2014/main" id="{15D2F7F9-D527-3673-F73F-11C0FEC9E142}"/>
+              </a:ext>
+            </a:extLst>
+          </p:cNvPr>
+          <p:cNvCxnSpPr>
+            <a:cxnSpLocks/>
+            <a:stCxn id="5" idx="3"/>
+            <a:endCxn id="6" idx="1"/>
+          </p:cNvCxnSpPr>
+          <p:nvPr/>
+        </p:nvCxnSpPr>
+        <p:spPr>
+          <a:xfrm flipV="1">
+            <a:off x="6177783" y="4850473"/>
+            <a:ext cx="1461948" cy="3"/>
+          </a:xfrm>
+          <a:prstGeom prst="straightConnector1">
+            <a:avLst/>
+          </a:prstGeom>
+          <a:ln>
+            <a:solidFill>
+              <a:srgbClr val="2088FE"/>
+            </a:solidFill>
+            <a:tailEnd type="triangle"/>
+          </a:ln>
+        </p:spPr>
+        <p:style>
+          <a:lnRef idx="1">
+            <a:schemeClr val="accent1"/>
+          </a:lnRef>
+          <a:fillRef idx="0">
+            <a:schemeClr val="accent1"/>
+          </a:fillRef>
+          <a:effectRef idx="0">
+            <a:schemeClr val="accent1"/>
+          </a:effectRef>
+          <a:fontRef idx="minor">
+            <a:schemeClr val="tx1"/>
+          </a:fontRef>
+        </p:style>
+      </p:cxnSp>
+      <p:sp>
+        <p:nvSpPr>
+          <p:cNvPr id="9" name="Rectangle: Rounded Corners 17">
+            <a:extLst>
+              <a:ext uri="{FF2B5EF4-FFF2-40B4-BE49-F238E27FC236}">
+                <a16:creationId xmlns:a16="http://schemas.microsoft.com/office/drawing/2014/main" id="{433EC4C8-5652-8E37-1388-42FECF4CA3D7}"/>
+              </a:ext>
+            </a:extLst>
+          </p:cNvPr>
+          <p:cNvSpPr/>
+          <p:nvPr/>
+        </p:nvSpPr>
+        <p:spPr>
+          <a:xfrm flipH="1" flipV="1">
+            <a:off x="3034753" y="3977640"/>
+            <a:ext cx="7433721" cy="1594946"/>
+          </a:xfrm>
+          <a:prstGeom prst="roundRect">
+            <a:avLst/>
+          </a:prstGeom>
+          <a:noFill/>
+          <a:ln>
+            <a:solidFill>
+              <a:srgbClr val="2088FE"/>
+            </a:solidFill>
+          </a:ln>
+        </p:spPr>
+        <p:style>
+          <a:lnRef idx="2">
+            <a:schemeClr val="accent1">
+              <a:shade val="50000"/>
+            </a:schemeClr>
+          </a:lnRef>
+          <a:fillRef idx="1">
+            <a:schemeClr val="accent1"/>
+          </a:fillRef>
+          <a:effectRef idx="0">
+            <a:schemeClr val="accent1"/>
+          </a:effectRef>
+          <a:fontRef idx="minor">
+            <a:schemeClr val="lt1"/>
+          </a:fontRef>
+        </p:style>
+        <p:txBody>
+          <a:bodyPr rtlCol="0" anchor="ctr"/>
+          <a:lstStyle/>
+          <a:p>
+            <a:pPr algn="ctr"/>
+            <a:endParaRPr lang="de-DE"/>
+          </a:p>
+        </p:txBody>
+      </p:sp>
+      <p:pic>
+        <p:nvPicPr>
+          <p:cNvPr id="10" name="Picture 19">
+            <a:extLst>
+              <a:ext uri="{FF2B5EF4-FFF2-40B4-BE49-F238E27FC236}">
+                <a16:creationId xmlns:a16="http://schemas.microsoft.com/office/drawing/2014/main" id="{B187C7EC-CE9C-D136-07DC-CC38CA9DE47D}"/>
+              </a:ext>
+            </a:extLst>
+          </p:cNvPr>
+          <p:cNvPicPr>
+            <a:picLocks noChangeAspect="1"/>
+          </p:cNvPicPr>
+          <p:nvPr/>
+        </p:nvPicPr>
+        <p:blipFill>
+          <a:blip r:embed="rId2"/>
+          <a:stretch>
+            <a:fillRect/>
+          </a:stretch>
+        </p:blipFill>
+        <p:spPr>
+          <a:xfrm>
+            <a:off x="3113900" y="4123214"/>
+            <a:ext cx="426720" cy="426720"/>
+          </a:xfrm>
+          <a:prstGeom prst="rect">
+            <a:avLst/>
+          </a:prstGeom>
+        </p:spPr>
+      </p:pic>
+      <p:cxnSp>
+        <p:nvCxnSpPr>
+          <p:cNvPr id="19" name="Straight Arrow Connector 11">
+            <a:extLst>
+              <a:ext uri="{FF2B5EF4-FFF2-40B4-BE49-F238E27FC236}">
+                <a16:creationId xmlns:a16="http://schemas.microsoft.com/office/drawing/2014/main" id="{2BE4D3C3-2C05-2D6B-EB00-0B569B104FB4}"/>
+              </a:ext>
+            </a:extLst>
+          </p:cNvPr>
+          <p:cNvCxnSpPr>
+            <a:cxnSpLocks/>
+            <a:stCxn id="5" idx="0"/>
+            <a:endCxn id="20" idx="2"/>
+          </p:cNvCxnSpPr>
+          <p:nvPr/>
+        </p:nvCxnSpPr>
+        <p:spPr>
+          <a:xfrm flipH="1" flipV="1">
+            <a:off x="4898774" y="3300716"/>
+            <a:ext cx="1" cy="1165296"/>
+          </a:xfrm>
+          <a:prstGeom prst="straightConnector1">
+            <a:avLst/>
+          </a:prstGeom>
+          <a:ln>
+            <a:solidFill>
+              <a:srgbClr val="5C4EE5"/>
+            </a:solidFill>
+            <a:tailEnd type="triangle"/>
+          </a:ln>
+        </p:spPr>
+        <p:style>
+          <a:lnRef idx="1">
+            <a:schemeClr val="accent1"/>
+          </a:lnRef>
+          <a:fillRef idx="0">
+            <a:schemeClr val="accent1"/>
+          </a:fillRef>
+          <a:effectRef idx="0">
+            <a:schemeClr val="accent1"/>
+          </a:effectRef>
+          <a:fontRef idx="minor">
+            <a:schemeClr val="tx1"/>
+          </a:fontRef>
+        </p:style>
+      </p:cxnSp>
+      <p:sp>
+        <p:nvSpPr>
+          <p:cNvPr id="20" name="Rectangle: Rounded Corners 6">
+            <a:extLst>
+              <a:ext uri="{FF2B5EF4-FFF2-40B4-BE49-F238E27FC236}">
+                <a16:creationId xmlns:a16="http://schemas.microsoft.com/office/drawing/2014/main" id="{B811BC74-BB0A-7701-99C2-0D2003A48E60}"/>
+              </a:ext>
+            </a:extLst>
+          </p:cNvPr>
+          <p:cNvSpPr/>
+          <p:nvPr/>
+        </p:nvSpPr>
+        <p:spPr>
+          <a:xfrm>
+            <a:off x="3619765" y="2531789"/>
+            <a:ext cx="2558017" cy="768927"/>
+          </a:xfrm>
+          <a:prstGeom prst="roundRect">
+            <a:avLst/>
+          </a:prstGeom>
+          <a:solidFill>
+            <a:srgbClr val="5C4EE5"/>
+          </a:solidFill>
+          <a:ln>
+            <a:noFill/>
+          </a:ln>
+        </p:spPr>
+        <p:style>
+          <a:lnRef idx="2">
+            <a:schemeClr val="accent1">
+              <a:shade val="50000"/>
+            </a:schemeClr>
+          </a:lnRef>
+          <a:fillRef idx="1">
+            <a:schemeClr val="accent1"/>
+          </a:fillRef>
+          <a:effectRef idx="0">
+            <a:schemeClr val="accent1"/>
+          </a:effectRef>
+          <a:fontRef idx="minor">
+            <a:schemeClr val="lt1"/>
+          </a:fontRef>
+        </p:style>
+        <p:txBody>
+          <a:bodyPr rtlCol="0" anchor="ctr"/>
+          <a:lstStyle/>
+          <a:p>
+            <a:pPr algn="ctr"/>
+            <a:r>
+              <a:rPr lang="de-DE" dirty="0"/>
+              <a:t>Create EC2 </a:t>
+            </a:r>
+            <a:r>
+              <a:rPr lang="de-DE" dirty="0" err="1"/>
+              <a:t>machine</a:t>
+            </a:r>
+            <a:endParaRPr lang="de-DE" dirty="0"/>
+          </a:p>
+        </p:txBody>
+      </p:sp>
+      <p:sp>
+        <p:nvSpPr>
+          <p:cNvPr id="21" name="Rectangle: Rounded Corners 17">
+            <a:extLst>
+              <a:ext uri="{FF2B5EF4-FFF2-40B4-BE49-F238E27FC236}">
+                <a16:creationId xmlns:a16="http://schemas.microsoft.com/office/drawing/2014/main" id="{865E96C3-898B-ABE0-91DC-5A88AEAE32A1}"/>
+              </a:ext>
+            </a:extLst>
+          </p:cNvPr>
+          <p:cNvSpPr/>
+          <p:nvPr/>
+        </p:nvSpPr>
+        <p:spPr>
+          <a:xfrm flipH="1" flipV="1">
+            <a:off x="3034754" y="1946276"/>
+            <a:ext cx="3424355" cy="1594946"/>
+          </a:xfrm>
+          <a:prstGeom prst="roundRect">
+            <a:avLst/>
+          </a:prstGeom>
+          <a:noFill/>
+          <a:ln>
+            <a:solidFill>
+              <a:srgbClr val="5C4EE5"/>
+            </a:solidFill>
+          </a:ln>
+        </p:spPr>
+        <p:style>
+          <a:lnRef idx="2">
+            <a:schemeClr val="accent1">
+              <a:shade val="50000"/>
+            </a:schemeClr>
+          </a:lnRef>
+          <a:fillRef idx="1">
+            <a:schemeClr val="accent1"/>
+          </a:fillRef>
+          <a:effectRef idx="0">
+            <a:schemeClr val="accent1"/>
+          </a:effectRef>
+          <a:fontRef idx="minor">
+            <a:schemeClr val="lt1"/>
+          </a:fontRef>
+        </p:style>
+        <p:txBody>
+          <a:bodyPr rtlCol="0" anchor="ctr"/>
+          <a:lstStyle/>
+          <a:p>
+            <a:pPr algn="ctr"/>
+            <a:endParaRPr lang="de-DE"/>
+          </a:p>
+        </p:txBody>
+      </p:sp>
+      <p:pic>
+        <p:nvPicPr>
+          <p:cNvPr id="24" name="Picture 4">
+            <a:extLst>
+              <a:ext uri="{FF2B5EF4-FFF2-40B4-BE49-F238E27FC236}">
+                <a16:creationId xmlns:a16="http://schemas.microsoft.com/office/drawing/2014/main" id="{F668A630-DDE5-F7FD-292A-06605BED7FC7}"/>
+              </a:ext>
+            </a:extLst>
+          </p:cNvPr>
+          <p:cNvPicPr>
+            <a:picLocks noChangeAspect="1"/>
+          </p:cNvPicPr>
+          <p:nvPr/>
+        </p:nvPicPr>
+        <p:blipFill>
+          <a:blip r:embed="rId3"/>
+          <a:stretch>
+            <a:fillRect/>
+          </a:stretch>
+        </p:blipFill>
+        <p:spPr>
+          <a:xfrm>
+            <a:off x="3234504" y="2049410"/>
+            <a:ext cx="426720" cy="482379"/>
+          </a:xfrm>
+          <a:prstGeom prst="rect">
+            <a:avLst/>
+          </a:prstGeom>
+        </p:spPr>
+      </p:pic>
+      <p:pic>
+        <p:nvPicPr>
+          <p:cNvPr id="28" name="Picture 6">
+            <a:extLst>
+              <a:ext uri="{FF2B5EF4-FFF2-40B4-BE49-F238E27FC236}">
+                <a16:creationId xmlns:a16="http://schemas.microsoft.com/office/drawing/2014/main" id="{97D45E23-90AD-A028-05E6-6586A5843E21}"/>
+              </a:ext>
+            </a:extLst>
+          </p:cNvPr>
+          <p:cNvPicPr>
+            <a:picLocks noChangeAspect="1"/>
+          </p:cNvPicPr>
+          <p:nvPr/>
+        </p:nvPicPr>
+        <p:blipFill>
+          <a:blip r:embed="rId4"/>
+          <a:stretch>
+            <a:fillRect/>
+          </a:stretch>
+        </p:blipFill>
+        <p:spPr>
+          <a:xfrm>
+            <a:off x="7249750" y="2094178"/>
+            <a:ext cx="549008" cy="336268"/>
+          </a:xfrm>
+          <a:prstGeom prst="rect">
+            <a:avLst/>
+          </a:prstGeom>
+        </p:spPr>
+      </p:pic>
+      <p:sp>
+        <p:nvSpPr>
+          <p:cNvPr id="29" name="Rectangle: Rounded Corners 6">
+            <a:extLst>
+              <a:ext uri="{FF2B5EF4-FFF2-40B4-BE49-F238E27FC236}">
+                <a16:creationId xmlns:a16="http://schemas.microsoft.com/office/drawing/2014/main" id="{8A69E514-DFCE-BDFC-FE4E-7567049EB630}"/>
+              </a:ext>
+            </a:extLst>
+          </p:cNvPr>
+          <p:cNvSpPr/>
+          <p:nvPr/>
+        </p:nvSpPr>
+        <p:spPr>
+          <a:xfrm>
+            <a:off x="7639732" y="2531789"/>
+            <a:ext cx="2558017" cy="768927"/>
+          </a:xfrm>
+          <a:prstGeom prst="roundRect">
+            <a:avLst/>
+          </a:prstGeom>
+          <a:solidFill>
+            <a:srgbClr val="FF9900"/>
+          </a:solidFill>
+          <a:ln>
+            <a:noFill/>
+          </a:ln>
+        </p:spPr>
+        <p:style>
+          <a:lnRef idx="2">
+            <a:schemeClr val="accent1">
+              <a:shade val="50000"/>
+            </a:schemeClr>
+          </a:lnRef>
+          <a:fillRef idx="1">
+            <a:schemeClr val="accent1"/>
+          </a:fillRef>
+          <a:effectRef idx="0">
+            <a:schemeClr val="accent1"/>
+          </a:effectRef>
+          <a:fontRef idx="minor">
+            <a:schemeClr val="lt1"/>
+          </a:fontRef>
+        </p:style>
+        <p:txBody>
+          <a:bodyPr rtlCol="0" anchor="ctr"/>
+          <a:lstStyle/>
+          <a:p>
+            <a:pPr algn="ctr"/>
+            <a:r>
+              <a:rPr lang="de-DE" dirty="0"/>
+              <a:t>EC2 </a:t>
+            </a:r>
+            <a:r>
+              <a:rPr lang="de-DE" dirty="0" err="1"/>
+              <a:t>machine</a:t>
+            </a:r>
+            <a:endParaRPr lang="de-DE" dirty="0"/>
+          </a:p>
+        </p:txBody>
+      </p:sp>
+      <p:sp>
+        <p:nvSpPr>
+          <p:cNvPr id="30" name="Rectangle: Rounded Corners 17">
+            <a:extLst>
+              <a:ext uri="{FF2B5EF4-FFF2-40B4-BE49-F238E27FC236}">
+                <a16:creationId xmlns:a16="http://schemas.microsoft.com/office/drawing/2014/main" id="{C3D25223-D404-A957-180D-7C74A93E192A}"/>
+              </a:ext>
+            </a:extLst>
+          </p:cNvPr>
+          <p:cNvSpPr/>
+          <p:nvPr/>
+        </p:nvSpPr>
+        <p:spPr>
+          <a:xfrm flipH="1" flipV="1">
+            <a:off x="7044120" y="1946276"/>
+            <a:ext cx="3424355" cy="1594946"/>
+          </a:xfrm>
+          <a:prstGeom prst="roundRect">
+            <a:avLst/>
+          </a:prstGeom>
+          <a:noFill/>
+          <a:ln>
+            <a:solidFill>
+              <a:srgbClr val="FF9900"/>
+            </a:solidFill>
+          </a:ln>
+        </p:spPr>
+        <p:style>
+          <a:lnRef idx="2">
+            <a:schemeClr val="accent1">
+              <a:shade val="50000"/>
+            </a:schemeClr>
+          </a:lnRef>
+          <a:fillRef idx="1">
+            <a:schemeClr val="accent1"/>
+          </a:fillRef>
+          <a:effectRef idx="0">
+            <a:schemeClr val="accent1"/>
+          </a:effectRef>
+          <a:fontRef idx="minor">
+            <a:schemeClr val="lt1"/>
+          </a:fontRef>
+        </p:style>
+        <p:txBody>
+          <a:bodyPr rtlCol="0" anchor="ctr"/>
+          <a:lstStyle/>
+          <a:p>
+            <a:pPr algn="ctr"/>
+            <a:endParaRPr lang="de-DE"/>
+          </a:p>
+        </p:txBody>
+      </p:sp>
+      <p:cxnSp>
+        <p:nvCxnSpPr>
+          <p:cNvPr id="31" name="Straight Arrow Connector 11">
+            <a:extLst>
+              <a:ext uri="{FF2B5EF4-FFF2-40B4-BE49-F238E27FC236}">
+                <a16:creationId xmlns:a16="http://schemas.microsoft.com/office/drawing/2014/main" id="{227B2E06-2BE5-7007-A654-EBE79D0F9520}"/>
+              </a:ext>
+            </a:extLst>
+          </p:cNvPr>
+          <p:cNvCxnSpPr>
+            <a:cxnSpLocks/>
+            <a:stCxn id="20" idx="3"/>
+            <a:endCxn id="29" idx="1"/>
+          </p:cNvCxnSpPr>
+          <p:nvPr/>
+        </p:nvCxnSpPr>
+        <p:spPr>
+          <a:xfrm>
+            <a:off x="6177782" y="2916253"/>
+            <a:ext cx="1461950" cy="0"/>
+          </a:xfrm>
+          <a:prstGeom prst="straightConnector1">
+            <a:avLst/>
+          </a:prstGeom>
+          <a:ln>
+            <a:solidFill>
+              <a:srgbClr val="FF9900"/>
+            </a:solidFill>
+            <a:tailEnd type="triangle"/>
+          </a:ln>
+        </p:spPr>
+        <p:style>
+          <a:lnRef idx="1">
+            <a:schemeClr val="accent1"/>
+          </a:lnRef>
+          <a:fillRef idx="0">
+            <a:schemeClr val="accent1"/>
+          </a:fillRef>
+          <a:effectRef idx="0">
+            <a:schemeClr val="accent1"/>
+          </a:effectRef>
+          <a:fontRef idx="minor">
+            <a:schemeClr val="tx1"/>
+          </a:fontRef>
+        </p:style>
+      </p:cxnSp>
+      <p:cxnSp>
+        <p:nvCxnSpPr>
+          <p:cNvPr id="36" name="Straight Arrow Connector 11">
+            <a:extLst>
+              <a:ext uri="{FF2B5EF4-FFF2-40B4-BE49-F238E27FC236}">
+                <a16:creationId xmlns:a16="http://schemas.microsoft.com/office/drawing/2014/main" id="{0939BA32-55A3-5025-F860-5D4857282D4C}"/>
+              </a:ext>
+            </a:extLst>
+          </p:cNvPr>
+          <p:cNvCxnSpPr>
+            <a:cxnSpLocks/>
+            <a:stCxn id="6" idx="0"/>
+            <a:endCxn id="29" idx="2"/>
+          </p:cNvCxnSpPr>
+          <p:nvPr/>
+        </p:nvCxnSpPr>
+        <p:spPr>
+          <a:xfrm flipV="1">
+            <a:off x="8918739" y="3300716"/>
+            <a:ext cx="2" cy="1165293"/>
+          </a:xfrm>
+          <a:prstGeom prst="straightConnector1">
+            <a:avLst/>
+          </a:prstGeom>
+          <a:ln>
+            <a:solidFill>
+              <a:srgbClr val="FF9900"/>
+            </a:solidFill>
+            <a:tailEnd type="triangle"/>
+          </a:ln>
+        </p:spPr>
+        <p:style>
+          <a:lnRef idx="1">
+            <a:schemeClr val="accent1"/>
+          </a:lnRef>
+          <a:fillRef idx="0">
+            <a:schemeClr val="accent1"/>
+          </a:fillRef>
+          <a:effectRef idx="0">
+            <a:schemeClr val="accent1"/>
+          </a:effectRef>
+          <a:fontRef idx="minor">
+            <a:schemeClr val="tx1"/>
+          </a:fontRef>
+        </p:style>
+      </p:cxnSp>
+    </p:spTree>
+    <p:extLst>
+      <p:ext uri="{BB962C8B-B14F-4D97-AF65-F5344CB8AC3E}">
+        <p14:creationId xmlns:p14="http://schemas.microsoft.com/office/powerpoint/2010/main" val="1877165191"/>
+      </p:ext>
+    </p:extLst>
+  </p:cSld>
+  <p:clrMapOvr>
+    <a:masterClrMapping/>
+  </p:clrMapOvr>
+</p:sld>
+</file>
+
+<file path=ppt/slides/slide6.xml><?xml version="1.0" encoding="utf-8"?>
+<p:sld xmlns:a="http://schemas.openxmlformats.org/drawingml/2006/main" xmlns:r="http://schemas.openxmlformats.org/officeDocument/2006/relationships" xmlns:p="http://schemas.openxmlformats.org/presentationml/2006/main">
+  <p:cSld>
+    <p:spTree>
+      <p:nvGrpSpPr>
+        <p:cNvPr id="1" name=""/>
+        <p:cNvGrpSpPr/>
+        <p:nvPr/>
+      </p:nvGrpSpPr>
+      <p:grpSpPr>
+        <a:xfrm>
+          <a:off x="0" y="0"/>
+          <a:ext cx="0" cy="0"/>
+          <a:chOff x="0" y="0"/>
+          <a:chExt cx="0" cy="0"/>
+        </a:xfrm>
+      </p:grpSpPr>
+      <p:sp>
+        <p:nvSpPr>
+          <p:cNvPr id="2" name="Titel 1">
+            <a:extLst>
+              <a:ext uri="{FF2B5EF4-FFF2-40B4-BE49-F238E27FC236}">
                 <a16:creationId xmlns:a16="http://schemas.microsoft.com/office/drawing/2014/main" id="{423EE35B-33E3-42A0-BBDA-368E8D825D7E}"/>
               </a:ext>
             </a:extLst>
@@ -8380,7 +10981,7 @@
 </p:sld>
 </file>
 
-<file path=ppt/slides/slide6.xml><?xml version="1.0" encoding="utf-8"?>
+<file path=ppt/slides/slide7.xml><?xml version="1.0" encoding="utf-8"?>
 <p:sld xmlns:a="http://schemas.openxmlformats.org/drawingml/2006/main" xmlns:r="http://schemas.openxmlformats.org/officeDocument/2006/relationships" xmlns:p="http://schemas.openxmlformats.org/presentationml/2006/main">
   <p:cSld>
     <p:spTree>
@@ -8822,90 +11423,6 @@
 </p:sld>
 </file>
 
-<file path=ppt/slides/slide7.xml><?xml version="1.0" encoding="utf-8"?>
-<p:sld xmlns:a="http://schemas.openxmlformats.org/drawingml/2006/main" xmlns:r="http://schemas.openxmlformats.org/officeDocument/2006/relationships" xmlns:p="http://schemas.openxmlformats.org/presentationml/2006/main">
-  <p:cSld>
-    <p:spTree>
-      <p:nvGrpSpPr>
-        <p:cNvPr id="1" name=""/>
-        <p:cNvGrpSpPr/>
-        <p:nvPr/>
-      </p:nvGrpSpPr>
-      <p:grpSpPr>
-        <a:xfrm>
-          <a:off x="0" y="0"/>
-          <a:ext cx="0" cy="0"/>
-          <a:chOff x="0" y="0"/>
-          <a:chExt cx="0" cy="0"/>
-        </a:xfrm>
-      </p:grpSpPr>
-      <p:sp>
-        <p:nvSpPr>
-          <p:cNvPr id="2" name="Titel 1">
-            <a:extLst>
-              <a:ext uri="{FF2B5EF4-FFF2-40B4-BE49-F238E27FC236}">
-                <a16:creationId xmlns:a16="http://schemas.microsoft.com/office/drawing/2014/main" id="{423EE35B-33E3-42A0-BBDA-368E8D825D7E}"/>
-              </a:ext>
-            </a:extLst>
-          </p:cNvPr>
-          <p:cNvSpPr>
-            <a:spLocks noGrp="1"/>
-          </p:cNvSpPr>
-          <p:nvPr>
-            <p:ph type="ctrTitle"/>
-          </p:nvPr>
-        </p:nvSpPr>
-        <p:spPr/>
-        <p:txBody>
-          <a:bodyPr/>
-          <a:lstStyle/>
-          <a:p>
-            <a:r>
-              <a:rPr lang="de-DE"/>
-              <a:t>Terraform &amp; AWS</a:t>
-            </a:r>
-            <a:endParaRPr lang="de-DE" dirty="0"/>
-          </a:p>
-        </p:txBody>
-      </p:sp>
-      <p:sp>
-        <p:nvSpPr>
-          <p:cNvPr id="5" name="Untertitel 4">
-            <a:extLst>
-              <a:ext uri="{FF2B5EF4-FFF2-40B4-BE49-F238E27FC236}">
-                <a16:creationId xmlns:a16="http://schemas.microsoft.com/office/drawing/2014/main" id="{B11A7254-9FA9-40F3-BD35-E1C8D97446A8}"/>
-              </a:ext>
-            </a:extLst>
-          </p:cNvPr>
-          <p:cNvSpPr>
-            <a:spLocks noGrp="1"/>
-          </p:cNvSpPr>
-          <p:nvPr>
-            <p:ph type="subTitle" idx="1"/>
-          </p:nvPr>
-        </p:nvSpPr>
-        <p:spPr/>
-        <p:txBody>
-          <a:bodyPr/>
-          <a:lstStyle/>
-          <a:p>
-            <a:endParaRPr lang="de-DE"/>
-          </a:p>
-        </p:txBody>
-      </p:sp>
-    </p:spTree>
-    <p:extLst>
-      <p:ext uri="{BB962C8B-B14F-4D97-AF65-F5344CB8AC3E}">
-        <p14:creationId xmlns:p14="http://schemas.microsoft.com/office/powerpoint/2010/main" val="2259264622"/>
-      </p:ext>
-    </p:extLst>
-  </p:cSld>
-  <p:clrMapOvr>
-    <a:masterClrMapping/>
-  </p:clrMapOvr>
-</p:sld>
-</file>
-
 <file path=ppt/slides/slide8.xml><?xml version="1.0" encoding="utf-8"?>
 <p:sld xmlns:a="http://schemas.openxmlformats.org/drawingml/2006/main" xmlns:r="http://schemas.openxmlformats.org/officeDocument/2006/relationships" xmlns:p="http://schemas.openxmlformats.org/presentationml/2006/main">
   <p:cSld>
@@ -8928,15 +11445,15 @@
           <p:cNvPr id="2" name="Titel 1">
             <a:extLst>
               <a:ext uri="{FF2B5EF4-FFF2-40B4-BE49-F238E27FC236}">
-                <a16:creationId xmlns:a16="http://schemas.microsoft.com/office/drawing/2014/main" id="{B65D7EC3-CD42-4551-8940-B2E7B1FA136C}"/>
-              </a:ext>
-            </a:extLst>
-          </p:cNvPr>
-          <p:cNvSpPr>
-            <a:spLocks noGrp="1"/>
-          </p:cNvSpPr>
-          <p:nvPr>
-            <p:ph type="title"/>
+                <a16:creationId xmlns:a16="http://schemas.microsoft.com/office/drawing/2014/main" id="{423EE35B-33E3-42A0-BBDA-368E8D825D7E}"/>
+              </a:ext>
+            </a:extLst>
+          </p:cNvPr>
+          <p:cNvSpPr>
+            <a:spLocks noGrp="1"/>
+          </p:cNvSpPr>
+          <p:nvPr>
+            <p:ph type="ctrTitle"/>
           </p:nvPr>
         </p:nvSpPr>
         <p:spPr/>
@@ -8945,27 +11462,26 @@
           <a:lstStyle/>
           <a:p>
             <a:r>
-              <a:rPr lang="de-DE"/>
+              <a:rPr lang="de-DE" dirty="0"/>
               <a:t>Terraform &amp; AWS</a:t>
             </a:r>
-            <a:endParaRPr lang="de-DE" dirty="0"/>
-          </a:p>
-        </p:txBody>
-      </p:sp>
-      <p:sp>
-        <p:nvSpPr>
-          <p:cNvPr id="4" name="Content Placeholder 3">
-            <a:extLst>
-              <a:ext uri="{FF2B5EF4-FFF2-40B4-BE49-F238E27FC236}">
-                <a16:creationId xmlns:a16="http://schemas.microsoft.com/office/drawing/2014/main" id="{2BF5D699-940E-4DE9-8183-FAB1BE315652}"/>
-              </a:ext>
-            </a:extLst>
-          </p:cNvPr>
-          <p:cNvSpPr>
-            <a:spLocks noGrp="1"/>
-          </p:cNvSpPr>
-          <p:nvPr>
-            <p:ph idx="1"/>
+          </a:p>
+        </p:txBody>
+      </p:sp>
+      <p:sp>
+        <p:nvSpPr>
+          <p:cNvPr id="5" name="Untertitel 4">
+            <a:extLst>
+              <a:ext uri="{FF2B5EF4-FFF2-40B4-BE49-F238E27FC236}">
+                <a16:creationId xmlns:a16="http://schemas.microsoft.com/office/drawing/2014/main" id="{B11A7254-9FA9-40F3-BD35-E1C8D97446A8}"/>
+              </a:ext>
+            </a:extLst>
+          </p:cNvPr>
+          <p:cNvSpPr>
+            <a:spLocks noGrp="1"/>
+          </p:cNvSpPr>
+          <p:nvPr>
+            <p:ph type="subTitle" idx="1"/>
           </p:nvPr>
         </p:nvSpPr>
         <p:spPr/>
@@ -8973,105 +11489,14 @@
           <a:bodyPr/>
           <a:lstStyle/>
           <a:p>
-            <a:r>
-              <a:rPr lang="en-US"/>
-              <a:t>Terraform to build, change, and version public cloud infrastructure</a:t>
-            </a:r>
-          </a:p>
-          <a:p>
-            <a:r>
-              <a:rPr lang="en-US"/>
-              <a:t>Amazon Elastic Compute Cloud (EC2) to deploy our application</a:t>
-            </a:r>
-          </a:p>
-          <a:p>
-            <a:pPr lvl="1"/>
-            <a:r>
-              <a:rPr lang="en-US"/>
-              <a:t>Security groups</a:t>
-            </a:r>
-          </a:p>
-          <a:p>
-            <a:pPr lvl="1"/>
-            <a:r>
-              <a:rPr lang="en-US"/>
-              <a:t>Elastic IP</a:t>
-            </a:r>
-          </a:p>
-          <a:p>
-            <a:pPr lvl="1"/>
-            <a:r>
-              <a:rPr lang="en-US"/>
-              <a:t>Load Balancer?</a:t>
-            </a:r>
             <a:endParaRPr lang="de-DE"/>
           </a:p>
         </p:txBody>
       </p:sp>
-      <p:pic>
-        <p:nvPicPr>
-          <p:cNvPr id="5" name="Picture 4">
-            <a:extLst>
-              <a:ext uri="{FF2B5EF4-FFF2-40B4-BE49-F238E27FC236}">
-                <a16:creationId xmlns:a16="http://schemas.microsoft.com/office/drawing/2014/main" id="{C71EF30E-69FD-408B-9A66-26E23FCAF59D}"/>
-              </a:ext>
-            </a:extLst>
-          </p:cNvPr>
-          <p:cNvPicPr>
-            <a:picLocks noChangeAspect="1"/>
-          </p:cNvPicPr>
-          <p:nvPr/>
-        </p:nvPicPr>
-        <p:blipFill>
-          <a:blip r:embed="rId2"/>
-          <a:stretch>
-            <a:fillRect/>
-          </a:stretch>
-        </p:blipFill>
-        <p:spPr>
-          <a:xfrm>
-            <a:off x="5363692" y="3429000"/>
-            <a:ext cx="1079150" cy="1219909"/>
-          </a:xfrm>
-          <a:prstGeom prst="rect">
-            <a:avLst/>
-          </a:prstGeom>
-        </p:spPr>
-      </p:pic>
-      <p:pic>
-        <p:nvPicPr>
-          <p:cNvPr id="7" name="Picture 6">
-            <a:extLst>
-              <a:ext uri="{FF2B5EF4-FFF2-40B4-BE49-F238E27FC236}">
-                <a16:creationId xmlns:a16="http://schemas.microsoft.com/office/drawing/2014/main" id="{E1C1E508-A52A-4971-A179-36A48ADFB13B}"/>
-              </a:ext>
-            </a:extLst>
-          </p:cNvPr>
-          <p:cNvPicPr>
-            <a:picLocks noChangeAspect="1"/>
-          </p:cNvPicPr>
-          <p:nvPr/>
-        </p:nvPicPr>
-        <p:blipFill>
-          <a:blip r:embed="rId3"/>
-          <a:stretch>
-            <a:fillRect/>
-          </a:stretch>
-        </p:blipFill>
-        <p:spPr>
-          <a:xfrm>
-            <a:off x="8702564" y="4078657"/>
-            <a:ext cx="1862047" cy="1140504"/>
-          </a:xfrm>
-          <a:prstGeom prst="rect">
-            <a:avLst/>
-          </a:prstGeom>
-        </p:spPr>
-      </p:pic>
     </p:spTree>
     <p:extLst>
       <p:ext uri="{BB962C8B-B14F-4D97-AF65-F5344CB8AC3E}">
-        <p14:creationId xmlns:p14="http://schemas.microsoft.com/office/powerpoint/2010/main" val="4128644860"/>
+        <p14:creationId xmlns:p14="http://schemas.microsoft.com/office/powerpoint/2010/main" val="2259264622"/>
       </p:ext>
     </p:extLst>
   </p:cSld>
@@ -9103,15 +11528,15 @@
           <p:cNvPr id="2" name="Titel 1">
             <a:extLst>
               <a:ext uri="{FF2B5EF4-FFF2-40B4-BE49-F238E27FC236}">
-                <a16:creationId xmlns:a16="http://schemas.microsoft.com/office/drawing/2014/main" id="{423EE35B-33E3-42A0-BBDA-368E8D825D7E}"/>
-              </a:ext>
-            </a:extLst>
-          </p:cNvPr>
-          <p:cNvSpPr>
-            <a:spLocks noGrp="1"/>
-          </p:cNvSpPr>
-          <p:nvPr>
-            <p:ph type="ctrTitle"/>
+                <a16:creationId xmlns:a16="http://schemas.microsoft.com/office/drawing/2014/main" id="{B65D7EC3-CD42-4551-8940-B2E7B1FA136C}"/>
+              </a:ext>
+            </a:extLst>
+          </p:cNvPr>
+          <p:cNvSpPr>
+            <a:spLocks noGrp="1"/>
+          </p:cNvSpPr>
+          <p:nvPr>
+            <p:ph type="title"/>
           </p:nvPr>
         </p:nvSpPr>
         <p:spPr/>
@@ -9120,27 +11545,26 @@
           <a:lstStyle/>
           <a:p>
             <a:r>
-              <a:rPr lang="de-DE"/>
-              <a:t>Solution 1</a:t>
-            </a:r>
-            <a:endParaRPr lang="de-DE" dirty="0"/>
-          </a:p>
-        </p:txBody>
-      </p:sp>
-      <p:sp>
-        <p:nvSpPr>
-          <p:cNvPr id="5" name="Untertitel 4">
-            <a:extLst>
-              <a:ext uri="{FF2B5EF4-FFF2-40B4-BE49-F238E27FC236}">
-                <a16:creationId xmlns:a16="http://schemas.microsoft.com/office/drawing/2014/main" id="{B11A7254-9FA9-40F3-BD35-E1C8D97446A8}"/>
-              </a:ext>
-            </a:extLst>
-          </p:cNvPr>
-          <p:cNvSpPr>
-            <a:spLocks noGrp="1"/>
-          </p:cNvSpPr>
-          <p:nvPr>
-            <p:ph type="subTitle" idx="1"/>
+              <a:rPr lang="de-DE" dirty="0"/>
+              <a:t>Terraform</a:t>
+            </a:r>
+          </a:p>
+        </p:txBody>
+      </p:sp>
+      <p:sp>
+        <p:nvSpPr>
+          <p:cNvPr id="4" name="Content Placeholder 3">
+            <a:extLst>
+              <a:ext uri="{FF2B5EF4-FFF2-40B4-BE49-F238E27FC236}">
+                <a16:creationId xmlns:a16="http://schemas.microsoft.com/office/drawing/2014/main" id="{2BF5D699-940E-4DE9-8183-FAB1BE315652}"/>
+              </a:ext>
+            </a:extLst>
+          </p:cNvPr>
+          <p:cNvSpPr>
+            <a:spLocks noGrp="1"/>
+          </p:cNvSpPr>
+          <p:nvPr>
+            <p:ph idx="1"/>
           </p:nvPr>
         </p:nvSpPr>
         <p:spPr/>
@@ -9148,14 +11572,84 @@
           <a:bodyPr/>
           <a:lstStyle/>
           <a:p>
-            <a:endParaRPr lang="de-DE"/>
-          </a:p>
-        </p:txBody>
-      </p:sp>
+            <a:r>
+              <a:rPr lang="en-US" dirty="0"/>
+              <a:t>Terraform to automatically build, change, and version public cloud infrastructure</a:t>
+            </a:r>
+          </a:p>
+        </p:txBody>
+      </p:sp>
+      <p:pic>
+        <p:nvPicPr>
+          <p:cNvPr id="5" name="Picture 4">
+            <a:extLst>
+              <a:ext uri="{FF2B5EF4-FFF2-40B4-BE49-F238E27FC236}">
+                <a16:creationId xmlns:a16="http://schemas.microsoft.com/office/drawing/2014/main" id="{C71EF30E-69FD-408B-9A66-26E23FCAF59D}"/>
+              </a:ext>
+            </a:extLst>
+          </p:cNvPr>
+          <p:cNvPicPr>
+            <a:picLocks noChangeAspect="1"/>
+          </p:cNvPicPr>
+          <p:nvPr/>
+        </p:nvPicPr>
+        <p:blipFill>
+          <a:blip r:embed="rId2"/>
+          <a:stretch>
+            <a:fillRect/>
+          </a:stretch>
+        </p:blipFill>
+        <p:spPr>
+          <a:xfrm>
+            <a:off x="10274650" y="417951"/>
+            <a:ext cx="1079150" cy="1219909"/>
+          </a:xfrm>
+          <a:prstGeom prst="rect">
+            <a:avLst/>
+          </a:prstGeom>
+        </p:spPr>
+      </p:pic>
+      <p:pic>
+        <p:nvPicPr>
+          <p:cNvPr id="6" name="Grafik 5">
+            <a:extLst>
+              <a:ext uri="{FF2B5EF4-FFF2-40B4-BE49-F238E27FC236}">
+                <a16:creationId xmlns:a16="http://schemas.microsoft.com/office/drawing/2014/main" id="{CF409AD2-EC87-FFBD-FDBA-2EC7012E4054}"/>
+              </a:ext>
+            </a:extLst>
+          </p:cNvPr>
+          <p:cNvPicPr>
+            <a:picLocks noChangeAspect="1"/>
+          </p:cNvPicPr>
+          <p:nvPr/>
+        </p:nvPicPr>
+        <p:blipFill>
+          <a:blip r:embed="rId3"/>
+          <a:stretch>
+            <a:fillRect/>
+          </a:stretch>
+        </p:blipFill>
+        <p:spPr>
+          <a:xfrm>
+            <a:off x="3057952" y="3283888"/>
+            <a:ext cx="6076095" cy="1752443"/>
+          </a:xfrm>
+          <a:prstGeom prst="rect">
+            <a:avLst/>
+          </a:prstGeom>
+          <a:effectLst>
+            <a:outerShdw blurRad="50800" dist="38100" dir="2700000" algn="tl" rotWithShape="0">
+              <a:prstClr val="black">
+                <a:alpha val="40000"/>
+              </a:prstClr>
+            </a:outerShdw>
+          </a:effectLst>
+        </p:spPr>
+      </p:pic>
     </p:spTree>
     <p:extLst>
       <p:ext uri="{BB962C8B-B14F-4D97-AF65-F5344CB8AC3E}">
-        <p14:creationId xmlns:p14="http://schemas.microsoft.com/office/powerpoint/2010/main" val="2403675243"/>
+        <p14:creationId xmlns:p14="http://schemas.microsoft.com/office/powerpoint/2010/main" val="4128644860"/>
       </p:ext>
     </p:extLst>
   </p:cSld>

</xml_diff>

<commit_message>
Added link to github repo
</commit_message>
<xml_diff>
--- a/Project Presentation.pptx
+++ b/Project Presentation.pptx
@@ -6,7 +6,7 @@
     <p:sldMasterId id="2147483660" r:id="rId2"/>
   </p:sldMasterIdLst>
   <p:notesMasterIdLst>
-    <p:notesMasterId r:id="rId32"/>
+    <p:notesMasterId r:id="rId33"/>
   </p:notesMasterIdLst>
   <p:sldIdLst>
     <p:sldId id="256" r:id="rId3"/>
@@ -33,11 +33,12 @@
     <p:sldId id="304" r:id="rId24"/>
     <p:sldId id="305" r:id="rId25"/>
     <p:sldId id="302" r:id="rId26"/>
-    <p:sldId id="319" r:id="rId27"/>
-    <p:sldId id="323" r:id="rId28"/>
-    <p:sldId id="320" r:id="rId29"/>
-    <p:sldId id="300" r:id="rId30"/>
-    <p:sldId id="303" r:id="rId31"/>
+    <p:sldId id="324" r:id="rId27"/>
+    <p:sldId id="319" r:id="rId28"/>
+    <p:sldId id="323" r:id="rId29"/>
+    <p:sldId id="320" r:id="rId30"/>
+    <p:sldId id="300" r:id="rId31"/>
+    <p:sldId id="303" r:id="rId32"/>
   </p:sldIdLst>
   <p:sldSz cx="12192000" cy="6858000"/>
   <p:notesSz cx="6858000" cy="9144000"/>
@@ -818,7 +819,7 @@
           <a:p>
             <a:fld id="{5976870D-EDE0-4065-9108-FF08285B4E25}" type="slidenum">
               <a:rPr lang="de-DE" smtClean="0"/>
-              <a:t>27</a:t>
+              <a:t>28</a:t>
             </a:fld>
             <a:endParaRPr lang="de-DE"/>
           </a:p>
@@ -2287,7 +2288,7 @@
           <a:p>
             <a:fld id="{5976870D-EDE0-4065-9108-FF08285B4E25}" type="slidenum">
               <a:rPr lang="de-DE" smtClean="0"/>
-              <a:t>26</a:t>
+              <a:t>27</a:t>
             </a:fld>
             <a:endParaRPr lang="de-DE"/>
           </a:p>
@@ -15030,6 +15031,110 @@
             <p:ph type="ctrTitle"/>
           </p:nvPr>
         </p:nvSpPr>
+        <p:spPr>
+          <a:xfrm>
+            <a:off x="1524000" y="1432464"/>
+            <a:ext cx="9144000" cy="2387600"/>
+          </a:xfrm>
+        </p:spPr>
+        <p:txBody>
+          <a:bodyPr>
+            <a:normAutofit/>
+          </a:bodyPr>
+          <a:lstStyle/>
+          <a:p>
+            <a:r>
+              <a:rPr lang="de-DE" sz="2800" dirty="0"/>
+              <a:t>https://gitlab.inf.unibz.it/Jana.Karas/cloud-computing-project</a:t>
+            </a:r>
+          </a:p>
+        </p:txBody>
+      </p:sp>
+      <p:pic>
+        <p:nvPicPr>
+          <p:cNvPr id="6" name="Grafik 5">
+            <a:extLst>
+              <a:ext uri="{FF2B5EF4-FFF2-40B4-BE49-F238E27FC236}">
+                <a16:creationId xmlns:a16="http://schemas.microsoft.com/office/drawing/2014/main" id="{BFCBC996-5DE8-D3B6-4865-A2B9DF3908FF}"/>
+              </a:ext>
+            </a:extLst>
+          </p:cNvPr>
+          <p:cNvPicPr>
+            <a:picLocks noChangeAspect="1"/>
+          </p:cNvPicPr>
+          <p:nvPr/>
+        </p:nvPicPr>
+        <p:blipFill>
+          <a:blip r:embed="rId2">
+            <a:extLst>
+              <a:ext uri="{28A0092B-C50C-407E-A947-70E740481C1C}">
+                <a14:useLocalDpi xmlns:a14="http://schemas.microsoft.com/office/drawing/2010/main" val="0"/>
+              </a:ext>
+              <a:ext uri="{96DAC541-7B7A-43D3-8B79-37D633B846F1}">
+                <asvg:svgBlip xmlns:asvg="http://schemas.microsoft.com/office/drawing/2016/SVG/main" r:embed="rId3"/>
+              </a:ext>
+            </a:extLst>
+          </a:blip>
+          <a:stretch>
+            <a:fillRect/>
+          </a:stretch>
+        </p:blipFill>
+        <p:spPr>
+          <a:xfrm>
+            <a:off x="5583858" y="4133532"/>
+            <a:ext cx="1024284" cy="1024284"/>
+          </a:xfrm>
+          <a:prstGeom prst="rect">
+            <a:avLst/>
+          </a:prstGeom>
+        </p:spPr>
+      </p:pic>
+    </p:spTree>
+    <p:extLst>
+      <p:ext uri="{BB962C8B-B14F-4D97-AF65-F5344CB8AC3E}">
+        <p14:creationId xmlns:p14="http://schemas.microsoft.com/office/powerpoint/2010/main" val="1611829248"/>
+      </p:ext>
+    </p:extLst>
+  </p:cSld>
+  <p:clrMapOvr>
+    <a:masterClrMapping/>
+  </p:clrMapOvr>
+</p:sld>
+</file>
+
+<file path=ppt/slides/slide26.xml><?xml version="1.0" encoding="utf-8"?>
+<p:sld xmlns:a="http://schemas.openxmlformats.org/drawingml/2006/main" xmlns:r="http://schemas.openxmlformats.org/officeDocument/2006/relationships" xmlns:p="http://schemas.openxmlformats.org/presentationml/2006/main">
+  <p:cSld>
+    <p:spTree>
+      <p:nvGrpSpPr>
+        <p:cNvPr id="1" name=""/>
+        <p:cNvGrpSpPr/>
+        <p:nvPr/>
+      </p:nvGrpSpPr>
+      <p:grpSpPr>
+        <a:xfrm>
+          <a:off x="0" y="0"/>
+          <a:ext cx="0" cy="0"/>
+          <a:chOff x="0" y="0"/>
+          <a:chExt cx="0" cy="0"/>
+        </a:xfrm>
+      </p:grpSpPr>
+      <p:sp>
+        <p:nvSpPr>
+          <p:cNvPr id="2" name="Titel 1">
+            <a:extLst>
+              <a:ext uri="{FF2B5EF4-FFF2-40B4-BE49-F238E27FC236}">
+                <a16:creationId xmlns:a16="http://schemas.microsoft.com/office/drawing/2014/main" id="{423EE35B-33E3-42A0-BBDA-368E8D825D7E}"/>
+              </a:ext>
+            </a:extLst>
+          </p:cNvPr>
+          <p:cNvSpPr>
+            <a:spLocks noGrp="1"/>
+          </p:cNvSpPr>
+          <p:nvPr>
+            <p:ph type="ctrTitle"/>
+          </p:nvPr>
+        </p:nvSpPr>
         <p:spPr/>
         <p:txBody>
           <a:bodyPr/>
@@ -15085,7 +15190,7 @@
 </p:sld>
 </file>
 
-<file path=ppt/slides/slide26.xml><?xml version="1.0" encoding="utf-8"?>
+<file path=ppt/slides/slide27.xml><?xml version="1.0" encoding="utf-8"?>
 <p:sld xmlns:a="http://schemas.openxmlformats.org/drawingml/2006/main" xmlns:r="http://schemas.openxmlformats.org/officeDocument/2006/relationships" xmlns:p="http://schemas.openxmlformats.org/presentationml/2006/main">
   <p:cSld>
     <p:spTree>
@@ -16215,7 +16320,7 @@
 </p:sld>
 </file>
 
-<file path=ppt/slides/slide27.xml><?xml version="1.0" encoding="utf-8"?>
+<file path=ppt/slides/slide28.xml><?xml version="1.0" encoding="utf-8"?>
 <p:sld xmlns:a="http://schemas.openxmlformats.org/drawingml/2006/main" xmlns:r="http://schemas.openxmlformats.org/officeDocument/2006/relationships" xmlns:p="http://schemas.openxmlformats.org/presentationml/2006/main">
   <p:cSld>
     <p:spTree>
@@ -18100,229 +18205,6 @@
 </p:sld>
 </file>
 
-<file path=ppt/slides/slide28.xml><?xml version="1.0" encoding="utf-8"?>
-<p:sld xmlns:a="http://schemas.openxmlformats.org/drawingml/2006/main" xmlns:r="http://schemas.openxmlformats.org/officeDocument/2006/relationships" xmlns:p="http://schemas.openxmlformats.org/presentationml/2006/main" show="0">
-  <p:cSld>
-    <p:spTree>
-      <p:nvGrpSpPr>
-        <p:cNvPr id="1" name=""/>
-        <p:cNvGrpSpPr/>
-        <p:nvPr/>
-      </p:nvGrpSpPr>
-      <p:grpSpPr>
-        <a:xfrm>
-          <a:off x="0" y="0"/>
-          <a:ext cx="0" cy="0"/>
-          <a:chOff x="0" y="0"/>
-          <a:chExt cx="0" cy="0"/>
-        </a:xfrm>
-      </p:grpSpPr>
-      <p:sp>
-        <p:nvSpPr>
-          <p:cNvPr id="2" name="Titel 1">
-            <a:extLst>
-              <a:ext uri="{FF2B5EF4-FFF2-40B4-BE49-F238E27FC236}">
-                <a16:creationId xmlns:a16="http://schemas.microsoft.com/office/drawing/2014/main" id="{B65D7EC3-CD42-4551-8940-B2E7B1FA136C}"/>
-              </a:ext>
-            </a:extLst>
-          </p:cNvPr>
-          <p:cNvSpPr>
-            <a:spLocks noGrp="1"/>
-          </p:cNvSpPr>
-          <p:nvPr>
-            <p:ph type="title"/>
-          </p:nvPr>
-        </p:nvSpPr>
-        <p:spPr/>
-        <p:txBody>
-          <a:bodyPr/>
-          <a:lstStyle/>
-          <a:p>
-            <a:r>
-              <a:rPr lang="de-DE"/>
-              <a:t>Solution 1</a:t>
-            </a:r>
-            <a:endParaRPr lang="de-DE" dirty="0"/>
-          </a:p>
-        </p:txBody>
-      </p:sp>
-      <p:sp>
-        <p:nvSpPr>
-          <p:cNvPr id="4" name="Content Placeholder 3">
-            <a:extLst>
-              <a:ext uri="{FF2B5EF4-FFF2-40B4-BE49-F238E27FC236}">
-                <a16:creationId xmlns:a16="http://schemas.microsoft.com/office/drawing/2014/main" id="{2BF5D699-940E-4DE9-8183-FAB1BE315652}"/>
-              </a:ext>
-            </a:extLst>
-          </p:cNvPr>
-          <p:cNvSpPr>
-            <a:spLocks noGrp="1"/>
-          </p:cNvSpPr>
-          <p:nvPr>
-            <p:ph idx="1"/>
-          </p:nvPr>
-        </p:nvSpPr>
-        <p:spPr/>
-        <p:txBody>
-          <a:bodyPr/>
-          <a:lstStyle/>
-          <a:p>
-            <a:pPr marL="0" indent="0">
-              <a:buNone/>
-            </a:pPr>
-            <a:r>
-              <a:rPr lang="de-DE" dirty="0" err="1"/>
-              <a:t>Deployment</a:t>
-            </a:r>
-            <a:r>
-              <a:rPr lang="de-DE" dirty="0"/>
-              <a:t> via .</a:t>
-            </a:r>
-            <a:r>
-              <a:rPr lang="de-DE" dirty="0" err="1"/>
-              <a:t>zip</a:t>
-            </a:r>
-            <a:r>
-              <a:rPr lang="de-DE" dirty="0"/>
-              <a:t> link:</a:t>
-            </a:r>
-          </a:p>
-          <a:p>
-            <a:pPr marL="0" indent="0">
-              <a:buNone/>
-            </a:pPr>
-            <a:endParaRPr lang="de-DE" dirty="0"/>
-          </a:p>
-          <a:p>
-            <a:pPr marL="457200" lvl="1" indent="0">
-              <a:buNone/>
-            </a:pPr>
-            <a:r>
-              <a:rPr lang="de-DE" dirty="0"/>
-              <a:t>1) Installation of Docker and Docker </a:t>
-            </a:r>
-            <a:r>
-              <a:rPr lang="de-DE" dirty="0" err="1"/>
-              <a:t>Compose</a:t>
-            </a:r>
-            <a:r>
-              <a:rPr lang="de-DE" dirty="0"/>
-              <a:t> SSH </a:t>
-            </a:r>
-            <a:r>
-              <a:rPr lang="de-DE" dirty="0" err="1"/>
-              <a:t>to</a:t>
-            </a:r>
-            <a:r>
-              <a:rPr lang="de-DE" dirty="0"/>
-              <a:t> </a:t>
-            </a:r>
-            <a:r>
-              <a:rPr lang="de-DE" dirty="0" err="1"/>
-              <a:t>access</a:t>
-            </a:r>
-            <a:r>
-              <a:rPr lang="de-DE" dirty="0"/>
-              <a:t> EC2 </a:t>
-            </a:r>
-            <a:r>
-              <a:rPr lang="de-DE" dirty="0" err="1"/>
-              <a:t>instance</a:t>
-            </a:r>
-            <a:endParaRPr lang="de-DE" dirty="0"/>
-          </a:p>
-          <a:p>
-            <a:pPr lvl="1"/>
-            <a:r>
-              <a:rPr lang="de-DE" dirty="0"/>
-              <a:t>Installation of Docker and Docker </a:t>
-            </a:r>
-            <a:r>
-              <a:rPr lang="de-DE" dirty="0" err="1"/>
-              <a:t>Compose</a:t>
-            </a:r>
-            <a:r>
-              <a:rPr lang="de-DE" dirty="0"/>
-              <a:t> on EC2</a:t>
-            </a:r>
-          </a:p>
-          <a:p>
-            <a:pPr lvl="1"/>
-            <a:r>
-              <a:rPr lang="de-DE" dirty="0"/>
-              <a:t>Upload of </a:t>
-            </a:r>
-            <a:r>
-              <a:rPr lang="de-DE" dirty="0" err="1"/>
-              <a:t>application</a:t>
-            </a:r>
-            <a:r>
-              <a:rPr lang="de-DE" dirty="0"/>
-              <a:t> via .</a:t>
-            </a:r>
-            <a:r>
-              <a:rPr lang="de-DE" dirty="0" err="1"/>
-              <a:t>zip</a:t>
-            </a:r>
-            <a:r>
-              <a:rPr lang="de-DE" dirty="0"/>
-              <a:t> link </a:t>
-            </a:r>
-            <a:r>
-              <a:rPr lang="de-DE" dirty="0" err="1"/>
-              <a:t>from</a:t>
-            </a:r>
-            <a:r>
-              <a:rPr lang="de-DE" dirty="0"/>
-              <a:t> GitHub Repo </a:t>
-            </a:r>
-            <a:r>
-              <a:rPr lang="de-DE" dirty="0" err="1"/>
-              <a:t>to</a:t>
-            </a:r>
-            <a:r>
-              <a:rPr lang="de-DE" dirty="0"/>
-              <a:t> EC2</a:t>
-            </a:r>
-          </a:p>
-          <a:p>
-            <a:pPr lvl="1"/>
-            <a:r>
-              <a:rPr lang="de-DE" dirty="0"/>
-              <a:t>Docker-</a:t>
-            </a:r>
-            <a:r>
-              <a:rPr lang="de-DE" dirty="0" err="1"/>
-              <a:t>compose</a:t>
-            </a:r>
-            <a:r>
-              <a:rPr lang="de-DE" dirty="0"/>
-              <a:t> </a:t>
-            </a:r>
-            <a:r>
-              <a:rPr lang="de-DE" dirty="0" err="1"/>
-              <a:t>up</a:t>
-            </a:r>
-            <a:r>
-              <a:rPr lang="de-DE" dirty="0"/>
-              <a:t> on EC2</a:t>
-            </a:r>
-          </a:p>
-        </p:txBody>
-      </p:sp>
-    </p:spTree>
-    <p:extLst>
-      <p:ext uri="{BB962C8B-B14F-4D97-AF65-F5344CB8AC3E}">
-        <p14:creationId xmlns:p14="http://schemas.microsoft.com/office/powerpoint/2010/main" val="3653631288"/>
-      </p:ext>
-    </p:extLst>
-  </p:cSld>
-  <p:clrMapOvr>
-    <a:masterClrMapping/>
-  </p:clrMapOvr>
-</p:sld>
-</file>
-
 <file path=ppt/slides/slide29.xml><?xml version="1.0" encoding="utf-8"?>
 <p:sld xmlns:a="http://schemas.openxmlformats.org/drawingml/2006/main" xmlns:r="http://schemas.openxmlformats.org/officeDocument/2006/relationships" xmlns:p="http://schemas.openxmlformats.org/presentationml/2006/main" show="0">
   <p:cSld>
@@ -18363,7 +18245,7 @@
           <a:p>
             <a:r>
               <a:rPr lang="de-DE"/>
-              <a:t>Solution 2</a:t>
+              <a:t>Solution 1</a:t>
             </a:r>
             <a:endParaRPr lang="de-DE" dirty="0"/>
           </a:p>
@@ -18394,101 +18276,149 @@
               <a:buNone/>
             </a:pPr>
             <a:r>
-              <a:rPr lang="de-DE"/>
-              <a:t>Deployment via DockerHub:</a:t>
+              <a:rPr lang="de-DE" dirty="0" err="1"/>
+              <a:t>Deployment</a:t>
+            </a:r>
+            <a:r>
+              <a:rPr lang="de-DE" dirty="0"/>
+              <a:t> via .</a:t>
+            </a:r>
+            <a:r>
+              <a:rPr lang="de-DE" dirty="0" err="1"/>
+              <a:t>zip</a:t>
+            </a:r>
+            <a:r>
+              <a:rPr lang="de-DE" dirty="0"/>
+              <a:t> link:</a:t>
             </a:r>
           </a:p>
           <a:p>
             <a:pPr marL="0" indent="0">
               <a:buNone/>
             </a:pPr>
-            <a:endParaRPr lang="de-DE"/>
+            <a:endParaRPr lang="de-DE" dirty="0"/>
+          </a:p>
+          <a:p>
+            <a:pPr marL="457200" lvl="1" indent="0">
+              <a:buNone/>
+            </a:pPr>
+            <a:r>
+              <a:rPr lang="de-DE" dirty="0"/>
+              <a:t>1) Installation of Docker and Docker </a:t>
+            </a:r>
+            <a:r>
+              <a:rPr lang="de-DE" dirty="0" err="1"/>
+              <a:t>Compose</a:t>
+            </a:r>
+            <a:r>
+              <a:rPr lang="de-DE" dirty="0"/>
+              <a:t> SSH </a:t>
+            </a:r>
+            <a:r>
+              <a:rPr lang="de-DE" dirty="0" err="1"/>
+              <a:t>to</a:t>
+            </a:r>
+            <a:r>
+              <a:rPr lang="de-DE" dirty="0"/>
+              <a:t> </a:t>
+            </a:r>
+            <a:r>
+              <a:rPr lang="de-DE" dirty="0" err="1"/>
+              <a:t>access</a:t>
+            </a:r>
+            <a:r>
+              <a:rPr lang="de-DE" dirty="0"/>
+              <a:t> EC2 </a:t>
+            </a:r>
+            <a:r>
+              <a:rPr lang="de-DE" dirty="0" err="1"/>
+              <a:t>instance</a:t>
+            </a:r>
+            <a:endParaRPr lang="de-DE" dirty="0"/>
           </a:p>
           <a:p>
             <a:pPr lvl="1"/>
             <a:r>
-              <a:rPr lang="de-DE"/>
-              <a:t>1. workflow</a:t>
-            </a:r>
-          </a:p>
-          <a:p>
-            <a:pPr lvl="2"/>
-            <a:r>
-              <a:rPr lang="de-DE"/>
-              <a:t>Push images to DockerHub</a:t>
+              <a:rPr lang="de-DE" dirty="0"/>
+              <a:t>Installation of Docker and Docker </a:t>
+            </a:r>
+            <a:r>
+              <a:rPr lang="de-DE" dirty="0" err="1"/>
+              <a:t>Compose</a:t>
+            </a:r>
+            <a:r>
+              <a:rPr lang="de-DE" dirty="0"/>
+              <a:t> on EC2</a:t>
             </a:r>
           </a:p>
           <a:p>
             <a:pPr lvl="1"/>
             <a:r>
-              <a:rPr lang="de-DE"/>
-              <a:t>2. workflow:</a:t>
-            </a:r>
-          </a:p>
-          <a:p>
-            <a:pPr lvl="2"/>
-            <a:r>
-              <a:rPr lang="de-DE"/>
-              <a:t>SSH to access EC2 instance</a:t>
-            </a:r>
-          </a:p>
-          <a:p>
-            <a:pPr lvl="2"/>
-            <a:r>
-              <a:rPr lang="de-DE"/>
-              <a:t>Installation of Docker and Docker Compose on EC2</a:t>
-            </a:r>
-          </a:p>
-          <a:p>
-            <a:pPr lvl="2"/>
-            <a:r>
-              <a:rPr lang="de-DE"/>
-              <a:t>Loading of images from DockerHub to EC2</a:t>
-            </a:r>
-          </a:p>
-          <a:p>
-            <a:pPr lvl="2"/>
-            <a:r>
-              <a:rPr lang="de-DE"/>
-              <a:t>Docker-compose up on EC2 with docker-compose.dockerhub.yml</a:t>
-            </a:r>
-          </a:p>
-        </p:txBody>
-      </p:sp>
-      <p:pic>
-        <p:nvPicPr>
-          <p:cNvPr id="5" name="Picture 4">
-            <a:extLst>
-              <a:ext uri="{FF2B5EF4-FFF2-40B4-BE49-F238E27FC236}">
-                <a16:creationId xmlns:a16="http://schemas.microsoft.com/office/drawing/2014/main" id="{0F114F07-129D-42EC-AD24-46C50F053298}"/>
-              </a:ext>
-            </a:extLst>
-          </p:cNvPr>
-          <p:cNvPicPr>
-            <a:picLocks noChangeAspect="1"/>
-          </p:cNvPicPr>
-          <p:nvPr/>
-        </p:nvPicPr>
-        <p:blipFill>
-          <a:blip r:embed="rId2"/>
-          <a:stretch>
-            <a:fillRect/>
-          </a:stretch>
-        </p:blipFill>
-        <p:spPr>
-          <a:xfrm>
-            <a:off x="7621708" y="2246038"/>
-            <a:ext cx="2791864" cy="780941"/>
-          </a:xfrm>
-          <a:prstGeom prst="rect">
-            <a:avLst/>
-          </a:prstGeom>
-        </p:spPr>
-      </p:pic>
+              <a:rPr lang="de-DE" dirty="0"/>
+              <a:t>Upload of </a:t>
+            </a:r>
+            <a:r>
+              <a:rPr lang="de-DE" dirty="0" err="1"/>
+              <a:t>application</a:t>
+            </a:r>
+            <a:r>
+              <a:rPr lang="de-DE" dirty="0"/>
+              <a:t> via .</a:t>
+            </a:r>
+            <a:r>
+              <a:rPr lang="de-DE" dirty="0" err="1"/>
+              <a:t>zip</a:t>
+            </a:r>
+            <a:r>
+              <a:rPr lang="de-DE" dirty="0"/>
+              <a:t> link </a:t>
+            </a:r>
+            <a:r>
+              <a:rPr lang="de-DE" dirty="0" err="1"/>
+              <a:t>from</a:t>
+            </a:r>
+            <a:r>
+              <a:rPr lang="de-DE" dirty="0"/>
+              <a:t> GitHub Repo </a:t>
+            </a:r>
+            <a:r>
+              <a:rPr lang="de-DE" dirty="0" err="1"/>
+              <a:t>to</a:t>
+            </a:r>
+            <a:r>
+              <a:rPr lang="de-DE" dirty="0"/>
+              <a:t> EC2</a:t>
+            </a:r>
+          </a:p>
+          <a:p>
+            <a:pPr lvl="1"/>
+            <a:r>
+              <a:rPr lang="de-DE" dirty="0"/>
+              <a:t>Docker-</a:t>
+            </a:r>
+            <a:r>
+              <a:rPr lang="de-DE" dirty="0" err="1"/>
+              <a:t>compose</a:t>
+            </a:r>
+            <a:r>
+              <a:rPr lang="de-DE" dirty="0"/>
+              <a:t> </a:t>
+            </a:r>
+            <a:r>
+              <a:rPr lang="de-DE" dirty="0" err="1"/>
+              <a:t>up</a:t>
+            </a:r>
+            <a:r>
+              <a:rPr lang="de-DE" dirty="0"/>
+              <a:t> on EC2</a:t>
+            </a:r>
+          </a:p>
+        </p:txBody>
+      </p:sp>
     </p:spTree>
     <p:extLst>
       <p:ext uri="{BB962C8B-B14F-4D97-AF65-F5344CB8AC3E}">
-        <p14:creationId xmlns:p14="http://schemas.microsoft.com/office/powerpoint/2010/main" val="3928375169"/>
+        <p14:creationId xmlns:p14="http://schemas.microsoft.com/office/powerpoint/2010/main" val="3653631288"/>
       </p:ext>
     </p:extLst>
   </p:cSld>
@@ -18588,6 +18518,181 @@
     <p:extLst>
       <p:ext uri="{BB962C8B-B14F-4D97-AF65-F5344CB8AC3E}">
         <p14:creationId xmlns:p14="http://schemas.microsoft.com/office/powerpoint/2010/main" val="1443446330"/>
+      </p:ext>
+    </p:extLst>
+  </p:cSld>
+  <p:clrMapOvr>
+    <a:masterClrMapping/>
+  </p:clrMapOvr>
+</p:sld>
+</file>
+
+<file path=ppt/slides/slide30.xml><?xml version="1.0" encoding="utf-8"?>
+<p:sld xmlns:a="http://schemas.openxmlformats.org/drawingml/2006/main" xmlns:r="http://schemas.openxmlformats.org/officeDocument/2006/relationships" xmlns:p="http://schemas.openxmlformats.org/presentationml/2006/main" show="0">
+  <p:cSld>
+    <p:spTree>
+      <p:nvGrpSpPr>
+        <p:cNvPr id="1" name=""/>
+        <p:cNvGrpSpPr/>
+        <p:nvPr/>
+      </p:nvGrpSpPr>
+      <p:grpSpPr>
+        <a:xfrm>
+          <a:off x="0" y="0"/>
+          <a:ext cx="0" cy="0"/>
+          <a:chOff x="0" y="0"/>
+          <a:chExt cx="0" cy="0"/>
+        </a:xfrm>
+      </p:grpSpPr>
+      <p:sp>
+        <p:nvSpPr>
+          <p:cNvPr id="2" name="Titel 1">
+            <a:extLst>
+              <a:ext uri="{FF2B5EF4-FFF2-40B4-BE49-F238E27FC236}">
+                <a16:creationId xmlns:a16="http://schemas.microsoft.com/office/drawing/2014/main" id="{B65D7EC3-CD42-4551-8940-B2E7B1FA136C}"/>
+              </a:ext>
+            </a:extLst>
+          </p:cNvPr>
+          <p:cNvSpPr>
+            <a:spLocks noGrp="1"/>
+          </p:cNvSpPr>
+          <p:nvPr>
+            <p:ph type="title"/>
+          </p:nvPr>
+        </p:nvSpPr>
+        <p:spPr/>
+        <p:txBody>
+          <a:bodyPr/>
+          <a:lstStyle/>
+          <a:p>
+            <a:r>
+              <a:rPr lang="de-DE"/>
+              <a:t>Solution 2</a:t>
+            </a:r>
+            <a:endParaRPr lang="de-DE" dirty="0"/>
+          </a:p>
+        </p:txBody>
+      </p:sp>
+      <p:sp>
+        <p:nvSpPr>
+          <p:cNvPr id="4" name="Content Placeholder 3">
+            <a:extLst>
+              <a:ext uri="{FF2B5EF4-FFF2-40B4-BE49-F238E27FC236}">
+                <a16:creationId xmlns:a16="http://schemas.microsoft.com/office/drawing/2014/main" id="{2BF5D699-940E-4DE9-8183-FAB1BE315652}"/>
+              </a:ext>
+            </a:extLst>
+          </p:cNvPr>
+          <p:cNvSpPr>
+            <a:spLocks noGrp="1"/>
+          </p:cNvSpPr>
+          <p:nvPr>
+            <p:ph idx="1"/>
+          </p:nvPr>
+        </p:nvSpPr>
+        <p:spPr/>
+        <p:txBody>
+          <a:bodyPr/>
+          <a:lstStyle/>
+          <a:p>
+            <a:pPr marL="0" indent="0">
+              <a:buNone/>
+            </a:pPr>
+            <a:r>
+              <a:rPr lang="de-DE"/>
+              <a:t>Deployment via DockerHub:</a:t>
+            </a:r>
+          </a:p>
+          <a:p>
+            <a:pPr marL="0" indent="0">
+              <a:buNone/>
+            </a:pPr>
+            <a:endParaRPr lang="de-DE"/>
+          </a:p>
+          <a:p>
+            <a:pPr lvl="1"/>
+            <a:r>
+              <a:rPr lang="de-DE"/>
+              <a:t>1. workflow</a:t>
+            </a:r>
+          </a:p>
+          <a:p>
+            <a:pPr lvl="2"/>
+            <a:r>
+              <a:rPr lang="de-DE"/>
+              <a:t>Push images to DockerHub</a:t>
+            </a:r>
+          </a:p>
+          <a:p>
+            <a:pPr lvl="1"/>
+            <a:r>
+              <a:rPr lang="de-DE"/>
+              <a:t>2. workflow:</a:t>
+            </a:r>
+          </a:p>
+          <a:p>
+            <a:pPr lvl="2"/>
+            <a:r>
+              <a:rPr lang="de-DE"/>
+              <a:t>SSH to access EC2 instance</a:t>
+            </a:r>
+          </a:p>
+          <a:p>
+            <a:pPr lvl="2"/>
+            <a:r>
+              <a:rPr lang="de-DE"/>
+              <a:t>Installation of Docker and Docker Compose on EC2</a:t>
+            </a:r>
+          </a:p>
+          <a:p>
+            <a:pPr lvl="2"/>
+            <a:r>
+              <a:rPr lang="de-DE"/>
+              <a:t>Loading of images from DockerHub to EC2</a:t>
+            </a:r>
+          </a:p>
+          <a:p>
+            <a:pPr lvl="2"/>
+            <a:r>
+              <a:rPr lang="de-DE"/>
+              <a:t>Docker-compose up on EC2 with docker-compose.dockerhub.yml</a:t>
+            </a:r>
+          </a:p>
+        </p:txBody>
+      </p:sp>
+      <p:pic>
+        <p:nvPicPr>
+          <p:cNvPr id="5" name="Picture 4">
+            <a:extLst>
+              <a:ext uri="{FF2B5EF4-FFF2-40B4-BE49-F238E27FC236}">
+                <a16:creationId xmlns:a16="http://schemas.microsoft.com/office/drawing/2014/main" id="{0F114F07-129D-42EC-AD24-46C50F053298}"/>
+              </a:ext>
+            </a:extLst>
+          </p:cNvPr>
+          <p:cNvPicPr>
+            <a:picLocks noChangeAspect="1"/>
+          </p:cNvPicPr>
+          <p:nvPr/>
+        </p:nvPicPr>
+        <p:blipFill>
+          <a:blip r:embed="rId2"/>
+          <a:stretch>
+            <a:fillRect/>
+          </a:stretch>
+        </p:blipFill>
+        <p:spPr>
+          <a:xfrm>
+            <a:off x="7621708" y="2246038"/>
+            <a:ext cx="2791864" cy="780941"/>
+          </a:xfrm>
+          <a:prstGeom prst="rect">
+            <a:avLst/>
+          </a:prstGeom>
+        </p:spPr>
+      </p:pic>
+    </p:spTree>
+    <p:extLst>
+      <p:ext uri="{BB962C8B-B14F-4D97-AF65-F5344CB8AC3E}">
+        <p14:creationId xmlns:p14="http://schemas.microsoft.com/office/powerpoint/2010/main" val="3928375169"/>
       </p:ext>
     </p:extLst>
   </p:cSld>

</xml_diff>

<commit_message>
Added a slide with Challenges
</commit_message>
<xml_diff>
--- a/Project Presentation.pptx
+++ b/Project Presentation.pptx
@@ -6,7 +6,7 @@
     <p:sldMasterId id="2147483660" r:id="rId2"/>
   </p:sldMasterIdLst>
   <p:notesMasterIdLst>
-    <p:notesMasterId r:id="rId34"/>
+    <p:notesMasterId r:id="rId35"/>
   </p:notesMasterIdLst>
   <p:sldIdLst>
     <p:sldId id="256" r:id="rId3"/>
@@ -36,10 +36,11 @@
     <p:sldId id="302" r:id="rId27"/>
     <p:sldId id="324" r:id="rId28"/>
     <p:sldId id="319" r:id="rId29"/>
-    <p:sldId id="323" r:id="rId30"/>
-    <p:sldId id="320" r:id="rId31"/>
-    <p:sldId id="300" r:id="rId32"/>
-    <p:sldId id="303" r:id="rId33"/>
+    <p:sldId id="326" r:id="rId30"/>
+    <p:sldId id="323" r:id="rId31"/>
+    <p:sldId id="320" r:id="rId32"/>
+    <p:sldId id="300" r:id="rId33"/>
+    <p:sldId id="303" r:id="rId34"/>
   </p:sldIdLst>
   <p:sldSz cx="12192000" cy="6858000"/>
   <p:notesSz cx="6858000" cy="9144000"/>
@@ -228,7 +229,7 @@
           <a:p>
             <a:fld id="{1F1BAD5C-F1F8-43FF-B1E4-442C6F91B49A}" type="datetimeFigureOut">
               <a:rPr lang="de-DE" smtClean="0"/>
-              <a:t>13.05.2022</a:t>
+              <a:t>16.05.2022</a:t>
             </a:fld>
             <a:endParaRPr lang="de-DE"/>
           </a:p>
@@ -386,7 +387,7 @@
           <a:p>
             <a:fld id="{5976870D-EDE0-4065-9108-FF08285B4E25}" type="slidenum">
               <a:rPr lang="de-DE" smtClean="0"/>
-              <a:t>‹#›</a:t>
+              <a:t>‹Nr.›</a:t>
             </a:fld>
             <a:endParaRPr lang="de-DE"/>
           </a:p>
@@ -820,7 +821,7 @@
           <a:p>
             <a:fld id="{5976870D-EDE0-4065-9108-FF08285B4E25}" type="slidenum">
               <a:rPr lang="de-DE" smtClean="0"/>
-              <a:t>29</a:t>
+              <a:t>30</a:t>
             </a:fld>
             <a:endParaRPr lang="de-DE"/>
           </a:p>
@@ -2289,7 +2290,7 @@
           <a:p>
             <a:fld id="{5976870D-EDE0-4065-9108-FF08285B4E25}" type="slidenum">
               <a:rPr lang="de-DE" smtClean="0"/>
-              <a:t>28</a:t>
+              <a:t>29</a:t>
             </a:fld>
             <a:endParaRPr lang="de-DE"/>
           </a:p>
@@ -2460,7 +2461,7 @@
           <a:p>
             <a:fld id="{C8735BCC-3E06-4614-A9C9-2FA5849F9F0F}" type="datetimeFigureOut">
               <a:rPr lang="de-DE" smtClean="0"/>
-              <a:t>13.05.2022</a:t>
+              <a:t>16.05.2022</a:t>
             </a:fld>
             <a:endParaRPr lang="de-DE"/>
           </a:p>
@@ -2517,7 +2518,7 @@
           <a:p>
             <a:fld id="{B82E1514-0941-4E58-8ADF-3E33D2A7C7AA}" type="slidenum">
               <a:rPr lang="de-DE" smtClean="0"/>
-              <a:t>‹#›</a:t>
+              <a:t>‹Nr.›</a:t>
             </a:fld>
             <a:endParaRPr lang="de-DE"/>
           </a:p>
@@ -2661,7 +2662,7 @@
           <a:p>
             <a:fld id="{C8735BCC-3E06-4614-A9C9-2FA5849F9F0F}" type="datetimeFigureOut">
               <a:rPr lang="de-DE" smtClean="0"/>
-              <a:t>13.05.2022</a:t>
+              <a:t>16.05.2022</a:t>
             </a:fld>
             <a:endParaRPr lang="de-DE"/>
           </a:p>
@@ -2715,7 +2716,7 @@
           <a:p>
             <a:fld id="{B82E1514-0941-4E58-8ADF-3E33D2A7C7AA}" type="slidenum">
               <a:rPr lang="de-DE" smtClean="0"/>
-              <a:t>‹#›</a:t>
+              <a:t>‹Nr.›</a:t>
             </a:fld>
             <a:endParaRPr lang="de-DE"/>
           </a:p>
@@ -2869,7 +2870,7 @@
           <a:p>
             <a:fld id="{C8735BCC-3E06-4614-A9C9-2FA5849F9F0F}" type="datetimeFigureOut">
               <a:rPr lang="de-DE" smtClean="0"/>
-              <a:t>13.05.2022</a:t>
+              <a:t>16.05.2022</a:t>
             </a:fld>
             <a:endParaRPr lang="de-DE"/>
           </a:p>
@@ -2923,7 +2924,7 @@
           <a:p>
             <a:fld id="{B82E1514-0941-4E58-8ADF-3E33D2A7C7AA}" type="slidenum">
               <a:rPr lang="de-DE" smtClean="0"/>
-              <a:t>‹#›</a:t>
+              <a:t>‹Nr.›</a:t>
             </a:fld>
             <a:endParaRPr lang="de-DE"/>
           </a:p>
@@ -3073,7 +3074,7 @@
           <a:p>
             <a:fld id="{C8735BCC-3E06-4614-A9C9-2FA5849F9F0F}" type="datetimeFigureOut">
               <a:rPr lang="de-DE" smtClean="0"/>
-              <a:t>13.05.2022</a:t>
+              <a:t>16.05.2022</a:t>
             </a:fld>
             <a:endParaRPr lang="de-DE"/>
           </a:p>
@@ -3115,7 +3116,7 @@
           <a:p>
             <a:fld id="{B82E1514-0941-4E58-8ADF-3E33D2A7C7AA}" type="slidenum">
               <a:rPr lang="de-DE" smtClean="0"/>
-              <a:t>‹#›</a:t>
+              <a:t>‹Nr.›</a:t>
             </a:fld>
             <a:endParaRPr lang="de-DE"/>
           </a:p>
@@ -3243,7 +3244,7 @@
           <a:p>
             <a:fld id="{C8735BCC-3E06-4614-A9C9-2FA5849F9F0F}" type="datetimeFigureOut">
               <a:rPr lang="de-DE" smtClean="0"/>
-              <a:t>13.05.2022</a:t>
+              <a:t>16.05.2022</a:t>
             </a:fld>
             <a:endParaRPr lang="de-DE"/>
           </a:p>
@@ -3285,7 +3286,7 @@
           <a:p>
             <a:fld id="{B82E1514-0941-4E58-8ADF-3E33D2A7C7AA}" type="slidenum">
               <a:rPr lang="de-DE" smtClean="0"/>
-              <a:t>‹#›</a:t>
+              <a:t>‹Nr.›</a:t>
             </a:fld>
             <a:endParaRPr lang="de-DE"/>
           </a:p>
@@ -3489,7 +3490,7 @@
           <a:p>
             <a:fld id="{C8735BCC-3E06-4614-A9C9-2FA5849F9F0F}" type="datetimeFigureOut">
               <a:rPr lang="de-DE" smtClean="0"/>
-              <a:t>13.05.2022</a:t>
+              <a:t>16.05.2022</a:t>
             </a:fld>
             <a:endParaRPr lang="de-DE"/>
           </a:p>
@@ -3531,7 +3532,7 @@
           <a:p>
             <a:fld id="{B82E1514-0941-4E58-8ADF-3E33D2A7C7AA}" type="slidenum">
               <a:rPr lang="de-DE" smtClean="0"/>
-              <a:t>‹#›</a:t>
+              <a:t>‹Nr.›</a:t>
             </a:fld>
             <a:endParaRPr lang="de-DE"/>
           </a:p>
@@ -3721,7 +3722,7 @@
           <a:p>
             <a:fld id="{C8735BCC-3E06-4614-A9C9-2FA5849F9F0F}" type="datetimeFigureOut">
               <a:rPr lang="de-DE" smtClean="0"/>
-              <a:t>13.05.2022</a:t>
+              <a:t>16.05.2022</a:t>
             </a:fld>
             <a:endParaRPr lang="de-DE"/>
           </a:p>
@@ -3763,7 +3764,7 @@
           <a:p>
             <a:fld id="{B82E1514-0941-4E58-8ADF-3E33D2A7C7AA}" type="slidenum">
               <a:rPr lang="de-DE" smtClean="0"/>
-              <a:t>‹#›</a:t>
+              <a:t>‹Nr.›</a:t>
             </a:fld>
             <a:endParaRPr lang="de-DE"/>
           </a:p>
@@ -4088,7 +4089,7 @@
           <a:p>
             <a:fld id="{C8735BCC-3E06-4614-A9C9-2FA5849F9F0F}" type="datetimeFigureOut">
               <a:rPr lang="de-DE" smtClean="0"/>
-              <a:t>13.05.2022</a:t>
+              <a:t>16.05.2022</a:t>
             </a:fld>
             <a:endParaRPr lang="de-DE"/>
           </a:p>
@@ -4130,7 +4131,7 @@
           <a:p>
             <a:fld id="{B82E1514-0941-4E58-8ADF-3E33D2A7C7AA}" type="slidenum">
               <a:rPr lang="de-DE" smtClean="0"/>
-              <a:t>‹#›</a:t>
+              <a:t>‹Nr.›</a:t>
             </a:fld>
             <a:endParaRPr lang="de-DE"/>
           </a:p>
@@ -4206,7 +4207,7 @@
           <a:p>
             <a:fld id="{C8735BCC-3E06-4614-A9C9-2FA5849F9F0F}" type="datetimeFigureOut">
               <a:rPr lang="de-DE" smtClean="0"/>
-              <a:t>13.05.2022</a:t>
+              <a:t>16.05.2022</a:t>
             </a:fld>
             <a:endParaRPr lang="de-DE"/>
           </a:p>
@@ -4248,7 +4249,7 @@
           <a:p>
             <a:fld id="{B82E1514-0941-4E58-8ADF-3E33D2A7C7AA}" type="slidenum">
               <a:rPr lang="de-DE" smtClean="0"/>
-              <a:t>‹#›</a:t>
+              <a:t>‹Nr.›</a:t>
             </a:fld>
             <a:endParaRPr lang="de-DE"/>
           </a:p>
@@ -4301,7 +4302,7 @@
           <a:p>
             <a:fld id="{C8735BCC-3E06-4614-A9C9-2FA5849F9F0F}" type="datetimeFigureOut">
               <a:rPr lang="de-DE" smtClean="0"/>
-              <a:t>13.05.2022</a:t>
+              <a:t>16.05.2022</a:t>
             </a:fld>
             <a:endParaRPr lang="de-DE"/>
           </a:p>
@@ -4343,7 +4344,7 @@
           <a:p>
             <a:fld id="{B82E1514-0941-4E58-8ADF-3E33D2A7C7AA}" type="slidenum">
               <a:rPr lang="de-DE" smtClean="0"/>
-              <a:t>‹#›</a:t>
+              <a:t>‹Nr.›</a:t>
             </a:fld>
             <a:endParaRPr lang="de-DE"/>
           </a:p>
@@ -4578,7 +4579,7 @@
           <a:p>
             <a:fld id="{C8735BCC-3E06-4614-A9C9-2FA5849F9F0F}" type="datetimeFigureOut">
               <a:rPr lang="de-DE" smtClean="0"/>
-              <a:t>13.05.2022</a:t>
+              <a:t>16.05.2022</a:t>
             </a:fld>
             <a:endParaRPr lang="de-DE"/>
           </a:p>
@@ -4620,7 +4621,7 @@
           <a:p>
             <a:fld id="{B82E1514-0941-4E58-8ADF-3E33D2A7C7AA}" type="slidenum">
               <a:rPr lang="de-DE" smtClean="0"/>
-              <a:t>‹#›</a:t>
+              <a:t>‹Nr.›</a:t>
             </a:fld>
             <a:endParaRPr lang="de-DE"/>
           </a:p>
@@ -4824,7 +4825,7 @@
             <a:fld id="{C8735BCC-3E06-4614-A9C9-2FA5849F9F0F}" type="datetimeFigureOut">
               <a:rPr lang="de-DE" smtClean="0"/>
               <a:pPr/>
-              <a:t>13.05.2022</a:t>
+              <a:t>16.05.2022</a:t>
             </a:fld>
             <a:endParaRPr lang="de-DE"/>
           </a:p>
@@ -4899,7 +4900,7 @@
             <a:fld id="{B82E1514-0941-4E58-8ADF-3E33D2A7C7AA}" type="slidenum">
               <a:rPr lang="de-DE" smtClean="0"/>
               <a:pPr/>
-              <a:t>‹#›</a:t>
+              <a:t>‹Nr.›</a:t>
             </a:fld>
             <a:endParaRPr lang="de-DE"/>
           </a:p>
@@ -5114,7 +5115,7 @@
           <a:p>
             <a:fld id="{C8735BCC-3E06-4614-A9C9-2FA5849F9F0F}" type="datetimeFigureOut">
               <a:rPr lang="de-DE" smtClean="0"/>
-              <a:t>13.05.2022</a:t>
+              <a:t>16.05.2022</a:t>
             </a:fld>
             <a:endParaRPr lang="de-DE"/>
           </a:p>
@@ -5156,7 +5157,7 @@
           <a:p>
             <a:fld id="{B82E1514-0941-4E58-8ADF-3E33D2A7C7AA}" type="slidenum">
               <a:rPr lang="de-DE" smtClean="0"/>
-              <a:t>‹#›</a:t>
+              <a:t>‹Nr.›</a:t>
             </a:fld>
             <a:endParaRPr lang="de-DE"/>
           </a:p>
@@ -5284,7 +5285,7 @@
           <a:p>
             <a:fld id="{C8735BCC-3E06-4614-A9C9-2FA5849F9F0F}" type="datetimeFigureOut">
               <a:rPr lang="de-DE" smtClean="0"/>
-              <a:t>13.05.2022</a:t>
+              <a:t>16.05.2022</a:t>
             </a:fld>
             <a:endParaRPr lang="de-DE"/>
           </a:p>
@@ -5326,7 +5327,7 @@
           <a:p>
             <a:fld id="{B82E1514-0941-4E58-8ADF-3E33D2A7C7AA}" type="slidenum">
               <a:rPr lang="de-DE" smtClean="0"/>
-              <a:t>‹#›</a:t>
+              <a:t>‹Nr.›</a:t>
             </a:fld>
             <a:endParaRPr lang="de-DE"/>
           </a:p>
@@ -5464,7 +5465,7 @@
           <a:p>
             <a:fld id="{C8735BCC-3E06-4614-A9C9-2FA5849F9F0F}" type="datetimeFigureOut">
               <a:rPr lang="de-DE" smtClean="0"/>
-              <a:t>13.05.2022</a:t>
+              <a:t>16.05.2022</a:t>
             </a:fld>
             <a:endParaRPr lang="de-DE"/>
           </a:p>
@@ -5506,7 +5507,7 @@
           <a:p>
             <a:fld id="{B82E1514-0941-4E58-8ADF-3E33D2A7C7AA}" type="slidenum">
               <a:rPr lang="de-DE" smtClean="0"/>
-              <a:t>‹#›</a:t>
+              <a:t>‹Nr.›</a:t>
             </a:fld>
             <a:endParaRPr lang="de-DE"/>
           </a:p>
@@ -5727,7 +5728,7 @@
           <a:p>
             <a:fld id="{C8735BCC-3E06-4614-A9C9-2FA5849F9F0F}" type="datetimeFigureOut">
               <a:rPr lang="de-DE" smtClean="0"/>
-              <a:t>13.05.2022</a:t>
+              <a:t>16.05.2022</a:t>
             </a:fld>
             <a:endParaRPr lang="de-DE"/>
           </a:p>
@@ -5784,7 +5785,7 @@
           <a:p>
             <a:fld id="{B82E1514-0941-4E58-8ADF-3E33D2A7C7AA}" type="slidenum">
               <a:rPr lang="de-DE" smtClean="0"/>
-              <a:t>‹#›</a:t>
+              <a:t>‹Nr.›</a:t>
             </a:fld>
             <a:endParaRPr lang="de-DE"/>
           </a:p>
@@ -5995,7 +5996,7 @@
           <a:p>
             <a:fld id="{C8735BCC-3E06-4614-A9C9-2FA5849F9F0F}" type="datetimeFigureOut">
               <a:rPr lang="de-DE" smtClean="0"/>
-              <a:t>13.05.2022</a:t>
+              <a:t>16.05.2022</a:t>
             </a:fld>
             <a:endParaRPr lang="de-DE"/>
           </a:p>
@@ -6052,7 +6053,7 @@
           <a:p>
             <a:fld id="{B82E1514-0941-4E58-8ADF-3E33D2A7C7AA}" type="slidenum">
               <a:rPr lang="de-DE" smtClean="0"/>
-              <a:t>‹#›</a:t>
+              <a:t>‹Nr.›</a:t>
             </a:fld>
             <a:endParaRPr lang="de-DE"/>
           </a:p>
@@ -6410,7 +6411,7 @@
           <a:p>
             <a:fld id="{C8735BCC-3E06-4614-A9C9-2FA5849F9F0F}" type="datetimeFigureOut">
               <a:rPr lang="de-DE" smtClean="0"/>
-              <a:t>13.05.2022</a:t>
+              <a:t>16.05.2022</a:t>
             </a:fld>
             <a:endParaRPr lang="de-DE"/>
           </a:p>
@@ -6464,7 +6465,7 @@
           <a:p>
             <a:fld id="{B82E1514-0941-4E58-8ADF-3E33D2A7C7AA}" type="slidenum">
               <a:rPr lang="de-DE" smtClean="0"/>
-              <a:t>‹#›</a:t>
+              <a:t>‹Nr.›</a:t>
             </a:fld>
             <a:endParaRPr lang="de-DE"/>
           </a:p>
@@ -6551,7 +6552,7 @@
           <a:p>
             <a:fld id="{C8735BCC-3E06-4614-A9C9-2FA5849F9F0F}" type="datetimeFigureOut">
               <a:rPr lang="de-DE" smtClean="0"/>
-              <a:t>13.05.2022</a:t>
+              <a:t>16.05.2022</a:t>
             </a:fld>
             <a:endParaRPr lang="de-DE"/>
           </a:p>
@@ -6605,7 +6606,7 @@
           <a:p>
             <a:fld id="{B82E1514-0941-4E58-8ADF-3E33D2A7C7AA}" type="slidenum">
               <a:rPr lang="de-DE" smtClean="0"/>
-              <a:t>‹#›</a:t>
+              <a:t>‹Nr.›</a:t>
             </a:fld>
             <a:endParaRPr lang="de-DE"/>
           </a:p>
@@ -6664,7 +6665,7 @@
           <a:p>
             <a:fld id="{C8735BCC-3E06-4614-A9C9-2FA5849F9F0F}" type="datetimeFigureOut">
               <a:rPr lang="de-DE" smtClean="0"/>
-              <a:t>13.05.2022</a:t>
+              <a:t>16.05.2022</a:t>
             </a:fld>
             <a:endParaRPr lang="de-DE"/>
           </a:p>
@@ -6718,7 +6719,7 @@
           <a:p>
             <a:fld id="{B82E1514-0941-4E58-8ADF-3E33D2A7C7AA}" type="slidenum">
               <a:rPr lang="de-DE" smtClean="0"/>
-              <a:t>‹#›</a:t>
+              <a:t>‹Nr.›</a:t>
             </a:fld>
             <a:endParaRPr lang="de-DE"/>
           </a:p>
@@ -6975,7 +6976,7 @@
           <a:p>
             <a:fld id="{C8735BCC-3E06-4614-A9C9-2FA5849F9F0F}" type="datetimeFigureOut">
               <a:rPr lang="de-DE" smtClean="0"/>
-              <a:t>13.05.2022</a:t>
+              <a:t>16.05.2022</a:t>
             </a:fld>
             <a:endParaRPr lang="de-DE"/>
           </a:p>
@@ -7029,7 +7030,7 @@
           <a:p>
             <a:fld id="{B82E1514-0941-4E58-8ADF-3E33D2A7C7AA}" type="slidenum">
               <a:rPr lang="de-DE" smtClean="0"/>
-              <a:t>‹#›</a:t>
+              <a:t>‹Nr.›</a:t>
             </a:fld>
             <a:endParaRPr lang="de-DE"/>
           </a:p>
@@ -7263,7 +7264,7 @@
           <a:p>
             <a:fld id="{C8735BCC-3E06-4614-A9C9-2FA5849F9F0F}" type="datetimeFigureOut">
               <a:rPr lang="de-DE" smtClean="0"/>
-              <a:t>13.05.2022</a:t>
+              <a:t>16.05.2022</a:t>
             </a:fld>
             <a:endParaRPr lang="de-DE"/>
           </a:p>
@@ -7317,7 +7318,7 @@
           <a:p>
             <a:fld id="{B82E1514-0941-4E58-8ADF-3E33D2A7C7AA}" type="slidenum">
               <a:rPr lang="de-DE" smtClean="0"/>
-              <a:t>‹#›</a:t>
+              <a:t>‹Nr.›</a:t>
             </a:fld>
             <a:endParaRPr lang="de-DE"/>
           </a:p>
@@ -7504,7 +7505,7 @@
           <a:p>
             <a:fld id="{C8735BCC-3E06-4614-A9C9-2FA5849F9F0F}" type="datetimeFigureOut">
               <a:rPr lang="de-DE" smtClean="0"/>
-              <a:t>13.05.2022</a:t>
+              <a:t>16.05.2022</a:t>
             </a:fld>
             <a:endParaRPr lang="de-DE"/>
           </a:p>
@@ -7594,7 +7595,7 @@
           <a:p>
             <a:fld id="{B82E1514-0941-4E58-8ADF-3E33D2A7C7AA}" type="slidenum">
               <a:rPr lang="de-DE" smtClean="0"/>
-              <a:t>‹#›</a:t>
+              <a:t>‹Nr.›</a:t>
             </a:fld>
             <a:endParaRPr lang="de-DE"/>
           </a:p>
@@ -8056,7 +8057,7 @@
           <a:p>
             <a:fld id="{C8735BCC-3E06-4614-A9C9-2FA5849F9F0F}" type="datetimeFigureOut">
               <a:rPr lang="de-DE" smtClean="0"/>
-              <a:t>13.05.2022</a:t>
+              <a:t>16.05.2022</a:t>
             </a:fld>
             <a:endParaRPr lang="de-DE"/>
           </a:p>
@@ -8134,7 +8135,7 @@
           <a:p>
             <a:fld id="{B82E1514-0941-4E58-8ADF-3E33D2A7C7AA}" type="slidenum">
               <a:rPr lang="de-DE" smtClean="0"/>
-              <a:t>‹#›</a:t>
+              <a:t>‹Nr.›</a:t>
             </a:fld>
             <a:endParaRPr lang="de-DE"/>
           </a:p>
@@ -9555,7 +9556,7 @@
         </p:blipFill>
         <p:spPr>
           <a:xfrm>
-            <a:off x="10274650" y="417951"/>
+            <a:off x="10274650" y="410000"/>
             <a:ext cx="1079150" cy="1219909"/>
           </a:xfrm>
           <a:prstGeom prst="rect">
@@ -10702,7 +10703,7 @@
         </p:blipFill>
         <p:spPr>
           <a:xfrm>
-            <a:off x="9491753" y="457654"/>
+            <a:off x="9491753" y="449702"/>
             <a:ext cx="1862047" cy="1140504"/>
           </a:xfrm>
           <a:prstGeom prst="rect">
@@ -16142,7 +16143,7 @@
           <a:p>
             <a:r>
               <a:rPr lang="de-DE" dirty="0"/>
-              <a:t>Possible </a:t>
+              <a:t>Challenges &amp; </a:t>
             </a:r>
             <a:r>
               <a:rPr lang="de-DE" dirty="0" err="1"/>
@@ -16191,6 +16192,830 @@
 </file>
 
 <file path=ppt/slides/slide28.xml><?xml version="1.0" encoding="utf-8"?>
+<p:sld xmlns:a="http://schemas.openxmlformats.org/drawingml/2006/main" xmlns:r="http://schemas.openxmlformats.org/officeDocument/2006/relationships" xmlns:p="http://schemas.openxmlformats.org/presentationml/2006/main">
+  <p:cSld>
+    <p:spTree>
+      <p:nvGrpSpPr>
+        <p:cNvPr id="1" name=""/>
+        <p:cNvGrpSpPr/>
+        <p:nvPr/>
+      </p:nvGrpSpPr>
+      <p:grpSpPr>
+        <a:xfrm>
+          <a:off x="0" y="0"/>
+          <a:ext cx="0" cy="0"/>
+          <a:chOff x="0" y="0"/>
+          <a:chExt cx="0" cy="0"/>
+        </a:xfrm>
+      </p:grpSpPr>
+      <p:sp>
+        <p:nvSpPr>
+          <p:cNvPr id="2" name="Titel 1">
+            <a:extLst>
+              <a:ext uri="{FF2B5EF4-FFF2-40B4-BE49-F238E27FC236}">
+                <a16:creationId xmlns:a16="http://schemas.microsoft.com/office/drawing/2014/main" id="{6092176D-1400-A5D5-981A-F3BF62D639B7}"/>
+              </a:ext>
+            </a:extLst>
+          </p:cNvPr>
+          <p:cNvSpPr>
+            <a:spLocks noGrp="1"/>
+          </p:cNvSpPr>
+          <p:nvPr>
+            <p:ph type="title"/>
+          </p:nvPr>
+        </p:nvSpPr>
+        <p:spPr/>
+        <p:txBody>
+          <a:bodyPr/>
+          <a:lstStyle/>
+          <a:p>
+            <a:r>
+              <a:rPr lang="de-DE" dirty="0"/>
+              <a:t>Challenges</a:t>
+            </a:r>
+          </a:p>
+        </p:txBody>
+      </p:sp>
+      <p:graphicFrame>
+        <p:nvGraphicFramePr>
+          <p:cNvPr id="4" name="Tabelle 4">
+            <a:extLst>
+              <a:ext uri="{FF2B5EF4-FFF2-40B4-BE49-F238E27FC236}">
+                <a16:creationId xmlns:a16="http://schemas.microsoft.com/office/drawing/2014/main" id="{C86F06B0-8B35-CFA3-466D-DC451C0DFFA4}"/>
+              </a:ext>
+            </a:extLst>
+          </p:cNvPr>
+          <p:cNvGraphicFramePr>
+            <a:graphicFrameLocks noGrp="1"/>
+          </p:cNvGraphicFramePr>
+          <p:nvPr>
+            <p:ph idx="1"/>
+            <p:extLst>
+              <p:ext uri="{D42A27DB-BD31-4B8C-83A1-F6EECF244321}">
+                <p14:modId xmlns:p14="http://schemas.microsoft.com/office/powerpoint/2010/main" val="1068812017"/>
+              </p:ext>
+            </p:extLst>
+          </p:nvPr>
+        </p:nvGraphicFramePr>
+        <p:xfrm>
+          <a:off x="838197" y="2345635"/>
+          <a:ext cx="10515597" cy="2701056"/>
+        </p:xfrm>
+        <a:graphic>
+          <a:graphicData uri="http://schemas.openxmlformats.org/drawingml/2006/table">
+            <a:tbl>
+              <a:tblPr firstRow="1" bandRow="1">
+                <a:tableStyleId>{2D5ABB26-0587-4C30-8999-92F81FD0307C}</a:tableStyleId>
+              </a:tblPr>
+              <a:tblGrid>
+                <a:gridCol w="3505199">
+                  <a:extLst>
+                    <a:ext uri="{9D8B030D-6E8A-4147-A177-3AD203B41FA5}">
+                      <a16:colId xmlns:a16="http://schemas.microsoft.com/office/drawing/2014/main" val="3592780068"/>
+                    </a:ext>
+                  </a:extLst>
+                </a:gridCol>
+                <a:gridCol w="3505199">
+                  <a:extLst>
+                    <a:ext uri="{9D8B030D-6E8A-4147-A177-3AD203B41FA5}">
+                      <a16:colId xmlns:a16="http://schemas.microsoft.com/office/drawing/2014/main" val="2379554404"/>
+                    </a:ext>
+                  </a:extLst>
+                </a:gridCol>
+                <a:gridCol w="3505199">
+                  <a:extLst>
+                    <a:ext uri="{9D8B030D-6E8A-4147-A177-3AD203B41FA5}">
+                      <a16:colId xmlns:a16="http://schemas.microsoft.com/office/drawing/2014/main" val="2720965873"/>
+                    </a:ext>
+                  </a:extLst>
+                </a:gridCol>
+              </a:tblGrid>
+              <a:tr h="900352">
+                <a:tc>
+                  <a:txBody>
+                    <a:bodyPr/>
+                    <a:lstStyle/>
+                    <a:p>
+                      <a:pPr algn="ctr"/>
+                      <a:endParaRPr lang="de-DE" sz="2000" dirty="0">
+                        <a:latin typeface="+mj-lt"/>
+                      </a:endParaRPr>
+                    </a:p>
+                  </a:txBody>
+                  <a:tcPr>
+                    <a:lnL w="12700" cap="flat" cmpd="sng" algn="ctr">
+                      <a:solidFill>
+                        <a:schemeClr val="tx1"/>
+                      </a:solidFill>
+                      <a:prstDash val="solid"/>
+                      <a:round/>
+                      <a:headEnd type="none" w="med" len="med"/>
+                      <a:tailEnd type="none" w="med" len="med"/>
+                    </a:lnL>
+                    <a:lnR w="12700" cap="flat" cmpd="sng" algn="ctr">
+                      <a:solidFill>
+                        <a:schemeClr val="tx1"/>
+                      </a:solidFill>
+                      <a:prstDash val="solid"/>
+                      <a:round/>
+                      <a:headEnd type="none" w="med" len="med"/>
+                      <a:tailEnd type="none" w="med" len="med"/>
+                    </a:lnR>
+                    <a:lnT w="12700" cap="flat" cmpd="sng" algn="ctr">
+                      <a:solidFill>
+                        <a:schemeClr val="tx1"/>
+                      </a:solidFill>
+                      <a:prstDash val="solid"/>
+                      <a:round/>
+                      <a:headEnd type="none" w="med" len="med"/>
+                      <a:tailEnd type="none" w="med" len="med"/>
+                    </a:lnT>
+                    <a:lnB w="12700" cap="flat" cmpd="sng" algn="ctr">
+                      <a:solidFill>
+                        <a:schemeClr val="tx1"/>
+                      </a:solidFill>
+                      <a:prstDash val="solid"/>
+                      <a:round/>
+                      <a:headEnd type="none" w="med" len="med"/>
+                      <a:tailEnd type="none" w="med" len="med"/>
+                    </a:lnB>
+                  </a:tcPr>
+                </a:tc>
+                <a:tc>
+                  <a:txBody>
+                    <a:bodyPr/>
+                    <a:lstStyle/>
+                    <a:p>
+                      <a:pPr algn="ctr"/>
+                      <a:endParaRPr lang="de-DE" sz="2000" dirty="0">
+                        <a:latin typeface="+mj-lt"/>
+                      </a:endParaRPr>
+                    </a:p>
+                  </a:txBody>
+                  <a:tcPr>
+                    <a:lnL w="12700" cap="flat" cmpd="sng" algn="ctr">
+                      <a:solidFill>
+                        <a:schemeClr val="tx1"/>
+                      </a:solidFill>
+                      <a:prstDash val="solid"/>
+                      <a:round/>
+                      <a:headEnd type="none" w="med" len="med"/>
+                      <a:tailEnd type="none" w="med" len="med"/>
+                    </a:lnL>
+                    <a:lnR w="12700" cap="flat" cmpd="sng" algn="ctr">
+                      <a:solidFill>
+                        <a:schemeClr val="tx1"/>
+                      </a:solidFill>
+                      <a:prstDash val="solid"/>
+                      <a:round/>
+                      <a:headEnd type="none" w="med" len="med"/>
+                      <a:tailEnd type="none" w="med" len="med"/>
+                    </a:lnR>
+                    <a:lnT w="12700" cap="flat" cmpd="sng" algn="ctr">
+                      <a:solidFill>
+                        <a:schemeClr val="tx1"/>
+                      </a:solidFill>
+                      <a:prstDash val="solid"/>
+                      <a:round/>
+                      <a:headEnd type="none" w="med" len="med"/>
+                      <a:tailEnd type="none" w="med" len="med"/>
+                    </a:lnT>
+                    <a:lnB w="12700" cap="flat" cmpd="sng" algn="ctr">
+                      <a:solidFill>
+                        <a:schemeClr val="tx1"/>
+                      </a:solidFill>
+                      <a:prstDash val="solid"/>
+                      <a:round/>
+                      <a:headEnd type="none" w="med" len="med"/>
+                      <a:tailEnd type="none" w="med" len="med"/>
+                    </a:lnB>
+                  </a:tcPr>
+                </a:tc>
+                <a:tc>
+                  <a:txBody>
+                    <a:bodyPr/>
+                    <a:lstStyle/>
+                    <a:p>
+                      <a:pPr algn="ctr"/>
+                      <a:endParaRPr lang="de-DE" sz="2000" dirty="0">
+                        <a:latin typeface="+mj-lt"/>
+                      </a:endParaRPr>
+                    </a:p>
+                  </a:txBody>
+                  <a:tcPr>
+                    <a:lnL w="12700" cap="flat" cmpd="sng" algn="ctr">
+                      <a:solidFill>
+                        <a:schemeClr val="tx1"/>
+                      </a:solidFill>
+                      <a:prstDash val="solid"/>
+                      <a:round/>
+                      <a:headEnd type="none" w="med" len="med"/>
+                      <a:tailEnd type="none" w="med" len="med"/>
+                    </a:lnL>
+                    <a:lnR w="12700" cap="flat" cmpd="sng" algn="ctr">
+                      <a:solidFill>
+                        <a:schemeClr val="tx1"/>
+                      </a:solidFill>
+                      <a:prstDash val="solid"/>
+                      <a:round/>
+                      <a:headEnd type="none" w="med" len="med"/>
+                      <a:tailEnd type="none" w="med" len="med"/>
+                    </a:lnR>
+                    <a:lnT w="12700" cap="flat" cmpd="sng" algn="ctr">
+                      <a:solidFill>
+                        <a:schemeClr val="tx1"/>
+                      </a:solidFill>
+                      <a:prstDash val="solid"/>
+                      <a:round/>
+                      <a:headEnd type="none" w="med" len="med"/>
+                      <a:tailEnd type="none" w="med" len="med"/>
+                    </a:lnT>
+                    <a:lnB w="12700" cap="flat" cmpd="sng" algn="ctr">
+                      <a:solidFill>
+                        <a:schemeClr val="tx1"/>
+                      </a:solidFill>
+                      <a:prstDash val="solid"/>
+                      <a:round/>
+                      <a:headEnd type="none" w="med" len="med"/>
+                      <a:tailEnd type="none" w="med" len="med"/>
+                    </a:lnB>
+                  </a:tcPr>
+                </a:tc>
+                <a:extLst>
+                  <a:ext uri="{0D108BD9-81ED-4DB2-BD59-A6C34878D82A}">
+                    <a16:rowId xmlns:a16="http://schemas.microsoft.com/office/drawing/2014/main" val="592435258"/>
+                  </a:ext>
+                </a:extLst>
+              </a:tr>
+              <a:tr h="900352">
+                <a:tc>
+                  <a:txBody>
+                    <a:bodyPr/>
+                    <a:lstStyle/>
+                    <a:p>
+                      <a:pPr algn="ctr"/>
+                      <a:r>
+                        <a:rPr lang="de-DE" sz="2000" dirty="0">
+                          <a:latin typeface="+mj-lt"/>
+                        </a:rPr>
+                        <a:t>Terraform State</a:t>
+                      </a:r>
+                    </a:p>
+                  </a:txBody>
+                  <a:tcPr anchor="ctr">
+                    <a:lnL w="12700" cap="flat" cmpd="sng" algn="ctr">
+                      <a:solidFill>
+                        <a:schemeClr val="tx1"/>
+                      </a:solidFill>
+                      <a:prstDash val="solid"/>
+                      <a:round/>
+                      <a:headEnd type="none" w="med" len="med"/>
+                      <a:tailEnd type="none" w="med" len="med"/>
+                    </a:lnL>
+                    <a:lnR w="12700" cap="flat" cmpd="sng" algn="ctr">
+                      <a:solidFill>
+                        <a:schemeClr val="tx1"/>
+                      </a:solidFill>
+                      <a:prstDash val="solid"/>
+                      <a:round/>
+                      <a:headEnd type="none" w="med" len="med"/>
+                      <a:tailEnd type="none" w="med" len="med"/>
+                    </a:lnR>
+                    <a:lnT w="12700" cap="flat" cmpd="sng" algn="ctr">
+                      <a:solidFill>
+                        <a:schemeClr val="tx1"/>
+                      </a:solidFill>
+                      <a:prstDash val="solid"/>
+                      <a:round/>
+                      <a:headEnd type="none" w="med" len="med"/>
+                      <a:tailEnd type="none" w="med" len="med"/>
+                    </a:lnT>
+                    <a:lnB w="12700" cap="flat" cmpd="sng" algn="ctr">
+                      <a:solidFill>
+                        <a:schemeClr val="tx1"/>
+                      </a:solidFill>
+                      <a:prstDash val="solid"/>
+                      <a:round/>
+                      <a:headEnd type="none" w="med" len="med"/>
+                      <a:tailEnd type="none" w="med" len="med"/>
+                    </a:lnB>
+                  </a:tcPr>
+                </a:tc>
+                <a:tc>
+                  <a:txBody>
+                    <a:bodyPr/>
+                    <a:lstStyle/>
+                    <a:p>
+                      <a:pPr algn="ctr"/>
+                      <a:r>
+                        <a:rPr lang="de-DE" sz="2000" dirty="0" err="1">
+                          <a:latin typeface="+mj-lt"/>
+                        </a:rPr>
+                        <a:t>User_data</a:t>
+                      </a:r>
+                      <a:r>
+                        <a:rPr lang="de-DE" sz="2000" dirty="0">
+                          <a:latin typeface="+mj-lt"/>
+                        </a:rPr>
+                        <a:t>, SSH and EIP</a:t>
+                      </a:r>
+                    </a:p>
+                  </a:txBody>
+                  <a:tcPr anchor="ctr">
+                    <a:lnL w="12700" cap="flat" cmpd="sng" algn="ctr">
+                      <a:solidFill>
+                        <a:schemeClr val="tx1"/>
+                      </a:solidFill>
+                      <a:prstDash val="solid"/>
+                      <a:round/>
+                      <a:headEnd type="none" w="med" len="med"/>
+                      <a:tailEnd type="none" w="med" len="med"/>
+                    </a:lnL>
+                    <a:lnR w="12700" cap="flat" cmpd="sng" algn="ctr">
+                      <a:solidFill>
+                        <a:schemeClr val="tx1"/>
+                      </a:solidFill>
+                      <a:prstDash val="solid"/>
+                      <a:round/>
+                      <a:headEnd type="none" w="med" len="med"/>
+                      <a:tailEnd type="none" w="med" len="med"/>
+                    </a:lnR>
+                    <a:lnT w="12700" cap="flat" cmpd="sng" algn="ctr">
+                      <a:solidFill>
+                        <a:schemeClr val="tx1"/>
+                      </a:solidFill>
+                      <a:prstDash val="solid"/>
+                      <a:round/>
+                      <a:headEnd type="none" w="med" len="med"/>
+                      <a:tailEnd type="none" w="med" len="med"/>
+                    </a:lnT>
+                    <a:lnB w="12700" cap="flat" cmpd="sng" algn="ctr">
+                      <a:solidFill>
+                        <a:schemeClr val="tx1"/>
+                      </a:solidFill>
+                      <a:prstDash val="solid"/>
+                      <a:round/>
+                      <a:headEnd type="none" w="med" len="med"/>
+                      <a:tailEnd type="none" w="med" len="med"/>
+                    </a:lnB>
+                  </a:tcPr>
+                </a:tc>
+                <a:tc>
+                  <a:txBody>
+                    <a:bodyPr/>
+                    <a:lstStyle/>
+                    <a:p>
+                      <a:pPr algn="ctr"/>
+                      <a:r>
+                        <a:rPr lang="de-DE" sz="2000" dirty="0">
+                          <a:latin typeface="+mj-lt"/>
+                        </a:rPr>
+                        <a:t>Security Rules</a:t>
+                      </a:r>
+                    </a:p>
+                  </a:txBody>
+                  <a:tcPr anchor="ctr">
+                    <a:lnL w="12700" cap="flat" cmpd="sng" algn="ctr">
+                      <a:solidFill>
+                        <a:schemeClr val="tx1"/>
+                      </a:solidFill>
+                      <a:prstDash val="solid"/>
+                      <a:round/>
+                      <a:headEnd type="none" w="med" len="med"/>
+                      <a:tailEnd type="none" w="med" len="med"/>
+                    </a:lnL>
+                    <a:lnR w="12700" cap="flat" cmpd="sng" algn="ctr">
+                      <a:solidFill>
+                        <a:schemeClr val="tx1"/>
+                      </a:solidFill>
+                      <a:prstDash val="solid"/>
+                      <a:round/>
+                      <a:headEnd type="none" w="med" len="med"/>
+                      <a:tailEnd type="none" w="med" len="med"/>
+                    </a:lnR>
+                    <a:lnT w="12700" cap="flat" cmpd="sng" algn="ctr">
+                      <a:solidFill>
+                        <a:schemeClr val="tx1"/>
+                      </a:solidFill>
+                      <a:prstDash val="solid"/>
+                      <a:round/>
+                      <a:headEnd type="none" w="med" len="med"/>
+                      <a:tailEnd type="none" w="med" len="med"/>
+                    </a:lnT>
+                    <a:lnB w="12700" cap="flat" cmpd="sng" algn="ctr">
+                      <a:solidFill>
+                        <a:schemeClr val="tx1"/>
+                      </a:solidFill>
+                      <a:prstDash val="solid"/>
+                      <a:round/>
+                      <a:headEnd type="none" w="med" len="med"/>
+                      <a:tailEnd type="none" w="med" len="med"/>
+                    </a:lnB>
+                  </a:tcPr>
+                </a:tc>
+                <a:extLst>
+                  <a:ext uri="{0D108BD9-81ED-4DB2-BD59-A6C34878D82A}">
+                    <a16:rowId xmlns:a16="http://schemas.microsoft.com/office/drawing/2014/main" val="2689379650"/>
+                  </a:ext>
+                </a:extLst>
+              </a:tr>
+              <a:tr h="900352">
+                <a:tc>
+                  <a:txBody>
+                    <a:bodyPr/>
+                    <a:lstStyle/>
+                    <a:p>
+                      <a:pPr algn="ctr"/>
+                      <a:r>
+                        <a:rPr lang="de-DE" sz="2000" dirty="0">
+                          <a:solidFill>
+                            <a:srgbClr val="00B050"/>
+                          </a:solidFill>
+                        </a:rPr>
+                        <a:t>Use Terraform Remote Backend</a:t>
+                      </a:r>
+                    </a:p>
+                  </a:txBody>
+                  <a:tcPr anchor="ctr">
+                    <a:lnL w="12700" cap="flat" cmpd="sng" algn="ctr">
+                      <a:solidFill>
+                        <a:schemeClr val="tx1"/>
+                      </a:solidFill>
+                      <a:prstDash val="solid"/>
+                      <a:round/>
+                      <a:headEnd type="none" w="med" len="med"/>
+                      <a:tailEnd type="none" w="med" len="med"/>
+                    </a:lnL>
+                    <a:lnR w="12700" cap="flat" cmpd="sng" algn="ctr">
+                      <a:solidFill>
+                        <a:schemeClr val="tx1"/>
+                      </a:solidFill>
+                      <a:prstDash val="solid"/>
+                      <a:round/>
+                      <a:headEnd type="none" w="med" len="med"/>
+                      <a:tailEnd type="none" w="med" len="med"/>
+                    </a:lnR>
+                    <a:lnT w="12700" cap="flat" cmpd="sng" algn="ctr">
+                      <a:solidFill>
+                        <a:schemeClr val="tx1"/>
+                      </a:solidFill>
+                      <a:prstDash val="solid"/>
+                      <a:round/>
+                      <a:headEnd type="none" w="med" len="med"/>
+                      <a:tailEnd type="none" w="med" len="med"/>
+                    </a:lnT>
+                    <a:lnB w="12700" cap="flat" cmpd="sng" algn="ctr">
+                      <a:solidFill>
+                        <a:schemeClr val="tx1"/>
+                      </a:solidFill>
+                      <a:prstDash val="solid"/>
+                      <a:round/>
+                      <a:headEnd type="none" w="med" len="med"/>
+                      <a:tailEnd type="none" w="med" len="med"/>
+                    </a:lnB>
+                  </a:tcPr>
+                </a:tc>
+                <a:tc>
+                  <a:txBody>
+                    <a:bodyPr/>
+                    <a:lstStyle/>
+                    <a:p>
+                      <a:pPr algn="ctr"/>
+                      <a:r>
+                        <a:rPr lang="de-DE" sz="2000" dirty="0" err="1">
+                          <a:solidFill>
+                            <a:srgbClr val="00B050"/>
+                          </a:solidFill>
+                        </a:rPr>
+                        <a:t>User_data</a:t>
+                      </a:r>
+                      <a:r>
+                        <a:rPr lang="de-DE" sz="2000" dirty="0">
+                          <a:solidFill>
+                            <a:srgbClr val="00B050"/>
+                          </a:solidFill>
+                        </a:rPr>
+                        <a:t> </a:t>
+                      </a:r>
+                      <a:r>
+                        <a:rPr lang="de-DE" sz="2000" dirty="0" err="1">
+                          <a:solidFill>
+                            <a:srgbClr val="00B050"/>
+                          </a:solidFill>
+                        </a:rPr>
+                        <a:t>for</a:t>
+                      </a:r>
+                      <a:r>
+                        <a:rPr lang="de-DE" sz="2000" dirty="0">
+                          <a:solidFill>
+                            <a:srgbClr val="00B050"/>
+                          </a:solidFill>
+                        </a:rPr>
+                        <a:t> </a:t>
+                      </a:r>
+                      <a:r>
+                        <a:rPr lang="de-DE" sz="2000" dirty="0" err="1">
+                          <a:solidFill>
+                            <a:srgbClr val="00B050"/>
+                          </a:solidFill>
+                        </a:rPr>
+                        <a:t>initialization</a:t>
+                      </a:r>
+                      <a:r>
+                        <a:rPr lang="de-DE" sz="2000" dirty="0">
+                          <a:solidFill>
+                            <a:srgbClr val="00B050"/>
+                          </a:solidFill>
+                        </a:rPr>
+                        <a:t>, SSH and EIP </a:t>
+                      </a:r>
+                      <a:r>
+                        <a:rPr lang="de-DE" sz="2000" dirty="0" err="1">
+                          <a:solidFill>
+                            <a:srgbClr val="00B050"/>
+                          </a:solidFill>
+                        </a:rPr>
+                        <a:t>for</a:t>
+                      </a:r>
+                      <a:r>
+                        <a:rPr lang="de-DE" sz="2000" dirty="0">
+                          <a:solidFill>
+                            <a:srgbClr val="00B050"/>
+                          </a:solidFill>
+                        </a:rPr>
+                        <a:t> </a:t>
+                      </a:r>
+                      <a:r>
+                        <a:rPr lang="de-DE" sz="2000" dirty="0" err="1">
+                          <a:solidFill>
+                            <a:srgbClr val="00B050"/>
+                          </a:solidFill>
+                        </a:rPr>
+                        <a:t>updating</a:t>
+                      </a:r>
+                      <a:endParaRPr lang="de-DE" sz="2000" dirty="0">
+                        <a:solidFill>
+                          <a:srgbClr val="00B050"/>
+                        </a:solidFill>
+                      </a:endParaRPr>
+                    </a:p>
+                  </a:txBody>
+                  <a:tcPr anchor="ctr">
+                    <a:lnL w="12700" cap="flat" cmpd="sng" algn="ctr">
+                      <a:solidFill>
+                        <a:schemeClr val="tx1"/>
+                      </a:solidFill>
+                      <a:prstDash val="solid"/>
+                      <a:round/>
+                      <a:headEnd type="none" w="med" len="med"/>
+                      <a:tailEnd type="none" w="med" len="med"/>
+                    </a:lnL>
+                    <a:lnR w="12700" cap="flat" cmpd="sng" algn="ctr">
+                      <a:solidFill>
+                        <a:schemeClr val="tx1"/>
+                      </a:solidFill>
+                      <a:prstDash val="solid"/>
+                      <a:round/>
+                      <a:headEnd type="none" w="med" len="med"/>
+                      <a:tailEnd type="none" w="med" len="med"/>
+                    </a:lnR>
+                    <a:lnT w="12700" cap="flat" cmpd="sng" algn="ctr">
+                      <a:solidFill>
+                        <a:schemeClr val="tx1"/>
+                      </a:solidFill>
+                      <a:prstDash val="solid"/>
+                      <a:round/>
+                      <a:headEnd type="none" w="med" len="med"/>
+                      <a:tailEnd type="none" w="med" len="med"/>
+                    </a:lnT>
+                    <a:lnB w="12700" cap="flat" cmpd="sng" algn="ctr">
+                      <a:solidFill>
+                        <a:schemeClr val="tx1"/>
+                      </a:solidFill>
+                      <a:prstDash val="solid"/>
+                      <a:round/>
+                      <a:headEnd type="none" w="med" len="med"/>
+                      <a:tailEnd type="none" w="med" len="med"/>
+                    </a:lnB>
+                  </a:tcPr>
+                </a:tc>
+                <a:tc>
+                  <a:txBody>
+                    <a:bodyPr/>
+                    <a:lstStyle/>
+                    <a:p>
+                      <a:pPr algn="ctr"/>
+                      <a:r>
+                        <a:rPr lang="de-DE" sz="2000" dirty="0">
+                          <a:solidFill>
+                            <a:srgbClr val="00B050"/>
+                          </a:solidFill>
+                        </a:rPr>
+                        <a:t>Security Group </a:t>
+                      </a:r>
+                      <a:r>
+                        <a:rPr lang="de-DE" sz="2000" dirty="0" err="1">
+                          <a:solidFill>
+                            <a:srgbClr val="00B050"/>
+                          </a:solidFill>
+                        </a:rPr>
+                        <a:t>that</a:t>
+                      </a:r>
+                      <a:r>
+                        <a:rPr lang="de-DE" sz="2000" dirty="0">
+                          <a:solidFill>
+                            <a:srgbClr val="00B050"/>
+                          </a:solidFill>
+                        </a:rPr>
+                        <a:t> </a:t>
+                      </a:r>
+                      <a:r>
+                        <a:rPr lang="de-DE" sz="2000" dirty="0" err="1">
+                          <a:solidFill>
+                            <a:srgbClr val="00B050"/>
+                          </a:solidFill>
+                        </a:rPr>
+                        <a:t>opens</a:t>
+                      </a:r>
+                      <a:r>
+                        <a:rPr lang="de-DE" sz="2000" dirty="0">
+                          <a:solidFill>
+                            <a:srgbClr val="00B050"/>
+                          </a:solidFill>
+                        </a:rPr>
+                        <a:t> </a:t>
+                      </a:r>
+                      <a:r>
+                        <a:rPr lang="de-DE" sz="2000" dirty="0" err="1">
+                          <a:solidFill>
+                            <a:srgbClr val="00B050"/>
+                          </a:solidFill>
+                        </a:rPr>
+                        <a:t>port</a:t>
+                      </a:r>
+                      <a:r>
+                        <a:rPr lang="de-DE" sz="2000" dirty="0">
+                          <a:solidFill>
+                            <a:srgbClr val="00B050"/>
+                          </a:solidFill>
+                        </a:rPr>
+                        <a:t> 5004</a:t>
+                      </a:r>
+                    </a:p>
+                  </a:txBody>
+                  <a:tcPr anchor="ctr">
+                    <a:lnL w="12700" cap="flat" cmpd="sng" algn="ctr">
+                      <a:solidFill>
+                        <a:schemeClr val="tx1"/>
+                      </a:solidFill>
+                      <a:prstDash val="solid"/>
+                      <a:round/>
+                      <a:headEnd type="none" w="med" len="med"/>
+                      <a:tailEnd type="none" w="med" len="med"/>
+                    </a:lnL>
+                    <a:lnR w="12700" cap="flat" cmpd="sng" algn="ctr">
+                      <a:solidFill>
+                        <a:schemeClr val="tx1"/>
+                      </a:solidFill>
+                      <a:prstDash val="solid"/>
+                      <a:round/>
+                      <a:headEnd type="none" w="med" len="med"/>
+                      <a:tailEnd type="none" w="med" len="med"/>
+                    </a:lnR>
+                    <a:lnT w="12700" cap="flat" cmpd="sng" algn="ctr">
+                      <a:solidFill>
+                        <a:schemeClr val="tx1"/>
+                      </a:solidFill>
+                      <a:prstDash val="solid"/>
+                      <a:round/>
+                      <a:headEnd type="none" w="med" len="med"/>
+                      <a:tailEnd type="none" w="med" len="med"/>
+                    </a:lnT>
+                    <a:lnB w="12700" cap="flat" cmpd="sng" algn="ctr">
+                      <a:solidFill>
+                        <a:schemeClr val="tx1"/>
+                      </a:solidFill>
+                      <a:prstDash val="solid"/>
+                      <a:round/>
+                      <a:headEnd type="none" w="med" len="med"/>
+                      <a:tailEnd type="none" w="med" len="med"/>
+                    </a:lnB>
+                  </a:tcPr>
+                </a:tc>
+                <a:extLst>
+                  <a:ext uri="{0D108BD9-81ED-4DB2-BD59-A6C34878D82A}">
+                    <a16:rowId xmlns:a16="http://schemas.microsoft.com/office/drawing/2014/main" val="1143186808"/>
+                  </a:ext>
+                </a:extLst>
+              </a:tr>
+            </a:tbl>
+          </a:graphicData>
+        </a:graphic>
+      </p:graphicFrame>
+      <p:pic>
+        <p:nvPicPr>
+          <p:cNvPr id="5" name="Picture 4">
+            <a:extLst>
+              <a:ext uri="{FF2B5EF4-FFF2-40B4-BE49-F238E27FC236}">
+                <a16:creationId xmlns:a16="http://schemas.microsoft.com/office/drawing/2014/main" id="{88519B49-320A-8B88-F61A-A31CAE8194F0}"/>
+              </a:ext>
+            </a:extLst>
+          </p:cNvPr>
+          <p:cNvPicPr>
+            <a:picLocks noChangeAspect="1"/>
+          </p:cNvPicPr>
+          <p:nvPr/>
+        </p:nvPicPr>
+        <p:blipFill>
+          <a:blip r:embed="rId2"/>
+          <a:stretch>
+            <a:fillRect/>
+          </a:stretch>
+        </p:blipFill>
+        <p:spPr>
+          <a:xfrm>
+            <a:off x="2259735" y="2369488"/>
+            <a:ext cx="720521" cy="814502"/>
+          </a:xfrm>
+          <a:prstGeom prst="rect">
+            <a:avLst/>
+          </a:prstGeom>
+        </p:spPr>
+      </p:pic>
+      <p:pic>
+        <p:nvPicPr>
+          <p:cNvPr id="6" name="Picture 6">
+            <a:extLst>
+              <a:ext uri="{FF2B5EF4-FFF2-40B4-BE49-F238E27FC236}">
+                <a16:creationId xmlns:a16="http://schemas.microsoft.com/office/drawing/2014/main" id="{5075A592-90D6-DFA4-30D4-FBFE9ECFAC66}"/>
+              </a:ext>
+            </a:extLst>
+          </p:cNvPr>
+          <p:cNvPicPr>
+            <a:picLocks noChangeAspect="1"/>
+          </p:cNvPicPr>
+          <p:nvPr/>
+        </p:nvPicPr>
+        <p:blipFill>
+          <a:blip r:embed="rId3"/>
+          <a:stretch>
+            <a:fillRect/>
+          </a:stretch>
+        </p:blipFill>
+        <p:spPr>
+          <a:xfrm>
+            <a:off x="5546308" y="2447009"/>
+            <a:ext cx="1099384" cy="673373"/>
+          </a:xfrm>
+          <a:prstGeom prst="rect">
+            <a:avLst/>
+          </a:prstGeom>
+        </p:spPr>
+      </p:pic>
+      <p:pic>
+        <p:nvPicPr>
+          <p:cNvPr id="7" name="Picture 6">
+            <a:extLst>
+              <a:ext uri="{FF2B5EF4-FFF2-40B4-BE49-F238E27FC236}">
+                <a16:creationId xmlns:a16="http://schemas.microsoft.com/office/drawing/2014/main" id="{E8AF519A-F8DF-BEBC-297D-932C40BF5E19}"/>
+              </a:ext>
+            </a:extLst>
+          </p:cNvPr>
+          <p:cNvPicPr>
+            <a:picLocks noChangeAspect="1"/>
+          </p:cNvPicPr>
+          <p:nvPr/>
+        </p:nvPicPr>
+        <p:blipFill>
+          <a:blip r:embed="rId3"/>
+          <a:stretch>
+            <a:fillRect/>
+          </a:stretch>
+        </p:blipFill>
+        <p:spPr>
+          <a:xfrm>
+            <a:off x="9022356" y="2431845"/>
+            <a:ext cx="1099384" cy="673373"/>
+          </a:xfrm>
+          <a:prstGeom prst="rect">
+            <a:avLst/>
+          </a:prstGeom>
+        </p:spPr>
+      </p:pic>
+    </p:spTree>
+    <p:extLst>
+      <p:ext uri="{BB962C8B-B14F-4D97-AF65-F5344CB8AC3E}">
+        <p14:creationId xmlns:p14="http://schemas.microsoft.com/office/powerpoint/2010/main" val="1337173882"/>
+      </p:ext>
+    </p:extLst>
+  </p:cSld>
+  <p:clrMapOvr>
+    <a:masterClrMapping/>
+  </p:clrMapOvr>
+</p:sld>
+</file>
+
+<file path=ppt/slides/slide29.xml><?xml version="1.0" encoding="utf-8"?>
 <p:sld xmlns:a="http://schemas.openxmlformats.org/drawingml/2006/main" xmlns:r="http://schemas.openxmlformats.org/officeDocument/2006/relationships" xmlns:p="http://schemas.openxmlformats.org/presentationml/2006/main">
   <p:cSld>
     <p:spTree>
@@ -17320,7 +18145,106 @@
 </p:sld>
 </file>
 
-<file path=ppt/slides/slide29.xml><?xml version="1.0" encoding="utf-8"?>
+<file path=ppt/slides/slide3.xml><?xml version="1.0" encoding="utf-8"?>
+<p:sld xmlns:a="http://schemas.openxmlformats.org/drawingml/2006/main" xmlns:r="http://schemas.openxmlformats.org/officeDocument/2006/relationships" xmlns:p="http://schemas.openxmlformats.org/presentationml/2006/main">
+  <p:cSld>
+    <p:bg>
+      <p:bgPr>
+        <a:solidFill>
+          <a:srgbClr val="516482"/>
+        </a:solidFill>
+        <a:effectLst/>
+      </p:bgPr>
+    </p:bg>
+    <p:spTree>
+      <p:nvGrpSpPr>
+        <p:cNvPr id="1" name=""/>
+        <p:cNvGrpSpPr/>
+        <p:nvPr/>
+      </p:nvGrpSpPr>
+      <p:grpSpPr>
+        <a:xfrm>
+          <a:off x="0" y="0"/>
+          <a:ext cx="0" cy="0"/>
+          <a:chOff x="0" y="0"/>
+          <a:chExt cx="0" cy="0"/>
+        </a:xfrm>
+      </p:grpSpPr>
+      <p:sp>
+        <p:nvSpPr>
+          <p:cNvPr id="2" name="Titel 1">
+            <a:extLst>
+              <a:ext uri="{FF2B5EF4-FFF2-40B4-BE49-F238E27FC236}">
+                <a16:creationId xmlns:a16="http://schemas.microsoft.com/office/drawing/2014/main" id="{423EE35B-33E3-42A0-BBDA-368E8D825D7E}"/>
+              </a:ext>
+            </a:extLst>
+          </p:cNvPr>
+          <p:cNvSpPr>
+            <a:spLocks noGrp="1"/>
+          </p:cNvSpPr>
+          <p:nvPr>
+            <p:ph type="ctrTitle"/>
+          </p:nvPr>
+        </p:nvSpPr>
+        <p:spPr/>
+        <p:txBody>
+          <a:bodyPr/>
+          <a:lstStyle/>
+          <a:p>
+            <a:r>
+              <a:rPr lang="de-DE" dirty="0"/>
+              <a:t>Basic </a:t>
+            </a:r>
+            <a:r>
+              <a:rPr lang="de-DE" dirty="0" err="1"/>
+              <a:t>Idea</a:t>
+            </a:r>
+            <a:r>
+              <a:rPr lang="de-DE" dirty="0"/>
+              <a:t> &amp; Tools</a:t>
+            </a:r>
+          </a:p>
+        </p:txBody>
+      </p:sp>
+      <p:sp>
+        <p:nvSpPr>
+          <p:cNvPr id="5" name="Untertitel 4">
+            <a:extLst>
+              <a:ext uri="{FF2B5EF4-FFF2-40B4-BE49-F238E27FC236}">
+                <a16:creationId xmlns:a16="http://schemas.microsoft.com/office/drawing/2014/main" id="{B11A7254-9FA9-40F3-BD35-E1C8D97446A8}"/>
+              </a:ext>
+            </a:extLst>
+          </p:cNvPr>
+          <p:cNvSpPr>
+            <a:spLocks noGrp="1"/>
+          </p:cNvSpPr>
+          <p:nvPr>
+            <p:ph type="subTitle" idx="1"/>
+          </p:nvPr>
+        </p:nvSpPr>
+        <p:spPr/>
+        <p:txBody>
+          <a:bodyPr/>
+          <a:lstStyle/>
+          <a:p>
+            <a:endParaRPr lang="de-DE"/>
+          </a:p>
+        </p:txBody>
+      </p:sp>
+    </p:spTree>
+    <p:extLst>
+      <p:ext uri="{BB962C8B-B14F-4D97-AF65-F5344CB8AC3E}">
+        <p14:creationId xmlns:p14="http://schemas.microsoft.com/office/powerpoint/2010/main" val="1443446330"/>
+      </p:ext>
+    </p:extLst>
+  </p:cSld>
+  <p:clrMapOvr>
+    <a:masterClrMapping/>
+  </p:clrMapOvr>
+</p:sld>
+</file>
+
+<file path=ppt/slides/slide30.xml><?xml version="1.0" encoding="utf-8"?>
 <p:sld xmlns:a="http://schemas.openxmlformats.org/drawingml/2006/main" xmlns:r="http://schemas.openxmlformats.org/officeDocument/2006/relationships" xmlns:p="http://schemas.openxmlformats.org/presentationml/2006/main">
   <p:cSld>
     <p:spTree>
@@ -19205,106 +20129,7 @@
 </p:sld>
 </file>
 
-<file path=ppt/slides/slide3.xml><?xml version="1.0" encoding="utf-8"?>
-<p:sld xmlns:a="http://schemas.openxmlformats.org/drawingml/2006/main" xmlns:r="http://schemas.openxmlformats.org/officeDocument/2006/relationships" xmlns:p="http://schemas.openxmlformats.org/presentationml/2006/main">
-  <p:cSld>
-    <p:bg>
-      <p:bgPr>
-        <a:solidFill>
-          <a:srgbClr val="516482"/>
-        </a:solidFill>
-        <a:effectLst/>
-      </p:bgPr>
-    </p:bg>
-    <p:spTree>
-      <p:nvGrpSpPr>
-        <p:cNvPr id="1" name=""/>
-        <p:cNvGrpSpPr/>
-        <p:nvPr/>
-      </p:nvGrpSpPr>
-      <p:grpSpPr>
-        <a:xfrm>
-          <a:off x="0" y="0"/>
-          <a:ext cx="0" cy="0"/>
-          <a:chOff x="0" y="0"/>
-          <a:chExt cx="0" cy="0"/>
-        </a:xfrm>
-      </p:grpSpPr>
-      <p:sp>
-        <p:nvSpPr>
-          <p:cNvPr id="2" name="Titel 1">
-            <a:extLst>
-              <a:ext uri="{FF2B5EF4-FFF2-40B4-BE49-F238E27FC236}">
-                <a16:creationId xmlns:a16="http://schemas.microsoft.com/office/drawing/2014/main" id="{423EE35B-33E3-42A0-BBDA-368E8D825D7E}"/>
-              </a:ext>
-            </a:extLst>
-          </p:cNvPr>
-          <p:cNvSpPr>
-            <a:spLocks noGrp="1"/>
-          </p:cNvSpPr>
-          <p:nvPr>
-            <p:ph type="ctrTitle"/>
-          </p:nvPr>
-        </p:nvSpPr>
-        <p:spPr/>
-        <p:txBody>
-          <a:bodyPr/>
-          <a:lstStyle/>
-          <a:p>
-            <a:r>
-              <a:rPr lang="de-DE" dirty="0"/>
-              <a:t>Basic </a:t>
-            </a:r>
-            <a:r>
-              <a:rPr lang="de-DE" dirty="0" err="1"/>
-              <a:t>Idea</a:t>
-            </a:r>
-            <a:r>
-              <a:rPr lang="de-DE" dirty="0"/>
-              <a:t> &amp; Tools</a:t>
-            </a:r>
-          </a:p>
-        </p:txBody>
-      </p:sp>
-      <p:sp>
-        <p:nvSpPr>
-          <p:cNvPr id="5" name="Untertitel 4">
-            <a:extLst>
-              <a:ext uri="{FF2B5EF4-FFF2-40B4-BE49-F238E27FC236}">
-                <a16:creationId xmlns:a16="http://schemas.microsoft.com/office/drawing/2014/main" id="{B11A7254-9FA9-40F3-BD35-E1C8D97446A8}"/>
-              </a:ext>
-            </a:extLst>
-          </p:cNvPr>
-          <p:cNvSpPr>
-            <a:spLocks noGrp="1"/>
-          </p:cNvSpPr>
-          <p:nvPr>
-            <p:ph type="subTitle" idx="1"/>
-          </p:nvPr>
-        </p:nvSpPr>
-        <p:spPr/>
-        <p:txBody>
-          <a:bodyPr/>
-          <a:lstStyle/>
-          <a:p>
-            <a:endParaRPr lang="de-DE"/>
-          </a:p>
-        </p:txBody>
-      </p:sp>
-    </p:spTree>
-    <p:extLst>
-      <p:ext uri="{BB962C8B-B14F-4D97-AF65-F5344CB8AC3E}">
-        <p14:creationId xmlns:p14="http://schemas.microsoft.com/office/powerpoint/2010/main" val="1443446330"/>
-      </p:ext>
-    </p:extLst>
-  </p:cSld>
-  <p:clrMapOvr>
-    <a:masterClrMapping/>
-  </p:clrMapOvr>
-</p:sld>
-</file>
-
-<file path=ppt/slides/slide30.xml><?xml version="1.0" encoding="utf-8"?>
+<file path=ppt/slides/slide31.xml><?xml version="1.0" encoding="utf-8"?>
 <p:sld xmlns:a="http://schemas.openxmlformats.org/drawingml/2006/main" xmlns:r="http://schemas.openxmlformats.org/officeDocument/2006/relationships" xmlns:p="http://schemas.openxmlformats.org/presentationml/2006/main" show="0">
   <p:cSld>
     <p:spTree>
@@ -19527,7 +20352,7 @@
 </p:sld>
 </file>
 
-<file path=ppt/slides/slide31.xml><?xml version="1.0" encoding="utf-8"?>
+<file path=ppt/slides/slide32.xml><?xml version="1.0" encoding="utf-8"?>
 <p:sld xmlns:a="http://schemas.openxmlformats.org/drawingml/2006/main" xmlns:r="http://schemas.openxmlformats.org/officeDocument/2006/relationships" xmlns:p="http://schemas.openxmlformats.org/presentationml/2006/main" show="0">
   <p:cSld>
     <p:spTree>

</xml_diff>

<commit_message>
Changed order of one image
</commit_message>
<xml_diff>
--- a/Project Presentation.pptx
+++ b/Project Presentation.pptx
@@ -12789,7 +12789,7 @@
         </p:nvSpPr>
         <p:spPr>
           <a:xfrm>
-            <a:off x="941957" y="4402400"/>
+            <a:off x="911084" y="4381332"/>
             <a:ext cx="1704110" cy="768927"/>
           </a:xfrm>
           <a:prstGeom prst="roundRect">
@@ -12846,7 +12846,7 @@
         </p:nvSpPr>
         <p:spPr>
           <a:xfrm>
-            <a:off x="3397130" y="4402402"/>
+            <a:off x="6084747" y="4381331"/>
             <a:ext cx="2256248" cy="768927"/>
           </a:xfrm>
           <a:prstGeom prst="roundRect">
@@ -12911,7 +12911,7 @@
         </p:nvSpPr>
         <p:spPr>
           <a:xfrm>
-            <a:off x="8896038" y="4402399"/>
+            <a:off x="8896041" y="4385329"/>
             <a:ext cx="2558014" cy="768927"/>
           </a:xfrm>
           <a:prstGeom prst="roundRect">
@@ -12983,26 +12983,108 @@
           </a:p>
         </p:txBody>
       </p:sp>
+      <p:sp>
+        <p:nvSpPr>
+          <p:cNvPr id="9" name="Rectangle: Rounded Corners 17">
+            <a:extLst>
+              <a:ext uri="{FF2B5EF4-FFF2-40B4-BE49-F238E27FC236}">
+                <a16:creationId xmlns:a16="http://schemas.microsoft.com/office/drawing/2014/main" id="{433EC4C8-5652-8E37-1388-42FECF4CA3D7}"/>
+              </a:ext>
+            </a:extLst>
+          </p:cNvPr>
+          <p:cNvSpPr/>
+          <p:nvPr/>
+        </p:nvSpPr>
+        <p:spPr>
+          <a:xfrm flipH="1" flipV="1">
+            <a:off x="2727297" y="3948467"/>
+            <a:ext cx="8997484" cy="1594946"/>
+          </a:xfrm>
+          <a:prstGeom prst="roundRect">
+            <a:avLst/>
+          </a:prstGeom>
+          <a:noFill/>
+          <a:ln>
+            <a:solidFill>
+              <a:schemeClr val="bg1">
+                <a:lumMod val="75000"/>
+              </a:schemeClr>
+            </a:solidFill>
+          </a:ln>
+        </p:spPr>
+        <p:style>
+          <a:lnRef idx="2">
+            <a:schemeClr val="accent1">
+              <a:shade val="50000"/>
+            </a:schemeClr>
+          </a:lnRef>
+          <a:fillRef idx="1">
+            <a:schemeClr val="accent1"/>
+          </a:fillRef>
+          <a:effectRef idx="0">
+            <a:schemeClr val="accent1"/>
+          </a:effectRef>
+          <a:fontRef idx="minor">
+            <a:schemeClr val="lt1"/>
+          </a:fontRef>
+        </p:style>
+        <p:txBody>
+          <a:bodyPr rtlCol="0" anchor="ctr"/>
+          <a:lstStyle/>
+          <a:p>
+            <a:pPr algn="ctr"/>
+            <a:endParaRPr lang="de-DE"/>
+          </a:p>
+        </p:txBody>
+      </p:sp>
+      <p:pic>
+        <p:nvPicPr>
+          <p:cNvPr id="10" name="Picture 19">
+            <a:extLst>
+              <a:ext uri="{FF2B5EF4-FFF2-40B4-BE49-F238E27FC236}">
+                <a16:creationId xmlns:a16="http://schemas.microsoft.com/office/drawing/2014/main" id="{B187C7EC-CE9C-D136-07DC-CC38CA9DE47D}"/>
+              </a:ext>
+            </a:extLst>
+          </p:cNvPr>
+          <p:cNvPicPr>
+            <a:picLocks noChangeAspect="1"/>
+          </p:cNvPicPr>
+          <p:nvPr/>
+        </p:nvPicPr>
+        <p:blipFill>
+          <a:blip r:embed="rId2"/>
+          <a:stretch>
+            <a:fillRect/>
+          </a:stretch>
+        </p:blipFill>
+        <p:spPr>
+          <a:xfrm>
+            <a:off x="2891263" y="4059604"/>
+            <a:ext cx="426720" cy="426720"/>
+          </a:xfrm>
+          <a:prstGeom prst="rect">
+            <a:avLst/>
+          </a:prstGeom>
+        </p:spPr>
+      </p:pic>
       <p:cxnSp>
         <p:nvCxnSpPr>
-          <p:cNvPr id="7" name="Straight Arrow Connector 11">
-            <a:extLst>
-              <a:ext uri="{FF2B5EF4-FFF2-40B4-BE49-F238E27FC236}">
-                <a16:creationId xmlns:a16="http://schemas.microsoft.com/office/drawing/2014/main" id="{F501AB0B-B3CB-38AA-624C-ED414CEFB3A8}"/>
+          <p:cNvPr id="19" name="Straight Arrow Connector 11">
+            <a:extLst>
+              <a:ext uri="{FF2B5EF4-FFF2-40B4-BE49-F238E27FC236}">
+                <a16:creationId xmlns:a16="http://schemas.microsoft.com/office/drawing/2014/main" id="{2BE4D3C3-2C05-2D6B-EB00-0B569B104FB4}"/>
               </a:ext>
             </a:extLst>
           </p:cNvPr>
           <p:cNvCxnSpPr>
             <a:cxnSpLocks/>
-            <a:stCxn id="4" idx="3"/>
-            <a:endCxn id="5" idx="1"/>
           </p:cNvCxnSpPr>
           <p:nvPr/>
         </p:nvCxnSpPr>
         <p:spPr>
-          <a:xfrm>
-            <a:off x="2646067" y="4786864"/>
-            <a:ext cx="751063" cy="2"/>
+          <a:xfrm flipV="1">
+            <a:off x="6615647" y="3237106"/>
+            <a:ext cx="0" cy="1165293"/>
           </a:xfrm>
           <a:prstGeom prst="straightConnector1">
             <a:avLst/>
@@ -13035,26 +13117,318 @@
           </a:fontRef>
         </p:style>
       </p:cxnSp>
+      <p:sp>
+        <p:nvSpPr>
+          <p:cNvPr id="20" name="Rectangle: Rounded Corners 6">
+            <a:extLst>
+              <a:ext uri="{FF2B5EF4-FFF2-40B4-BE49-F238E27FC236}">
+                <a16:creationId xmlns:a16="http://schemas.microsoft.com/office/drawing/2014/main" id="{B811BC74-BB0A-7701-99C2-0D2003A48E60}"/>
+              </a:ext>
+            </a:extLst>
+          </p:cNvPr>
+          <p:cNvSpPr/>
+          <p:nvPr/>
+        </p:nvSpPr>
+        <p:spPr>
+          <a:xfrm>
+            <a:off x="4777686" y="2468179"/>
+            <a:ext cx="2558017" cy="768927"/>
+          </a:xfrm>
+          <a:prstGeom prst="roundRect">
+            <a:avLst/>
+          </a:prstGeom>
+          <a:solidFill>
+            <a:schemeClr val="bg1">
+              <a:lumMod val="65000"/>
+            </a:schemeClr>
+          </a:solidFill>
+          <a:ln>
+            <a:noFill/>
+          </a:ln>
+        </p:spPr>
+        <p:style>
+          <a:lnRef idx="2">
+            <a:schemeClr val="accent1">
+              <a:shade val="50000"/>
+            </a:schemeClr>
+          </a:lnRef>
+          <a:fillRef idx="1">
+            <a:schemeClr val="accent1"/>
+          </a:fillRef>
+          <a:effectRef idx="0">
+            <a:schemeClr val="accent1"/>
+          </a:effectRef>
+          <a:fontRef idx="minor">
+            <a:schemeClr val="lt1"/>
+          </a:fontRef>
+        </p:style>
+        <p:txBody>
+          <a:bodyPr rtlCol="0" anchor="ctr"/>
+          <a:lstStyle/>
+          <a:p>
+            <a:pPr algn="ctr"/>
+            <a:r>
+              <a:rPr lang="de-DE" dirty="0"/>
+              <a:t>Create EC2 </a:t>
+            </a:r>
+            <a:r>
+              <a:rPr lang="de-DE" dirty="0" err="1"/>
+              <a:t>machine</a:t>
+            </a:r>
+            <a:endParaRPr lang="de-DE" dirty="0"/>
+          </a:p>
+        </p:txBody>
+      </p:sp>
+      <p:sp>
+        <p:nvSpPr>
+          <p:cNvPr id="21" name="Rectangle: Rounded Corners 17">
+            <a:extLst>
+              <a:ext uri="{FF2B5EF4-FFF2-40B4-BE49-F238E27FC236}">
+                <a16:creationId xmlns:a16="http://schemas.microsoft.com/office/drawing/2014/main" id="{865E96C3-898B-ABE0-91DC-5A88AEAE32A1}"/>
+              </a:ext>
+            </a:extLst>
+          </p:cNvPr>
+          <p:cNvSpPr/>
+          <p:nvPr/>
+        </p:nvSpPr>
+        <p:spPr>
+          <a:xfrm flipH="1" flipV="1">
+            <a:off x="4192675" y="1882666"/>
+            <a:ext cx="3424355" cy="1594946"/>
+          </a:xfrm>
+          <a:prstGeom prst="roundRect">
+            <a:avLst/>
+          </a:prstGeom>
+          <a:noFill/>
+          <a:ln>
+            <a:solidFill>
+              <a:schemeClr val="bg1">
+                <a:lumMod val="75000"/>
+              </a:schemeClr>
+            </a:solidFill>
+          </a:ln>
+        </p:spPr>
+        <p:style>
+          <a:lnRef idx="2">
+            <a:schemeClr val="accent1">
+              <a:shade val="50000"/>
+            </a:schemeClr>
+          </a:lnRef>
+          <a:fillRef idx="1">
+            <a:schemeClr val="accent1"/>
+          </a:fillRef>
+          <a:effectRef idx="0">
+            <a:schemeClr val="accent1"/>
+          </a:effectRef>
+          <a:fontRef idx="minor">
+            <a:schemeClr val="lt1"/>
+          </a:fontRef>
+        </p:style>
+        <p:txBody>
+          <a:bodyPr rtlCol="0" anchor="ctr"/>
+          <a:lstStyle/>
+          <a:p>
+            <a:pPr algn="ctr"/>
+            <a:endParaRPr lang="de-DE"/>
+          </a:p>
+        </p:txBody>
+      </p:sp>
+      <p:pic>
+        <p:nvPicPr>
+          <p:cNvPr id="24" name="Picture 4">
+            <a:extLst>
+              <a:ext uri="{FF2B5EF4-FFF2-40B4-BE49-F238E27FC236}">
+                <a16:creationId xmlns:a16="http://schemas.microsoft.com/office/drawing/2014/main" id="{F668A630-DDE5-F7FD-292A-06605BED7FC7}"/>
+              </a:ext>
+            </a:extLst>
+          </p:cNvPr>
+          <p:cNvPicPr>
+            <a:picLocks noChangeAspect="1"/>
+          </p:cNvPicPr>
+          <p:nvPr/>
+        </p:nvPicPr>
+        <p:blipFill>
+          <a:blip r:embed="rId3"/>
+          <a:stretch>
+            <a:fillRect/>
+          </a:stretch>
+        </p:blipFill>
+        <p:spPr>
+          <a:xfrm>
+            <a:off x="4392425" y="1985800"/>
+            <a:ext cx="426720" cy="482379"/>
+          </a:xfrm>
+          <a:prstGeom prst="rect">
+            <a:avLst/>
+          </a:prstGeom>
+        </p:spPr>
+      </p:pic>
+      <p:pic>
+        <p:nvPicPr>
+          <p:cNvPr id="28" name="Picture 6">
+            <a:extLst>
+              <a:ext uri="{FF2B5EF4-FFF2-40B4-BE49-F238E27FC236}">
+                <a16:creationId xmlns:a16="http://schemas.microsoft.com/office/drawing/2014/main" id="{97D45E23-90AD-A028-05E6-6586A5843E21}"/>
+              </a:ext>
+            </a:extLst>
+          </p:cNvPr>
+          <p:cNvPicPr>
+            <a:picLocks noChangeAspect="1"/>
+          </p:cNvPicPr>
+          <p:nvPr/>
+        </p:nvPicPr>
+        <p:blipFill>
+          <a:blip r:embed="rId4"/>
+          <a:stretch>
+            <a:fillRect/>
+          </a:stretch>
+        </p:blipFill>
+        <p:spPr>
+          <a:xfrm>
+            <a:off x="8506056" y="2030568"/>
+            <a:ext cx="549008" cy="336268"/>
+          </a:xfrm>
+          <a:prstGeom prst="rect">
+            <a:avLst/>
+          </a:prstGeom>
+        </p:spPr>
+      </p:pic>
+      <p:sp>
+        <p:nvSpPr>
+          <p:cNvPr id="29" name="Rectangle: Rounded Corners 6">
+            <a:extLst>
+              <a:ext uri="{FF2B5EF4-FFF2-40B4-BE49-F238E27FC236}">
+                <a16:creationId xmlns:a16="http://schemas.microsoft.com/office/drawing/2014/main" id="{8A69E514-DFCE-BDFC-FE4E-7567049EB630}"/>
+              </a:ext>
+            </a:extLst>
+          </p:cNvPr>
+          <p:cNvSpPr/>
+          <p:nvPr/>
+        </p:nvSpPr>
+        <p:spPr>
+          <a:xfrm>
+            <a:off x="8896038" y="2468179"/>
+            <a:ext cx="2558017" cy="768927"/>
+          </a:xfrm>
+          <a:prstGeom prst="roundRect">
+            <a:avLst/>
+          </a:prstGeom>
+          <a:solidFill>
+            <a:schemeClr val="bg1">
+              <a:lumMod val="65000"/>
+            </a:schemeClr>
+          </a:solidFill>
+          <a:ln>
+            <a:noFill/>
+          </a:ln>
+        </p:spPr>
+        <p:style>
+          <a:lnRef idx="2">
+            <a:schemeClr val="accent1">
+              <a:shade val="50000"/>
+            </a:schemeClr>
+          </a:lnRef>
+          <a:fillRef idx="1">
+            <a:schemeClr val="accent1"/>
+          </a:fillRef>
+          <a:effectRef idx="0">
+            <a:schemeClr val="accent1"/>
+          </a:effectRef>
+          <a:fontRef idx="minor">
+            <a:schemeClr val="lt1"/>
+          </a:fontRef>
+        </p:style>
+        <p:txBody>
+          <a:bodyPr rtlCol="0" anchor="ctr"/>
+          <a:lstStyle/>
+          <a:p>
+            <a:pPr algn="ctr"/>
+            <a:r>
+              <a:rPr lang="de-DE" dirty="0"/>
+              <a:t>EC2 </a:t>
+            </a:r>
+            <a:r>
+              <a:rPr lang="de-DE" dirty="0" err="1"/>
+              <a:t>machine</a:t>
+            </a:r>
+            <a:endParaRPr lang="de-DE" dirty="0"/>
+          </a:p>
+        </p:txBody>
+      </p:sp>
+      <p:sp>
+        <p:nvSpPr>
+          <p:cNvPr id="30" name="Rectangle: Rounded Corners 17">
+            <a:extLst>
+              <a:ext uri="{FF2B5EF4-FFF2-40B4-BE49-F238E27FC236}">
+                <a16:creationId xmlns:a16="http://schemas.microsoft.com/office/drawing/2014/main" id="{C3D25223-D404-A957-180D-7C74A93E192A}"/>
+              </a:ext>
+            </a:extLst>
+          </p:cNvPr>
+          <p:cNvSpPr/>
+          <p:nvPr/>
+        </p:nvSpPr>
+        <p:spPr>
+          <a:xfrm flipH="1" flipV="1">
+            <a:off x="8300426" y="1882666"/>
+            <a:ext cx="3424355" cy="1594946"/>
+          </a:xfrm>
+          <a:prstGeom prst="roundRect">
+            <a:avLst/>
+          </a:prstGeom>
+          <a:noFill/>
+          <a:ln>
+            <a:solidFill>
+              <a:schemeClr val="bg1">
+                <a:lumMod val="75000"/>
+              </a:schemeClr>
+            </a:solidFill>
+          </a:ln>
+        </p:spPr>
+        <p:style>
+          <a:lnRef idx="2">
+            <a:schemeClr val="accent1">
+              <a:shade val="50000"/>
+            </a:schemeClr>
+          </a:lnRef>
+          <a:fillRef idx="1">
+            <a:schemeClr val="accent1"/>
+          </a:fillRef>
+          <a:effectRef idx="0">
+            <a:schemeClr val="accent1"/>
+          </a:effectRef>
+          <a:fontRef idx="minor">
+            <a:schemeClr val="lt1"/>
+          </a:fontRef>
+        </p:style>
+        <p:txBody>
+          <a:bodyPr rtlCol="0" anchor="ctr"/>
+          <a:lstStyle/>
+          <a:p>
+            <a:pPr algn="ctr"/>
+            <a:endParaRPr lang="de-DE"/>
+          </a:p>
+        </p:txBody>
+      </p:sp>
       <p:cxnSp>
         <p:nvCxnSpPr>
-          <p:cNvPr id="8" name="Straight Arrow Connector 13">
-            <a:extLst>
-              <a:ext uri="{FF2B5EF4-FFF2-40B4-BE49-F238E27FC236}">
-                <a16:creationId xmlns:a16="http://schemas.microsoft.com/office/drawing/2014/main" id="{15D2F7F9-D527-3673-F73F-11C0FEC9E142}"/>
+          <p:cNvPr id="31" name="Straight Arrow Connector 11">
+            <a:extLst>
+              <a:ext uri="{FF2B5EF4-FFF2-40B4-BE49-F238E27FC236}">
+                <a16:creationId xmlns:a16="http://schemas.microsoft.com/office/drawing/2014/main" id="{227B2E06-2BE5-7007-A654-EBE79D0F9520}"/>
               </a:ext>
             </a:extLst>
           </p:cNvPr>
           <p:cNvCxnSpPr>
             <a:cxnSpLocks/>
-            <a:stCxn id="5" idx="3"/>
-            <a:endCxn id="22" idx="1"/>
+            <a:stCxn id="20" idx="3"/>
+            <a:endCxn id="29" idx="1"/>
           </p:cNvCxnSpPr>
           <p:nvPr/>
         </p:nvCxnSpPr>
         <p:spPr>
-          <a:xfrm flipV="1">
-            <a:off x="5653378" y="4786863"/>
-            <a:ext cx="510480" cy="3"/>
+          <a:xfrm>
+            <a:off x="7335703" y="2852643"/>
+            <a:ext cx="1560335" cy="0"/>
           </a:xfrm>
           <a:prstGeom prst="straightConnector1">
             <a:avLst/>
@@ -13087,109 +13461,26 @@
           </a:fontRef>
         </p:style>
       </p:cxnSp>
-      <p:sp>
-        <p:nvSpPr>
-          <p:cNvPr id="9" name="Rectangle: Rounded Corners 17">
-            <a:extLst>
-              <a:ext uri="{FF2B5EF4-FFF2-40B4-BE49-F238E27FC236}">
-                <a16:creationId xmlns:a16="http://schemas.microsoft.com/office/drawing/2014/main" id="{433EC4C8-5652-8E37-1388-42FECF4CA3D7}"/>
-              </a:ext>
-            </a:extLst>
-          </p:cNvPr>
-          <p:cNvSpPr/>
-          <p:nvPr/>
-        </p:nvSpPr>
-        <p:spPr>
-          <a:xfrm flipH="1" flipV="1">
-            <a:off x="2727297" y="4035928"/>
-            <a:ext cx="8997484" cy="1594946"/>
-          </a:xfrm>
-          <a:prstGeom prst="roundRect">
-            <a:avLst/>
-          </a:prstGeom>
-          <a:noFill/>
-          <a:ln>
-            <a:solidFill>
-              <a:schemeClr val="bg1">
-                <a:lumMod val="75000"/>
-              </a:schemeClr>
-            </a:solidFill>
-          </a:ln>
-        </p:spPr>
-        <p:style>
-          <a:lnRef idx="2">
-            <a:schemeClr val="accent1">
-              <a:shade val="50000"/>
-            </a:schemeClr>
-          </a:lnRef>
-          <a:fillRef idx="1">
-            <a:schemeClr val="accent1"/>
-          </a:fillRef>
-          <a:effectRef idx="0">
-            <a:schemeClr val="accent1"/>
-          </a:effectRef>
-          <a:fontRef idx="minor">
-            <a:schemeClr val="lt1"/>
-          </a:fontRef>
-        </p:style>
-        <p:txBody>
-          <a:bodyPr rtlCol="0" anchor="ctr"/>
-          <a:lstStyle/>
-          <a:p>
-            <a:pPr algn="ctr"/>
-            <a:endParaRPr lang="de-DE"/>
-          </a:p>
-        </p:txBody>
-      </p:sp>
-      <p:pic>
-        <p:nvPicPr>
-          <p:cNvPr id="10" name="Picture 19">
-            <a:extLst>
-              <a:ext uri="{FF2B5EF4-FFF2-40B4-BE49-F238E27FC236}">
-                <a16:creationId xmlns:a16="http://schemas.microsoft.com/office/drawing/2014/main" id="{B187C7EC-CE9C-D136-07DC-CC38CA9DE47D}"/>
-              </a:ext>
-            </a:extLst>
-          </p:cNvPr>
-          <p:cNvPicPr>
-            <a:picLocks noChangeAspect="1"/>
-          </p:cNvPicPr>
-          <p:nvPr/>
-        </p:nvPicPr>
-        <p:blipFill>
-          <a:blip r:embed="rId2"/>
-          <a:stretch>
-            <a:fillRect/>
-          </a:stretch>
-        </p:blipFill>
-        <p:spPr>
-          <a:xfrm>
-            <a:off x="2891263" y="4059604"/>
-            <a:ext cx="426720" cy="426720"/>
-          </a:xfrm>
-          <a:prstGeom prst="rect">
-            <a:avLst/>
-          </a:prstGeom>
-        </p:spPr>
-      </p:pic>
       <p:cxnSp>
         <p:nvCxnSpPr>
-          <p:cNvPr id="19" name="Straight Arrow Connector 11">
-            <a:extLst>
-              <a:ext uri="{FF2B5EF4-FFF2-40B4-BE49-F238E27FC236}">
-                <a16:creationId xmlns:a16="http://schemas.microsoft.com/office/drawing/2014/main" id="{2BE4D3C3-2C05-2D6B-EB00-0B569B104FB4}"/>
+          <p:cNvPr id="36" name="Straight Arrow Connector 11">
+            <a:extLst>
+              <a:ext uri="{FF2B5EF4-FFF2-40B4-BE49-F238E27FC236}">
+                <a16:creationId xmlns:a16="http://schemas.microsoft.com/office/drawing/2014/main" id="{0939BA32-55A3-5025-F860-5D4857282D4C}"/>
               </a:ext>
             </a:extLst>
           </p:cNvPr>
           <p:cNvCxnSpPr>
             <a:cxnSpLocks/>
-            <a:endCxn id="20" idx="2"/>
+            <a:stCxn id="6" idx="0"/>
+            <a:endCxn id="29" idx="2"/>
           </p:cNvCxnSpPr>
           <p:nvPr/>
         </p:nvCxnSpPr>
         <p:spPr>
-          <a:xfrm flipV="1">
-            <a:off x="4676135" y="3237106"/>
-            <a:ext cx="2" cy="1165293"/>
+          <a:xfrm flipH="1" flipV="1">
+            <a:off x="10175047" y="3237106"/>
+            <a:ext cx="1" cy="1148223"/>
           </a:xfrm>
           <a:prstGeom prst="straightConnector1">
             <a:avLst/>
@@ -13224,10 +13515,10 @@
       </p:cxnSp>
       <p:sp>
         <p:nvSpPr>
-          <p:cNvPr id="20" name="Rectangle: Rounded Corners 6">
-            <a:extLst>
-              <a:ext uri="{FF2B5EF4-FFF2-40B4-BE49-F238E27FC236}">
-                <a16:creationId xmlns:a16="http://schemas.microsoft.com/office/drawing/2014/main" id="{B811BC74-BB0A-7701-99C2-0D2003A48E60}"/>
+          <p:cNvPr id="22" name="Rectangle: Rounded Corners 7">
+            <a:extLst>
+              <a:ext uri="{FF2B5EF4-FFF2-40B4-BE49-F238E27FC236}">
+                <a16:creationId xmlns:a16="http://schemas.microsoft.com/office/drawing/2014/main" id="{70D14B7E-B2E8-D44D-9F76-43A117366100}"/>
               </a:ext>
             </a:extLst>
           </p:cNvPr>
@@ -13236,8 +13527,8 @@
         </p:nvSpPr>
         <p:spPr>
           <a:xfrm>
-            <a:off x="3397128" y="2468179"/>
-            <a:ext cx="2558017" cy="768927"/>
+            <a:off x="3429827" y="4381332"/>
+            <a:ext cx="2153842" cy="768927"/>
           </a:xfrm>
           <a:prstGeom prst="roundRect">
             <a:avLst/>
@@ -13274,266 +13565,60 @@
             <a:pPr algn="ctr"/>
             <a:r>
               <a:rPr lang="de-DE" dirty="0"/>
-              <a:t>Create EC2 </a:t>
+              <a:t>Push </a:t>
             </a:r>
             <a:r>
               <a:rPr lang="de-DE" dirty="0" err="1"/>
-              <a:t>machine</a:t>
+              <a:t>docker</a:t>
+            </a:r>
+            <a:r>
+              <a:rPr lang="de-DE" dirty="0"/>
+              <a:t> </a:t>
+            </a:r>
+            <a:r>
+              <a:rPr lang="de-DE" dirty="0" err="1"/>
+              <a:t>images</a:t>
+            </a:r>
+            <a:r>
+              <a:rPr lang="de-DE" dirty="0"/>
+              <a:t> </a:t>
+            </a:r>
+            <a:r>
+              <a:rPr lang="de-DE" dirty="0" err="1"/>
+              <a:t>to</a:t>
+            </a:r>
+            <a:r>
+              <a:rPr lang="de-DE" dirty="0"/>
+              <a:t> </a:t>
+            </a:r>
+            <a:r>
+              <a:rPr lang="de-DE" dirty="0" err="1"/>
+              <a:t>dockerhub</a:t>
             </a:r>
             <a:endParaRPr lang="de-DE" dirty="0"/>
-          </a:p>
-        </p:txBody>
-      </p:sp>
-      <p:sp>
-        <p:nvSpPr>
-          <p:cNvPr id="21" name="Rectangle: Rounded Corners 17">
-            <a:extLst>
-              <a:ext uri="{FF2B5EF4-FFF2-40B4-BE49-F238E27FC236}">
-                <a16:creationId xmlns:a16="http://schemas.microsoft.com/office/drawing/2014/main" id="{865E96C3-898B-ABE0-91DC-5A88AEAE32A1}"/>
-              </a:ext>
-            </a:extLst>
-          </p:cNvPr>
-          <p:cNvSpPr/>
-          <p:nvPr/>
-        </p:nvSpPr>
-        <p:spPr>
-          <a:xfrm flipH="1" flipV="1">
-            <a:off x="2812117" y="1882666"/>
-            <a:ext cx="3424355" cy="1594946"/>
-          </a:xfrm>
-          <a:prstGeom prst="roundRect">
-            <a:avLst/>
-          </a:prstGeom>
-          <a:noFill/>
-          <a:ln>
-            <a:solidFill>
-              <a:schemeClr val="bg1">
-                <a:lumMod val="75000"/>
-              </a:schemeClr>
-            </a:solidFill>
-          </a:ln>
-        </p:spPr>
-        <p:style>
-          <a:lnRef idx="2">
-            <a:schemeClr val="accent1">
-              <a:shade val="50000"/>
-            </a:schemeClr>
-          </a:lnRef>
-          <a:fillRef idx="1">
-            <a:schemeClr val="accent1"/>
-          </a:fillRef>
-          <a:effectRef idx="0">
-            <a:schemeClr val="accent1"/>
-          </a:effectRef>
-          <a:fontRef idx="minor">
-            <a:schemeClr val="lt1"/>
-          </a:fontRef>
-        </p:style>
-        <p:txBody>
-          <a:bodyPr rtlCol="0" anchor="ctr"/>
-          <a:lstStyle/>
-          <a:p>
-            <a:pPr algn="ctr"/>
-            <a:endParaRPr lang="de-DE"/>
-          </a:p>
-        </p:txBody>
-      </p:sp>
-      <p:pic>
-        <p:nvPicPr>
-          <p:cNvPr id="24" name="Picture 4">
-            <a:extLst>
-              <a:ext uri="{FF2B5EF4-FFF2-40B4-BE49-F238E27FC236}">
-                <a16:creationId xmlns:a16="http://schemas.microsoft.com/office/drawing/2014/main" id="{F668A630-DDE5-F7FD-292A-06605BED7FC7}"/>
-              </a:ext>
-            </a:extLst>
-          </p:cNvPr>
-          <p:cNvPicPr>
-            <a:picLocks noChangeAspect="1"/>
-          </p:cNvPicPr>
-          <p:nvPr/>
-        </p:nvPicPr>
-        <p:blipFill>
-          <a:blip r:embed="rId3"/>
-          <a:stretch>
-            <a:fillRect/>
-          </a:stretch>
-        </p:blipFill>
-        <p:spPr>
-          <a:xfrm>
-            <a:off x="3011867" y="1985800"/>
-            <a:ext cx="426720" cy="482379"/>
-          </a:xfrm>
-          <a:prstGeom prst="rect">
-            <a:avLst/>
-          </a:prstGeom>
-        </p:spPr>
-      </p:pic>
-      <p:pic>
-        <p:nvPicPr>
-          <p:cNvPr id="28" name="Picture 6">
-            <a:extLst>
-              <a:ext uri="{FF2B5EF4-FFF2-40B4-BE49-F238E27FC236}">
-                <a16:creationId xmlns:a16="http://schemas.microsoft.com/office/drawing/2014/main" id="{97D45E23-90AD-A028-05E6-6586A5843E21}"/>
-              </a:ext>
-            </a:extLst>
-          </p:cNvPr>
-          <p:cNvPicPr>
-            <a:picLocks noChangeAspect="1"/>
-          </p:cNvPicPr>
-          <p:nvPr/>
-        </p:nvPicPr>
-        <p:blipFill>
-          <a:blip r:embed="rId4"/>
-          <a:stretch>
-            <a:fillRect/>
-          </a:stretch>
-        </p:blipFill>
-        <p:spPr>
-          <a:xfrm>
-            <a:off x="8506056" y="2030568"/>
-            <a:ext cx="549008" cy="336268"/>
-          </a:xfrm>
-          <a:prstGeom prst="rect">
-            <a:avLst/>
-          </a:prstGeom>
-        </p:spPr>
-      </p:pic>
-      <p:sp>
-        <p:nvSpPr>
-          <p:cNvPr id="29" name="Rectangle: Rounded Corners 6">
-            <a:extLst>
-              <a:ext uri="{FF2B5EF4-FFF2-40B4-BE49-F238E27FC236}">
-                <a16:creationId xmlns:a16="http://schemas.microsoft.com/office/drawing/2014/main" id="{8A69E514-DFCE-BDFC-FE4E-7567049EB630}"/>
-              </a:ext>
-            </a:extLst>
-          </p:cNvPr>
-          <p:cNvSpPr/>
-          <p:nvPr/>
-        </p:nvSpPr>
-        <p:spPr>
-          <a:xfrm>
-            <a:off x="8896038" y="2468179"/>
-            <a:ext cx="2558017" cy="768927"/>
-          </a:xfrm>
-          <a:prstGeom prst="roundRect">
-            <a:avLst/>
-          </a:prstGeom>
-          <a:solidFill>
-            <a:schemeClr val="bg1">
-              <a:lumMod val="65000"/>
-            </a:schemeClr>
-          </a:solidFill>
-          <a:ln>
-            <a:noFill/>
-          </a:ln>
-        </p:spPr>
-        <p:style>
-          <a:lnRef idx="2">
-            <a:schemeClr val="accent1">
-              <a:shade val="50000"/>
-            </a:schemeClr>
-          </a:lnRef>
-          <a:fillRef idx="1">
-            <a:schemeClr val="accent1"/>
-          </a:fillRef>
-          <a:effectRef idx="0">
-            <a:schemeClr val="accent1"/>
-          </a:effectRef>
-          <a:fontRef idx="minor">
-            <a:schemeClr val="lt1"/>
-          </a:fontRef>
-        </p:style>
-        <p:txBody>
-          <a:bodyPr rtlCol="0" anchor="ctr"/>
-          <a:lstStyle/>
-          <a:p>
-            <a:pPr algn="ctr"/>
-            <a:r>
-              <a:rPr lang="de-DE" dirty="0"/>
-              <a:t>EC2 </a:t>
-            </a:r>
-            <a:r>
-              <a:rPr lang="de-DE" dirty="0" err="1"/>
-              <a:t>machine</a:t>
-            </a:r>
-            <a:endParaRPr lang="de-DE" dirty="0"/>
-          </a:p>
-        </p:txBody>
-      </p:sp>
-      <p:sp>
-        <p:nvSpPr>
-          <p:cNvPr id="30" name="Rectangle: Rounded Corners 17">
-            <a:extLst>
-              <a:ext uri="{FF2B5EF4-FFF2-40B4-BE49-F238E27FC236}">
-                <a16:creationId xmlns:a16="http://schemas.microsoft.com/office/drawing/2014/main" id="{C3D25223-D404-A957-180D-7C74A93E192A}"/>
-              </a:ext>
-            </a:extLst>
-          </p:cNvPr>
-          <p:cNvSpPr/>
-          <p:nvPr/>
-        </p:nvSpPr>
-        <p:spPr>
-          <a:xfrm flipH="1" flipV="1">
-            <a:off x="8300426" y="1882666"/>
-            <a:ext cx="3424355" cy="1594946"/>
-          </a:xfrm>
-          <a:prstGeom prst="roundRect">
-            <a:avLst/>
-          </a:prstGeom>
-          <a:noFill/>
-          <a:ln>
-            <a:solidFill>
-              <a:schemeClr val="bg1">
-                <a:lumMod val="75000"/>
-              </a:schemeClr>
-            </a:solidFill>
-          </a:ln>
-        </p:spPr>
-        <p:style>
-          <a:lnRef idx="2">
-            <a:schemeClr val="accent1">
-              <a:shade val="50000"/>
-            </a:schemeClr>
-          </a:lnRef>
-          <a:fillRef idx="1">
-            <a:schemeClr val="accent1"/>
-          </a:fillRef>
-          <a:effectRef idx="0">
-            <a:schemeClr val="accent1"/>
-          </a:effectRef>
-          <a:fontRef idx="minor">
-            <a:schemeClr val="lt1"/>
-          </a:fontRef>
-        </p:style>
-        <p:txBody>
-          <a:bodyPr rtlCol="0" anchor="ctr"/>
-          <a:lstStyle/>
-          <a:p>
-            <a:pPr algn="ctr"/>
-            <a:endParaRPr lang="de-DE"/>
           </a:p>
         </p:txBody>
       </p:sp>
       <p:cxnSp>
         <p:nvCxnSpPr>
-          <p:cNvPr id="31" name="Straight Arrow Connector 11">
-            <a:extLst>
-              <a:ext uri="{FF2B5EF4-FFF2-40B4-BE49-F238E27FC236}">
-                <a16:creationId xmlns:a16="http://schemas.microsoft.com/office/drawing/2014/main" id="{227B2E06-2BE5-7007-A654-EBE79D0F9520}"/>
+          <p:cNvPr id="26" name="Straight Arrow Connector 13">
+            <a:extLst>
+              <a:ext uri="{FF2B5EF4-FFF2-40B4-BE49-F238E27FC236}">
+                <a16:creationId xmlns:a16="http://schemas.microsoft.com/office/drawing/2014/main" id="{D9F0D3DE-92F8-BAFA-2875-037DC3C725F9}"/>
               </a:ext>
             </a:extLst>
           </p:cNvPr>
           <p:cNvCxnSpPr>
             <a:cxnSpLocks/>
-            <a:stCxn id="20" idx="3"/>
-            <a:endCxn id="29" idx="1"/>
+            <a:stCxn id="5" idx="3"/>
+            <a:endCxn id="6" idx="1"/>
           </p:cNvCxnSpPr>
           <p:nvPr/>
         </p:nvCxnSpPr>
         <p:spPr>
           <a:xfrm>
-            <a:off x="5955145" y="2852643"/>
-            <a:ext cx="2940893" cy="0"/>
+            <a:off x="8340995" y="4765795"/>
+            <a:ext cx="555046" cy="3998"/>
           </a:xfrm>
           <a:prstGeom prst="straightConnector1">
             <a:avLst/>
@@ -13568,24 +13653,22 @@
       </p:cxnSp>
       <p:cxnSp>
         <p:nvCxnSpPr>
-          <p:cNvPr id="36" name="Straight Arrow Connector 11">
-            <a:extLst>
-              <a:ext uri="{FF2B5EF4-FFF2-40B4-BE49-F238E27FC236}">
-                <a16:creationId xmlns:a16="http://schemas.microsoft.com/office/drawing/2014/main" id="{0939BA32-55A3-5025-F860-5D4857282D4C}"/>
+          <p:cNvPr id="37" name="Straight Arrow Connector 13">
+            <a:extLst>
+              <a:ext uri="{FF2B5EF4-FFF2-40B4-BE49-F238E27FC236}">
+                <a16:creationId xmlns:a16="http://schemas.microsoft.com/office/drawing/2014/main" id="{A8015AE6-938D-9FA1-9EBD-F3A6AB72FA35}"/>
               </a:ext>
             </a:extLst>
           </p:cNvPr>
           <p:cNvCxnSpPr>
             <a:cxnSpLocks/>
-            <a:stCxn id="6" idx="0"/>
-            <a:endCxn id="29" idx="2"/>
           </p:cNvCxnSpPr>
           <p:nvPr/>
         </p:nvCxnSpPr>
         <p:spPr>
-          <a:xfrm flipV="1">
-            <a:off x="10175045" y="3237106"/>
-            <a:ext cx="2" cy="1165293"/>
+          <a:xfrm>
+            <a:off x="5583669" y="4765795"/>
+            <a:ext cx="541875" cy="0"/>
           </a:xfrm>
           <a:prstGeom prst="straightConnector1">
             <a:avLst/>
@@ -13618,112 +13701,26 @@
           </a:fontRef>
         </p:style>
       </p:cxnSp>
-      <p:sp>
-        <p:nvSpPr>
-          <p:cNvPr id="22" name="Rectangle: Rounded Corners 7">
-            <a:extLst>
-              <a:ext uri="{FF2B5EF4-FFF2-40B4-BE49-F238E27FC236}">
-                <a16:creationId xmlns:a16="http://schemas.microsoft.com/office/drawing/2014/main" id="{70D14B7E-B2E8-D44D-9F76-43A117366100}"/>
-              </a:ext>
-            </a:extLst>
-          </p:cNvPr>
-          <p:cNvSpPr/>
-          <p:nvPr/>
-        </p:nvSpPr>
-        <p:spPr>
-          <a:xfrm>
-            <a:off x="6163858" y="4402399"/>
-            <a:ext cx="2153842" cy="768927"/>
-          </a:xfrm>
-          <a:prstGeom prst="roundRect">
-            <a:avLst/>
-          </a:prstGeom>
-          <a:solidFill>
-            <a:schemeClr val="bg1">
-              <a:lumMod val="65000"/>
-            </a:schemeClr>
-          </a:solidFill>
-          <a:ln>
-            <a:noFill/>
-          </a:ln>
-        </p:spPr>
-        <p:style>
-          <a:lnRef idx="2">
-            <a:schemeClr val="accent1">
-              <a:shade val="50000"/>
-            </a:schemeClr>
-          </a:lnRef>
-          <a:fillRef idx="1">
-            <a:schemeClr val="accent1"/>
-          </a:fillRef>
-          <a:effectRef idx="0">
-            <a:schemeClr val="accent1"/>
-          </a:effectRef>
-          <a:fontRef idx="minor">
-            <a:schemeClr val="lt1"/>
-          </a:fontRef>
-        </p:style>
-        <p:txBody>
-          <a:bodyPr rtlCol="0" anchor="ctr"/>
-          <a:lstStyle/>
-          <a:p>
-            <a:pPr algn="ctr"/>
-            <a:r>
-              <a:rPr lang="de-DE" dirty="0"/>
-              <a:t>Push </a:t>
-            </a:r>
-            <a:r>
-              <a:rPr lang="de-DE" dirty="0" err="1"/>
-              <a:t>docker</a:t>
-            </a:r>
-            <a:r>
-              <a:rPr lang="de-DE" dirty="0"/>
-              <a:t> </a:t>
-            </a:r>
-            <a:r>
-              <a:rPr lang="de-DE" dirty="0" err="1"/>
-              <a:t>images</a:t>
-            </a:r>
-            <a:r>
-              <a:rPr lang="de-DE" dirty="0"/>
-              <a:t> </a:t>
-            </a:r>
-            <a:r>
-              <a:rPr lang="de-DE" dirty="0" err="1"/>
-              <a:t>to</a:t>
-            </a:r>
-            <a:r>
-              <a:rPr lang="de-DE" dirty="0"/>
-              <a:t> </a:t>
-            </a:r>
-            <a:r>
-              <a:rPr lang="de-DE" dirty="0" err="1"/>
-              <a:t>dockerhub</a:t>
-            </a:r>
-            <a:endParaRPr lang="de-DE" dirty="0"/>
-          </a:p>
-        </p:txBody>
-      </p:sp>
       <p:cxnSp>
         <p:nvCxnSpPr>
-          <p:cNvPr id="26" name="Straight Arrow Connector 13">
-            <a:extLst>
-              <a:ext uri="{FF2B5EF4-FFF2-40B4-BE49-F238E27FC236}">
-                <a16:creationId xmlns:a16="http://schemas.microsoft.com/office/drawing/2014/main" id="{D9F0D3DE-92F8-BAFA-2875-037DC3C725F9}"/>
+          <p:cNvPr id="38" name="Straight Arrow Connector 13">
+            <a:extLst>
+              <a:ext uri="{FF2B5EF4-FFF2-40B4-BE49-F238E27FC236}">
+                <a16:creationId xmlns:a16="http://schemas.microsoft.com/office/drawing/2014/main" id="{3540DC38-4A95-BC65-75B7-CE5BB359397D}"/>
               </a:ext>
             </a:extLst>
           </p:cNvPr>
           <p:cNvCxnSpPr>
             <a:cxnSpLocks/>
-            <a:stCxn id="22" idx="3"/>
-            <a:endCxn id="6" idx="1"/>
+            <a:stCxn id="4" idx="3"/>
+            <a:endCxn id="22" idx="1"/>
           </p:cNvCxnSpPr>
           <p:nvPr/>
         </p:nvCxnSpPr>
         <p:spPr>
           <a:xfrm>
-            <a:off x="8317700" y="4786863"/>
-            <a:ext cx="578338" cy="0"/>
+            <a:off x="2615194" y="4765796"/>
+            <a:ext cx="814633" cy="0"/>
           </a:xfrm>
           <a:prstGeom prst="straightConnector1">
             <a:avLst/>
@@ -14910,10 +14907,10 @@
       </p:grpSpPr>
       <p:pic>
         <p:nvPicPr>
-          <p:cNvPr id="4" name="Grafik 3">
-            <a:extLst>
-              <a:ext uri="{FF2B5EF4-FFF2-40B4-BE49-F238E27FC236}">
-                <a16:creationId xmlns:a16="http://schemas.microsoft.com/office/drawing/2014/main" id="{73EAFD23-835D-BE75-950B-784D8824F747}"/>
+          <p:cNvPr id="5" name="Grafik 4">
+            <a:extLst>
+              <a:ext uri="{FF2B5EF4-FFF2-40B4-BE49-F238E27FC236}">
+                <a16:creationId xmlns:a16="http://schemas.microsoft.com/office/drawing/2014/main" id="{933AA050-33BC-ADA8-560D-587E2ED6CD34}"/>
               </a:ext>
             </a:extLst>
           </p:cNvPr>
@@ -14939,8 +14936,8 @@
         </p:blipFill>
         <p:spPr>
           <a:xfrm>
-            <a:off x="476704" y="2787382"/>
-            <a:ext cx="9294109" cy="3253758"/>
+            <a:off x="339132" y="2762514"/>
+            <a:ext cx="9454226" cy="3217929"/>
           </a:xfrm>
           <a:prstGeom prst="rect">
             <a:avLst/>
@@ -14989,7 +14986,7 @@
         </p:nvSpPr>
         <p:spPr>
           <a:xfrm>
-            <a:off x="2056737" y="1663601"/>
+            <a:off x="2740599" y="1639751"/>
             <a:ext cx="2719346" cy="646331"/>
           </a:xfrm>
           <a:prstGeom prst="rect">
@@ -15426,7 +15423,7 @@
         </p:blipFill>
         <p:spPr>
           <a:xfrm rot="10800000">
-            <a:off x="3416410" y="2305314"/>
+            <a:off x="4100272" y="2281464"/>
             <a:ext cx="914400" cy="914400"/>
           </a:xfrm>
           <a:prstGeom prst="rect">

</xml_diff>

<commit_message>
Added new version of diagram
</commit_message>
<xml_diff>
--- a/Project Presentation.pptx
+++ b/Project Presentation.pptx
@@ -6,7 +6,7 @@
     <p:sldMasterId id="2147483660" r:id="rId2"/>
   </p:sldMasterIdLst>
   <p:notesMasterIdLst>
-    <p:notesMasterId r:id="rId35"/>
+    <p:notesMasterId r:id="rId34"/>
   </p:notesMasterIdLst>
   <p:sldIdLst>
     <p:sldId id="256" r:id="rId3"/>
@@ -32,15 +32,14 @@
     <p:sldId id="317" r:id="rId23"/>
     <p:sldId id="322" r:id="rId24"/>
     <p:sldId id="304" r:id="rId25"/>
-    <p:sldId id="305" r:id="rId26"/>
-    <p:sldId id="302" r:id="rId27"/>
-    <p:sldId id="324" r:id="rId28"/>
-    <p:sldId id="319" r:id="rId29"/>
-    <p:sldId id="326" r:id="rId30"/>
-    <p:sldId id="323" r:id="rId31"/>
-    <p:sldId id="320" r:id="rId32"/>
-    <p:sldId id="300" r:id="rId33"/>
-    <p:sldId id="303" r:id="rId34"/>
+    <p:sldId id="302" r:id="rId26"/>
+    <p:sldId id="324" r:id="rId27"/>
+    <p:sldId id="319" r:id="rId28"/>
+    <p:sldId id="326" r:id="rId29"/>
+    <p:sldId id="323" r:id="rId30"/>
+    <p:sldId id="320" r:id="rId31"/>
+    <p:sldId id="300" r:id="rId32"/>
+    <p:sldId id="303" r:id="rId33"/>
   </p:sldIdLst>
   <p:sldSz cx="12192000" cy="6858000"/>
   <p:notesSz cx="6858000" cy="9144000"/>
@@ -580,266 +579,6 @@
 </p:notes>
 </file>
 
-<file path=ppt/notesSlides/notesSlide10.xml><?xml version="1.0" encoding="utf-8"?>
-<p:notes xmlns:a="http://schemas.openxmlformats.org/drawingml/2006/main" xmlns:r="http://schemas.openxmlformats.org/officeDocument/2006/relationships" xmlns:p="http://schemas.openxmlformats.org/presentationml/2006/main">
-  <p:cSld>
-    <p:spTree>
-      <p:nvGrpSpPr>
-        <p:cNvPr id="1" name=""/>
-        <p:cNvGrpSpPr/>
-        <p:nvPr/>
-      </p:nvGrpSpPr>
-      <p:grpSpPr>
-        <a:xfrm>
-          <a:off x="0" y="0"/>
-          <a:ext cx="0" cy="0"/>
-          <a:chOff x="0" y="0"/>
-          <a:chExt cx="0" cy="0"/>
-        </a:xfrm>
-      </p:grpSpPr>
-      <p:sp>
-        <p:nvSpPr>
-          <p:cNvPr id="2" name="Folienbildplatzhalter 1"/>
-          <p:cNvSpPr>
-            <a:spLocks noGrp="1" noRot="1" noChangeAspect="1"/>
-          </p:cNvSpPr>
-          <p:nvPr>
-            <p:ph type="sldImg"/>
-          </p:nvPr>
-        </p:nvSpPr>
-        <p:spPr/>
-      </p:sp>
-      <p:sp>
-        <p:nvSpPr>
-          <p:cNvPr id="3" name="Notizenplatzhalter 2"/>
-          <p:cNvSpPr>
-            <a:spLocks noGrp="1"/>
-          </p:cNvSpPr>
-          <p:nvPr>
-            <p:ph type="body" idx="1"/>
-          </p:nvPr>
-        </p:nvSpPr>
-        <p:spPr/>
-        <p:txBody>
-          <a:bodyPr/>
-          <a:lstStyle/>
-          <a:p>
-            <a:r>
-              <a:rPr lang="de-DE" dirty="0"/>
-              <a:t>Like </a:t>
-            </a:r>
-            <a:r>
-              <a:rPr lang="de-DE" dirty="0" err="1"/>
-              <a:t>this</a:t>
-            </a:r>
-            <a:r>
-              <a:rPr lang="de-DE" dirty="0"/>
-              <a:t>, </a:t>
-            </a:r>
-            <a:r>
-              <a:rPr lang="de-DE" dirty="0" err="1"/>
-              <a:t>the</a:t>
-            </a:r>
-            <a:r>
-              <a:rPr lang="de-DE" dirty="0"/>
-              <a:t> </a:t>
-            </a:r>
-            <a:r>
-              <a:rPr lang="de-DE" dirty="0" err="1"/>
-              <a:t>handling</a:t>
-            </a:r>
-            <a:r>
-              <a:rPr lang="de-DE" dirty="0"/>
-              <a:t> of </a:t>
-            </a:r>
-            <a:r>
-              <a:rPr lang="de-DE" dirty="0" err="1"/>
-              <a:t>the</a:t>
-            </a:r>
-            <a:r>
-              <a:rPr lang="de-DE" dirty="0"/>
-              <a:t> </a:t>
-            </a:r>
-            <a:r>
-              <a:rPr lang="de-DE" dirty="0" err="1"/>
-              <a:t>data</a:t>
-            </a:r>
-            <a:r>
-              <a:rPr lang="de-DE" dirty="0"/>
-              <a:t> </a:t>
-            </a:r>
-            <a:r>
-              <a:rPr lang="de-DE" dirty="0" err="1"/>
-              <a:t>would</a:t>
-            </a:r>
-            <a:r>
-              <a:rPr lang="de-DE" dirty="0"/>
-              <a:t> </a:t>
-            </a:r>
-            <a:r>
-              <a:rPr lang="de-DE" dirty="0" err="1"/>
-              <a:t>be</a:t>
-            </a:r>
-            <a:r>
-              <a:rPr lang="de-DE" dirty="0"/>
-              <a:t> </a:t>
-            </a:r>
-            <a:r>
-              <a:rPr lang="de-DE" dirty="0" err="1"/>
-              <a:t>improved</a:t>
-            </a:r>
-            <a:r>
-              <a:rPr lang="de-DE" dirty="0"/>
-              <a:t>, also </a:t>
-            </a:r>
-            <a:r>
-              <a:rPr lang="de-DE" dirty="0" err="1"/>
-              <a:t>it</a:t>
-            </a:r>
-            <a:r>
-              <a:rPr lang="de-DE" dirty="0"/>
-              <a:t> </a:t>
-            </a:r>
-            <a:r>
-              <a:rPr lang="de-DE" dirty="0" err="1"/>
-              <a:t>would</a:t>
-            </a:r>
-            <a:r>
-              <a:rPr lang="de-DE" dirty="0"/>
-              <a:t> </a:t>
-            </a:r>
-            <a:r>
-              <a:rPr lang="de-DE" dirty="0" err="1"/>
-              <a:t>be</a:t>
-            </a:r>
-            <a:r>
-              <a:rPr lang="de-DE" dirty="0"/>
-              <a:t> possible </a:t>
-            </a:r>
-            <a:r>
-              <a:rPr lang="de-DE" dirty="0" err="1"/>
-              <a:t>to</a:t>
-            </a:r>
-            <a:r>
-              <a:rPr lang="de-DE" dirty="0"/>
-              <a:t> </a:t>
-            </a:r>
-            <a:r>
-              <a:rPr lang="de-DE" dirty="0" err="1"/>
-              <a:t>implement</a:t>
-            </a:r>
-            <a:r>
-              <a:rPr lang="de-DE" dirty="0"/>
-              <a:t> </a:t>
-            </a:r>
-            <a:r>
-              <a:rPr lang="de-DE" dirty="0" err="1"/>
-              <a:t>Autoscaling</a:t>
-            </a:r>
-            <a:r>
-              <a:rPr lang="de-DE" dirty="0"/>
-              <a:t> and Load Balancer, </a:t>
-            </a:r>
-            <a:r>
-              <a:rPr lang="de-DE" dirty="0" err="1"/>
-              <a:t>possibility</a:t>
-            </a:r>
-            <a:r>
-              <a:rPr lang="de-DE" dirty="0"/>
-              <a:t> </a:t>
-            </a:r>
-            <a:r>
-              <a:rPr lang="de-DE" dirty="0" err="1"/>
-              <a:t>to</a:t>
-            </a:r>
-            <a:r>
-              <a:rPr lang="de-DE" dirty="0"/>
-              <a:t> </a:t>
-            </a:r>
-            <a:r>
-              <a:rPr lang="de-DE" dirty="0" err="1"/>
-              <a:t>use</a:t>
-            </a:r>
-            <a:r>
-              <a:rPr lang="de-DE" dirty="0"/>
-              <a:t> an alternative </a:t>
-            </a:r>
-            <a:r>
-              <a:rPr lang="de-DE" dirty="0" err="1"/>
-              <a:t>to</a:t>
-            </a:r>
-            <a:r>
-              <a:rPr lang="de-DE" dirty="0"/>
-              <a:t> EC2 (e.g. Lambda, </a:t>
-            </a:r>
-            <a:r>
-              <a:rPr lang="de-DE" dirty="0" err="1"/>
-              <a:t>Beanstalk</a:t>
-            </a:r>
-            <a:r>
-              <a:rPr lang="de-DE" dirty="0"/>
-              <a:t>), </a:t>
-            </a:r>
-            <a:r>
-              <a:rPr lang="de-DE" dirty="0" err="1"/>
-              <a:t>fewer</a:t>
-            </a:r>
-            <a:r>
-              <a:rPr lang="de-DE" dirty="0"/>
-              <a:t> </a:t>
-            </a:r>
-            <a:r>
-              <a:rPr lang="de-DE" dirty="0" err="1"/>
-              <a:t>layers</a:t>
-            </a:r>
-            <a:r>
-              <a:rPr lang="de-DE" dirty="0"/>
-              <a:t> of </a:t>
-            </a:r>
-            <a:r>
-              <a:rPr lang="de-DE" dirty="0" err="1"/>
-              <a:t>virtualisation</a:t>
-            </a:r>
-            <a:endParaRPr lang="de-DE" dirty="0"/>
-          </a:p>
-        </p:txBody>
-      </p:sp>
-      <p:sp>
-        <p:nvSpPr>
-          <p:cNvPr id="4" name="Foliennummernplatzhalter 3"/>
-          <p:cNvSpPr>
-            <a:spLocks noGrp="1"/>
-          </p:cNvSpPr>
-          <p:nvPr>
-            <p:ph type="sldNum" sz="quarter" idx="5"/>
-          </p:nvPr>
-        </p:nvSpPr>
-        <p:spPr/>
-        <p:txBody>
-          <a:bodyPr/>
-          <a:lstStyle/>
-          <a:p>
-            <a:fld id="{5976870D-EDE0-4065-9108-FF08285B4E25}" type="slidenum">
-              <a:rPr lang="de-DE" smtClean="0"/>
-              <a:t>30</a:t>
-            </a:fld>
-            <a:endParaRPr lang="de-DE"/>
-          </a:p>
-        </p:txBody>
-      </p:sp>
-    </p:spTree>
-    <p:extLst>
-      <p:ext uri="{BB962C8B-B14F-4D97-AF65-F5344CB8AC3E}">
-        <p14:creationId xmlns:p14="http://schemas.microsoft.com/office/powerpoint/2010/main" val="191350293"/>
-      </p:ext>
-    </p:extLst>
-  </p:cSld>
-  <p:clrMapOvr>
-    <a:masterClrMapping/>
-  </p:clrMapOvr>
-</p:notes>
-</file>
-
 <file path=ppt/notesSlides/notesSlide2.xml><?xml version="1.0" encoding="utf-8"?>
 <p:notes xmlns:a="http://schemas.openxmlformats.org/drawingml/2006/main" xmlns:r="http://schemas.openxmlformats.org/officeDocument/2006/relationships" xmlns:p="http://schemas.openxmlformats.org/presentationml/2006/main">
   <p:cSld>
@@ -1984,7 +1723,7 @@
       </p:grpSpPr>
       <p:sp>
         <p:nvSpPr>
-          <p:cNvPr id="2" name="Slide Image Placeholder 1"/>
+          <p:cNvPr id="2" name="Folienbildplatzhalter 1"/>
           <p:cNvSpPr>
             <a:spLocks noGrp="1" noRot="1" noChangeAspect="1"/>
           </p:cNvSpPr>
@@ -1996,7 +1735,7 @@
       </p:sp>
       <p:sp>
         <p:nvSpPr>
-          <p:cNvPr id="3" name="Notes Placeholder 2"/>
+          <p:cNvPr id="3" name="Notizenplatzhalter 2"/>
           <p:cNvSpPr>
             <a:spLocks noGrp="1"/>
           </p:cNvSpPr>
@@ -2009,13 +1748,189 @@
           <a:bodyPr/>
           <a:lstStyle/>
           <a:p>
-            <a:endParaRPr lang="de-DE"/>
-          </a:p>
-        </p:txBody>
-      </p:sp>
-      <p:sp>
-        <p:nvSpPr>
-          <p:cNvPr id="4" name="Slide Number Placeholder 3"/>
+            <a:r>
+              <a:rPr lang="de-DE" dirty="0"/>
+              <a:t>Like </a:t>
+            </a:r>
+            <a:r>
+              <a:rPr lang="de-DE" dirty="0" err="1"/>
+              <a:t>this</a:t>
+            </a:r>
+            <a:r>
+              <a:rPr lang="de-DE" dirty="0"/>
+              <a:t>, </a:t>
+            </a:r>
+            <a:r>
+              <a:rPr lang="de-DE" dirty="0" err="1"/>
+              <a:t>the</a:t>
+            </a:r>
+            <a:r>
+              <a:rPr lang="de-DE" dirty="0"/>
+              <a:t> </a:t>
+            </a:r>
+            <a:r>
+              <a:rPr lang="de-DE" dirty="0" err="1"/>
+              <a:t>handling</a:t>
+            </a:r>
+            <a:r>
+              <a:rPr lang="de-DE" dirty="0"/>
+              <a:t> of </a:t>
+            </a:r>
+            <a:r>
+              <a:rPr lang="de-DE" dirty="0" err="1"/>
+              <a:t>the</a:t>
+            </a:r>
+            <a:r>
+              <a:rPr lang="de-DE" dirty="0"/>
+              <a:t> </a:t>
+            </a:r>
+            <a:r>
+              <a:rPr lang="de-DE" dirty="0" err="1"/>
+              <a:t>data</a:t>
+            </a:r>
+            <a:r>
+              <a:rPr lang="de-DE" dirty="0"/>
+              <a:t> </a:t>
+            </a:r>
+            <a:r>
+              <a:rPr lang="de-DE" dirty="0" err="1"/>
+              <a:t>would</a:t>
+            </a:r>
+            <a:r>
+              <a:rPr lang="de-DE" dirty="0"/>
+              <a:t> </a:t>
+            </a:r>
+            <a:r>
+              <a:rPr lang="de-DE" dirty="0" err="1"/>
+              <a:t>be</a:t>
+            </a:r>
+            <a:r>
+              <a:rPr lang="de-DE" dirty="0"/>
+              <a:t> </a:t>
+            </a:r>
+            <a:r>
+              <a:rPr lang="de-DE" dirty="0" err="1"/>
+              <a:t>improved</a:t>
+            </a:r>
+            <a:r>
+              <a:rPr lang="de-DE" dirty="0"/>
+              <a:t>, also </a:t>
+            </a:r>
+            <a:r>
+              <a:rPr lang="de-DE" dirty="0" err="1"/>
+              <a:t>it</a:t>
+            </a:r>
+            <a:r>
+              <a:rPr lang="de-DE" dirty="0"/>
+              <a:t> </a:t>
+            </a:r>
+            <a:r>
+              <a:rPr lang="de-DE" dirty="0" err="1"/>
+              <a:t>would</a:t>
+            </a:r>
+            <a:r>
+              <a:rPr lang="de-DE" dirty="0"/>
+              <a:t> </a:t>
+            </a:r>
+            <a:r>
+              <a:rPr lang="de-DE" dirty="0" err="1"/>
+              <a:t>be</a:t>
+            </a:r>
+            <a:r>
+              <a:rPr lang="de-DE" dirty="0"/>
+              <a:t> possible </a:t>
+            </a:r>
+            <a:r>
+              <a:rPr lang="de-DE" dirty="0" err="1"/>
+              <a:t>to</a:t>
+            </a:r>
+            <a:r>
+              <a:rPr lang="de-DE" dirty="0"/>
+              <a:t> </a:t>
+            </a:r>
+            <a:r>
+              <a:rPr lang="de-DE" dirty="0" err="1"/>
+              <a:t>implement</a:t>
+            </a:r>
+            <a:r>
+              <a:rPr lang="de-DE" dirty="0"/>
+              <a:t> </a:t>
+            </a:r>
+            <a:r>
+              <a:rPr lang="de-DE" dirty="0" err="1"/>
+              <a:t>Autoscaling</a:t>
+            </a:r>
+            <a:r>
+              <a:rPr lang="de-DE" dirty="0"/>
+              <a:t> and Load Balancer, </a:t>
+            </a:r>
+            <a:r>
+              <a:rPr lang="de-DE" dirty="0" err="1"/>
+              <a:t>possibility</a:t>
+            </a:r>
+            <a:r>
+              <a:rPr lang="de-DE" dirty="0"/>
+              <a:t> </a:t>
+            </a:r>
+            <a:r>
+              <a:rPr lang="de-DE" dirty="0" err="1"/>
+              <a:t>to</a:t>
+            </a:r>
+            <a:r>
+              <a:rPr lang="de-DE" dirty="0"/>
+              <a:t> </a:t>
+            </a:r>
+            <a:r>
+              <a:rPr lang="de-DE" dirty="0" err="1"/>
+              <a:t>use</a:t>
+            </a:r>
+            <a:r>
+              <a:rPr lang="de-DE" dirty="0"/>
+              <a:t> an alternative </a:t>
+            </a:r>
+            <a:r>
+              <a:rPr lang="de-DE" dirty="0" err="1"/>
+              <a:t>to</a:t>
+            </a:r>
+            <a:r>
+              <a:rPr lang="de-DE" dirty="0"/>
+              <a:t> EC2 (e.g. Lambda, </a:t>
+            </a:r>
+            <a:r>
+              <a:rPr lang="de-DE" dirty="0" err="1"/>
+              <a:t>Beanstalk</a:t>
+            </a:r>
+            <a:r>
+              <a:rPr lang="de-DE" dirty="0"/>
+              <a:t>), </a:t>
+            </a:r>
+            <a:r>
+              <a:rPr lang="de-DE" dirty="0" err="1"/>
+              <a:t>fewer</a:t>
+            </a:r>
+            <a:r>
+              <a:rPr lang="de-DE" dirty="0"/>
+              <a:t> </a:t>
+            </a:r>
+            <a:r>
+              <a:rPr lang="de-DE" dirty="0" err="1"/>
+              <a:t>layers</a:t>
+            </a:r>
+            <a:r>
+              <a:rPr lang="de-DE" dirty="0"/>
+              <a:t> of </a:t>
+            </a:r>
+            <a:r>
+              <a:rPr lang="de-DE" dirty="0" err="1"/>
+              <a:t>virtualisation</a:t>
+            </a:r>
+            <a:endParaRPr lang="de-DE" dirty="0"/>
+          </a:p>
+        </p:txBody>
+      </p:sp>
+      <p:sp>
+        <p:nvSpPr>
+          <p:cNvPr id="4" name="Foliennummernplatzhalter 3"/>
           <p:cNvSpPr>
             <a:spLocks noGrp="1"/>
           </p:cNvSpPr>
@@ -2030,7 +1945,7 @@
           <a:p>
             <a:fld id="{5976870D-EDE0-4065-9108-FF08285B4E25}" type="slidenum">
               <a:rPr lang="de-DE" smtClean="0"/>
-              <a:t>24</a:t>
+              <a:t>28</a:t>
             </a:fld>
             <a:endParaRPr lang="de-DE"/>
           </a:p>
@@ -2039,7 +1954,7 @@
     </p:spTree>
     <p:extLst>
       <p:ext uri="{BB962C8B-B14F-4D97-AF65-F5344CB8AC3E}">
-        <p14:creationId xmlns:p14="http://schemas.microsoft.com/office/powerpoint/2010/main" val="287121394"/>
+        <p14:creationId xmlns:p14="http://schemas.microsoft.com/office/powerpoint/2010/main" val="848746586"/>
       </p:ext>
     </p:extLst>
   </p:cSld>
@@ -2299,7 +2214,7 @@
     </p:spTree>
     <p:extLst>
       <p:ext uri="{BB962C8B-B14F-4D97-AF65-F5344CB8AC3E}">
-        <p14:creationId xmlns:p14="http://schemas.microsoft.com/office/powerpoint/2010/main" val="848746586"/>
+        <p14:creationId xmlns:p14="http://schemas.microsoft.com/office/powerpoint/2010/main" val="191350293"/>
       </p:ext>
     </p:extLst>
   </p:cSld>
@@ -15620,19 +15535,17 @@
       </p:grpSpPr>
       <p:pic>
         <p:nvPicPr>
-          <p:cNvPr id="6" name="Content Placeholder 5" descr="Graphical user interface&#10;&#10;Description automatically generated">
-            <a:extLst>
-              <a:ext uri="{FF2B5EF4-FFF2-40B4-BE49-F238E27FC236}">
-                <a16:creationId xmlns:a16="http://schemas.microsoft.com/office/drawing/2014/main" id="{ED725C0A-64A6-40CB-92B2-245C3C8F3BE6}"/>
+          <p:cNvPr id="8" name="Grafik 7">
+            <a:extLst>
+              <a:ext uri="{FF2B5EF4-FFF2-40B4-BE49-F238E27FC236}">
+                <a16:creationId xmlns:a16="http://schemas.microsoft.com/office/drawing/2014/main" id="{FAC98668-C192-06C0-8E13-7ABE2714EBD5}"/>
               </a:ext>
             </a:extLst>
           </p:cNvPr>
           <p:cNvPicPr>
-            <a:picLocks noGrp="1" noChangeAspect="1"/>
+            <a:picLocks noChangeAspect="1"/>
           </p:cNvPicPr>
-          <p:nvPr>
-            <p:ph idx="1"/>
-          </p:nvPr>
+          <p:nvPr/>
         </p:nvPicPr>
         <p:blipFill>
           <a:blip r:embed="rId3">
@@ -15648,9 +15561,12 @@
         </p:blipFill>
         <p:spPr>
           <a:xfrm>
-            <a:off x="1990673" y="128750"/>
-            <a:ext cx="8210654" cy="6600499"/>
-          </a:xfrm>
+            <a:off x="1127106" y="213836"/>
+            <a:ext cx="9937788" cy="6310210"/>
+          </a:xfrm>
+          <a:prstGeom prst="rect">
+            <a:avLst/>
+          </a:prstGeom>
         </p:spPr>
       </p:pic>
     </p:spTree>
@@ -15667,7 +15583,7 @@
 </file>
 
 <file path=ppt/slides/slide24.xml><?xml version="1.0" encoding="utf-8"?>
-<p:sld xmlns:a="http://schemas.openxmlformats.org/drawingml/2006/main" xmlns:r="http://schemas.openxmlformats.org/officeDocument/2006/relationships" xmlns:p="http://schemas.openxmlformats.org/presentationml/2006/main" show="0">
+<p:sld xmlns:a="http://schemas.openxmlformats.org/drawingml/2006/main" xmlns:r="http://schemas.openxmlformats.org/officeDocument/2006/relationships" xmlns:p="http://schemas.openxmlformats.org/presentationml/2006/main">
   <p:cSld>
     <p:spTree>
       <p:nvGrpSpPr>
@@ -15683,207 +15599,83 @@
           <a:chExt cx="0" cy="0"/>
         </a:xfrm>
       </p:grpSpPr>
-      <p:pic>
-        <p:nvPicPr>
-          <p:cNvPr id="6" name="Content Placeholder 5" descr="Graphical user interface&#10;&#10;Description automatically generated">
-            <a:extLst>
-              <a:ext uri="{FF2B5EF4-FFF2-40B4-BE49-F238E27FC236}">
-                <a16:creationId xmlns:a16="http://schemas.microsoft.com/office/drawing/2014/main" id="{ED725C0A-64A6-40CB-92B2-245C3C8F3BE6}"/>
-              </a:ext>
-            </a:extLst>
-          </p:cNvPr>
-          <p:cNvPicPr>
-            <a:picLocks noGrp="1" noChangeAspect="1"/>
-          </p:cNvPicPr>
+      <p:sp>
+        <p:nvSpPr>
+          <p:cNvPr id="2" name="Titel 1">
+            <a:extLst>
+              <a:ext uri="{FF2B5EF4-FFF2-40B4-BE49-F238E27FC236}">
+                <a16:creationId xmlns:a16="http://schemas.microsoft.com/office/drawing/2014/main" id="{423EE35B-33E3-42A0-BBDA-368E8D825D7E}"/>
+              </a:ext>
+            </a:extLst>
+          </p:cNvPr>
+          <p:cNvSpPr>
+            <a:spLocks noGrp="1"/>
+          </p:cNvSpPr>
           <p:nvPr>
-            <p:ph idx="1"/>
+            <p:ph type="ctrTitle"/>
           </p:nvPr>
-        </p:nvPicPr>
-        <p:blipFill>
-          <a:blip r:embed="rId3">
-            <a:extLst>
-              <a:ext uri="{28A0092B-C50C-407E-A947-70E740481C1C}">
-                <a14:useLocalDpi xmlns:a14="http://schemas.microsoft.com/office/drawing/2010/main" val="0"/>
-              </a:ext>
-            </a:extLst>
-          </a:blip>
-          <a:stretch>
-            <a:fillRect/>
-          </a:stretch>
-        </p:blipFill>
-        <p:spPr>
-          <a:xfrm>
-            <a:off x="1990673" y="128750"/>
-            <a:ext cx="8210654" cy="6600499"/>
-          </a:xfrm>
-        </p:spPr>
-      </p:pic>
-      <p:sp>
-        <p:nvSpPr>
-          <p:cNvPr id="2" name="Rectangle 1">
-            <a:extLst>
-              <a:ext uri="{FF2B5EF4-FFF2-40B4-BE49-F238E27FC236}">
-                <a16:creationId xmlns:a16="http://schemas.microsoft.com/office/drawing/2014/main" id="{C4C43598-254E-42A3-A873-E9DE551DF40B}"/>
-              </a:ext>
-            </a:extLst>
-          </p:cNvPr>
-          <p:cNvSpPr/>
-          <p:nvPr/>
-        </p:nvSpPr>
-        <p:spPr>
-          <a:xfrm>
-            <a:off x="1418897" y="2081048"/>
-            <a:ext cx="7683062" cy="1040524"/>
-          </a:xfrm>
-          <a:prstGeom prst="rect">
-            <a:avLst/>
-          </a:prstGeom>
-          <a:solidFill>
-            <a:schemeClr val="bg1">
-              <a:alpha val="70000"/>
-            </a:schemeClr>
-          </a:solidFill>
-          <a:ln>
-            <a:noFill/>
-          </a:ln>
-        </p:spPr>
-        <p:style>
-          <a:lnRef idx="2">
-            <a:schemeClr val="accent1">
-              <a:shade val="50000"/>
-            </a:schemeClr>
-          </a:lnRef>
-          <a:fillRef idx="1">
-            <a:schemeClr val="accent1"/>
-          </a:fillRef>
-          <a:effectRef idx="0">
-            <a:schemeClr val="accent1"/>
-          </a:effectRef>
-          <a:fontRef idx="minor">
-            <a:schemeClr val="lt1"/>
-          </a:fontRef>
-        </p:style>
-        <p:txBody>
-          <a:bodyPr rtlCol="0" anchor="ctr"/>
-          <a:lstStyle/>
-          <a:p>
-            <a:pPr algn="ctr"/>
-            <a:endParaRPr lang="de-DE"/>
-          </a:p>
-        </p:txBody>
-      </p:sp>
-      <p:sp>
-        <p:nvSpPr>
-          <p:cNvPr id="7" name="Rectangle 6">
-            <a:extLst>
-              <a:ext uri="{FF2B5EF4-FFF2-40B4-BE49-F238E27FC236}">
-                <a16:creationId xmlns:a16="http://schemas.microsoft.com/office/drawing/2014/main" id="{EFF89D9B-D28C-4593-BCB5-8437E76ED3D2}"/>
-              </a:ext>
-            </a:extLst>
-          </p:cNvPr>
-          <p:cNvSpPr/>
-          <p:nvPr/>
-        </p:nvSpPr>
-        <p:spPr>
-          <a:xfrm>
-            <a:off x="7147034" y="3121571"/>
-            <a:ext cx="1613338" cy="1481959"/>
-          </a:xfrm>
-          <a:prstGeom prst="rect">
-            <a:avLst/>
-          </a:prstGeom>
-          <a:solidFill>
-            <a:schemeClr val="bg1">
-              <a:alpha val="70000"/>
-            </a:schemeClr>
-          </a:solidFill>
-          <a:ln>
-            <a:noFill/>
-          </a:ln>
-        </p:spPr>
-        <p:style>
-          <a:lnRef idx="2">
-            <a:schemeClr val="accent1">
-              <a:shade val="50000"/>
-            </a:schemeClr>
-          </a:lnRef>
-          <a:fillRef idx="1">
-            <a:schemeClr val="accent1"/>
-          </a:fillRef>
-          <a:effectRef idx="0">
-            <a:schemeClr val="accent1"/>
-          </a:effectRef>
-          <a:fontRef idx="minor">
-            <a:schemeClr val="lt1"/>
-          </a:fontRef>
-        </p:style>
-        <p:txBody>
-          <a:bodyPr rtlCol="0" anchor="ctr"/>
-          <a:lstStyle/>
-          <a:p>
-            <a:pPr algn="ctr"/>
-            <a:endParaRPr lang="de-DE"/>
-          </a:p>
-        </p:txBody>
-      </p:sp>
-      <p:sp>
-        <p:nvSpPr>
-          <p:cNvPr id="8" name="Rectangle 7">
-            <a:extLst>
-              <a:ext uri="{FF2B5EF4-FFF2-40B4-BE49-F238E27FC236}">
-                <a16:creationId xmlns:a16="http://schemas.microsoft.com/office/drawing/2014/main" id="{D2B05F31-F8A8-4C31-969B-B15C8141EB9C}"/>
-              </a:ext>
-            </a:extLst>
-          </p:cNvPr>
-          <p:cNvSpPr/>
-          <p:nvPr/>
-        </p:nvSpPr>
-        <p:spPr>
-          <a:xfrm>
-            <a:off x="1644869" y="4382815"/>
-            <a:ext cx="3547242" cy="2475186"/>
-          </a:xfrm>
-          <a:prstGeom prst="rect">
-            <a:avLst/>
-          </a:prstGeom>
-          <a:solidFill>
-            <a:schemeClr val="bg1">
-              <a:alpha val="70000"/>
-            </a:schemeClr>
-          </a:solidFill>
-          <a:ln>
-            <a:noFill/>
-          </a:ln>
-        </p:spPr>
-        <p:style>
-          <a:lnRef idx="2">
-            <a:schemeClr val="accent1">
-              <a:shade val="50000"/>
-            </a:schemeClr>
-          </a:lnRef>
-          <a:fillRef idx="1">
-            <a:schemeClr val="accent1"/>
-          </a:fillRef>
-          <a:effectRef idx="0">
-            <a:schemeClr val="accent1"/>
-          </a:effectRef>
-          <a:fontRef idx="minor">
-            <a:schemeClr val="lt1"/>
-          </a:fontRef>
-        </p:style>
-        <p:txBody>
-          <a:bodyPr rtlCol="0" anchor="ctr"/>
-          <a:lstStyle/>
-          <a:p>
-            <a:pPr algn="ctr"/>
-            <a:endParaRPr lang="de-DE"/>
+        </p:nvSpPr>
+        <p:spPr/>
+        <p:txBody>
+          <a:bodyPr/>
+          <a:lstStyle/>
+          <a:p>
+            <a:r>
+              <a:rPr lang="de-DE"/>
+              <a:t>Working Demo</a:t>
+            </a:r>
+            <a:endParaRPr lang="de-DE" dirty="0"/>
+          </a:p>
+        </p:txBody>
+      </p:sp>
+      <p:sp>
+        <p:nvSpPr>
+          <p:cNvPr id="5" name="Untertitel 4">
+            <a:extLst>
+              <a:ext uri="{FF2B5EF4-FFF2-40B4-BE49-F238E27FC236}">
+                <a16:creationId xmlns:a16="http://schemas.microsoft.com/office/drawing/2014/main" id="{B11A7254-9FA9-40F3-BD35-E1C8D97446A8}"/>
+              </a:ext>
+            </a:extLst>
+          </p:cNvPr>
+          <p:cNvSpPr>
+            <a:spLocks noGrp="1"/>
+          </p:cNvSpPr>
+          <p:nvPr>
+            <p:ph type="subTitle" idx="1"/>
+          </p:nvPr>
+        </p:nvSpPr>
+        <p:spPr/>
+        <p:txBody>
+          <a:bodyPr/>
+          <a:lstStyle/>
+          <a:p>
+            <a:r>
+              <a:rPr lang="de-DE" dirty="0"/>
+              <a:t>See </a:t>
+            </a:r>
+            <a:r>
+              <a:rPr lang="de-DE" dirty="0" err="1"/>
+              <a:t>the</a:t>
+            </a:r>
+            <a:r>
+              <a:rPr lang="de-DE" dirty="0"/>
+              <a:t> </a:t>
+            </a:r>
+            <a:r>
+              <a:rPr lang="de-DE" dirty="0" err="1"/>
+              <a:t>magic</a:t>
+            </a:r>
+            <a:r>
+              <a:rPr lang="de-DE" dirty="0"/>
+              <a:t>… 🦄</a:t>
+            </a:r>
           </a:p>
         </p:txBody>
       </p:sp>
     </p:spTree>
     <p:extLst>
       <p:ext uri="{BB962C8B-B14F-4D97-AF65-F5344CB8AC3E}">
-        <p14:creationId xmlns:p14="http://schemas.microsoft.com/office/powerpoint/2010/main" val="1587925568"/>
+        <p14:creationId xmlns:p14="http://schemas.microsoft.com/office/powerpoint/2010/main" val="3888514522"/>
       </p:ext>
     </p:extLst>
   </p:cSld>
@@ -15926,67 +15718,68 @@
             <p:ph type="ctrTitle"/>
           </p:nvPr>
         </p:nvSpPr>
-        <p:spPr/>
-        <p:txBody>
-          <a:bodyPr/>
-          <a:lstStyle/>
-          <a:p>
-            <a:r>
-              <a:rPr lang="de-DE"/>
-              <a:t>Working Demo</a:t>
-            </a:r>
-            <a:endParaRPr lang="de-DE" dirty="0"/>
-          </a:p>
-        </p:txBody>
-      </p:sp>
-      <p:sp>
-        <p:nvSpPr>
-          <p:cNvPr id="5" name="Untertitel 4">
-            <a:extLst>
-              <a:ext uri="{FF2B5EF4-FFF2-40B4-BE49-F238E27FC236}">
-                <a16:creationId xmlns:a16="http://schemas.microsoft.com/office/drawing/2014/main" id="{B11A7254-9FA9-40F3-BD35-E1C8D97446A8}"/>
-              </a:ext>
-            </a:extLst>
-          </p:cNvPr>
-          <p:cNvSpPr>
-            <a:spLocks noGrp="1"/>
-          </p:cNvSpPr>
-          <p:nvPr>
-            <p:ph type="subTitle" idx="1"/>
-          </p:nvPr>
-        </p:nvSpPr>
-        <p:spPr/>
-        <p:txBody>
-          <a:bodyPr/>
-          <a:lstStyle/>
-          <a:p>
-            <a:r>
-              <a:rPr lang="de-DE" dirty="0"/>
-              <a:t>See </a:t>
-            </a:r>
-            <a:r>
-              <a:rPr lang="de-DE" dirty="0" err="1"/>
-              <a:t>the</a:t>
-            </a:r>
-            <a:r>
-              <a:rPr lang="de-DE" dirty="0"/>
-              <a:t> </a:t>
-            </a:r>
-            <a:r>
-              <a:rPr lang="de-DE" dirty="0" err="1"/>
-              <a:t>magic</a:t>
-            </a:r>
-            <a:r>
-              <a:rPr lang="de-DE" dirty="0"/>
-              <a:t>… 🦄</a:t>
-            </a:r>
-          </a:p>
-        </p:txBody>
-      </p:sp>
+        <p:spPr>
+          <a:xfrm>
+            <a:off x="1524000" y="1432464"/>
+            <a:ext cx="9144000" cy="2387600"/>
+          </a:xfrm>
+        </p:spPr>
+        <p:txBody>
+          <a:bodyPr>
+            <a:normAutofit/>
+          </a:bodyPr>
+          <a:lstStyle/>
+          <a:p>
+            <a:r>
+              <a:rPr lang="de-DE" sz="2800" dirty="0"/>
+              <a:t>https://gitlab.inf.unibz.it/Jana.Karas/cloud-computing-project</a:t>
+            </a:r>
+          </a:p>
+        </p:txBody>
+      </p:sp>
+      <p:pic>
+        <p:nvPicPr>
+          <p:cNvPr id="6" name="Grafik 5">
+            <a:extLst>
+              <a:ext uri="{FF2B5EF4-FFF2-40B4-BE49-F238E27FC236}">
+                <a16:creationId xmlns:a16="http://schemas.microsoft.com/office/drawing/2014/main" id="{BFCBC996-5DE8-D3B6-4865-A2B9DF3908FF}"/>
+              </a:ext>
+            </a:extLst>
+          </p:cNvPr>
+          <p:cNvPicPr>
+            <a:picLocks noChangeAspect="1"/>
+          </p:cNvPicPr>
+          <p:nvPr/>
+        </p:nvPicPr>
+        <p:blipFill>
+          <a:blip r:embed="rId2">
+            <a:extLst>
+              <a:ext uri="{28A0092B-C50C-407E-A947-70E740481C1C}">
+                <a14:useLocalDpi xmlns:a14="http://schemas.microsoft.com/office/drawing/2010/main" val="0"/>
+              </a:ext>
+              <a:ext uri="{96DAC541-7B7A-43D3-8B79-37D633B846F1}">
+                <asvg:svgBlip xmlns:asvg="http://schemas.microsoft.com/office/drawing/2016/SVG/main" r:embed="rId3"/>
+              </a:ext>
+            </a:extLst>
+          </a:blip>
+          <a:stretch>
+            <a:fillRect/>
+          </a:stretch>
+        </p:blipFill>
+        <p:spPr>
+          <a:xfrm>
+            <a:off x="5583858" y="4133532"/>
+            <a:ext cx="1024284" cy="1024284"/>
+          </a:xfrm>
+          <a:prstGeom prst="rect">
+            <a:avLst/>
+          </a:prstGeom>
+        </p:spPr>
+      </p:pic>
     </p:spTree>
     <p:extLst>
       <p:ext uri="{BB962C8B-B14F-4D97-AF65-F5344CB8AC3E}">
-        <p14:creationId xmlns:p14="http://schemas.microsoft.com/office/powerpoint/2010/main" val="3888514522"/>
+        <p14:creationId xmlns:p14="http://schemas.microsoft.com/office/powerpoint/2010/main" val="1611829248"/>
       </p:ext>
     </p:extLst>
   </p:cSld>
@@ -16029,110 +15822,6 @@
             <p:ph type="ctrTitle"/>
           </p:nvPr>
         </p:nvSpPr>
-        <p:spPr>
-          <a:xfrm>
-            <a:off x="1524000" y="1432464"/>
-            <a:ext cx="9144000" cy="2387600"/>
-          </a:xfrm>
-        </p:spPr>
-        <p:txBody>
-          <a:bodyPr>
-            <a:normAutofit/>
-          </a:bodyPr>
-          <a:lstStyle/>
-          <a:p>
-            <a:r>
-              <a:rPr lang="de-DE" sz="2800" dirty="0"/>
-              <a:t>https://gitlab.inf.unibz.it/Jana.Karas/cloud-computing-project</a:t>
-            </a:r>
-          </a:p>
-        </p:txBody>
-      </p:sp>
-      <p:pic>
-        <p:nvPicPr>
-          <p:cNvPr id="6" name="Grafik 5">
-            <a:extLst>
-              <a:ext uri="{FF2B5EF4-FFF2-40B4-BE49-F238E27FC236}">
-                <a16:creationId xmlns:a16="http://schemas.microsoft.com/office/drawing/2014/main" id="{BFCBC996-5DE8-D3B6-4865-A2B9DF3908FF}"/>
-              </a:ext>
-            </a:extLst>
-          </p:cNvPr>
-          <p:cNvPicPr>
-            <a:picLocks noChangeAspect="1"/>
-          </p:cNvPicPr>
-          <p:nvPr/>
-        </p:nvPicPr>
-        <p:blipFill>
-          <a:blip r:embed="rId2">
-            <a:extLst>
-              <a:ext uri="{28A0092B-C50C-407E-A947-70E740481C1C}">
-                <a14:useLocalDpi xmlns:a14="http://schemas.microsoft.com/office/drawing/2010/main" val="0"/>
-              </a:ext>
-              <a:ext uri="{96DAC541-7B7A-43D3-8B79-37D633B846F1}">
-                <asvg:svgBlip xmlns:asvg="http://schemas.microsoft.com/office/drawing/2016/SVG/main" r:embed="rId3"/>
-              </a:ext>
-            </a:extLst>
-          </a:blip>
-          <a:stretch>
-            <a:fillRect/>
-          </a:stretch>
-        </p:blipFill>
-        <p:spPr>
-          <a:xfrm>
-            <a:off x="5583858" y="4133532"/>
-            <a:ext cx="1024284" cy="1024284"/>
-          </a:xfrm>
-          <a:prstGeom prst="rect">
-            <a:avLst/>
-          </a:prstGeom>
-        </p:spPr>
-      </p:pic>
-    </p:spTree>
-    <p:extLst>
-      <p:ext uri="{BB962C8B-B14F-4D97-AF65-F5344CB8AC3E}">
-        <p14:creationId xmlns:p14="http://schemas.microsoft.com/office/powerpoint/2010/main" val="1611829248"/>
-      </p:ext>
-    </p:extLst>
-  </p:cSld>
-  <p:clrMapOvr>
-    <a:masterClrMapping/>
-  </p:clrMapOvr>
-</p:sld>
-</file>
-
-<file path=ppt/slides/slide27.xml><?xml version="1.0" encoding="utf-8"?>
-<p:sld xmlns:a="http://schemas.openxmlformats.org/drawingml/2006/main" xmlns:r="http://schemas.openxmlformats.org/officeDocument/2006/relationships" xmlns:p="http://schemas.openxmlformats.org/presentationml/2006/main">
-  <p:cSld>
-    <p:spTree>
-      <p:nvGrpSpPr>
-        <p:cNvPr id="1" name=""/>
-        <p:cNvGrpSpPr/>
-        <p:nvPr/>
-      </p:nvGrpSpPr>
-      <p:grpSpPr>
-        <a:xfrm>
-          <a:off x="0" y="0"/>
-          <a:ext cx="0" cy="0"/>
-          <a:chOff x="0" y="0"/>
-          <a:chExt cx="0" cy="0"/>
-        </a:xfrm>
-      </p:grpSpPr>
-      <p:sp>
-        <p:nvSpPr>
-          <p:cNvPr id="2" name="Titel 1">
-            <a:extLst>
-              <a:ext uri="{FF2B5EF4-FFF2-40B4-BE49-F238E27FC236}">
-                <a16:creationId xmlns:a16="http://schemas.microsoft.com/office/drawing/2014/main" id="{423EE35B-33E3-42A0-BBDA-368E8D825D7E}"/>
-              </a:ext>
-            </a:extLst>
-          </p:cNvPr>
-          <p:cNvSpPr>
-            <a:spLocks noGrp="1"/>
-          </p:cNvSpPr>
-          <p:nvPr>
-            <p:ph type="ctrTitle"/>
-          </p:nvPr>
-        </p:nvSpPr>
         <p:spPr/>
         <p:txBody>
           <a:bodyPr/>
@@ -16188,7 +15877,7 @@
 </p:sld>
 </file>
 
-<file path=ppt/slides/slide28.xml><?xml version="1.0" encoding="utf-8"?>
+<file path=ppt/slides/slide27.xml><?xml version="1.0" encoding="utf-8"?>
 <p:sld xmlns:a="http://schemas.openxmlformats.org/drawingml/2006/main" xmlns:r="http://schemas.openxmlformats.org/officeDocument/2006/relationships" xmlns:p="http://schemas.openxmlformats.org/presentationml/2006/main">
   <p:cSld>
     <p:spTree>
@@ -17012,7 +16701,7 @@
 </p:sld>
 </file>
 
-<file path=ppt/slides/slide29.xml><?xml version="1.0" encoding="utf-8"?>
+<file path=ppt/slides/slide28.xml><?xml version="1.0" encoding="utf-8"?>
 <p:sld xmlns:a="http://schemas.openxmlformats.org/drawingml/2006/main" xmlns:r="http://schemas.openxmlformats.org/officeDocument/2006/relationships" xmlns:p="http://schemas.openxmlformats.org/presentationml/2006/main">
   <p:cSld>
     <p:spTree>
@@ -18142,106 +17831,7 @@
 </p:sld>
 </file>
 
-<file path=ppt/slides/slide3.xml><?xml version="1.0" encoding="utf-8"?>
-<p:sld xmlns:a="http://schemas.openxmlformats.org/drawingml/2006/main" xmlns:r="http://schemas.openxmlformats.org/officeDocument/2006/relationships" xmlns:p="http://schemas.openxmlformats.org/presentationml/2006/main">
-  <p:cSld>
-    <p:bg>
-      <p:bgPr>
-        <a:solidFill>
-          <a:srgbClr val="516482"/>
-        </a:solidFill>
-        <a:effectLst/>
-      </p:bgPr>
-    </p:bg>
-    <p:spTree>
-      <p:nvGrpSpPr>
-        <p:cNvPr id="1" name=""/>
-        <p:cNvGrpSpPr/>
-        <p:nvPr/>
-      </p:nvGrpSpPr>
-      <p:grpSpPr>
-        <a:xfrm>
-          <a:off x="0" y="0"/>
-          <a:ext cx="0" cy="0"/>
-          <a:chOff x="0" y="0"/>
-          <a:chExt cx="0" cy="0"/>
-        </a:xfrm>
-      </p:grpSpPr>
-      <p:sp>
-        <p:nvSpPr>
-          <p:cNvPr id="2" name="Titel 1">
-            <a:extLst>
-              <a:ext uri="{FF2B5EF4-FFF2-40B4-BE49-F238E27FC236}">
-                <a16:creationId xmlns:a16="http://schemas.microsoft.com/office/drawing/2014/main" id="{423EE35B-33E3-42A0-BBDA-368E8D825D7E}"/>
-              </a:ext>
-            </a:extLst>
-          </p:cNvPr>
-          <p:cNvSpPr>
-            <a:spLocks noGrp="1"/>
-          </p:cNvSpPr>
-          <p:nvPr>
-            <p:ph type="ctrTitle"/>
-          </p:nvPr>
-        </p:nvSpPr>
-        <p:spPr/>
-        <p:txBody>
-          <a:bodyPr/>
-          <a:lstStyle/>
-          <a:p>
-            <a:r>
-              <a:rPr lang="de-DE" dirty="0"/>
-              <a:t>Basic </a:t>
-            </a:r>
-            <a:r>
-              <a:rPr lang="de-DE" dirty="0" err="1"/>
-              <a:t>Idea</a:t>
-            </a:r>
-            <a:r>
-              <a:rPr lang="de-DE" dirty="0"/>
-              <a:t> &amp; Tools</a:t>
-            </a:r>
-          </a:p>
-        </p:txBody>
-      </p:sp>
-      <p:sp>
-        <p:nvSpPr>
-          <p:cNvPr id="5" name="Untertitel 4">
-            <a:extLst>
-              <a:ext uri="{FF2B5EF4-FFF2-40B4-BE49-F238E27FC236}">
-                <a16:creationId xmlns:a16="http://schemas.microsoft.com/office/drawing/2014/main" id="{B11A7254-9FA9-40F3-BD35-E1C8D97446A8}"/>
-              </a:ext>
-            </a:extLst>
-          </p:cNvPr>
-          <p:cNvSpPr>
-            <a:spLocks noGrp="1"/>
-          </p:cNvSpPr>
-          <p:nvPr>
-            <p:ph type="subTitle" idx="1"/>
-          </p:nvPr>
-        </p:nvSpPr>
-        <p:spPr/>
-        <p:txBody>
-          <a:bodyPr/>
-          <a:lstStyle/>
-          <a:p>
-            <a:endParaRPr lang="de-DE"/>
-          </a:p>
-        </p:txBody>
-      </p:sp>
-    </p:spTree>
-    <p:extLst>
-      <p:ext uri="{BB962C8B-B14F-4D97-AF65-F5344CB8AC3E}">
-        <p14:creationId xmlns:p14="http://schemas.microsoft.com/office/powerpoint/2010/main" val="1443446330"/>
-      </p:ext>
-    </p:extLst>
-  </p:cSld>
-  <p:clrMapOvr>
-    <a:masterClrMapping/>
-  </p:clrMapOvr>
-</p:sld>
-</file>
-
-<file path=ppt/slides/slide30.xml><?xml version="1.0" encoding="utf-8"?>
+<file path=ppt/slides/slide29.xml><?xml version="1.0" encoding="utf-8"?>
 <p:sld xmlns:a="http://schemas.openxmlformats.org/drawingml/2006/main" xmlns:r="http://schemas.openxmlformats.org/officeDocument/2006/relationships" xmlns:p="http://schemas.openxmlformats.org/presentationml/2006/main">
   <p:cSld>
     <p:spTree>
@@ -20126,7 +19716,106 @@
 </p:sld>
 </file>
 
-<file path=ppt/slides/slide31.xml><?xml version="1.0" encoding="utf-8"?>
+<file path=ppt/slides/slide3.xml><?xml version="1.0" encoding="utf-8"?>
+<p:sld xmlns:a="http://schemas.openxmlformats.org/drawingml/2006/main" xmlns:r="http://schemas.openxmlformats.org/officeDocument/2006/relationships" xmlns:p="http://schemas.openxmlformats.org/presentationml/2006/main">
+  <p:cSld>
+    <p:bg>
+      <p:bgPr>
+        <a:solidFill>
+          <a:srgbClr val="516482"/>
+        </a:solidFill>
+        <a:effectLst/>
+      </p:bgPr>
+    </p:bg>
+    <p:spTree>
+      <p:nvGrpSpPr>
+        <p:cNvPr id="1" name=""/>
+        <p:cNvGrpSpPr/>
+        <p:nvPr/>
+      </p:nvGrpSpPr>
+      <p:grpSpPr>
+        <a:xfrm>
+          <a:off x="0" y="0"/>
+          <a:ext cx="0" cy="0"/>
+          <a:chOff x="0" y="0"/>
+          <a:chExt cx="0" cy="0"/>
+        </a:xfrm>
+      </p:grpSpPr>
+      <p:sp>
+        <p:nvSpPr>
+          <p:cNvPr id="2" name="Titel 1">
+            <a:extLst>
+              <a:ext uri="{FF2B5EF4-FFF2-40B4-BE49-F238E27FC236}">
+                <a16:creationId xmlns:a16="http://schemas.microsoft.com/office/drawing/2014/main" id="{423EE35B-33E3-42A0-BBDA-368E8D825D7E}"/>
+              </a:ext>
+            </a:extLst>
+          </p:cNvPr>
+          <p:cNvSpPr>
+            <a:spLocks noGrp="1"/>
+          </p:cNvSpPr>
+          <p:nvPr>
+            <p:ph type="ctrTitle"/>
+          </p:nvPr>
+        </p:nvSpPr>
+        <p:spPr/>
+        <p:txBody>
+          <a:bodyPr/>
+          <a:lstStyle/>
+          <a:p>
+            <a:r>
+              <a:rPr lang="de-DE" dirty="0"/>
+              <a:t>Basic </a:t>
+            </a:r>
+            <a:r>
+              <a:rPr lang="de-DE" dirty="0" err="1"/>
+              <a:t>Idea</a:t>
+            </a:r>
+            <a:r>
+              <a:rPr lang="de-DE" dirty="0"/>
+              <a:t> &amp; Tools</a:t>
+            </a:r>
+          </a:p>
+        </p:txBody>
+      </p:sp>
+      <p:sp>
+        <p:nvSpPr>
+          <p:cNvPr id="5" name="Untertitel 4">
+            <a:extLst>
+              <a:ext uri="{FF2B5EF4-FFF2-40B4-BE49-F238E27FC236}">
+                <a16:creationId xmlns:a16="http://schemas.microsoft.com/office/drawing/2014/main" id="{B11A7254-9FA9-40F3-BD35-E1C8D97446A8}"/>
+              </a:ext>
+            </a:extLst>
+          </p:cNvPr>
+          <p:cNvSpPr>
+            <a:spLocks noGrp="1"/>
+          </p:cNvSpPr>
+          <p:nvPr>
+            <p:ph type="subTitle" idx="1"/>
+          </p:nvPr>
+        </p:nvSpPr>
+        <p:spPr/>
+        <p:txBody>
+          <a:bodyPr/>
+          <a:lstStyle/>
+          <a:p>
+            <a:endParaRPr lang="de-DE"/>
+          </a:p>
+        </p:txBody>
+      </p:sp>
+    </p:spTree>
+    <p:extLst>
+      <p:ext uri="{BB962C8B-B14F-4D97-AF65-F5344CB8AC3E}">
+        <p14:creationId xmlns:p14="http://schemas.microsoft.com/office/powerpoint/2010/main" val="1443446330"/>
+      </p:ext>
+    </p:extLst>
+  </p:cSld>
+  <p:clrMapOvr>
+    <a:masterClrMapping/>
+  </p:clrMapOvr>
+</p:sld>
+</file>
+
+<file path=ppt/slides/slide30.xml><?xml version="1.0" encoding="utf-8"?>
 <p:sld xmlns:a="http://schemas.openxmlformats.org/drawingml/2006/main" xmlns:r="http://schemas.openxmlformats.org/officeDocument/2006/relationships" xmlns:p="http://schemas.openxmlformats.org/presentationml/2006/main" show="0">
   <p:cSld>
     <p:spTree>
@@ -20349,7 +20038,7 @@
 </p:sld>
 </file>
 
-<file path=ppt/slides/slide32.xml><?xml version="1.0" encoding="utf-8"?>
+<file path=ppt/slides/slide31.xml><?xml version="1.0" encoding="utf-8"?>
 <p:sld xmlns:a="http://schemas.openxmlformats.org/drawingml/2006/main" xmlns:r="http://schemas.openxmlformats.org/officeDocument/2006/relationships" xmlns:p="http://schemas.openxmlformats.org/presentationml/2006/main" show="0">
   <p:cSld>
     <p:spTree>

</xml_diff>